<commit_message>
Asset system - starting over
</commit_message>
<xml_diff>
--- a/Documentation/Asset Pipeline.pptx
+++ b/Documentation/Asset Pipeline.pptx
@@ -273,7 +273,7 @@
           <a:p>
             <a:fld id="{783DC7D5-4D76-4679-A391-31CBAFA90932}" type="datetimeFigureOut">
               <a:rPr lang="en-US" smtClean="0"/>
-              <a:t>3/31/2024</a:t>
+              <a:t>4/21/2024</a:t>
             </a:fld>
             <a:endParaRPr lang="en-US"/>
           </a:p>
@@ -471,7 +471,7 @@
           <a:p>
             <a:fld id="{783DC7D5-4D76-4679-A391-31CBAFA90932}" type="datetimeFigureOut">
               <a:rPr lang="en-US" smtClean="0"/>
-              <a:t>3/31/2024</a:t>
+              <a:t>4/21/2024</a:t>
             </a:fld>
             <a:endParaRPr lang="en-US"/>
           </a:p>
@@ -679,7 +679,7 @@
           <a:p>
             <a:fld id="{783DC7D5-4D76-4679-A391-31CBAFA90932}" type="datetimeFigureOut">
               <a:rPr lang="en-US" smtClean="0"/>
-              <a:t>3/31/2024</a:t>
+              <a:t>4/21/2024</a:t>
             </a:fld>
             <a:endParaRPr lang="en-US"/>
           </a:p>
@@ -877,7 +877,7 @@
           <a:p>
             <a:fld id="{783DC7D5-4D76-4679-A391-31CBAFA90932}" type="datetimeFigureOut">
               <a:rPr lang="en-US" smtClean="0"/>
-              <a:t>3/31/2024</a:t>
+              <a:t>4/21/2024</a:t>
             </a:fld>
             <a:endParaRPr lang="en-US"/>
           </a:p>
@@ -1152,7 +1152,7 @@
           <a:p>
             <a:fld id="{783DC7D5-4D76-4679-A391-31CBAFA90932}" type="datetimeFigureOut">
               <a:rPr lang="en-US" smtClean="0"/>
-              <a:t>3/31/2024</a:t>
+              <a:t>4/21/2024</a:t>
             </a:fld>
             <a:endParaRPr lang="en-US"/>
           </a:p>
@@ -1417,7 +1417,7 @@
           <a:p>
             <a:fld id="{783DC7D5-4D76-4679-A391-31CBAFA90932}" type="datetimeFigureOut">
               <a:rPr lang="en-US" smtClean="0"/>
-              <a:t>3/31/2024</a:t>
+              <a:t>4/21/2024</a:t>
             </a:fld>
             <a:endParaRPr lang="en-US"/>
           </a:p>
@@ -1829,7 +1829,7 @@
           <a:p>
             <a:fld id="{783DC7D5-4D76-4679-A391-31CBAFA90932}" type="datetimeFigureOut">
               <a:rPr lang="en-US" smtClean="0"/>
-              <a:t>3/31/2024</a:t>
+              <a:t>4/21/2024</a:t>
             </a:fld>
             <a:endParaRPr lang="en-US"/>
           </a:p>
@@ -1970,7 +1970,7 @@
           <a:p>
             <a:fld id="{783DC7D5-4D76-4679-A391-31CBAFA90932}" type="datetimeFigureOut">
               <a:rPr lang="en-US" smtClean="0"/>
-              <a:t>3/31/2024</a:t>
+              <a:t>4/21/2024</a:t>
             </a:fld>
             <a:endParaRPr lang="en-US"/>
           </a:p>
@@ -2083,7 +2083,7 @@
           <a:p>
             <a:fld id="{783DC7D5-4D76-4679-A391-31CBAFA90932}" type="datetimeFigureOut">
               <a:rPr lang="en-US" smtClean="0"/>
-              <a:t>3/31/2024</a:t>
+              <a:t>4/21/2024</a:t>
             </a:fld>
             <a:endParaRPr lang="en-US"/>
           </a:p>
@@ -2394,7 +2394,7 @@
           <a:p>
             <a:fld id="{783DC7D5-4D76-4679-A391-31CBAFA90932}" type="datetimeFigureOut">
               <a:rPr lang="en-US" smtClean="0"/>
-              <a:t>3/31/2024</a:t>
+              <a:t>4/21/2024</a:t>
             </a:fld>
             <a:endParaRPr lang="en-US"/>
           </a:p>
@@ -2682,7 +2682,7 @@
           <a:p>
             <a:fld id="{783DC7D5-4D76-4679-A391-31CBAFA90932}" type="datetimeFigureOut">
               <a:rPr lang="en-US" smtClean="0"/>
-              <a:t>3/31/2024</a:t>
+              <a:t>4/21/2024</a:t>
             </a:fld>
             <a:endParaRPr lang="en-US"/>
           </a:p>
@@ -2923,7 +2923,7 @@
           <a:p>
             <a:fld id="{783DC7D5-4D76-4679-A391-31CBAFA90932}" type="datetimeFigureOut">
               <a:rPr lang="en-US" smtClean="0"/>
-              <a:t>3/31/2024</a:t>
+              <a:t>4/21/2024</a:t>
             </a:fld>
             <a:endParaRPr lang="en-US"/>
           </a:p>
@@ -3567,7 +3567,15 @@
           <a:p>
             <a:r>
               <a:rPr lang="en-US" sz="1600" dirty="0"/>
-              <a:t>Assets authored in external programs cannot be used directly either by the editor or by the game:</a:t>
+              <a:t>Assets authored in external programs sometimes</a:t>
+            </a:r>
+            <a:r>
+              <a:rPr lang="pl-PL" sz="1600" dirty="0"/>
+              <a:t> </a:t>
+            </a:r>
+            <a:r>
+              <a:rPr lang="en-US" sz="1600" dirty="0"/>
+              <a:t>cannot be used directly either by the editor or by the game:</a:t>
             </a:r>
           </a:p>
           <a:p>
@@ -3579,7 +3587,7 @@
           <a:p>
             <a:r>
               <a:rPr lang="en-US" sz="1600" dirty="0"/>
-              <a:t>- Multiple formats</a:t>
+              <a:t>- Many existing formats</a:t>
             </a:r>
           </a:p>
           <a:p>
@@ -3841,10 +3849,10 @@
       </p:sp>
       <p:sp>
         <p:nvSpPr>
-          <p:cNvPr id="22" name="Rectangle: Rounded Corners 21">
-            <a:extLst>
-              <a:ext uri="{FF2B5EF4-FFF2-40B4-BE49-F238E27FC236}">
-                <a16:creationId xmlns:a16="http://schemas.microsoft.com/office/drawing/2014/main" id="{58D49D8A-9C50-E6F3-2EB8-E33388A5D558}"/>
+          <p:cNvPr id="14" name="Rectangle: Rounded Corners 13">
+            <a:extLst>
+              <a:ext uri="{FF2B5EF4-FFF2-40B4-BE49-F238E27FC236}">
+                <a16:creationId xmlns:a16="http://schemas.microsoft.com/office/drawing/2014/main" id="{A8B24E9D-2FFE-8970-4A92-BC67E23FD65D}"/>
               </a:ext>
             </a:extLst>
           </p:cNvPr>
@@ -3853,7 +3861,7 @@
         </p:nvSpPr>
         <p:spPr>
           <a:xfrm>
-            <a:off x="8031367" y="2371999"/>
+            <a:off x="8006688" y="3092823"/>
             <a:ext cx="1256082" cy="350943"/>
           </a:xfrm>
           <a:prstGeom prst="roundRect">
@@ -3892,10 +3900,10 @@
       </p:sp>
       <p:sp>
         <p:nvSpPr>
-          <p:cNvPr id="12" name="Rectangle: Rounded Corners 11">
-            <a:extLst>
-              <a:ext uri="{FF2B5EF4-FFF2-40B4-BE49-F238E27FC236}">
-                <a16:creationId xmlns:a16="http://schemas.microsoft.com/office/drawing/2014/main" id="{5BFBFEF2-E063-6223-9BA9-05D6B21CF483}"/>
+          <p:cNvPr id="19" name="Rectangle: Rounded Corners 18">
+            <a:extLst>
+              <a:ext uri="{FF2B5EF4-FFF2-40B4-BE49-F238E27FC236}">
+                <a16:creationId xmlns:a16="http://schemas.microsoft.com/office/drawing/2014/main" id="{C4A9DF4A-74EC-E9B3-1A93-12C76F4588EE}"/>
               </a:ext>
             </a:extLst>
           </p:cNvPr>
@@ -3904,7 +3912,7 @@
         </p:nvSpPr>
         <p:spPr>
           <a:xfrm>
-            <a:off x="6275759" y="2373258"/>
+            <a:off x="8006688" y="3720983"/>
             <a:ext cx="1256082" cy="350943"/>
           </a:xfrm>
           <a:prstGeom prst="roundRect">
@@ -3936,17 +3944,17 @@
                   <a:schemeClr val="tx1"/>
                 </a:solidFill>
               </a:rPr>
-              <a:t>Asset Source</a:t>
-            </a:r>
-          </a:p>
-        </p:txBody>
-      </p:sp>
-      <p:sp>
-        <p:nvSpPr>
-          <p:cNvPr id="14" name="Rectangle: Rounded Corners 13">
-            <a:extLst>
-              <a:ext uri="{FF2B5EF4-FFF2-40B4-BE49-F238E27FC236}">
-                <a16:creationId xmlns:a16="http://schemas.microsoft.com/office/drawing/2014/main" id="{A8B24E9D-2FFE-8970-4A92-BC67E23FD65D}"/>
+              <a:t>Asset Proxy</a:t>
+            </a:r>
+          </a:p>
+        </p:txBody>
+      </p:sp>
+      <p:sp>
+        <p:nvSpPr>
+          <p:cNvPr id="21" name="Rectangle: Rounded Corners 20">
+            <a:extLst>
+              <a:ext uri="{FF2B5EF4-FFF2-40B4-BE49-F238E27FC236}">
+                <a16:creationId xmlns:a16="http://schemas.microsoft.com/office/drawing/2014/main" id="{B3BEE67D-16C1-8266-9492-13ACC6A3A4BC}"/>
               </a:ext>
             </a:extLst>
           </p:cNvPr>
@@ -3955,7 +3963,7 @@
         </p:nvSpPr>
         <p:spPr>
           <a:xfrm>
-            <a:off x="8031367" y="3622180"/>
+            <a:off x="6251080" y="4710688"/>
             <a:ext cx="1256082" cy="350943"/>
           </a:xfrm>
           <a:prstGeom prst="roundRect">
@@ -3987,17 +3995,17 @@
                   <a:schemeClr val="tx1"/>
                 </a:solidFill>
               </a:rPr>
-              <a:t>Asset Proxy</a:t>
-            </a:r>
-          </a:p>
-        </p:txBody>
-      </p:sp>
-      <p:sp>
-        <p:nvSpPr>
-          <p:cNvPr id="19" name="Rectangle: Rounded Corners 18">
-            <a:extLst>
-              <a:ext uri="{FF2B5EF4-FFF2-40B4-BE49-F238E27FC236}">
-                <a16:creationId xmlns:a16="http://schemas.microsoft.com/office/drawing/2014/main" id="{C4A9DF4A-74EC-E9B3-1A93-12C76F4588EE}"/>
+              <a:t>Asset Source</a:t>
+            </a:r>
+          </a:p>
+        </p:txBody>
+      </p:sp>
+      <p:sp>
+        <p:nvSpPr>
+          <p:cNvPr id="23" name="Rectangle: Rounded Corners 22">
+            <a:extLst>
+              <a:ext uri="{FF2B5EF4-FFF2-40B4-BE49-F238E27FC236}">
+                <a16:creationId xmlns:a16="http://schemas.microsoft.com/office/drawing/2014/main" id="{0AA9B7D8-3394-6E5D-51DF-A8F8E02666CB}"/>
               </a:ext>
             </a:extLst>
           </p:cNvPr>
@@ -4006,7 +4014,7 @@
         </p:nvSpPr>
         <p:spPr>
           <a:xfrm>
-            <a:off x="8031367" y="4250340"/>
+            <a:off x="8006688" y="4387471"/>
             <a:ext cx="1256082" cy="350943"/>
           </a:xfrm>
           <a:prstGeom prst="roundRect">
@@ -4045,10 +4053,10 @@
       </p:sp>
       <p:sp>
         <p:nvSpPr>
-          <p:cNvPr id="21" name="Rectangle: Rounded Corners 20">
-            <a:extLst>
-              <a:ext uri="{FF2B5EF4-FFF2-40B4-BE49-F238E27FC236}">
-                <a16:creationId xmlns:a16="http://schemas.microsoft.com/office/drawing/2014/main" id="{B3BEE67D-16C1-8266-9492-13ACC6A3A4BC}"/>
+          <p:cNvPr id="26" name="Rectangle: Rounded Corners 25">
+            <a:extLst>
+              <a:ext uri="{FF2B5EF4-FFF2-40B4-BE49-F238E27FC236}">
+                <a16:creationId xmlns:a16="http://schemas.microsoft.com/office/drawing/2014/main" id="{88D70D07-FE3B-EC1C-709D-AC86198386C7}"/>
               </a:ext>
             </a:extLst>
           </p:cNvPr>
@@ -4057,7 +4065,7 @@
         </p:nvSpPr>
         <p:spPr>
           <a:xfrm>
-            <a:off x="6275759" y="5240045"/>
+            <a:off x="8006688" y="5022861"/>
             <a:ext cx="1256082" cy="350943"/>
           </a:xfrm>
           <a:prstGeom prst="roundRect">
@@ -4089,17 +4097,17 @@
                   <a:schemeClr val="tx1"/>
                 </a:solidFill>
               </a:rPr>
-              <a:t>Asset Source</a:t>
-            </a:r>
-          </a:p>
-        </p:txBody>
-      </p:sp>
-      <p:sp>
-        <p:nvSpPr>
-          <p:cNvPr id="23" name="Rectangle: Rounded Corners 22">
-            <a:extLst>
-              <a:ext uri="{FF2B5EF4-FFF2-40B4-BE49-F238E27FC236}">
-                <a16:creationId xmlns:a16="http://schemas.microsoft.com/office/drawing/2014/main" id="{0AA9B7D8-3394-6E5D-51DF-A8F8E02666CB}"/>
+              <a:t>Asset Proxy</a:t>
+            </a:r>
+          </a:p>
+        </p:txBody>
+      </p:sp>
+      <p:sp>
+        <p:nvSpPr>
+          <p:cNvPr id="30" name="Rectangle: Rounded Corners 29">
+            <a:extLst>
+              <a:ext uri="{FF2B5EF4-FFF2-40B4-BE49-F238E27FC236}">
+                <a16:creationId xmlns:a16="http://schemas.microsoft.com/office/drawing/2014/main" id="{E45F4621-3998-D58E-5535-ADD2BFAF0E5A}"/>
               </a:ext>
             </a:extLst>
           </p:cNvPr>
@@ -4108,7 +4116,315 @@
         </p:nvSpPr>
         <p:spPr>
           <a:xfrm>
-            <a:off x="8031367" y="4916828"/>
+            <a:off x="10214948" y="2451731"/>
+            <a:ext cx="1256082" cy="342651"/>
+          </a:xfrm>
+          <a:prstGeom prst="roundRect">
+            <a:avLst/>
+          </a:prstGeom>
+          <a:solidFill>
+            <a:schemeClr val="accent4">
+              <a:alpha val="50000"/>
+            </a:schemeClr>
+          </a:solidFill>
+          <a:ln>
+            <a:noFill/>
+          </a:ln>
+        </p:spPr>
+        <p:style>
+          <a:lnRef idx="0">
+            <a:scrgbClr r="0" g="0" b="0"/>
+          </a:lnRef>
+          <a:fillRef idx="0">
+            <a:scrgbClr r="0" g="0" b="0"/>
+          </a:fillRef>
+          <a:effectRef idx="0">
+            <a:scrgbClr r="0" g="0" b="0"/>
+          </a:effectRef>
+          <a:fontRef idx="minor">
+            <a:schemeClr val="lt1"/>
+          </a:fontRef>
+        </p:style>
+        <p:txBody>
+          <a:bodyPr rtlCol="0" anchor="ctr"/>
+          <a:lstStyle/>
+          <a:p>
+            <a:pPr algn="ctr"/>
+            <a:r>
+              <a:rPr lang="en-US" sz="1400" dirty="0">
+                <a:solidFill>
+                  <a:schemeClr val="tx1"/>
+                </a:solidFill>
+              </a:rPr>
+              <a:t>Asse</a:t>
+            </a:r>
+            <a:r>
+              <a:rPr lang="pl-PL" sz="1400" dirty="0">
+                <a:solidFill>
+                  <a:schemeClr val="tx1"/>
+                </a:solidFill>
+              </a:rPr>
+              <a:t>t</a:t>
+            </a:r>
+            <a:endParaRPr lang="en-US" sz="1400" dirty="0">
+              <a:solidFill>
+                <a:schemeClr val="tx1"/>
+              </a:solidFill>
+            </a:endParaRPr>
+          </a:p>
+        </p:txBody>
+      </p:sp>
+      <p:sp>
+        <p:nvSpPr>
+          <p:cNvPr id="31" name="Rectangle: Rounded Corners 30">
+            <a:extLst>
+              <a:ext uri="{FF2B5EF4-FFF2-40B4-BE49-F238E27FC236}">
+                <a16:creationId xmlns:a16="http://schemas.microsoft.com/office/drawing/2014/main" id="{FE6023C5-65C7-4233-6EF7-3136820A32BC}"/>
+              </a:ext>
+            </a:extLst>
+          </p:cNvPr>
+          <p:cNvSpPr/>
+          <p:nvPr/>
+        </p:nvSpPr>
+        <p:spPr>
+          <a:xfrm>
+            <a:off x="10190269" y="3103364"/>
+            <a:ext cx="1256082" cy="342651"/>
+          </a:xfrm>
+          <a:prstGeom prst="roundRect">
+            <a:avLst/>
+          </a:prstGeom>
+          <a:solidFill>
+            <a:schemeClr val="accent4">
+              <a:alpha val="50000"/>
+            </a:schemeClr>
+          </a:solidFill>
+          <a:ln>
+            <a:noFill/>
+          </a:ln>
+        </p:spPr>
+        <p:style>
+          <a:lnRef idx="0">
+            <a:scrgbClr r="0" g="0" b="0"/>
+          </a:lnRef>
+          <a:fillRef idx="0">
+            <a:scrgbClr r="0" g="0" b="0"/>
+          </a:fillRef>
+          <a:effectRef idx="0">
+            <a:scrgbClr r="0" g="0" b="0"/>
+          </a:effectRef>
+          <a:fontRef idx="minor">
+            <a:schemeClr val="lt1"/>
+          </a:fontRef>
+        </p:style>
+        <p:txBody>
+          <a:bodyPr rtlCol="0" anchor="ctr"/>
+          <a:lstStyle/>
+          <a:p>
+            <a:pPr algn="ctr"/>
+            <a:r>
+              <a:rPr lang="en-US" sz="1400" dirty="0">
+                <a:solidFill>
+                  <a:schemeClr val="tx1"/>
+                </a:solidFill>
+              </a:rPr>
+              <a:t>Asset</a:t>
+            </a:r>
+          </a:p>
+        </p:txBody>
+      </p:sp>
+      <p:sp>
+        <p:nvSpPr>
+          <p:cNvPr id="97" name="Rectangle: Rounded Corners 96">
+            <a:extLst>
+              <a:ext uri="{FF2B5EF4-FFF2-40B4-BE49-F238E27FC236}">
+                <a16:creationId xmlns:a16="http://schemas.microsoft.com/office/drawing/2014/main" id="{B82C1784-C72C-0F57-3753-A90D4E3A794D}"/>
+              </a:ext>
+            </a:extLst>
+          </p:cNvPr>
+          <p:cNvSpPr/>
+          <p:nvPr/>
+        </p:nvSpPr>
+        <p:spPr>
+          <a:xfrm>
+            <a:off x="10183643" y="3725129"/>
+            <a:ext cx="1256082" cy="342651"/>
+          </a:xfrm>
+          <a:prstGeom prst="roundRect">
+            <a:avLst/>
+          </a:prstGeom>
+          <a:solidFill>
+            <a:schemeClr val="accent4">
+              <a:alpha val="50000"/>
+            </a:schemeClr>
+          </a:solidFill>
+          <a:ln>
+            <a:noFill/>
+          </a:ln>
+        </p:spPr>
+        <p:style>
+          <a:lnRef idx="0">
+            <a:scrgbClr r="0" g="0" b="0"/>
+          </a:lnRef>
+          <a:fillRef idx="0">
+            <a:scrgbClr r="0" g="0" b="0"/>
+          </a:fillRef>
+          <a:effectRef idx="0">
+            <a:scrgbClr r="0" g="0" b="0"/>
+          </a:effectRef>
+          <a:fontRef idx="minor">
+            <a:schemeClr val="lt1"/>
+          </a:fontRef>
+        </p:style>
+        <p:txBody>
+          <a:bodyPr rtlCol="0" anchor="ctr"/>
+          <a:lstStyle/>
+          <a:p>
+            <a:pPr algn="ctr"/>
+            <a:r>
+              <a:rPr lang="en-US" sz="1400" dirty="0">
+                <a:solidFill>
+                  <a:schemeClr val="tx1"/>
+                </a:solidFill>
+              </a:rPr>
+              <a:t>Asset</a:t>
+            </a:r>
+          </a:p>
+        </p:txBody>
+      </p:sp>
+      <p:sp>
+        <p:nvSpPr>
+          <p:cNvPr id="98" name="Rectangle: Rounded Corners 97">
+            <a:extLst>
+              <a:ext uri="{FF2B5EF4-FFF2-40B4-BE49-F238E27FC236}">
+                <a16:creationId xmlns:a16="http://schemas.microsoft.com/office/drawing/2014/main" id="{27EB69E3-5E74-E6D2-B4E8-BC7E0C6D8E2E}"/>
+              </a:ext>
+            </a:extLst>
+          </p:cNvPr>
+          <p:cNvSpPr/>
+          <p:nvPr/>
+        </p:nvSpPr>
+        <p:spPr>
+          <a:xfrm>
+            <a:off x="10183643" y="4382519"/>
+            <a:ext cx="1256082" cy="342651"/>
+          </a:xfrm>
+          <a:prstGeom prst="roundRect">
+            <a:avLst/>
+          </a:prstGeom>
+          <a:solidFill>
+            <a:schemeClr val="accent4">
+              <a:alpha val="50000"/>
+            </a:schemeClr>
+          </a:solidFill>
+          <a:ln>
+            <a:noFill/>
+          </a:ln>
+        </p:spPr>
+        <p:style>
+          <a:lnRef idx="0">
+            <a:scrgbClr r="0" g="0" b="0"/>
+          </a:lnRef>
+          <a:fillRef idx="0">
+            <a:scrgbClr r="0" g="0" b="0"/>
+          </a:fillRef>
+          <a:effectRef idx="0">
+            <a:scrgbClr r="0" g="0" b="0"/>
+          </a:effectRef>
+          <a:fontRef idx="minor">
+            <a:schemeClr val="lt1"/>
+          </a:fontRef>
+        </p:style>
+        <p:txBody>
+          <a:bodyPr rtlCol="0" anchor="ctr"/>
+          <a:lstStyle/>
+          <a:p>
+            <a:pPr algn="ctr"/>
+            <a:r>
+              <a:rPr lang="en-US" sz="1400" dirty="0">
+                <a:solidFill>
+                  <a:schemeClr val="tx1"/>
+                </a:solidFill>
+              </a:rPr>
+              <a:t>Asset</a:t>
+            </a:r>
+          </a:p>
+        </p:txBody>
+      </p:sp>
+      <p:sp>
+        <p:nvSpPr>
+          <p:cNvPr id="99" name="Rectangle: Rounded Corners 98">
+            <a:extLst>
+              <a:ext uri="{FF2B5EF4-FFF2-40B4-BE49-F238E27FC236}">
+                <a16:creationId xmlns:a16="http://schemas.microsoft.com/office/drawing/2014/main" id="{0BB7ACEF-E45A-5F29-14F2-EF850A80384F}"/>
+              </a:ext>
+            </a:extLst>
+          </p:cNvPr>
+          <p:cNvSpPr/>
+          <p:nvPr/>
+        </p:nvSpPr>
+        <p:spPr>
+          <a:xfrm>
+            <a:off x="10183643" y="5022861"/>
+            <a:ext cx="1256082" cy="342651"/>
+          </a:xfrm>
+          <a:prstGeom prst="roundRect">
+            <a:avLst/>
+          </a:prstGeom>
+          <a:solidFill>
+            <a:schemeClr val="accent4">
+              <a:alpha val="50000"/>
+            </a:schemeClr>
+          </a:solidFill>
+          <a:ln>
+            <a:noFill/>
+          </a:ln>
+        </p:spPr>
+        <p:style>
+          <a:lnRef idx="0">
+            <a:scrgbClr r="0" g="0" b="0"/>
+          </a:lnRef>
+          <a:fillRef idx="0">
+            <a:scrgbClr r="0" g="0" b="0"/>
+          </a:fillRef>
+          <a:effectRef idx="0">
+            <a:scrgbClr r="0" g="0" b="0"/>
+          </a:effectRef>
+          <a:fontRef idx="minor">
+            <a:schemeClr val="lt1"/>
+          </a:fontRef>
+        </p:style>
+        <p:txBody>
+          <a:bodyPr rtlCol="0" anchor="ctr"/>
+          <a:lstStyle/>
+          <a:p>
+            <a:pPr algn="ctr"/>
+            <a:r>
+              <a:rPr lang="en-US" sz="1400" dirty="0">
+                <a:solidFill>
+                  <a:schemeClr val="tx1"/>
+                </a:solidFill>
+              </a:rPr>
+              <a:t>Asset</a:t>
+            </a:r>
+          </a:p>
+        </p:txBody>
+      </p:sp>
+      <p:sp>
+        <p:nvSpPr>
+          <p:cNvPr id="101" name="Rectangle: Rounded Corners 100">
+            <a:extLst>
+              <a:ext uri="{FF2B5EF4-FFF2-40B4-BE49-F238E27FC236}">
+                <a16:creationId xmlns:a16="http://schemas.microsoft.com/office/drawing/2014/main" id="{4EF168EE-4A7C-FB80-66F8-3E11653B5DE6}"/>
+              </a:ext>
+            </a:extLst>
+          </p:cNvPr>
+          <p:cNvSpPr/>
+          <p:nvPr/>
+        </p:nvSpPr>
+        <p:spPr>
+          <a:xfrm>
+            <a:off x="8031367" y="1786240"/>
             <a:ext cx="1256082" cy="350943"/>
           </a:xfrm>
           <a:prstGeom prst="roundRect">
@@ -4147,10 +4463,10 @@
       </p:sp>
       <p:sp>
         <p:nvSpPr>
-          <p:cNvPr id="26" name="Rectangle: Rounded Corners 25">
-            <a:extLst>
-              <a:ext uri="{FF2B5EF4-FFF2-40B4-BE49-F238E27FC236}">
-                <a16:creationId xmlns:a16="http://schemas.microsoft.com/office/drawing/2014/main" id="{88D70D07-FE3B-EC1C-709D-AC86198386C7}"/>
+          <p:cNvPr id="102" name="Rectangle: Rounded Corners 101">
+            <a:extLst>
+              <a:ext uri="{FF2B5EF4-FFF2-40B4-BE49-F238E27FC236}">
+                <a16:creationId xmlns:a16="http://schemas.microsoft.com/office/drawing/2014/main" id="{A1F4AB2A-0E67-6F5D-0554-54679C1B8314}"/>
               </a:ext>
             </a:extLst>
           </p:cNvPr>
@@ -4159,489 +4475,7 @@
         </p:nvSpPr>
         <p:spPr>
           <a:xfrm>
-            <a:off x="8031367" y="5552218"/>
-            <a:ext cx="1256082" cy="350943"/>
-          </a:xfrm>
-          <a:prstGeom prst="roundRect">
-            <a:avLst/>
-          </a:prstGeom>
-        </p:spPr>
-        <p:style>
-          <a:lnRef idx="0">
-            <a:schemeClr val="accent4"/>
-          </a:lnRef>
-          <a:fillRef idx="3">
-            <a:schemeClr val="accent4"/>
-          </a:fillRef>
-          <a:effectRef idx="3">
-            <a:schemeClr val="accent4"/>
-          </a:effectRef>
-          <a:fontRef idx="minor">
-            <a:schemeClr val="lt1"/>
-          </a:fontRef>
-        </p:style>
-        <p:txBody>
-          <a:bodyPr rtlCol="0" anchor="ctr"/>
-          <a:lstStyle/>
-          <a:p>
-            <a:pPr algn="ctr"/>
-            <a:r>
-              <a:rPr lang="en-US" sz="1400" dirty="0">
-                <a:solidFill>
-                  <a:schemeClr val="tx1"/>
-                </a:solidFill>
-              </a:rPr>
-              <a:t>Asset Proxy</a:t>
-            </a:r>
-          </a:p>
-        </p:txBody>
-      </p:sp>
-      <p:sp>
-        <p:nvSpPr>
-          <p:cNvPr id="30" name="Rectangle: Rounded Corners 29">
-            <a:extLst>
-              <a:ext uri="{FF2B5EF4-FFF2-40B4-BE49-F238E27FC236}">
-                <a16:creationId xmlns:a16="http://schemas.microsoft.com/office/drawing/2014/main" id="{E45F4621-3998-D58E-5535-ADD2BFAF0E5A}"/>
-              </a:ext>
-            </a:extLst>
-          </p:cNvPr>
-          <p:cNvSpPr/>
-          <p:nvPr/>
-        </p:nvSpPr>
-        <p:spPr>
-          <a:xfrm>
-            <a:off x="10239627" y="2981088"/>
-            <a:ext cx="1256082" cy="342651"/>
-          </a:xfrm>
-          <a:prstGeom prst="roundRect">
-            <a:avLst/>
-          </a:prstGeom>
-          <a:solidFill>
-            <a:schemeClr val="accent4">
-              <a:alpha val="50000"/>
-            </a:schemeClr>
-          </a:solidFill>
-          <a:ln>
-            <a:noFill/>
-          </a:ln>
-        </p:spPr>
-        <p:style>
-          <a:lnRef idx="0">
-            <a:scrgbClr r="0" g="0" b="0"/>
-          </a:lnRef>
-          <a:fillRef idx="0">
-            <a:scrgbClr r="0" g="0" b="0"/>
-          </a:fillRef>
-          <a:effectRef idx="0">
-            <a:scrgbClr r="0" g="0" b="0"/>
-          </a:effectRef>
-          <a:fontRef idx="minor">
-            <a:schemeClr val="lt1"/>
-          </a:fontRef>
-        </p:style>
-        <p:txBody>
-          <a:bodyPr rtlCol="0" anchor="ctr"/>
-          <a:lstStyle/>
-          <a:p>
-            <a:pPr algn="ctr"/>
-            <a:r>
-              <a:rPr lang="en-US" sz="1400" dirty="0">
-                <a:solidFill>
-                  <a:schemeClr val="tx1"/>
-                </a:solidFill>
-              </a:rPr>
-              <a:t>Asse</a:t>
-            </a:r>
-            <a:r>
-              <a:rPr lang="pl-PL" sz="1400" dirty="0">
-                <a:solidFill>
-                  <a:schemeClr val="tx1"/>
-                </a:solidFill>
-              </a:rPr>
-              <a:t>t</a:t>
-            </a:r>
-            <a:endParaRPr lang="en-US" sz="1400" dirty="0">
-              <a:solidFill>
-                <a:schemeClr val="tx1"/>
-              </a:solidFill>
-            </a:endParaRPr>
-          </a:p>
-        </p:txBody>
-      </p:sp>
-      <p:sp>
-        <p:nvSpPr>
-          <p:cNvPr id="31" name="Rectangle: Rounded Corners 30">
-            <a:extLst>
-              <a:ext uri="{FF2B5EF4-FFF2-40B4-BE49-F238E27FC236}">
-                <a16:creationId xmlns:a16="http://schemas.microsoft.com/office/drawing/2014/main" id="{FE6023C5-65C7-4233-6EF7-3136820A32BC}"/>
-              </a:ext>
-            </a:extLst>
-          </p:cNvPr>
-          <p:cNvSpPr/>
-          <p:nvPr/>
-        </p:nvSpPr>
-        <p:spPr>
-          <a:xfrm>
-            <a:off x="10214948" y="3632721"/>
-            <a:ext cx="1256082" cy="342651"/>
-          </a:xfrm>
-          <a:prstGeom prst="roundRect">
-            <a:avLst/>
-          </a:prstGeom>
-          <a:solidFill>
-            <a:schemeClr val="accent4">
-              <a:alpha val="50000"/>
-            </a:schemeClr>
-          </a:solidFill>
-          <a:ln>
-            <a:noFill/>
-          </a:ln>
-        </p:spPr>
-        <p:style>
-          <a:lnRef idx="0">
-            <a:scrgbClr r="0" g="0" b="0"/>
-          </a:lnRef>
-          <a:fillRef idx="0">
-            <a:scrgbClr r="0" g="0" b="0"/>
-          </a:fillRef>
-          <a:effectRef idx="0">
-            <a:scrgbClr r="0" g="0" b="0"/>
-          </a:effectRef>
-          <a:fontRef idx="minor">
-            <a:schemeClr val="lt1"/>
-          </a:fontRef>
-        </p:style>
-        <p:txBody>
-          <a:bodyPr rtlCol="0" anchor="ctr"/>
-          <a:lstStyle/>
-          <a:p>
-            <a:pPr algn="ctr"/>
-            <a:r>
-              <a:rPr lang="en-US" sz="1400" dirty="0">
-                <a:solidFill>
-                  <a:schemeClr val="tx1"/>
-                </a:solidFill>
-              </a:rPr>
-              <a:t>Asset</a:t>
-            </a:r>
-          </a:p>
-        </p:txBody>
-      </p:sp>
-      <p:sp>
-        <p:nvSpPr>
-          <p:cNvPr id="97" name="Rectangle: Rounded Corners 96">
-            <a:extLst>
-              <a:ext uri="{FF2B5EF4-FFF2-40B4-BE49-F238E27FC236}">
-                <a16:creationId xmlns:a16="http://schemas.microsoft.com/office/drawing/2014/main" id="{B82C1784-C72C-0F57-3753-A90D4E3A794D}"/>
-              </a:ext>
-            </a:extLst>
-          </p:cNvPr>
-          <p:cNvSpPr/>
-          <p:nvPr/>
-        </p:nvSpPr>
-        <p:spPr>
-          <a:xfrm>
-            <a:off x="10208322" y="4254486"/>
-            <a:ext cx="1256082" cy="342651"/>
-          </a:xfrm>
-          <a:prstGeom prst="roundRect">
-            <a:avLst/>
-          </a:prstGeom>
-          <a:solidFill>
-            <a:schemeClr val="accent4">
-              <a:alpha val="50000"/>
-            </a:schemeClr>
-          </a:solidFill>
-          <a:ln>
-            <a:noFill/>
-          </a:ln>
-        </p:spPr>
-        <p:style>
-          <a:lnRef idx="0">
-            <a:scrgbClr r="0" g="0" b="0"/>
-          </a:lnRef>
-          <a:fillRef idx="0">
-            <a:scrgbClr r="0" g="0" b="0"/>
-          </a:fillRef>
-          <a:effectRef idx="0">
-            <a:scrgbClr r="0" g="0" b="0"/>
-          </a:effectRef>
-          <a:fontRef idx="minor">
-            <a:schemeClr val="lt1"/>
-          </a:fontRef>
-        </p:style>
-        <p:txBody>
-          <a:bodyPr rtlCol="0" anchor="ctr"/>
-          <a:lstStyle/>
-          <a:p>
-            <a:pPr algn="ctr"/>
-            <a:r>
-              <a:rPr lang="en-US" sz="1400" dirty="0">
-                <a:solidFill>
-                  <a:schemeClr val="tx1"/>
-                </a:solidFill>
-              </a:rPr>
-              <a:t>Asset</a:t>
-            </a:r>
-          </a:p>
-        </p:txBody>
-      </p:sp>
-      <p:sp>
-        <p:nvSpPr>
-          <p:cNvPr id="98" name="Rectangle: Rounded Corners 97">
-            <a:extLst>
-              <a:ext uri="{FF2B5EF4-FFF2-40B4-BE49-F238E27FC236}">
-                <a16:creationId xmlns:a16="http://schemas.microsoft.com/office/drawing/2014/main" id="{27EB69E3-5E74-E6D2-B4E8-BC7E0C6D8E2E}"/>
-              </a:ext>
-            </a:extLst>
-          </p:cNvPr>
-          <p:cNvSpPr/>
-          <p:nvPr/>
-        </p:nvSpPr>
-        <p:spPr>
-          <a:xfrm>
-            <a:off x="10208322" y="4911876"/>
-            <a:ext cx="1256082" cy="342651"/>
-          </a:xfrm>
-          <a:prstGeom prst="roundRect">
-            <a:avLst/>
-          </a:prstGeom>
-          <a:solidFill>
-            <a:schemeClr val="accent4">
-              <a:alpha val="50000"/>
-            </a:schemeClr>
-          </a:solidFill>
-          <a:ln>
-            <a:noFill/>
-          </a:ln>
-        </p:spPr>
-        <p:style>
-          <a:lnRef idx="0">
-            <a:scrgbClr r="0" g="0" b="0"/>
-          </a:lnRef>
-          <a:fillRef idx="0">
-            <a:scrgbClr r="0" g="0" b="0"/>
-          </a:fillRef>
-          <a:effectRef idx="0">
-            <a:scrgbClr r="0" g="0" b="0"/>
-          </a:effectRef>
-          <a:fontRef idx="minor">
-            <a:schemeClr val="lt1"/>
-          </a:fontRef>
-        </p:style>
-        <p:txBody>
-          <a:bodyPr rtlCol="0" anchor="ctr"/>
-          <a:lstStyle/>
-          <a:p>
-            <a:pPr algn="ctr"/>
-            <a:r>
-              <a:rPr lang="en-US" sz="1400" dirty="0">
-                <a:solidFill>
-                  <a:schemeClr val="tx1"/>
-                </a:solidFill>
-              </a:rPr>
-              <a:t>Asset</a:t>
-            </a:r>
-          </a:p>
-        </p:txBody>
-      </p:sp>
-      <p:sp>
-        <p:nvSpPr>
-          <p:cNvPr id="99" name="Rectangle: Rounded Corners 98">
-            <a:extLst>
-              <a:ext uri="{FF2B5EF4-FFF2-40B4-BE49-F238E27FC236}">
-                <a16:creationId xmlns:a16="http://schemas.microsoft.com/office/drawing/2014/main" id="{0BB7ACEF-E45A-5F29-14F2-EF850A80384F}"/>
-              </a:ext>
-            </a:extLst>
-          </p:cNvPr>
-          <p:cNvSpPr/>
-          <p:nvPr/>
-        </p:nvSpPr>
-        <p:spPr>
-          <a:xfrm>
-            <a:off x="10208322" y="5552218"/>
-            <a:ext cx="1256082" cy="342651"/>
-          </a:xfrm>
-          <a:prstGeom prst="roundRect">
-            <a:avLst/>
-          </a:prstGeom>
-          <a:solidFill>
-            <a:schemeClr val="accent4">
-              <a:alpha val="50000"/>
-            </a:schemeClr>
-          </a:solidFill>
-          <a:ln>
-            <a:noFill/>
-          </a:ln>
-        </p:spPr>
-        <p:style>
-          <a:lnRef idx="0">
-            <a:scrgbClr r="0" g="0" b="0"/>
-          </a:lnRef>
-          <a:fillRef idx="0">
-            <a:scrgbClr r="0" g="0" b="0"/>
-          </a:fillRef>
-          <a:effectRef idx="0">
-            <a:scrgbClr r="0" g="0" b="0"/>
-          </a:effectRef>
-          <a:fontRef idx="minor">
-            <a:schemeClr val="lt1"/>
-          </a:fontRef>
-        </p:style>
-        <p:txBody>
-          <a:bodyPr rtlCol="0" anchor="ctr"/>
-          <a:lstStyle/>
-          <a:p>
-            <a:pPr algn="ctr"/>
-            <a:r>
-              <a:rPr lang="en-US" sz="1400" dirty="0">
-                <a:solidFill>
-                  <a:schemeClr val="tx1"/>
-                </a:solidFill>
-              </a:rPr>
-              <a:t>Asset</a:t>
-            </a:r>
-          </a:p>
-        </p:txBody>
-      </p:sp>
-      <p:sp>
-        <p:nvSpPr>
-          <p:cNvPr id="101" name="Rectangle: Rounded Corners 100">
-            <a:extLst>
-              <a:ext uri="{FF2B5EF4-FFF2-40B4-BE49-F238E27FC236}">
-                <a16:creationId xmlns:a16="http://schemas.microsoft.com/office/drawing/2014/main" id="{4EF168EE-4A7C-FB80-66F8-3E11653B5DE6}"/>
-              </a:ext>
-            </a:extLst>
-          </p:cNvPr>
-          <p:cNvSpPr/>
-          <p:nvPr/>
-        </p:nvSpPr>
-        <p:spPr>
-          <a:xfrm>
-            <a:off x="8031367" y="1786240"/>
-            <a:ext cx="1256082" cy="350943"/>
-          </a:xfrm>
-          <a:prstGeom prst="roundRect">
-            <a:avLst/>
-          </a:prstGeom>
-        </p:spPr>
-        <p:style>
-          <a:lnRef idx="0">
-            <a:schemeClr val="accent4"/>
-          </a:lnRef>
-          <a:fillRef idx="3">
-            <a:schemeClr val="accent4"/>
-          </a:fillRef>
-          <a:effectRef idx="3">
-            <a:schemeClr val="accent4"/>
-          </a:effectRef>
-          <a:fontRef idx="minor">
-            <a:schemeClr val="lt1"/>
-          </a:fontRef>
-        </p:style>
-        <p:txBody>
-          <a:bodyPr rtlCol="0" anchor="ctr"/>
-          <a:lstStyle/>
-          <a:p>
-            <a:pPr algn="ctr"/>
-            <a:r>
-              <a:rPr lang="en-US" sz="1400" dirty="0">
-                <a:solidFill>
-                  <a:schemeClr val="tx1"/>
-                </a:solidFill>
-              </a:rPr>
-              <a:t>Asset Proxy</a:t>
-            </a:r>
-          </a:p>
-        </p:txBody>
-      </p:sp>
-      <p:sp>
-        <p:nvSpPr>
-          <p:cNvPr id="102" name="Rectangle: Rounded Corners 101">
-            <a:extLst>
-              <a:ext uri="{FF2B5EF4-FFF2-40B4-BE49-F238E27FC236}">
-                <a16:creationId xmlns:a16="http://schemas.microsoft.com/office/drawing/2014/main" id="{A1F4AB2A-0E67-6F5D-0554-54679C1B8314}"/>
-              </a:ext>
-            </a:extLst>
-          </p:cNvPr>
-          <p:cNvSpPr/>
-          <p:nvPr/>
-        </p:nvSpPr>
-        <p:spPr>
-          <a:xfrm>
             <a:off x="10214948" y="1793395"/>
-            <a:ext cx="1256082" cy="342651"/>
-          </a:xfrm>
-          <a:prstGeom prst="roundRect">
-            <a:avLst/>
-          </a:prstGeom>
-          <a:solidFill>
-            <a:schemeClr val="accent4">
-              <a:alpha val="50000"/>
-            </a:schemeClr>
-          </a:solidFill>
-          <a:ln>
-            <a:noFill/>
-          </a:ln>
-        </p:spPr>
-        <p:style>
-          <a:lnRef idx="0">
-            <a:scrgbClr r="0" g="0" b="0"/>
-          </a:lnRef>
-          <a:fillRef idx="0">
-            <a:scrgbClr r="0" g="0" b="0"/>
-          </a:fillRef>
-          <a:effectRef idx="0">
-            <a:scrgbClr r="0" g="0" b="0"/>
-          </a:effectRef>
-          <a:fontRef idx="minor">
-            <a:schemeClr val="lt1"/>
-          </a:fontRef>
-        </p:style>
-        <p:txBody>
-          <a:bodyPr rtlCol="0" anchor="ctr"/>
-          <a:lstStyle/>
-          <a:p>
-            <a:pPr algn="ctr"/>
-            <a:r>
-              <a:rPr lang="en-US" sz="1400" dirty="0">
-                <a:solidFill>
-                  <a:schemeClr val="tx1"/>
-                </a:solidFill>
-              </a:rPr>
-              <a:t>Asse</a:t>
-            </a:r>
-            <a:r>
-              <a:rPr lang="pl-PL" sz="1400" dirty="0">
-                <a:solidFill>
-                  <a:schemeClr val="tx1"/>
-                </a:solidFill>
-              </a:rPr>
-              <a:t>t</a:t>
-            </a:r>
-            <a:endParaRPr lang="en-US" sz="1400" dirty="0">
-              <a:solidFill>
-                <a:schemeClr val="tx1"/>
-              </a:solidFill>
-            </a:endParaRPr>
-          </a:p>
-        </p:txBody>
-      </p:sp>
-      <p:sp>
-        <p:nvSpPr>
-          <p:cNvPr id="103" name="Rectangle: Rounded Corners 102">
-            <a:extLst>
-              <a:ext uri="{FF2B5EF4-FFF2-40B4-BE49-F238E27FC236}">
-                <a16:creationId xmlns:a16="http://schemas.microsoft.com/office/drawing/2014/main" id="{BAC8A7F9-D054-EDD7-0809-DB3FD49BE6A1}"/>
-              </a:ext>
-            </a:extLst>
-          </p:cNvPr>
-          <p:cNvSpPr/>
-          <p:nvPr/>
-        </p:nvSpPr>
-        <p:spPr>
-          <a:xfrm>
-            <a:off x="10214948" y="2367619"/>
             <a:ext cx="1256082" cy="342651"/>
           </a:xfrm>
           <a:prstGeom prst="roundRect">
@@ -4788,93 +4622,6 @@
       </p:cxnSp>
       <p:cxnSp>
         <p:nvCxnSpPr>
-          <p:cNvPr id="109" name="Straight Arrow Connector 108">
-            <a:extLst>
-              <a:ext uri="{FF2B5EF4-FFF2-40B4-BE49-F238E27FC236}">
-                <a16:creationId xmlns:a16="http://schemas.microsoft.com/office/drawing/2014/main" id="{7666DEF4-F4F9-F340-6566-4935A202F2B5}"/>
-              </a:ext>
-            </a:extLst>
-          </p:cNvPr>
-          <p:cNvCxnSpPr>
-            <a:cxnSpLocks/>
-            <a:stCxn id="22" idx="1"/>
-            <a:endCxn id="12" idx="3"/>
-          </p:cNvCxnSpPr>
-          <p:nvPr/>
-        </p:nvCxnSpPr>
-        <p:spPr>
-          <a:xfrm flipH="1">
-            <a:off x="7531841" y="2547471"/>
-            <a:ext cx="499526" cy="1259"/>
-          </a:xfrm>
-          <a:prstGeom prst="straightConnector1">
-            <a:avLst/>
-          </a:prstGeom>
-          <a:ln>
-            <a:tailEnd type="triangle"/>
-          </a:ln>
-        </p:spPr>
-        <p:style>
-          <a:lnRef idx="3">
-            <a:schemeClr val="dk1"/>
-          </a:lnRef>
-          <a:fillRef idx="0">
-            <a:schemeClr val="dk1"/>
-          </a:fillRef>
-          <a:effectRef idx="2">
-            <a:schemeClr val="dk1"/>
-          </a:effectRef>
-          <a:fontRef idx="minor">
-            <a:schemeClr val="tx1"/>
-          </a:fontRef>
-        </p:style>
-      </p:cxnSp>
-      <p:cxnSp>
-        <p:nvCxnSpPr>
-          <p:cNvPr id="111" name="Straight Arrow Connector 110">
-            <a:extLst>
-              <a:ext uri="{FF2B5EF4-FFF2-40B4-BE49-F238E27FC236}">
-                <a16:creationId xmlns:a16="http://schemas.microsoft.com/office/drawing/2014/main" id="{5D14C46F-B0A7-F74F-B1F8-A916811931A3}"/>
-              </a:ext>
-            </a:extLst>
-          </p:cNvPr>
-          <p:cNvCxnSpPr>
-            <a:cxnSpLocks/>
-            <a:stCxn id="103" idx="1"/>
-            <a:endCxn id="22" idx="3"/>
-          </p:cNvCxnSpPr>
-          <p:nvPr/>
-        </p:nvCxnSpPr>
-        <p:spPr>
-          <a:xfrm flipH="1">
-            <a:off x="9287449" y="2538945"/>
-            <a:ext cx="927499" cy="8526"/>
-          </a:xfrm>
-          <a:prstGeom prst="straightConnector1">
-            <a:avLst/>
-          </a:prstGeom>
-          <a:ln>
-            <a:headEnd type="triangle" w="med" len="med"/>
-            <a:tailEnd type="triangle" w="med" len="med"/>
-          </a:ln>
-        </p:spPr>
-        <p:style>
-          <a:lnRef idx="3">
-            <a:schemeClr val="dk1"/>
-          </a:lnRef>
-          <a:fillRef idx="0">
-            <a:schemeClr val="dk1"/>
-          </a:fillRef>
-          <a:effectRef idx="2">
-            <a:schemeClr val="dk1"/>
-          </a:effectRef>
-          <a:fontRef idx="minor">
-            <a:schemeClr val="tx1"/>
-          </a:fontRef>
-        </p:style>
-      </p:cxnSp>
-      <p:cxnSp>
-        <p:nvCxnSpPr>
           <p:cNvPr id="115" name="Straight Arrow Connector 114">
             <a:extLst>
               <a:ext uri="{FF2B5EF4-FFF2-40B4-BE49-F238E27FC236}">
@@ -4891,7 +4638,7 @@
         </p:nvCxnSpPr>
         <p:spPr>
           <a:xfrm flipH="1">
-            <a:off x="7531841" y="3797652"/>
+            <a:off x="7507162" y="3268295"/>
             <a:ext cx="499526" cy="1304"/>
           </a:xfrm>
           <a:prstGeom prst="straightConnector1">
@@ -4934,7 +4681,7 @@
         </p:nvCxnSpPr>
         <p:spPr>
           <a:xfrm flipH="1" flipV="1">
-            <a:off x="7531841" y="3798956"/>
+            <a:off x="7507162" y="3269599"/>
             <a:ext cx="499526" cy="626856"/>
           </a:xfrm>
           <a:prstGeom prst="straightConnector1">
@@ -4977,7 +4724,7 @@
         </p:nvCxnSpPr>
         <p:spPr>
           <a:xfrm flipH="1" flipV="1">
-            <a:off x="9287449" y="3797652"/>
+            <a:off x="9262770" y="3268295"/>
             <a:ext cx="927499" cy="6395"/>
           </a:xfrm>
           <a:prstGeom prst="straightConnector1">
@@ -5021,7 +4768,7 @@
         </p:nvCxnSpPr>
         <p:spPr>
           <a:xfrm flipH="1">
-            <a:off x="9287449" y="4425812"/>
+            <a:off x="9262770" y="3896455"/>
             <a:ext cx="920873" cy="0"/>
           </a:xfrm>
           <a:prstGeom prst="straightConnector1">
@@ -5065,7 +4812,7 @@
         </p:nvCxnSpPr>
         <p:spPr>
           <a:xfrm flipH="1">
-            <a:off x="7531841" y="5092300"/>
+            <a:off x="7507162" y="4562943"/>
             <a:ext cx="499526" cy="323217"/>
           </a:xfrm>
           <a:prstGeom prst="straightConnector1">
@@ -5108,7 +4855,7 @@
         </p:nvCxnSpPr>
         <p:spPr>
           <a:xfrm flipH="1" flipV="1">
-            <a:off x="7531841" y="5415517"/>
+            <a:off x="7507162" y="4886160"/>
             <a:ext cx="499526" cy="312173"/>
           </a:xfrm>
           <a:prstGeom prst="straightConnector1">
@@ -5151,7 +4898,7 @@
         </p:nvCxnSpPr>
         <p:spPr>
           <a:xfrm flipH="1">
-            <a:off x="9287449" y="5083202"/>
+            <a:off x="9262770" y="4553845"/>
             <a:ext cx="920873" cy="9098"/>
           </a:xfrm>
           <a:prstGeom prst="straightConnector1">
@@ -5195,7 +4942,7 @@
         </p:nvCxnSpPr>
         <p:spPr>
           <a:xfrm flipH="1">
-            <a:off x="9287449" y="5723544"/>
+            <a:off x="9262770" y="5194187"/>
             <a:ext cx="920873" cy="4146"/>
           </a:xfrm>
           <a:prstGeom prst="straightConnector1">
@@ -5351,7 +5098,7 @@
           <a:p>
             <a:r>
               <a:rPr lang="en-US" sz="1600" dirty="0"/>
-              <a:t>Assets don’t ever exist on disk.</a:t>
+              <a:t>Assets are not saved to disk after importing.</a:t>
             </a:r>
           </a:p>
           <a:p>
@@ -5390,7 +5137,7 @@
           <a:p>
             <a:r>
               <a:rPr lang="en-US" sz="1600" dirty="0"/>
-              <a:t>Asset data is stored on disc in one form without duplication.</a:t>
+              <a:t>Asset data is stored on disk in one form without duplication.</a:t>
             </a:r>
           </a:p>
         </p:txBody>
@@ -5409,7 +5156,7 @@
         </p:nvSpPr>
         <p:spPr>
           <a:xfrm>
-            <a:off x="6275759" y="3623484"/>
+            <a:off x="6251080" y="3094127"/>
             <a:ext cx="1256082" cy="350943"/>
           </a:xfrm>
           <a:prstGeom prst="roundRect">
@@ -5460,7 +5207,7 @@
         </p:nvSpPr>
         <p:spPr>
           <a:xfrm>
-            <a:off x="8031367" y="2977075"/>
+            <a:off x="8006688" y="2447718"/>
             <a:ext cx="1256082" cy="350943"/>
           </a:xfrm>
           <a:prstGeom prst="roundRect">
@@ -5515,7 +5262,7 @@
         </p:nvCxnSpPr>
         <p:spPr>
           <a:xfrm flipH="1">
-            <a:off x="7531841" y="3152547"/>
+            <a:off x="7507162" y="2623190"/>
             <a:ext cx="499526" cy="646409"/>
           </a:xfrm>
           <a:prstGeom prst="straightConnector1">
@@ -5558,8 +5305,269 @@
         </p:nvCxnSpPr>
         <p:spPr>
           <a:xfrm flipH="1">
-            <a:off x="9287449" y="3152414"/>
+            <a:off x="9262770" y="2623057"/>
             <a:ext cx="952178" cy="133"/>
+          </a:xfrm>
+          <a:prstGeom prst="straightConnector1">
+            <a:avLst/>
+          </a:prstGeom>
+          <a:ln>
+            <a:headEnd type="triangle" w="med" len="med"/>
+            <a:tailEnd type="triangle" w="med" len="med"/>
+          </a:ln>
+        </p:spPr>
+        <p:style>
+          <a:lnRef idx="3">
+            <a:schemeClr val="dk1"/>
+          </a:lnRef>
+          <a:fillRef idx="0">
+            <a:schemeClr val="dk1"/>
+          </a:fillRef>
+          <a:effectRef idx="2">
+            <a:schemeClr val="dk1"/>
+          </a:effectRef>
+          <a:fontRef idx="minor">
+            <a:schemeClr val="tx1"/>
+          </a:fontRef>
+        </p:style>
+      </p:cxnSp>
+      <p:sp>
+        <p:nvSpPr>
+          <p:cNvPr id="2" name="Rectangle: Rounded Corners 1">
+            <a:extLst>
+              <a:ext uri="{FF2B5EF4-FFF2-40B4-BE49-F238E27FC236}">
+                <a16:creationId xmlns:a16="http://schemas.microsoft.com/office/drawing/2014/main" id="{DF8CDD2A-EE5F-1DDE-4394-7F17F0C44C65}"/>
+              </a:ext>
+            </a:extLst>
+          </p:cNvPr>
+          <p:cNvSpPr/>
+          <p:nvPr/>
+        </p:nvSpPr>
+        <p:spPr>
+          <a:xfrm>
+            <a:off x="6251080" y="5615221"/>
+            <a:ext cx="1256082" cy="350943"/>
+          </a:xfrm>
+          <a:prstGeom prst="roundRect">
+            <a:avLst/>
+          </a:prstGeom>
+        </p:spPr>
+        <p:style>
+          <a:lnRef idx="0">
+            <a:schemeClr val="accent4"/>
+          </a:lnRef>
+          <a:fillRef idx="3">
+            <a:schemeClr val="accent4"/>
+          </a:fillRef>
+          <a:effectRef idx="3">
+            <a:schemeClr val="accent4"/>
+          </a:effectRef>
+          <a:fontRef idx="minor">
+            <a:schemeClr val="lt1"/>
+          </a:fontRef>
+        </p:style>
+        <p:txBody>
+          <a:bodyPr rtlCol="0" anchor="ctr"/>
+          <a:lstStyle/>
+          <a:p>
+            <a:pPr algn="ctr"/>
+            <a:r>
+              <a:rPr lang="en-US" sz="1400" dirty="0">
+                <a:solidFill>
+                  <a:schemeClr val="tx1"/>
+                </a:solidFill>
+              </a:rPr>
+              <a:t>Asset Source</a:t>
+            </a:r>
+          </a:p>
+        </p:txBody>
+      </p:sp>
+      <p:sp>
+        <p:nvSpPr>
+          <p:cNvPr id="3" name="Rectangle: Rounded Corners 2">
+            <a:extLst>
+              <a:ext uri="{FF2B5EF4-FFF2-40B4-BE49-F238E27FC236}">
+                <a16:creationId xmlns:a16="http://schemas.microsoft.com/office/drawing/2014/main" id="{D43B4F9A-69EB-2662-2FD8-FEAE4087527A}"/>
+              </a:ext>
+            </a:extLst>
+          </p:cNvPr>
+          <p:cNvSpPr/>
+          <p:nvPr/>
+        </p:nvSpPr>
+        <p:spPr>
+          <a:xfrm>
+            <a:off x="8006688" y="5614834"/>
+            <a:ext cx="1256082" cy="350943"/>
+          </a:xfrm>
+          <a:prstGeom prst="roundRect">
+            <a:avLst/>
+          </a:prstGeom>
+        </p:spPr>
+        <p:style>
+          <a:lnRef idx="0">
+            <a:schemeClr val="accent4"/>
+          </a:lnRef>
+          <a:fillRef idx="3">
+            <a:schemeClr val="accent4"/>
+          </a:fillRef>
+          <a:effectRef idx="3">
+            <a:schemeClr val="accent4"/>
+          </a:effectRef>
+          <a:fontRef idx="minor">
+            <a:schemeClr val="lt1"/>
+          </a:fontRef>
+        </p:style>
+        <p:txBody>
+          <a:bodyPr rtlCol="0" anchor="ctr"/>
+          <a:lstStyle/>
+          <a:p>
+            <a:pPr algn="ctr"/>
+            <a:r>
+              <a:rPr lang="en-US" sz="1400" dirty="0">
+                <a:solidFill>
+                  <a:schemeClr val="tx1"/>
+                </a:solidFill>
+              </a:rPr>
+              <a:t>Asset Proxy</a:t>
+            </a:r>
+          </a:p>
+        </p:txBody>
+      </p:sp>
+      <p:sp>
+        <p:nvSpPr>
+          <p:cNvPr id="4" name="Rectangle: Rounded Corners 3">
+            <a:extLst>
+              <a:ext uri="{FF2B5EF4-FFF2-40B4-BE49-F238E27FC236}">
+                <a16:creationId xmlns:a16="http://schemas.microsoft.com/office/drawing/2014/main" id="{ECC9FF4F-0FAE-37CF-190E-96AE2673EEC1}"/>
+              </a:ext>
+            </a:extLst>
+          </p:cNvPr>
+          <p:cNvSpPr/>
+          <p:nvPr/>
+        </p:nvSpPr>
+        <p:spPr>
+          <a:xfrm>
+            <a:off x="10190269" y="5621989"/>
+            <a:ext cx="1256082" cy="342651"/>
+          </a:xfrm>
+          <a:prstGeom prst="roundRect">
+            <a:avLst/>
+          </a:prstGeom>
+          <a:solidFill>
+            <a:schemeClr val="accent4">
+              <a:alpha val="50000"/>
+            </a:schemeClr>
+          </a:solidFill>
+          <a:ln>
+            <a:noFill/>
+          </a:ln>
+        </p:spPr>
+        <p:style>
+          <a:lnRef idx="0">
+            <a:scrgbClr r="0" g="0" b="0"/>
+          </a:lnRef>
+          <a:fillRef idx="0">
+            <a:scrgbClr r="0" g="0" b="0"/>
+          </a:fillRef>
+          <a:effectRef idx="0">
+            <a:scrgbClr r="0" g="0" b="0"/>
+          </a:effectRef>
+          <a:fontRef idx="minor">
+            <a:schemeClr val="lt1"/>
+          </a:fontRef>
+        </p:style>
+        <p:txBody>
+          <a:bodyPr rtlCol="0" anchor="ctr"/>
+          <a:lstStyle/>
+          <a:p>
+            <a:pPr algn="ctr"/>
+            <a:r>
+              <a:rPr lang="en-US" sz="1400" dirty="0">
+                <a:solidFill>
+                  <a:schemeClr val="tx1"/>
+                </a:solidFill>
+              </a:rPr>
+              <a:t>Asse</a:t>
+            </a:r>
+            <a:r>
+              <a:rPr lang="pl-PL" sz="1400" dirty="0">
+                <a:solidFill>
+                  <a:schemeClr val="tx1"/>
+                </a:solidFill>
+              </a:rPr>
+              <a:t>t</a:t>
+            </a:r>
+            <a:endParaRPr lang="en-US" sz="1400" dirty="0">
+              <a:solidFill>
+                <a:schemeClr val="tx1"/>
+              </a:solidFill>
+            </a:endParaRPr>
+          </a:p>
+        </p:txBody>
+      </p:sp>
+      <p:cxnSp>
+        <p:nvCxnSpPr>
+          <p:cNvPr id="5" name="Straight Arrow Connector 4">
+            <a:extLst>
+              <a:ext uri="{FF2B5EF4-FFF2-40B4-BE49-F238E27FC236}">
+                <a16:creationId xmlns:a16="http://schemas.microsoft.com/office/drawing/2014/main" id="{96C7BB1F-C62B-EAC8-9E4D-A79516EDBB8A}"/>
+              </a:ext>
+            </a:extLst>
+          </p:cNvPr>
+          <p:cNvCxnSpPr>
+            <a:cxnSpLocks/>
+            <a:stCxn id="3" idx="1"/>
+            <a:endCxn id="2" idx="3"/>
+          </p:cNvCxnSpPr>
+          <p:nvPr/>
+        </p:nvCxnSpPr>
+        <p:spPr>
+          <a:xfrm flipH="1">
+            <a:off x="7507162" y="5790306"/>
+            <a:ext cx="499526" cy="387"/>
+          </a:xfrm>
+          <a:prstGeom prst="straightConnector1">
+            <a:avLst/>
+          </a:prstGeom>
+          <a:ln>
+            <a:tailEnd type="triangle"/>
+          </a:ln>
+        </p:spPr>
+        <p:style>
+          <a:lnRef idx="3">
+            <a:schemeClr val="dk1"/>
+          </a:lnRef>
+          <a:fillRef idx="0">
+            <a:schemeClr val="dk1"/>
+          </a:fillRef>
+          <a:effectRef idx="2">
+            <a:schemeClr val="dk1"/>
+          </a:effectRef>
+          <a:fontRef idx="minor">
+            <a:schemeClr val="tx1"/>
+          </a:fontRef>
+        </p:style>
+      </p:cxnSp>
+      <p:cxnSp>
+        <p:nvCxnSpPr>
+          <p:cNvPr id="6" name="Straight Arrow Connector 5">
+            <a:extLst>
+              <a:ext uri="{FF2B5EF4-FFF2-40B4-BE49-F238E27FC236}">
+                <a16:creationId xmlns:a16="http://schemas.microsoft.com/office/drawing/2014/main" id="{1E1E309B-7312-0D9E-43E3-FABB0B9CD601}"/>
+              </a:ext>
+            </a:extLst>
+          </p:cNvPr>
+          <p:cNvCxnSpPr>
+            <a:cxnSpLocks/>
+            <a:stCxn id="4" idx="1"/>
+            <a:endCxn id="3" idx="3"/>
+          </p:cNvCxnSpPr>
+          <p:nvPr/>
+        </p:nvCxnSpPr>
+        <p:spPr>
+          <a:xfrm flipH="1" flipV="1">
+            <a:off x="9262770" y="5790306"/>
+            <a:ext cx="927499" cy="3009"/>
           </a:xfrm>
           <a:prstGeom prst="straightConnector1">
             <a:avLst/>

</xml_diff>

<commit_message>
Asset system architecture finalization, integration and assets adaptation
</commit_message>
<xml_diff>
--- a/Documentation/Asset Pipeline.pptx
+++ b/Documentation/Asset Pipeline.pptx
@@ -8,6 +8,7 @@
     <p:sldId id="256" r:id="rId2"/>
     <p:sldId id="257" r:id="rId3"/>
     <p:sldId id="259" r:id="rId4"/>
+    <p:sldId id="260" r:id="rId5"/>
   </p:sldIdLst>
   <p:sldSz cx="12192000" cy="6858000"/>
   <p:notesSz cx="6858000" cy="9144000"/>
@@ -273,7 +274,7 @@
           <a:p>
             <a:fld id="{783DC7D5-4D76-4679-A391-31CBAFA90932}" type="datetimeFigureOut">
               <a:rPr lang="en-US" smtClean="0"/>
-              <a:t>4/21/2024</a:t>
+              <a:t>7/27/2024</a:t>
             </a:fld>
             <a:endParaRPr lang="en-US"/>
           </a:p>
@@ -471,7 +472,7 @@
           <a:p>
             <a:fld id="{783DC7D5-4D76-4679-A391-31CBAFA90932}" type="datetimeFigureOut">
               <a:rPr lang="en-US" smtClean="0"/>
-              <a:t>4/21/2024</a:t>
+              <a:t>7/27/2024</a:t>
             </a:fld>
             <a:endParaRPr lang="en-US"/>
           </a:p>
@@ -679,7 +680,7 @@
           <a:p>
             <a:fld id="{783DC7D5-4D76-4679-A391-31CBAFA90932}" type="datetimeFigureOut">
               <a:rPr lang="en-US" smtClean="0"/>
-              <a:t>4/21/2024</a:t>
+              <a:t>7/27/2024</a:t>
             </a:fld>
             <a:endParaRPr lang="en-US"/>
           </a:p>
@@ -877,7 +878,7 @@
           <a:p>
             <a:fld id="{783DC7D5-4D76-4679-A391-31CBAFA90932}" type="datetimeFigureOut">
               <a:rPr lang="en-US" smtClean="0"/>
-              <a:t>4/21/2024</a:t>
+              <a:t>7/27/2024</a:t>
             </a:fld>
             <a:endParaRPr lang="en-US"/>
           </a:p>
@@ -1152,7 +1153,7 @@
           <a:p>
             <a:fld id="{783DC7D5-4D76-4679-A391-31CBAFA90932}" type="datetimeFigureOut">
               <a:rPr lang="en-US" smtClean="0"/>
-              <a:t>4/21/2024</a:t>
+              <a:t>7/27/2024</a:t>
             </a:fld>
             <a:endParaRPr lang="en-US"/>
           </a:p>
@@ -1417,7 +1418,7 @@
           <a:p>
             <a:fld id="{783DC7D5-4D76-4679-A391-31CBAFA90932}" type="datetimeFigureOut">
               <a:rPr lang="en-US" smtClean="0"/>
-              <a:t>4/21/2024</a:t>
+              <a:t>7/27/2024</a:t>
             </a:fld>
             <a:endParaRPr lang="en-US"/>
           </a:p>
@@ -1829,7 +1830,7 @@
           <a:p>
             <a:fld id="{783DC7D5-4D76-4679-A391-31CBAFA90932}" type="datetimeFigureOut">
               <a:rPr lang="en-US" smtClean="0"/>
-              <a:t>4/21/2024</a:t>
+              <a:t>7/27/2024</a:t>
             </a:fld>
             <a:endParaRPr lang="en-US"/>
           </a:p>
@@ -1970,7 +1971,7 @@
           <a:p>
             <a:fld id="{783DC7D5-4D76-4679-A391-31CBAFA90932}" type="datetimeFigureOut">
               <a:rPr lang="en-US" smtClean="0"/>
-              <a:t>4/21/2024</a:t>
+              <a:t>7/27/2024</a:t>
             </a:fld>
             <a:endParaRPr lang="en-US"/>
           </a:p>
@@ -2083,7 +2084,7 @@
           <a:p>
             <a:fld id="{783DC7D5-4D76-4679-A391-31CBAFA90932}" type="datetimeFigureOut">
               <a:rPr lang="en-US" smtClean="0"/>
-              <a:t>4/21/2024</a:t>
+              <a:t>7/27/2024</a:t>
             </a:fld>
             <a:endParaRPr lang="en-US"/>
           </a:p>
@@ -2394,7 +2395,7 @@
           <a:p>
             <a:fld id="{783DC7D5-4D76-4679-A391-31CBAFA90932}" type="datetimeFigureOut">
               <a:rPr lang="en-US" smtClean="0"/>
-              <a:t>4/21/2024</a:t>
+              <a:t>7/27/2024</a:t>
             </a:fld>
             <a:endParaRPr lang="en-US"/>
           </a:p>
@@ -2682,7 +2683,7 @@
           <a:p>
             <a:fld id="{783DC7D5-4D76-4679-A391-31CBAFA90932}" type="datetimeFigureOut">
               <a:rPr lang="en-US" smtClean="0"/>
-              <a:t>4/21/2024</a:t>
+              <a:t>7/27/2024</a:t>
             </a:fld>
             <a:endParaRPr lang="en-US"/>
           </a:p>
@@ -2923,7 +2924,7 @@
           <a:p>
             <a:fld id="{783DC7D5-4D76-4679-A391-31CBAFA90932}" type="datetimeFigureOut">
               <a:rPr lang="en-US" smtClean="0"/>
-              <a:t>4/21/2024</a:t>
+              <a:t>7/27/2024</a:t>
             </a:fld>
             <a:endParaRPr lang="en-US"/>
           </a:p>
@@ -3627,7 +3628,7 @@
             </a:pPr>
             <a:r>
               <a:rPr lang="en-US" sz="1600" dirty="0"/>
-              <a:t>Additional processing and/or data generation into a universally structured asset.</a:t>
+              <a:t>Additional processing and data generation into a universally structured asset (per type).</a:t>
             </a:r>
           </a:p>
           <a:p>
@@ -3651,7 +3652,7 @@
           <a:p>
             <a:r>
               <a:rPr lang="en-US" sz="1600" dirty="0"/>
-              <a:t>- Asset file generated by the engine does not have any reference to the original source file.</a:t>
+              <a:t>- The asset file generated by the engine does not reference the original source file.</a:t>
             </a:r>
           </a:p>
           <a:p>
@@ -3663,13 +3664,13 @@
           <a:p>
             <a:r>
               <a:rPr lang="en-US" sz="1600" dirty="0"/>
-              <a:t>- Data is duplicated on disk, just in a different format.</a:t>
+              <a:t>- Data is duplicated on a disk, just in a different format.</a:t>
             </a:r>
           </a:p>
           <a:p>
             <a:r>
               <a:rPr lang="en-US" sz="1600" dirty="0"/>
-              <a:t>- Still additional packaging process necessary for improving loading times in the game’s runtime. </a:t>
+              <a:t>- Still, an additional packaging process is necessary to improve loading times in the game’s runtime. </a:t>
             </a:r>
           </a:p>
         </p:txBody>
@@ -5596,6 +5597,3823 @@
     <p:extLst>
       <p:ext uri="{BB962C8B-B14F-4D97-AF65-F5344CB8AC3E}">
         <p14:creationId xmlns:p14="http://schemas.microsoft.com/office/powerpoint/2010/main" val="3482331004"/>
+      </p:ext>
+    </p:extLst>
+  </p:cSld>
+  <p:clrMapOvr>
+    <a:masterClrMapping/>
+  </p:clrMapOvr>
+</p:sld>
+</file>
+
+<file path=ppt/slides/slide4.xml><?xml version="1.0" encoding="utf-8"?>
+<p:sld xmlns:a="http://schemas.openxmlformats.org/drawingml/2006/main" xmlns:r="http://schemas.openxmlformats.org/officeDocument/2006/relationships" xmlns:p="http://schemas.openxmlformats.org/presentationml/2006/main">
+  <p:cSld>
+    <p:spTree>
+      <p:nvGrpSpPr>
+        <p:cNvPr id="1" name=""/>
+        <p:cNvGrpSpPr/>
+        <p:nvPr/>
+      </p:nvGrpSpPr>
+      <p:grpSpPr>
+        <a:xfrm>
+          <a:off x="0" y="0"/>
+          <a:ext cx="0" cy="0"/>
+          <a:chOff x="0" y="0"/>
+          <a:chExt cx="0" cy="0"/>
+        </a:xfrm>
+      </p:grpSpPr>
+      <p:sp>
+        <p:nvSpPr>
+          <p:cNvPr id="14" name="Rectangle: Rounded Corners 13">
+            <a:extLst>
+              <a:ext uri="{FF2B5EF4-FFF2-40B4-BE49-F238E27FC236}">
+                <a16:creationId xmlns:a16="http://schemas.microsoft.com/office/drawing/2014/main" id="{2AB9F892-4AE6-8275-7017-38642685BC75}"/>
+              </a:ext>
+            </a:extLst>
+          </p:cNvPr>
+          <p:cNvSpPr/>
+          <p:nvPr/>
+        </p:nvSpPr>
+        <p:spPr>
+          <a:xfrm>
+            <a:off x="8630521" y="4411094"/>
+            <a:ext cx="2212920" cy="1891003"/>
+          </a:xfrm>
+          <a:prstGeom prst="roundRect">
+            <a:avLst>
+              <a:gd name="adj" fmla="val 12160"/>
+            </a:avLst>
+          </a:prstGeom>
+        </p:spPr>
+        <p:style>
+          <a:lnRef idx="1">
+            <a:schemeClr val="accent1"/>
+          </a:lnRef>
+          <a:fillRef idx="2">
+            <a:schemeClr val="accent1"/>
+          </a:fillRef>
+          <a:effectRef idx="1">
+            <a:schemeClr val="accent1"/>
+          </a:effectRef>
+          <a:fontRef idx="minor">
+            <a:schemeClr val="dk1"/>
+          </a:fontRef>
+        </p:style>
+        <p:txBody>
+          <a:bodyPr rtlCol="0" anchor="b"/>
+          <a:lstStyle/>
+          <a:p>
+            <a:pPr marL="69750"/>
+            <a:endParaRPr lang="en-US" sz="1400" dirty="0"/>
+          </a:p>
+        </p:txBody>
+      </p:sp>
+      <p:sp>
+        <p:nvSpPr>
+          <p:cNvPr id="49" name="Rectangle: Rounded Corners 48">
+            <a:extLst>
+              <a:ext uri="{FF2B5EF4-FFF2-40B4-BE49-F238E27FC236}">
+                <a16:creationId xmlns:a16="http://schemas.microsoft.com/office/drawing/2014/main" id="{3DA6CFE8-1891-5B54-1E0D-1A1BC025E081}"/>
+              </a:ext>
+            </a:extLst>
+          </p:cNvPr>
+          <p:cNvSpPr/>
+          <p:nvPr/>
+        </p:nvSpPr>
+        <p:spPr>
+          <a:xfrm>
+            <a:off x="1898501" y="3702372"/>
+            <a:ext cx="2712098" cy="672435"/>
+          </a:xfrm>
+          <a:prstGeom prst="roundRect">
+            <a:avLst>
+              <a:gd name="adj" fmla="val 12160"/>
+            </a:avLst>
+          </a:prstGeom>
+        </p:spPr>
+        <p:style>
+          <a:lnRef idx="1">
+            <a:schemeClr val="accent1"/>
+          </a:lnRef>
+          <a:fillRef idx="2">
+            <a:schemeClr val="accent1"/>
+          </a:fillRef>
+          <a:effectRef idx="1">
+            <a:schemeClr val="accent1"/>
+          </a:effectRef>
+          <a:fontRef idx="minor">
+            <a:schemeClr val="dk1"/>
+          </a:fontRef>
+        </p:style>
+        <p:txBody>
+          <a:bodyPr rtlCol="0" anchor="b"/>
+          <a:lstStyle/>
+          <a:p>
+            <a:pPr marL="285750" indent="-216000">
+              <a:buFont typeface="Arial" panose="020B0604020202020204" pitchFamily="34" charset="0"/>
+              <a:buChar char="•"/>
+            </a:pPr>
+            <a:r>
+              <a:rPr lang="en-US" sz="1400" dirty="0"/>
+              <a:t>Like </a:t>
+            </a:r>
+            <a:r>
+              <a:rPr lang="en-US" sz="1400" dirty="0" err="1"/>
+              <a:t>weak_ptr</a:t>
+            </a:r>
+            <a:endParaRPr lang="pl-PL" sz="1400" dirty="0"/>
+          </a:p>
+          <a:p>
+            <a:pPr marL="285750" indent="-216000">
+              <a:buFont typeface="Arial" panose="020B0604020202020204" pitchFamily="34" charset="0"/>
+              <a:buChar char="•"/>
+            </a:pPr>
+            <a:r>
+              <a:rPr lang="pl-PL" sz="1400" dirty="0"/>
+              <a:t>Just </a:t>
+            </a:r>
+            <a:r>
+              <a:rPr lang="pl-PL" sz="1400" dirty="0" err="1"/>
+              <a:t>AssetID</a:t>
+            </a:r>
+            <a:endParaRPr lang="en-US" sz="1400" dirty="0"/>
+          </a:p>
+        </p:txBody>
+      </p:sp>
+      <p:sp>
+        <p:nvSpPr>
+          <p:cNvPr id="4" name="Rectangle: Rounded Corners 3">
+            <a:extLst>
+              <a:ext uri="{FF2B5EF4-FFF2-40B4-BE49-F238E27FC236}">
+                <a16:creationId xmlns:a16="http://schemas.microsoft.com/office/drawing/2014/main" id="{9B34552E-9BD7-0A0C-084C-D59CBFB6B90F}"/>
+              </a:ext>
+            </a:extLst>
+          </p:cNvPr>
+          <p:cNvSpPr/>
+          <p:nvPr/>
+        </p:nvSpPr>
+        <p:spPr>
+          <a:xfrm>
+            <a:off x="4517811" y="301347"/>
+            <a:ext cx="2712098" cy="582346"/>
+          </a:xfrm>
+          <a:prstGeom prst="roundRect">
+            <a:avLst/>
+          </a:prstGeom>
+        </p:spPr>
+        <p:style>
+          <a:lnRef idx="0">
+            <a:schemeClr val="accent1"/>
+          </a:lnRef>
+          <a:fillRef idx="3">
+            <a:schemeClr val="accent1"/>
+          </a:fillRef>
+          <a:effectRef idx="3">
+            <a:schemeClr val="accent1"/>
+          </a:effectRef>
+          <a:fontRef idx="minor">
+            <a:schemeClr val="lt1"/>
+          </a:fontRef>
+        </p:style>
+        <p:txBody>
+          <a:bodyPr rtlCol="0" anchor="ctr"/>
+          <a:lstStyle/>
+          <a:p>
+            <a:pPr algn="ctr"/>
+            <a:r>
+              <a:rPr lang="en-US" dirty="0"/>
+              <a:t>Runtime’s Management</a:t>
+            </a:r>
+          </a:p>
+        </p:txBody>
+      </p:sp>
+      <p:sp>
+        <p:nvSpPr>
+          <p:cNvPr id="11" name="Rectangle: Rounded Corners 10">
+            <a:extLst>
+              <a:ext uri="{FF2B5EF4-FFF2-40B4-BE49-F238E27FC236}">
+                <a16:creationId xmlns:a16="http://schemas.microsoft.com/office/drawing/2014/main" id="{4D27B462-0403-79E1-FD21-40C1F106D7CA}"/>
+              </a:ext>
+            </a:extLst>
+          </p:cNvPr>
+          <p:cNvSpPr/>
+          <p:nvPr/>
+        </p:nvSpPr>
+        <p:spPr>
+          <a:xfrm>
+            <a:off x="7800884" y="952257"/>
+            <a:ext cx="3813106" cy="2950584"/>
+          </a:xfrm>
+          <a:prstGeom prst="roundRect">
+            <a:avLst>
+              <a:gd name="adj" fmla="val 12160"/>
+            </a:avLst>
+          </a:prstGeom>
+        </p:spPr>
+        <p:style>
+          <a:lnRef idx="1">
+            <a:schemeClr val="accent3"/>
+          </a:lnRef>
+          <a:fillRef idx="2">
+            <a:schemeClr val="accent3"/>
+          </a:fillRef>
+          <a:effectRef idx="1">
+            <a:schemeClr val="accent3"/>
+          </a:effectRef>
+          <a:fontRef idx="minor">
+            <a:schemeClr val="dk1"/>
+          </a:fontRef>
+        </p:style>
+        <p:txBody>
+          <a:bodyPr rtlCol="0" anchor="t"/>
+          <a:lstStyle/>
+          <a:p>
+            <a:pPr marL="285750" indent="-216000">
+              <a:buFont typeface="Arial" panose="020B0604020202020204" pitchFamily="34" charset="0"/>
+              <a:buChar char="•"/>
+            </a:pPr>
+            <a:r>
+              <a:rPr lang="en-US" sz="1400" dirty="0"/>
+              <a:t>Creates and manages </a:t>
+            </a:r>
+            <a:r>
+              <a:rPr lang="en-US" sz="1400" dirty="0" err="1"/>
+              <a:t>ECSes</a:t>
+            </a:r>
+            <a:endParaRPr lang="en-US" sz="1400" dirty="0"/>
+          </a:p>
+          <a:p>
+            <a:pPr marL="285750" indent="-216000">
+              <a:buFont typeface="Arial" panose="020B0604020202020204" pitchFamily="34" charset="0"/>
+              <a:buChar char="•"/>
+            </a:pPr>
+            <a:r>
+              <a:rPr lang="en-US" sz="1400" dirty="0"/>
+              <a:t>Decides what to load and what to unload</a:t>
+            </a:r>
+          </a:p>
+        </p:txBody>
+      </p:sp>
+      <p:sp>
+        <p:nvSpPr>
+          <p:cNvPr id="16" name="Rectangle: Rounded Corners 15">
+            <a:extLst>
+              <a:ext uri="{FF2B5EF4-FFF2-40B4-BE49-F238E27FC236}">
+                <a16:creationId xmlns:a16="http://schemas.microsoft.com/office/drawing/2014/main" id="{E95E1443-876E-5358-E360-96AECB58DB48}"/>
+              </a:ext>
+            </a:extLst>
+          </p:cNvPr>
+          <p:cNvSpPr/>
+          <p:nvPr/>
+        </p:nvSpPr>
+        <p:spPr>
+          <a:xfrm>
+            <a:off x="8917442" y="789824"/>
+            <a:ext cx="1698172" cy="291173"/>
+          </a:xfrm>
+          <a:prstGeom prst="roundRect">
+            <a:avLst/>
+          </a:prstGeom>
+        </p:spPr>
+        <p:style>
+          <a:lnRef idx="0">
+            <a:schemeClr val="accent3"/>
+          </a:lnRef>
+          <a:fillRef idx="3">
+            <a:schemeClr val="accent3"/>
+          </a:fillRef>
+          <a:effectRef idx="3">
+            <a:schemeClr val="accent3"/>
+          </a:effectRef>
+          <a:fontRef idx="minor">
+            <a:schemeClr val="lt1"/>
+          </a:fontRef>
+        </p:style>
+        <p:txBody>
+          <a:bodyPr rtlCol="0" anchor="ctr"/>
+          <a:lstStyle/>
+          <a:p>
+            <a:pPr algn="ctr"/>
+            <a:r>
+              <a:rPr lang="en-US" dirty="0" err="1"/>
+              <a:t>AssetsManager</a:t>
+            </a:r>
+            <a:endParaRPr lang="en-US" dirty="0"/>
+          </a:p>
+        </p:txBody>
+      </p:sp>
+      <p:sp>
+        <p:nvSpPr>
+          <p:cNvPr id="20" name="Rectangle: Rounded Corners 19">
+            <a:extLst>
+              <a:ext uri="{FF2B5EF4-FFF2-40B4-BE49-F238E27FC236}">
+                <a16:creationId xmlns:a16="http://schemas.microsoft.com/office/drawing/2014/main" id="{9A7AA30D-BFD4-79CE-25C5-CBEA8C68FD00}"/>
+              </a:ext>
+            </a:extLst>
+          </p:cNvPr>
+          <p:cNvSpPr/>
+          <p:nvPr/>
+        </p:nvSpPr>
+        <p:spPr>
+          <a:xfrm>
+            <a:off x="8887896" y="4694266"/>
+            <a:ext cx="1698172" cy="291173"/>
+          </a:xfrm>
+          <a:prstGeom prst="roundRect">
+            <a:avLst/>
+          </a:prstGeom>
+        </p:spPr>
+        <p:style>
+          <a:lnRef idx="0">
+            <a:schemeClr val="accent1"/>
+          </a:lnRef>
+          <a:fillRef idx="3">
+            <a:schemeClr val="accent1"/>
+          </a:fillRef>
+          <a:effectRef idx="3">
+            <a:schemeClr val="accent1"/>
+          </a:effectRef>
+          <a:fontRef idx="minor">
+            <a:schemeClr val="lt1"/>
+          </a:fontRef>
+        </p:style>
+        <p:txBody>
+          <a:bodyPr rtlCol="0" anchor="ctr"/>
+          <a:lstStyle/>
+          <a:p>
+            <a:r>
+              <a:rPr lang="pl-PL" dirty="0" err="1"/>
+              <a:t>TextureLoader</a:t>
+            </a:r>
+            <a:endParaRPr lang="en-US" dirty="0"/>
+          </a:p>
+        </p:txBody>
+      </p:sp>
+      <p:sp>
+        <p:nvSpPr>
+          <p:cNvPr id="21" name="Rectangle: Rounded Corners 20">
+            <a:extLst>
+              <a:ext uri="{FF2B5EF4-FFF2-40B4-BE49-F238E27FC236}">
+                <a16:creationId xmlns:a16="http://schemas.microsoft.com/office/drawing/2014/main" id="{91C8088E-D709-D392-3900-8A97632FCCE3}"/>
+              </a:ext>
+            </a:extLst>
+          </p:cNvPr>
+          <p:cNvSpPr/>
+          <p:nvPr/>
+        </p:nvSpPr>
+        <p:spPr>
+          <a:xfrm>
+            <a:off x="8887896" y="5079062"/>
+            <a:ext cx="1698172" cy="291173"/>
+          </a:xfrm>
+          <a:prstGeom prst="roundRect">
+            <a:avLst/>
+          </a:prstGeom>
+        </p:spPr>
+        <p:style>
+          <a:lnRef idx="0">
+            <a:schemeClr val="accent1"/>
+          </a:lnRef>
+          <a:fillRef idx="3">
+            <a:schemeClr val="accent1"/>
+          </a:fillRef>
+          <a:effectRef idx="3">
+            <a:schemeClr val="accent1"/>
+          </a:effectRef>
+          <a:fontRef idx="minor">
+            <a:schemeClr val="lt1"/>
+          </a:fontRef>
+        </p:style>
+        <p:txBody>
+          <a:bodyPr rtlCol="0" anchor="ctr"/>
+          <a:lstStyle/>
+          <a:p>
+            <a:r>
+              <a:rPr lang="pl-PL" dirty="0" err="1"/>
+              <a:t>Shader</a:t>
+            </a:r>
+            <a:r>
+              <a:rPr lang="en-US" dirty="0"/>
+              <a:t>Loader</a:t>
+            </a:r>
+          </a:p>
+        </p:txBody>
+      </p:sp>
+      <p:sp>
+        <p:nvSpPr>
+          <p:cNvPr id="22" name="Rectangle: Rounded Corners 21">
+            <a:extLst>
+              <a:ext uri="{FF2B5EF4-FFF2-40B4-BE49-F238E27FC236}">
+                <a16:creationId xmlns:a16="http://schemas.microsoft.com/office/drawing/2014/main" id="{E1B96F15-E655-ACC0-8971-BDE84D0E67B4}"/>
+              </a:ext>
+            </a:extLst>
+          </p:cNvPr>
+          <p:cNvSpPr/>
+          <p:nvPr/>
+        </p:nvSpPr>
+        <p:spPr>
+          <a:xfrm>
+            <a:off x="8887896" y="5463858"/>
+            <a:ext cx="1698172" cy="291173"/>
+          </a:xfrm>
+          <a:prstGeom prst="roundRect">
+            <a:avLst/>
+          </a:prstGeom>
+        </p:spPr>
+        <p:style>
+          <a:lnRef idx="0">
+            <a:schemeClr val="accent1"/>
+          </a:lnRef>
+          <a:fillRef idx="3">
+            <a:schemeClr val="accent1"/>
+          </a:fillRef>
+          <a:effectRef idx="3">
+            <a:schemeClr val="accent1"/>
+          </a:effectRef>
+          <a:fontRef idx="minor">
+            <a:schemeClr val="lt1"/>
+          </a:fontRef>
+        </p:style>
+        <p:txBody>
+          <a:bodyPr rtlCol="0" anchor="ctr"/>
+          <a:lstStyle/>
+          <a:p>
+            <a:r>
+              <a:rPr lang="pl-PL" dirty="0" err="1"/>
+              <a:t>Material</a:t>
+            </a:r>
+            <a:r>
+              <a:rPr lang="en-US" dirty="0"/>
+              <a:t>Loader</a:t>
+            </a:r>
+          </a:p>
+        </p:txBody>
+      </p:sp>
+      <p:sp>
+        <p:nvSpPr>
+          <p:cNvPr id="23" name="Rectangle: Rounded Corners 22">
+            <a:extLst>
+              <a:ext uri="{FF2B5EF4-FFF2-40B4-BE49-F238E27FC236}">
+                <a16:creationId xmlns:a16="http://schemas.microsoft.com/office/drawing/2014/main" id="{5DFE7CE4-B094-F994-4B5C-D0B4AA11D0DC}"/>
+              </a:ext>
+            </a:extLst>
+          </p:cNvPr>
+          <p:cNvSpPr/>
+          <p:nvPr/>
+        </p:nvSpPr>
+        <p:spPr>
+          <a:xfrm>
+            <a:off x="8887896" y="5848654"/>
+            <a:ext cx="1698172" cy="291173"/>
+          </a:xfrm>
+          <a:prstGeom prst="roundRect">
+            <a:avLst/>
+          </a:prstGeom>
+        </p:spPr>
+        <p:style>
+          <a:lnRef idx="0">
+            <a:schemeClr val="accent1"/>
+          </a:lnRef>
+          <a:fillRef idx="3">
+            <a:schemeClr val="accent1"/>
+          </a:fillRef>
+          <a:effectRef idx="3">
+            <a:schemeClr val="accent1"/>
+          </a:effectRef>
+          <a:fontRef idx="minor">
+            <a:schemeClr val="lt1"/>
+          </a:fontRef>
+        </p:style>
+        <p:txBody>
+          <a:bodyPr rtlCol="0" anchor="ctr"/>
+          <a:lstStyle/>
+          <a:p>
+            <a:r>
+              <a:rPr lang="pl-PL" dirty="0"/>
+              <a:t>Audio</a:t>
+            </a:r>
+            <a:r>
+              <a:rPr lang="en-US" dirty="0"/>
+              <a:t>Loader</a:t>
+            </a:r>
+          </a:p>
+        </p:txBody>
+      </p:sp>
+      <p:sp>
+        <p:nvSpPr>
+          <p:cNvPr id="24" name="Rectangle: Rounded Corners 23">
+            <a:extLst>
+              <a:ext uri="{FF2B5EF4-FFF2-40B4-BE49-F238E27FC236}">
+                <a16:creationId xmlns:a16="http://schemas.microsoft.com/office/drawing/2014/main" id="{3EF42813-46D0-10FD-67DE-D6BACF08FB44}"/>
+              </a:ext>
+            </a:extLst>
+          </p:cNvPr>
+          <p:cNvSpPr/>
+          <p:nvPr/>
+        </p:nvSpPr>
+        <p:spPr>
+          <a:xfrm>
+            <a:off x="1468017" y="964033"/>
+            <a:ext cx="2396644" cy="363190"/>
+          </a:xfrm>
+          <a:prstGeom prst="roundRect">
+            <a:avLst>
+              <a:gd name="adj" fmla="val 12160"/>
+            </a:avLst>
+          </a:prstGeom>
+        </p:spPr>
+        <p:style>
+          <a:lnRef idx="1">
+            <a:schemeClr val="accent1"/>
+          </a:lnRef>
+          <a:fillRef idx="2">
+            <a:schemeClr val="accent1"/>
+          </a:fillRef>
+          <a:effectRef idx="1">
+            <a:schemeClr val="accent1"/>
+          </a:effectRef>
+          <a:fontRef idx="minor">
+            <a:schemeClr val="dk1"/>
+          </a:fontRef>
+        </p:style>
+        <p:txBody>
+          <a:bodyPr rtlCol="0" anchor="b"/>
+          <a:lstStyle/>
+          <a:p>
+            <a:pPr marL="285750" indent="-216000">
+              <a:buFont typeface="Arial" panose="020B0604020202020204" pitchFamily="34" charset="0"/>
+              <a:buChar char="•"/>
+            </a:pPr>
+            <a:r>
+              <a:rPr lang="en-US" sz="1400" dirty="0"/>
+              <a:t>Generic interface to ECS</a:t>
+            </a:r>
+          </a:p>
+        </p:txBody>
+      </p:sp>
+      <p:sp>
+        <p:nvSpPr>
+          <p:cNvPr id="25" name="Rectangle: Rounded Corners 24">
+            <a:extLst>
+              <a:ext uri="{FF2B5EF4-FFF2-40B4-BE49-F238E27FC236}">
+                <a16:creationId xmlns:a16="http://schemas.microsoft.com/office/drawing/2014/main" id="{F2C9A6F4-DA46-462F-FA1E-C718EDD33103}"/>
+              </a:ext>
+            </a:extLst>
+          </p:cNvPr>
+          <p:cNvSpPr/>
+          <p:nvPr/>
+        </p:nvSpPr>
+        <p:spPr>
+          <a:xfrm>
+            <a:off x="2293116" y="732006"/>
+            <a:ext cx="746446" cy="291173"/>
+          </a:xfrm>
+          <a:prstGeom prst="roundRect">
+            <a:avLst/>
+          </a:prstGeom>
+        </p:spPr>
+        <p:style>
+          <a:lnRef idx="0">
+            <a:schemeClr val="accent1"/>
+          </a:lnRef>
+          <a:fillRef idx="3">
+            <a:schemeClr val="accent1"/>
+          </a:fillRef>
+          <a:effectRef idx="3">
+            <a:schemeClr val="accent1"/>
+          </a:effectRef>
+          <a:fontRef idx="minor">
+            <a:schemeClr val="lt1"/>
+          </a:fontRef>
+        </p:style>
+        <p:txBody>
+          <a:bodyPr rtlCol="0" anchor="ctr"/>
+          <a:lstStyle/>
+          <a:p>
+            <a:pPr algn="ctr"/>
+            <a:r>
+              <a:rPr lang="en-US" dirty="0"/>
+              <a:t>Asset</a:t>
+            </a:r>
+          </a:p>
+        </p:txBody>
+      </p:sp>
+      <p:sp>
+        <p:nvSpPr>
+          <p:cNvPr id="26" name="Rectangle: Rounded Corners 25">
+            <a:extLst>
+              <a:ext uri="{FF2B5EF4-FFF2-40B4-BE49-F238E27FC236}">
+                <a16:creationId xmlns:a16="http://schemas.microsoft.com/office/drawing/2014/main" id="{085EAEF1-A414-DCE0-CB7D-4284A65BA02B}"/>
+              </a:ext>
+            </a:extLst>
+          </p:cNvPr>
+          <p:cNvSpPr/>
+          <p:nvPr/>
+        </p:nvSpPr>
+        <p:spPr>
+          <a:xfrm>
+            <a:off x="580547" y="1663074"/>
+            <a:ext cx="5312226" cy="1645323"/>
+          </a:xfrm>
+          <a:prstGeom prst="roundRect">
+            <a:avLst>
+              <a:gd name="adj" fmla="val 7245"/>
+            </a:avLst>
+          </a:prstGeom>
+        </p:spPr>
+        <p:style>
+          <a:lnRef idx="1">
+            <a:schemeClr val="accent1"/>
+          </a:lnRef>
+          <a:fillRef idx="2">
+            <a:schemeClr val="accent1"/>
+          </a:fillRef>
+          <a:effectRef idx="1">
+            <a:schemeClr val="accent1"/>
+          </a:effectRef>
+          <a:fontRef idx="minor">
+            <a:schemeClr val="dk1"/>
+          </a:fontRef>
+        </p:style>
+        <p:txBody>
+          <a:bodyPr rtlCol="0" anchor="ctr"/>
+          <a:lstStyle/>
+          <a:p>
+            <a:pPr marL="285750" indent="-216000">
+              <a:buFont typeface="Arial" panose="020B0604020202020204" pitchFamily="34" charset="0"/>
+              <a:buChar char="•"/>
+            </a:pPr>
+            <a:r>
+              <a:rPr lang="en-US" sz="1400" dirty="0"/>
+              <a:t>Concrete Asset</a:t>
+            </a:r>
+          </a:p>
+          <a:p>
+            <a:pPr marL="285750" indent="-216000">
+              <a:buFont typeface="Arial" panose="020B0604020202020204" pitchFamily="34" charset="0"/>
+              <a:buChar char="•"/>
+            </a:pPr>
+            <a:r>
+              <a:rPr lang="en-US" sz="1400" dirty="0"/>
+              <a:t>Public only methods specific to its</a:t>
+            </a:r>
+            <a:br>
+              <a:rPr lang="en-US" sz="1400" dirty="0"/>
+            </a:br>
+            <a:r>
+              <a:rPr lang="en-US" sz="1400" dirty="0"/>
+              <a:t>asset type</a:t>
+            </a:r>
+          </a:p>
+          <a:p>
+            <a:pPr marL="285750" indent="-216000">
+              <a:buFont typeface="Arial" panose="020B0604020202020204" pitchFamily="34" charset="0"/>
+              <a:buChar char="•"/>
+            </a:pPr>
+            <a:r>
+              <a:rPr lang="en-US" sz="1400" dirty="0"/>
+              <a:t>Can be conceptualized as an asset</a:t>
+            </a:r>
+            <a:br>
+              <a:rPr lang="en-US" sz="1400" dirty="0"/>
+            </a:br>
+            <a:r>
+              <a:rPr lang="en-US" sz="1400" dirty="0"/>
+              <a:t>itself, but actually is just an interface</a:t>
+            </a:r>
+            <a:br>
+              <a:rPr lang="en-US" sz="1400" dirty="0"/>
+            </a:br>
+            <a:r>
+              <a:rPr lang="en-US" sz="1400" dirty="0"/>
+              <a:t>to ECS</a:t>
+            </a:r>
+          </a:p>
+        </p:txBody>
+      </p:sp>
+      <p:sp>
+        <p:nvSpPr>
+          <p:cNvPr id="29" name="Rectangle: Rounded Corners 28">
+            <a:extLst>
+              <a:ext uri="{FF2B5EF4-FFF2-40B4-BE49-F238E27FC236}">
+                <a16:creationId xmlns:a16="http://schemas.microsoft.com/office/drawing/2014/main" id="{74B9983E-B778-6BFD-97D6-90BE954CD878}"/>
+              </a:ext>
+            </a:extLst>
+          </p:cNvPr>
+          <p:cNvSpPr/>
+          <p:nvPr/>
+        </p:nvSpPr>
+        <p:spPr>
+          <a:xfrm>
+            <a:off x="4114513" y="1758268"/>
+            <a:ext cx="1698172" cy="291173"/>
+          </a:xfrm>
+          <a:prstGeom prst="roundRect">
+            <a:avLst/>
+          </a:prstGeom>
+        </p:spPr>
+        <p:style>
+          <a:lnRef idx="0">
+            <a:schemeClr val="accent1"/>
+          </a:lnRef>
+          <a:fillRef idx="3">
+            <a:schemeClr val="accent1"/>
+          </a:fillRef>
+          <a:effectRef idx="3">
+            <a:schemeClr val="accent1"/>
+          </a:effectRef>
+          <a:fontRef idx="minor">
+            <a:schemeClr val="lt1"/>
+          </a:fontRef>
+        </p:style>
+        <p:txBody>
+          <a:bodyPr rtlCol="0" anchor="ctr"/>
+          <a:lstStyle/>
+          <a:p>
+            <a:r>
+              <a:rPr lang="en-US" dirty="0"/>
+              <a:t>Texture : Asset</a:t>
+            </a:r>
+          </a:p>
+        </p:txBody>
+      </p:sp>
+      <p:sp>
+        <p:nvSpPr>
+          <p:cNvPr id="30" name="Rectangle: Rounded Corners 29">
+            <a:extLst>
+              <a:ext uri="{FF2B5EF4-FFF2-40B4-BE49-F238E27FC236}">
+                <a16:creationId xmlns:a16="http://schemas.microsoft.com/office/drawing/2014/main" id="{8F679557-2737-50F4-CB08-593E0B2C31EB}"/>
+              </a:ext>
+            </a:extLst>
+          </p:cNvPr>
+          <p:cNvSpPr/>
+          <p:nvPr/>
+        </p:nvSpPr>
+        <p:spPr>
+          <a:xfrm>
+            <a:off x="4114513" y="2143064"/>
+            <a:ext cx="1698172" cy="291173"/>
+          </a:xfrm>
+          <a:prstGeom prst="roundRect">
+            <a:avLst/>
+          </a:prstGeom>
+        </p:spPr>
+        <p:style>
+          <a:lnRef idx="0">
+            <a:schemeClr val="accent1"/>
+          </a:lnRef>
+          <a:fillRef idx="3">
+            <a:schemeClr val="accent1"/>
+          </a:fillRef>
+          <a:effectRef idx="3">
+            <a:schemeClr val="accent1"/>
+          </a:effectRef>
+          <a:fontRef idx="minor">
+            <a:schemeClr val="lt1"/>
+          </a:fontRef>
+        </p:style>
+        <p:txBody>
+          <a:bodyPr rtlCol="0" anchor="ctr"/>
+          <a:lstStyle/>
+          <a:p>
+            <a:r>
+              <a:rPr lang="en-US" dirty="0"/>
+              <a:t>Shader : Asset</a:t>
+            </a:r>
+          </a:p>
+        </p:txBody>
+      </p:sp>
+      <p:sp>
+        <p:nvSpPr>
+          <p:cNvPr id="31" name="Rectangle: Rounded Corners 30">
+            <a:extLst>
+              <a:ext uri="{FF2B5EF4-FFF2-40B4-BE49-F238E27FC236}">
+                <a16:creationId xmlns:a16="http://schemas.microsoft.com/office/drawing/2014/main" id="{70A4F2A2-BE78-F95E-C47E-3E2C5C01F0FB}"/>
+              </a:ext>
+            </a:extLst>
+          </p:cNvPr>
+          <p:cNvSpPr/>
+          <p:nvPr/>
+        </p:nvSpPr>
+        <p:spPr>
+          <a:xfrm>
+            <a:off x="4114513" y="2527860"/>
+            <a:ext cx="1698172" cy="291173"/>
+          </a:xfrm>
+          <a:prstGeom prst="roundRect">
+            <a:avLst/>
+          </a:prstGeom>
+        </p:spPr>
+        <p:style>
+          <a:lnRef idx="0">
+            <a:schemeClr val="accent1"/>
+          </a:lnRef>
+          <a:fillRef idx="3">
+            <a:schemeClr val="accent1"/>
+          </a:fillRef>
+          <a:effectRef idx="3">
+            <a:schemeClr val="accent1"/>
+          </a:effectRef>
+          <a:fontRef idx="minor">
+            <a:schemeClr val="lt1"/>
+          </a:fontRef>
+        </p:style>
+        <p:txBody>
+          <a:bodyPr rtlCol="0" anchor="ctr"/>
+          <a:lstStyle/>
+          <a:p>
+            <a:r>
+              <a:rPr lang="en-US" dirty="0"/>
+              <a:t>Material : Asset</a:t>
+            </a:r>
+          </a:p>
+        </p:txBody>
+      </p:sp>
+      <p:sp>
+        <p:nvSpPr>
+          <p:cNvPr id="32" name="Rectangle: Rounded Corners 31">
+            <a:extLst>
+              <a:ext uri="{FF2B5EF4-FFF2-40B4-BE49-F238E27FC236}">
+                <a16:creationId xmlns:a16="http://schemas.microsoft.com/office/drawing/2014/main" id="{F0D7A861-8771-2F69-5AF5-A01C91A04648}"/>
+              </a:ext>
+            </a:extLst>
+          </p:cNvPr>
+          <p:cNvSpPr/>
+          <p:nvPr/>
+        </p:nvSpPr>
+        <p:spPr>
+          <a:xfrm>
+            <a:off x="4114513" y="2912656"/>
+            <a:ext cx="1698172" cy="291173"/>
+          </a:xfrm>
+          <a:prstGeom prst="roundRect">
+            <a:avLst/>
+          </a:prstGeom>
+        </p:spPr>
+        <p:style>
+          <a:lnRef idx="0">
+            <a:schemeClr val="accent1"/>
+          </a:lnRef>
+          <a:fillRef idx="3">
+            <a:schemeClr val="accent1"/>
+          </a:fillRef>
+          <a:effectRef idx="3">
+            <a:schemeClr val="accent1"/>
+          </a:effectRef>
+          <a:fontRef idx="minor">
+            <a:schemeClr val="lt1"/>
+          </a:fontRef>
+        </p:style>
+        <p:txBody>
+          <a:bodyPr rtlCol="0" anchor="ctr"/>
+          <a:lstStyle/>
+          <a:p>
+            <a:r>
+              <a:rPr lang="en-US" dirty="0"/>
+              <a:t>Audio : Asset</a:t>
+            </a:r>
+          </a:p>
+        </p:txBody>
+      </p:sp>
+      <p:cxnSp>
+        <p:nvCxnSpPr>
+          <p:cNvPr id="34" name="Straight Arrow Connector 33">
+            <a:extLst>
+              <a:ext uri="{FF2B5EF4-FFF2-40B4-BE49-F238E27FC236}">
+                <a16:creationId xmlns:a16="http://schemas.microsoft.com/office/drawing/2014/main" id="{368638C0-86FD-BF63-CFD7-AD8590CC15AA}"/>
+              </a:ext>
+            </a:extLst>
+          </p:cNvPr>
+          <p:cNvCxnSpPr>
+            <a:cxnSpLocks/>
+          </p:cNvCxnSpPr>
+          <p:nvPr/>
+        </p:nvCxnSpPr>
+        <p:spPr>
+          <a:xfrm>
+            <a:off x="3740513" y="1327223"/>
+            <a:ext cx="0" cy="335851"/>
+          </a:xfrm>
+          <a:prstGeom prst="straightConnector1">
+            <a:avLst/>
+          </a:prstGeom>
+          <a:ln>
+            <a:tailEnd type="triangle"/>
+          </a:ln>
+        </p:spPr>
+        <p:style>
+          <a:lnRef idx="3">
+            <a:schemeClr val="accent1"/>
+          </a:lnRef>
+          <a:fillRef idx="0">
+            <a:schemeClr val="accent1"/>
+          </a:fillRef>
+          <a:effectRef idx="2">
+            <a:schemeClr val="accent1"/>
+          </a:effectRef>
+          <a:fontRef idx="minor">
+            <a:schemeClr val="tx1"/>
+          </a:fontRef>
+        </p:style>
+      </p:cxnSp>
+      <p:cxnSp>
+        <p:nvCxnSpPr>
+          <p:cNvPr id="39" name="Connector: Elbow 38">
+            <a:extLst>
+              <a:ext uri="{FF2B5EF4-FFF2-40B4-BE49-F238E27FC236}">
+                <a16:creationId xmlns:a16="http://schemas.microsoft.com/office/drawing/2014/main" id="{CAD081EE-3F1B-2C36-94C4-8FB30D431875}"/>
+              </a:ext>
+            </a:extLst>
+          </p:cNvPr>
+          <p:cNvCxnSpPr>
+            <a:endCxn id="32" idx="1"/>
+          </p:cNvCxnSpPr>
+          <p:nvPr/>
+        </p:nvCxnSpPr>
+        <p:spPr>
+          <a:xfrm rot="16200000" flipH="1">
+            <a:off x="3229929" y="2173658"/>
+            <a:ext cx="1395169" cy="374000"/>
+          </a:xfrm>
+          <a:prstGeom prst="bentConnector2">
+            <a:avLst/>
+          </a:prstGeom>
+          <a:ln>
+            <a:tailEnd type="triangle"/>
+          </a:ln>
+        </p:spPr>
+        <p:style>
+          <a:lnRef idx="3">
+            <a:schemeClr val="accent1"/>
+          </a:lnRef>
+          <a:fillRef idx="0">
+            <a:schemeClr val="accent1"/>
+          </a:fillRef>
+          <a:effectRef idx="2">
+            <a:schemeClr val="accent1"/>
+          </a:effectRef>
+          <a:fontRef idx="minor">
+            <a:schemeClr val="tx1"/>
+          </a:fontRef>
+        </p:style>
+      </p:cxnSp>
+      <p:cxnSp>
+        <p:nvCxnSpPr>
+          <p:cNvPr id="41" name="Connector: Elbow 40">
+            <a:extLst>
+              <a:ext uri="{FF2B5EF4-FFF2-40B4-BE49-F238E27FC236}">
+                <a16:creationId xmlns:a16="http://schemas.microsoft.com/office/drawing/2014/main" id="{750701F6-5177-1999-9EA9-4246A9AEFB83}"/>
+              </a:ext>
+            </a:extLst>
+          </p:cNvPr>
+          <p:cNvCxnSpPr>
+            <a:endCxn id="31" idx="1"/>
+          </p:cNvCxnSpPr>
+          <p:nvPr/>
+        </p:nvCxnSpPr>
+        <p:spPr>
+          <a:xfrm rot="16200000" flipH="1">
+            <a:off x="3422325" y="1981259"/>
+            <a:ext cx="1010374" cy="374001"/>
+          </a:xfrm>
+          <a:prstGeom prst="bentConnector2">
+            <a:avLst/>
+          </a:prstGeom>
+          <a:ln>
+            <a:tailEnd type="triangle"/>
+          </a:ln>
+        </p:spPr>
+        <p:style>
+          <a:lnRef idx="3">
+            <a:schemeClr val="accent1"/>
+          </a:lnRef>
+          <a:fillRef idx="0">
+            <a:schemeClr val="accent1"/>
+          </a:fillRef>
+          <a:effectRef idx="2">
+            <a:schemeClr val="accent1"/>
+          </a:effectRef>
+          <a:fontRef idx="minor">
+            <a:schemeClr val="tx1"/>
+          </a:fontRef>
+        </p:style>
+      </p:cxnSp>
+      <p:cxnSp>
+        <p:nvCxnSpPr>
+          <p:cNvPr id="43" name="Connector: Elbow 42">
+            <a:extLst>
+              <a:ext uri="{FF2B5EF4-FFF2-40B4-BE49-F238E27FC236}">
+                <a16:creationId xmlns:a16="http://schemas.microsoft.com/office/drawing/2014/main" id="{FDA2C075-ACAB-899D-7CC7-AF48D767B0BC}"/>
+              </a:ext>
+            </a:extLst>
+          </p:cNvPr>
+          <p:cNvCxnSpPr>
+            <a:endCxn id="30" idx="1"/>
+          </p:cNvCxnSpPr>
+          <p:nvPr/>
+        </p:nvCxnSpPr>
+        <p:spPr>
+          <a:xfrm rot="16200000" flipH="1">
+            <a:off x="3614722" y="1788859"/>
+            <a:ext cx="625579" cy="374003"/>
+          </a:xfrm>
+          <a:prstGeom prst="bentConnector2">
+            <a:avLst/>
+          </a:prstGeom>
+          <a:ln>
+            <a:tailEnd type="triangle"/>
+          </a:ln>
+        </p:spPr>
+        <p:style>
+          <a:lnRef idx="3">
+            <a:schemeClr val="accent1"/>
+          </a:lnRef>
+          <a:fillRef idx="0">
+            <a:schemeClr val="accent1"/>
+          </a:fillRef>
+          <a:effectRef idx="2">
+            <a:schemeClr val="accent1"/>
+          </a:effectRef>
+          <a:fontRef idx="minor">
+            <a:schemeClr val="tx1"/>
+          </a:fontRef>
+        </p:style>
+      </p:cxnSp>
+      <p:cxnSp>
+        <p:nvCxnSpPr>
+          <p:cNvPr id="45" name="Connector: Elbow 44">
+            <a:extLst>
+              <a:ext uri="{FF2B5EF4-FFF2-40B4-BE49-F238E27FC236}">
+                <a16:creationId xmlns:a16="http://schemas.microsoft.com/office/drawing/2014/main" id="{93FCDE67-0159-EB48-396A-210D41E520E1}"/>
+              </a:ext>
+            </a:extLst>
+          </p:cNvPr>
+          <p:cNvCxnSpPr>
+            <a:endCxn id="29" idx="1"/>
+          </p:cNvCxnSpPr>
+          <p:nvPr/>
+        </p:nvCxnSpPr>
+        <p:spPr>
+          <a:xfrm>
+            <a:off x="3740509" y="1663070"/>
+            <a:ext cx="374004" cy="240785"/>
+          </a:xfrm>
+          <a:prstGeom prst="bentConnector3">
+            <a:avLst>
+              <a:gd name="adj1" fmla="val 104"/>
+            </a:avLst>
+          </a:prstGeom>
+          <a:ln>
+            <a:tailEnd type="triangle"/>
+          </a:ln>
+        </p:spPr>
+        <p:style>
+          <a:lnRef idx="3">
+            <a:schemeClr val="accent1"/>
+          </a:lnRef>
+          <a:fillRef idx="0">
+            <a:schemeClr val="accent1"/>
+          </a:fillRef>
+          <a:effectRef idx="2">
+            <a:schemeClr val="accent1"/>
+          </a:effectRef>
+          <a:fontRef idx="minor">
+            <a:schemeClr val="tx1"/>
+          </a:fontRef>
+        </p:style>
+      </p:cxnSp>
+      <p:sp>
+        <p:nvSpPr>
+          <p:cNvPr id="48" name="Rectangle: Rounded Corners 47">
+            <a:extLst>
+              <a:ext uri="{FF2B5EF4-FFF2-40B4-BE49-F238E27FC236}">
+                <a16:creationId xmlns:a16="http://schemas.microsoft.com/office/drawing/2014/main" id="{B1B16EFC-0F53-09AF-F5F4-6F198738767F}"/>
+              </a:ext>
+            </a:extLst>
+          </p:cNvPr>
+          <p:cNvSpPr/>
+          <p:nvPr/>
+        </p:nvSpPr>
+        <p:spPr>
+          <a:xfrm>
+            <a:off x="2099110" y="3529491"/>
+            <a:ext cx="2310881" cy="291173"/>
+          </a:xfrm>
+          <a:prstGeom prst="roundRect">
+            <a:avLst/>
+          </a:prstGeom>
+        </p:spPr>
+        <p:style>
+          <a:lnRef idx="0">
+            <a:schemeClr val="accent1"/>
+          </a:lnRef>
+          <a:fillRef idx="3">
+            <a:schemeClr val="accent1"/>
+          </a:fillRef>
+          <a:effectRef idx="3">
+            <a:schemeClr val="accent1"/>
+          </a:effectRef>
+          <a:fontRef idx="minor">
+            <a:schemeClr val="lt1"/>
+          </a:fontRef>
+        </p:style>
+        <p:txBody>
+          <a:bodyPr rtlCol="0" anchor="ctr"/>
+          <a:lstStyle/>
+          <a:p>
+            <a:pPr algn="ctr"/>
+            <a:r>
+              <a:rPr lang="en-US" dirty="0" err="1"/>
+              <a:t>AssetHandle</a:t>
+            </a:r>
+            <a:r>
+              <a:rPr lang="en-US" dirty="0"/>
+              <a:t>&lt;</a:t>
+            </a:r>
+            <a:r>
+              <a:rPr lang="en-US" dirty="0" err="1"/>
+              <a:t>tnAsset</a:t>
+            </a:r>
+            <a:r>
+              <a:rPr lang="en-US" dirty="0"/>
+              <a:t>&gt;</a:t>
+            </a:r>
+          </a:p>
+        </p:txBody>
+      </p:sp>
+      <p:sp>
+        <p:nvSpPr>
+          <p:cNvPr id="19" name="Rectangle: Rounded Corners 18">
+            <a:extLst>
+              <a:ext uri="{FF2B5EF4-FFF2-40B4-BE49-F238E27FC236}">
+                <a16:creationId xmlns:a16="http://schemas.microsoft.com/office/drawing/2014/main" id="{0E718222-A285-B7AB-65DE-1190C8ED1063}"/>
+              </a:ext>
+            </a:extLst>
+          </p:cNvPr>
+          <p:cNvSpPr/>
+          <p:nvPr/>
+        </p:nvSpPr>
+        <p:spPr>
+          <a:xfrm>
+            <a:off x="8562879" y="2241829"/>
+            <a:ext cx="2712098" cy="1380037"/>
+          </a:xfrm>
+          <a:prstGeom prst="roundRect">
+            <a:avLst>
+              <a:gd name="adj" fmla="val 12160"/>
+            </a:avLst>
+          </a:prstGeom>
+        </p:spPr>
+        <p:style>
+          <a:lnRef idx="1">
+            <a:schemeClr val="accent1"/>
+          </a:lnRef>
+          <a:fillRef idx="2">
+            <a:schemeClr val="accent1"/>
+          </a:fillRef>
+          <a:effectRef idx="1">
+            <a:schemeClr val="accent1"/>
+          </a:effectRef>
+          <a:fontRef idx="minor">
+            <a:schemeClr val="dk1"/>
+          </a:fontRef>
+        </p:style>
+        <p:txBody>
+          <a:bodyPr rtlCol="0" anchor="t"/>
+          <a:lstStyle/>
+          <a:p>
+            <a:pPr algn="ctr"/>
+            <a:endParaRPr lang="en-US" dirty="0"/>
+          </a:p>
+        </p:txBody>
+      </p:sp>
+      <p:sp>
+        <p:nvSpPr>
+          <p:cNvPr id="18" name="Rectangle: Rounded Corners 17">
+            <a:extLst>
+              <a:ext uri="{FF2B5EF4-FFF2-40B4-BE49-F238E27FC236}">
+                <a16:creationId xmlns:a16="http://schemas.microsoft.com/office/drawing/2014/main" id="{E9063FDF-1E90-C287-F3CB-6DAC3167651D}"/>
+              </a:ext>
+            </a:extLst>
+          </p:cNvPr>
+          <p:cNvSpPr/>
+          <p:nvPr/>
+        </p:nvSpPr>
+        <p:spPr>
+          <a:xfrm>
+            <a:off x="8410479" y="2089429"/>
+            <a:ext cx="2712098" cy="1380037"/>
+          </a:xfrm>
+          <a:prstGeom prst="roundRect">
+            <a:avLst>
+              <a:gd name="adj" fmla="val 12160"/>
+            </a:avLst>
+          </a:prstGeom>
+        </p:spPr>
+        <p:style>
+          <a:lnRef idx="1">
+            <a:schemeClr val="accent1"/>
+          </a:lnRef>
+          <a:fillRef idx="2">
+            <a:schemeClr val="accent1"/>
+          </a:fillRef>
+          <a:effectRef idx="1">
+            <a:schemeClr val="accent1"/>
+          </a:effectRef>
+          <a:fontRef idx="minor">
+            <a:schemeClr val="dk1"/>
+          </a:fontRef>
+        </p:style>
+        <p:txBody>
+          <a:bodyPr rtlCol="0" anchor="t"/>
+          <a:lstStyle/>
+          <a:p>
+            <a:pPr algn="ctr"/>
+            <a:endParaRPr lang="en-US" dirty="0"/>
+          </a:p>
+        </p:txBody>
+      </p:sp>
+      <p:sp>
+        <p:nvSpPr>
+          <p:cNvPr id="17" name="Rectangle: Rounded Corners 16">
+            <a:extLst>
+              <a:ext uri="{FF2B5EF4-FFF2-40B4-BE49-F238E27FC236}">
+                <a16:creationId xmlns:a16="http://schemas.microsoft.com/office/drawing/2014/main" id="{305361BF-E5C7-487A-5E78-A32E29767BFB}"/>
+              </a:ext>
+            </a:extLst>
+          </p:cNvPr>
+          <p:cNvSpPr/>
+          <p:nvPr/>
+        </p:nvSpPr>
+        <p:spPr>
+          <a:xfrm>
+            <a:off x="8258079" y="1937029"/>
+            <a:ext cx="2712098" cy="1380037"/>
+          </a:xfrm>
+          <a:prstGeom prst="roundRect">
+            <a:avLst>
+              <a:gd name="adj" fmla="val 12160"/>
+            </a:avLst>
+          </a:prstGeom>
+        </p:spPr>
+        <p:style>
+          <a:lnRef idx="1">
+            <a:schemeClr val="accent1"/>
+          </a:lnRef>
+          <a:fillRef idx="2">
+            <a:schemeClr val="accent1"/>
+          </a:fillRef>
+          <a:effectRef idx="1">
+            <a:schemeClr val="accent1"/>
+          </a:effectRef>
+          <a:fontRef idx="minor">
+            <a:schemeClr val="dk1"/>
+          </a:fontRef>
+        </p:style>
+        <p:txBody>
+          <a:bodyPr rtlCol="0" anchor="t"/>
+          <a:lstStyle/>
+          <a:p>
+            <a:pPr algn="ctr"/>
+            <a:endParaRPr lang="en-US" dirty="0"/>
+          </a:p>
+        </p:txBody>
+      </p:sp>
+      <p:sp>
+        <p:nvSpPr>
+          <p:cNvPr id="5" name="Rectangle: Rounded Corners 4">
+            <a:extLst>
+              <a:ext uri="{FF2B5EF4-FFF2-40B4-BE49-F238E27FC236}">
+                <a16:creationId xmlns:a16="http://schemas.microsoft.com/office/drawing/2014/main" id="{F875D195-7BA4-C0B7-ABDD-9E716D5BCE41}"/>
+              </a:ext>
+            </a:extLst>
+          </p:cNvPr>
+          <p:cNvSpPr/>
+          <p:nvPr/>
+        </p:nvSpPr>
+        <p:spPr>
+          <a:xfrm>
+            <a:off x="8105679" y="1784629"/>
+            <a:ext cx="2712098" cy="1380037"/>
+          </a:xfrm>
+          <a:prstGeom prst="roundRect">
+            <a:avLst>
+              <a:gd name="adj" fmla="val 12160"/>
+            </a:avLst>
+          </a:prstGeom>
+        </p:spPr>
+        <p:style>
+          <a:lnRef idx="1">
+            <a:schemeClr val="accent1"/>
+          </a:lnRef>
+          <a:fillRef idx="2">
+            <a:schemeClr val="accent1"/>
+          </a:fillRef>
+          <a:effectRef idx="1">
+            <a:schemeClr val="accent1"/>
+          </a:effectRef>
+          <a:fontRef idx="minor">
+            <a:schemeClr val="dk1"/>
+          </a:fontRef>
+        </p:style>
+        <p:txBody>
+          <a:bodyPr rtlCol="0" anchor="t"/>
+          <a:lstStyle/>
+          <a:p>
+            <a:pPr algn="ctr"/>
+            <a:endParaRPr lang="en-US" dirty="0"/>
+          </a:p>
+        </p:txBody>
+      </p:sp>
+      <p:graphicFrame>
+        <p:nvGraphicFramePr>
+          <p:cNvPr id="6" name="Table 5">
+            <a:extLst>
+              <a:ext uri="{FF2B5EF4-FFF2-40B4-BE49-F238E27FC236}">
+                <a16:creationId xmlns:a16="http://schemas.microsoft.com/office/drawing/2014/main" id="{3394259D-24FB-489E-01BE-C86E3C45BFFE}"/>
+              </a:ext>
+            </a:extLst>
+          </p:cNvPr>
+          <p:cNvGraphicFramePr>
+            <a:graphicFrameLocks noGrp="1"/>
+          </p:cNvGraphicFramePr>
+          <p:nvPr>
+            <p:extLst>
+              <p:ext uri="{D42A27DB-BD31-4B8C-83A1-F6EECF244321}">
+                <p14:modId xmlns:p14="http://schemas.microsoft.com/office/powerpoint/2010/main" val="29952105"/>
+              </p:ext>
+            </p:extLst>
+          </p:nvPr>
+        </p:nvGraphicFramePr>
+        <p:xfrm>
+          <a:off x="8266893" y="2030652"/>
+          <a:ext cx="2389670" cy="182292"/>
+        </p:xfrm>
+        <a:graphic>
+          <a:graphicData uri="http://schemas.openxmlformats.org/drawingml/2006/table">
+            <a:tbl>
+              <a:tblPr firstRow="1" bandRow="1">
+                <a:tableStyleId>{93296810-A885-4BE3-A3E7-6D5BEEA58F35}</a:tableStyleId>
+              </a:tblPr>
+              <a:tblGrid>
+                <a:gridCol w="238967">
+                  <a:extLst>
+                    <a:ext uri="{9D8B030D-6E8A-4147-A177-3AD203B41FA5}">
+                      <a16:colId xmlns:a16="http://schemas.microsoft.com/office/drawing/2014/main" val="1452157560"/>
+                    </a:ext>
+                  </a:extLst>
+                </a:gridCol>
+                <a:gridCol w="238967">
+                  <a:extLst>
+                    <a:ext uri="{9D8B030D-6E8A-4147-A177-3AD203B41FA5}">
+                      <a16:colId xmlns:a16="http://schemas.microsoft.com/office/drawing/2014/main" val="2094690716"/>
+                    </a:ext>
+                  </a:extLst>
+                </a:gridCol>
+                <a:gridCol w="238967">
+                  <a:extLst>
+                    <a:ext uri="{9D8B030D-6E8A-4147-A177-3AD203B41FA5}">
+                      <a16:colId xmlns:a16="http://schemas.microsoft.com/office/drawing/2014/main" val="2410800384"/>
+                    </a:ext>
+                  </a:extLst>
+                </a:gridCol>
+                <a:gridCol w="238967">
+                  <a:extLst>
+                    <a:ext uri="{9D8B030D-6E8A-4147-A177-3AD203B41FA5}">
+                      <a16:colId xmlns:a16="http://schemas.microsoft.com/office/drawing/2014/main" val="219437509"/>
+                    </a:ext>
+                  </a:extLst>
+                </a:gridCol>
+                <a:gridCol w="238967">
+                  <a:extLst>
+                    <a:ext uri="{9D8B030D-6E8A-4147-A177-3AD203B41FA5}">
+                      <a16:colId xmlns:a16="http://schemas.microsoft.com/office/drawing/2014/main" val="2787922525"/>
+                    </a:ext>
+                  </a:extLst>
+                </a:gridCol>
+                <a:gridCol w="238967">
+                  <a:extLst>
+                    <a:ext uri="{9D8B030D-6E8A-4147-A177-3AD203B41FA5}">
+                      <a16:colId xmlns:a16="http://schemas.microsoft.com/office/drawing/2014/main" val="4092570086"/>
+                    </a:ext>
+                  </a:extLst>
+                </a:gridCol>
+                <a:gridCol w="238967">
+                  <a:extLst>
+                    <a:ext uri="{9D8B030D-6E8A-4147-A177-3AD203B41FA5}">
+                      <a16:colId xmlns:a16="http://schemas.microsoft.com/office/drawing/2014/main" val="2420869638"/>
+                    </a:ext>
+                  </a:extLst>
+                </a:gridCol>
+                <a:gridCol w="238967">
+                  <a:extLst>
+                    <a:ext uri="{9D8B030D-6E8A-4147-A177-3AD203B41FA5}">
+                      <a16:colId xmlns:a16="http://schemas.microsoft.com/office/drawing/2014/main" val="1752270359"/>
+                    </a:ext>
+                  </a:extLst>
+                </a:gridCol>
+                <a:gridCol w="238967">
+                  <a:extLst>
+                    <a:ext uri="{9D8B030D-6E8A-4147-A177-3AD203B41FA5}">
+                      <a16:colId xmlns:a16="http://schemas.microsoft.com/office/drawing/2014/main" val="1624973094"/>
+                    </a:ext>
+                  </a:extLst>
+                </a:gridCol>
+                <a:gridCol w="238967">
+                  <a:extLst>
+                    <a:ext uri="{9D8B030D-6E8A-4147-A177-3AD203B41FA5}">
+                      <a16:colId xmlns:a16="http://schemas.microsoft.com/office/drawing/2014/main" val="2483870472"/>
+                    </a:ext>
+                  </a:extLst>
+                </a:gridCol>
+              </a:tblGrid>
+              <a:tr h="182292">
+                <a:tc>
+                  <a:txBody>
+                    <a:bodyPr/>
+                    <a:lstStyle/>
+                    <a:p>
+                      <a:endParaRPr lang="en-US" sz="200"/>
+                    </a:p>
+                  </a:txBody>
+                  <a:tcPr>
+                    <a:lnL w="12700" cap="flat" cmpd="sng" algn="ctr">
+                      <a:solidFill>
+                        <a:schemeClr val="tx1"/>
+                      </a:solidFill>
+                      <a:prstDash val="solid"/>
+                      <a:round/>
+                      <a:headEnd type="none" w="med" len="med"/>
+                      <a:tailEnd type="none" w="med" len="med"/>
+                    </a:lnL>
+                    <a:lnR w="12700" cap="flat" cmpd="sng" algn="ctr">
+                      <a:solidFill>
+                        <a:schemeClr val="tx1"/>
+                      </a:solidFill>
+                      <a:prstDash val="solid"/>
+                      <a:round/>
+                      <a:headEnd type="none" w="med" len="med"/>
+                      <a:tailEnd type="none" w="med" len="med"/>
+                    </a:lnR>
+                    <a:lnT w="12700" cap="flat" cmpd="sng" algn="ctr">
+                      <a:solidFill>
+                        <a:schemeClr val="tx1"/>
+                      </a:solidFill>
+                      <a:prstDash val="solid"/>
+                      <a:round/>
+                      <a:headEnd type="none" w="med" len="med"/>
+                      <a:tailEnd type="none" w="med" len="med"/>
+                    </a:lnT>
+                    <a:lnB w="12700" cap="flat" cmpd="sng" algn="ctr">
+                      <a:solidFill>
+                        <a:schemeClr val="tx1"/>
+                      </a:solidFill>
+                      <a:prstDash val="solid"/>
+                      <a:round/>
+                      <a:headEnd type="none" w="med" len="med"/>
+                      <a:tailEnd type="none" w="med" len="med"/>
+                    </a:lnB>
+                    <a:lnTlToBr w="12700" cmpd="sng">
+                      <a:noFill/>
+                      <a:prstDash val="solid"/>
+                    </a:lnTlToBr>
+                    <a:lnBlToTr w="12700" cmpd="sng">
+                      <a:noFill/>
+                      <a:prstDash val="solid"/>
+                    </a:lnBlToTr>
+                  </a:tcPr>
+                </a:tc>
+                <a:tc>
+                  <a:txBody>
+                    <a:bodyPr/>
+                    <a:lstStyle/>
+                    <a:p>
+                      <a:endParaRPr lang="en-US" sz="200"/>
+                    </a:p>
+                  </a:txBody>
+                  <a:tcPr>
+                    <a:lnL w="12700" cap="flat" cmpd="sng" algn="ctr">
+                      <a:solidFill>
+                        <a:schemeClr val="tx1"/>
+                      </a:solidFill>
+                      <a:prstDash val="solid"/>
+                      <a:round/>
+                      <a:headEnd type="none" w="med" len="med"/>
+                      <a:tailEnd type="none" w="med" len="med"/>
+                    </a:lnL>
+                    <a:lnR w="12700" cap="flat" cmpd="sng" algn="ctr">
+                      <a:solidFill>
+                        <a:schemeClr val="tx1"/>
+                      </a:solidFill>
+                      <a:prstDash val="solid"/>
+                      <a:round/>
+                      <a:headEnd type="none" w="med" len="med"/>
+                      <a:tailEnd type="none" w="med" len="med"/>
+                    </a:lnR>
+                    <a:lnT w="12700" cap="flat" cmpd="sng" algn="ctr">
+                      <a:solidFill>
+                        <a:schemeClr val="tx1"/>
+                      </a:solidFill>
+                      <a:prstDash val="solid"/>
+                      <a:round/>
+                      <a:headEnd type="none" w="med" len="med"/>
+                      <a:tailEnd type="none" w="med" len="med"/>
+                    </a:lnT>
+                    <a:lnB w="12700" cap="flat" cmpd="sng" algn="ctr">
+                      <a:solidFill>
+                        <a:schemeClr val="tx1"/>
+                      </a:solidFill>
+                      <a:prstDash val="solid"/>
+                      <a:round/>
+                      <a:headEnd type="none" w="med" len="med"/>
+                      <a:tailEnd type="none" w="med" len="med"/>
+                    </a:lnB>
+                    <a:lnTlToBr w="12700" cmpd="sng">
+                      <a:noFill/>
+                      <a:prstDash val="solid"/>
+                    </a:lnTlToBr>
+                    <a:lnBlToTr w="12700" cmpd="sng">
+                      <a:noFill/>
+                      <a:prstDash val="solid"/>
+                    </a:lnBlToTr>
+                  </a:tcPr>
+                </a:tc>
+                <a:tc>
+                  <a:txBody>
+                    <a:bodyPr/>
+                    <a:lstStyle/>
+                    <a:p>
+                      <a:endParaRPr lang="en-US" sz="200"/>
+                    </a:p>
+                  </a:txBody>
+                  <a:tcPr>
+                    <a:lnL w="12700" cap="flat" cmpd="sng" algn="ctr">
+                      <a:solidFill>
+                        <a:schemeClr val="tx1"/>
+                      </a:solidFill>
+                      <a:prstDash val="solid"/>
+                      <a:round/>
+                      <a:headEnd type="none" w="med" len="med"/>
+                      <a:tailEnd type="none" w="med" len="med"/>
+                    </a:lnL>
+                    <a:lnR w="12700" cap="flat" cmpd="sng" algn="ctr">
+                      <a:solidFill>
+                        <a:schemeClr val="tx1"/>
+                      </a:solidFill>
+                      <a:prstDash val="solid"/>
+                      <a:round/>
+                      <a:headEnd type="none" w="med" len="med"/>
+                      <a:tailEnd type="none" w="med" len="med"/>
+                    </a:lnR>
+                    <a:lnT w="12700" cap="flat" cmpd="sng" algn="ctr">
+                      <a:solidFill>
+                        <a:schemeClr val="tx1"/>
+                      </a:solidFill>
+                      <a:prstDash val="solid"/>
+                      <a:round/>
+                      <a:headEnd type="none" w="med" len="med"/>
+                      <a:tailEnd type="none" w="med" len="med"/>
+                    </a:lnT>
+                    <a:lnB w="12700" cap="flat" cmpd="sng" algn="ctr">
+                      <a:solidFill>
+                        <a:schemeClr val="tx1"/>
+                      </a:solidFill>
+                      <a:prstDash val="solid"/>
+                      <a:round/>
+                      <a:headEnd type="none" w="med" len="med"/>
+                      <a:tailEnd type="none" w="med" len="med"/>
+                    </a:lnB>
+                    <a:lnTlToBr w="12700" cmpd="sng">
+                      <a:noFill/>
+                      <a:prstDash val="solid"/>
+                    </a:lnTlToBr>
+                    <a:lnBlToTr w="12700" cmpd="sng">
+                      <a:noFill/>
+                      <a:prstDash val="solid"/>
+                    </a:lnBlToTr>
+                  </a:tcPr>
+                </a:tc>
+                <a:tc>
+                  <a:txBody>
+                    <a:bodyPr/>
+                    <a:lstStyle/>
+                    <a:p>
+                      <a:endParaRPr lang="en-US" sz="200"/>
+                    </a:p>
+                  </a:txBody>
+                  <a:tcPr>
+                    <a:lnL w="12700" cap="flat" cmpd="sng" algn="ctr">
+                      <a:solidFill>
+                        <a:schemeClr val="tx1"/>
+                      </a:solidFill>
+                      <a:prstDash val="solid"/>
+                      <a:round/>
+                      <a:headEnd type="none" w="med" len="med"/>
+                      <a:tailEnd type="none" w="med" len="med"/>
+                    </a:lnL>
+                    <a:lnR w="12700" cap="flat" cmpd="sng" algn="ctr">
+                      <a:solidFill>
+                        <a:schemeClr val="tx1"/>
+                      </a:solidFill>
+                      <a:prstDash val="solid"/>
+                      <a:round/>
+                      <a:headEnd type="none" w="med" len="med"/>
+                      <a:tailEnd type="none" w="med" len="med"/>
+                    </a:lnR>
+                    <a:lnT w="12700" cap="flat" cmpd="sng" algn="ctr">
+                      <a:solidFill>
+                        <a:schemeClr val="tx1"/>
+                      </a:solidFill>
+                      <a:prstDash val="solid"/>
+                      <a:round/>
+                      <a:headEnd type="none" w="med" len="med"/>
+                      <a:tailEnd type="none" w="med" len="med"/>
+                    </a:lnT>
+                    <a:lnB w="12700" cap="flat" cmpd="sng" algn="ctr">
+                      <a:solidFill>
+                        <a:schemeClr val="tx1"/>
+                      </a:solidFill>
+                      <a:prstDash val="solid"/>
+                      <a:round/>
+                      <a:headEnd type="none" w="med" len="med"/>
+                      <a:tailEnd type="none" w="med" len="med"/>
+                    </a:lnB>
+                    <a:lnTlToBr w="12700" cmpd="sng">
+                      <a:noFill/>
+                      <a:prstDash val="solid"/>
+                    </a:lnTlToBr>
+                    <a:lnBlToTr w="12700" cmpd="sng">
+                      <a:noFill/>
+                      <a:prstDash val="solid"/>
+                    </a:lnBlToTr>
+                  </a:tcPr>
+                </a:tc>
+                <a:tc>
+                  <a:txBody>
+                    <a:bodyPr/>
+                    <a:lstStyle/>
+                    <a:p>
+                      <a:endParaRPr lang="en-US" sz="200"/>
+                    </a:p>
+                  </a:txBody>
+                  <a:tcPr>
+                    <a:lnL w="12700" cap="flat" cmpd="sng" algn="ctr">
+                      <a:solidFill>
+                        <a:schemeClr val="tx1"/>
+                      </a:solidFill>
+                      <a:prstDash val="solid"/>
+                      <a:round/>
+                      <a:headEnd type="none" w="med" len="med"/>
+                      <a:tailEnd type="none" w="med" len="med"/>
+                    </a:lnL>
+                    <a:lnR w="12700" cap="flat" cmpd="sng" algn="ctr">
+                      <a:solidFill>
+                        <a:schemeClr val="tx1"/>
+                      </a:solidFill>
+                      <a:prstDash val="solid"/>
+                      <a:round/>
+                      <a:headEnd type="none" w="med" len="med"/>
+                      <a:tailEnd type="none" w="med" len="med"/>
+                    </a:lnR>
+                    <a:lnT w="12700" cap="flat" cmpd="sng" algn="ctr">
+                      <a:solidFill>
+                        <a:schemeClr val="tx1"/>
+                      </a:solidFill>
+                      <a:prstDash val="solid"/>
+                      <a:round/>
+                      <a:headEnd type="none" w="med" len="med"/>
+                      <a:tailEnd type="none" w="med" len="med"/>
+                    </a:lnT>
+                    <a:lnB w="12700" cap="flat" cmpd="sng" algn="ctr">
+                      <a:solidFill>
+                        <a:schemeClr val="tx1"/>
+                      </a:solidFill>
+                      <a:prstDash val="solid"/>
+                      <a:round/>
+                      <a:headEnd type="none" w="med" len="med"/>
+                      <a:tailEnd type="none" w="med" len="med"/>
+                    </a:lnB>
+                    <a:lnTlToBr w="12700" cmpd="sng">
+                      <a:noFill/>
+                      <a:prstDash val="solid"/>
+                    </a:lnTlToBr>
+                    <a:lnBlToTr w="12700" cmpd="sng">
+                      <a:noFill/>
+                      <a:prstDash val="solid"/>
+                    </a:lnBlToTr>
+                  </a:tcPr>
+                </a:tc>
+                <a:tc>
+                  <a:txBody>
+                    <a:bodyPr/>
+                    <a:lstStyle/>
+                    <a:p>
+                      <a:endParaRPr lang="en-US" sz="200"/>
+                    </a:p>
+                  </a:txBody>
+                  <a:tcPr>
+                    <a:lnL w="12700" cap="flat" cmpd="sng" algn="ctr">
+                      <a:solidFill>
+                        <a:schemeClr val="tx1"/>
+                      </a:solidFill>
+                      <a:prstDash val="solid"/>
+                      <a:round/>
+                      <a:headEnd type="none" w="med" len="med"/>
+                      <a:tailEnd type="none" w="med" len="med"/>
+                    </a:lnL>
+                    <a:lnR w="12700" cap="flat" cmpd="sng" algn="ctr">
+                      <a:solidFill>
+                        <a:schemeClr val="tx1"/>
+                      </a:solidFill>
+                      <a:prstDash val="solid"/>
+                      <a:round/>
+                      <a:headEnd type="none" w="med" len="med"/>
+                      <a:tailEnd type="none" w="med" len="med"/>
+                    </a:lnR>
+                    <a:lnT w="12700" cap="flat" cmpd="sng" algn="ctr">
+                      <a:solidFill>
+                        <a:schemeClr val="tx1"/>
+                      </a:solidFill>
+                      <a:prstDash val="solid"/>
+                      <a:round/>
+                      <a:headEnd type="none" w="med" len="med"/>
+                      <a:tailEnd type="none" w="med" len="med"/>
+                    </a:lnT>
+                    <a:lnB w="12700" cap="flat" cmpd="sng" algn="ctr">
+                      <a:solidFill>
+                        <a:schemeClr val="tx1"/>
+                      </a:solidFill>
+                      <a:prstDash val="solid"/>
+                      <a:round/>
+                      <a:headEnd type="none" w="med" len="med"/>
+                      <a:tailEnd type="none" w="med" len="med"/>
+                    </a:lnB>
+                    <a:lnTlToBr w="12700" cmpd="sng">
+                      <a:noFill/>
+                      <a:prstDash val="solid"/>
+                    </a:lnTlToBr>
+                    <a:lnBlToTr w="12700" cmpd="sng">
+                      <a:noFill/>
+                      <a:prstDash val="solid"/>
+                    </a:lnBlToTr>
+                  </a:tcPr>
+                </a:tc>
+                <a:tc>
+                  <a:txBody>
+                    <a:bodyPr/>
+                    <a:lstStyle/>
+                    <a:p>
+                      <a:endParaRPr lang="en-US" sz="200"/>
+                    </a:p>
+                  </a:txBody>
+                  <a:tcPr>
+                    <a:lnL w="12700" cap="flat" cmpd="sng" algn="ctr">
+                      <a:solidFill>
+                        <a:schemeClr val="tx1"/>
+                      </a:solidFill>
+                      <a:prstDash val="solid"/>
+                      <a:round/>
+                      <a:headEnd type="none" w="med" len="med"/>
+                      <a:tailEnd type="none" w="med" len="med"/>
+                    </a:lnL>
+                    <a:lnR w="12700" cap="flat" cmpd="sng" algn="ctr">
+                      <a:solidFill>
+                        <a:schemeClr val="tx1"/>
+                      </a:solidFill>
+                      <a:prstDash val="solid"/>
+                      <a:round/>
+                      <a:headEnd type="none" w="med" len="med"/>
+                      <a:tailEnd type="none" w="med" len="med"/>
+                    </a:lnR>
+                    <a:lnT w="12700" cap="flat" cmpd="sng" algn="ctr">
+                      <a:solidFill>
+                        <a:schemeClr val="tx1"/>
+                      </a:solidFill>
+                      <a:prstDash val="solid"/>
+                      <a:round/>
+                      <a:headEnd type="none" w="med" len="med"/>
+                      <a:tailEnd type="none" w="med" len="med"/>
+                    </a:lnT>
+                    <a:lnB w="12700" cap="flat" cmpd="sng" algn="ctr">
+                      <a:solidFill>
+                        <a:schemeClr val="tx1"/>
+                      </a:solidFill>
+                      <a:prstDash val="solid"/>
+                      <a:round/>
+                      <a:headEnd type="none" w="med" len="med"/>
+                      <a:tailEnd type="none" w="med" len="med"/>
+                    </a:lnB>
+                    <a:lnTlToBr w="12700" cmpd="sng">
+                      <a:noFill/>
+                      <a:prstDash val="solid"/>
+                    </a:lnTlToBr>
+                    <a:lnBlToTr w="12700" cmpd="sng">
+                      <a:noFill/>
+                      <a:prstDash val="solid"/>
+                    </a:lnBlToTr>
+                  </a:tcPr>
+                </a:tc>
+                <a:tc>
+                  <a:txBody>
+                    <a:bodyPr/>
+                    <a:lstStyle/>
+                    <a:p>
+                      <a:endParaRPr lang="en-US" sz="200" dirty="0"/>
+                    </a:p>
+                  </a:txBody>
+                  <a:tcPr>
+                    <a:lnL w="12700" cap="flat" cmpd="sng" algn="ctr">
+                      <a:solidFill>
+                        <a:schemeClr val="tx1"/>
+                      </a:solidFill>
+                      <a:prstDash val="solid"/>
+                      <a:round/>
+                      <a:headEnd type="none" w="med" len="med"/>
+                      <a:tailEnd type="none" w="med" len="med"/>
+                    </a:lnL>
+                    <a:lnR w="12700" cap="flat" cmpd="sng" algn="ctr">
+                      <a:solidFill>
+                        <a:schemeClr val="tx1"/>
+                      </a:solidFill>
+                      <a:prstDash val="solid"/>
+                      <a:round/>
+                      <a:headEnd type="none" w="med" len="med"/>
+                      <a:tailEnd type="none" w="med" len="med"/>
+                    </a:lnR>
+                    <a:lnT w="12700" cap="flat" cmpd="sng" algn="ctr">
+                      <a:solidFill>
+                        <a:schemeClr val="tx1"/>
+                      </a:solidFill>
+                      <a:prstDash val="solid"/>
+                      <a:round/>
+                      <a:headEnd type="none" w="med" len="med"/>
+                      <a:tailEnd type="none" w="med" len="med"/>
+                    </a:lnT>
+                    <a:lnB w="12700" cap="flat" cmpd="sng" algn="ctr">
+                      <a:solidFill>
+                        <a:schemeClr val="tx1"/>
+                      </a:solidFill>
+                      <a:prstDash val="solid"/>
+                      <a:round/>
+                      <a:headEnd type="none" w="med" len="med"/>
+                      <a:tailEnd type="none" w="med" len="med"/>
+                    </a:lnB>
+                    <a:lnTlToBr w="12700" cmpd="sng">
+                      <a:noFill/>
+                      <a:prstDash val="solid"/>
+                    </a:lnTlToBr>
+                    <a:lnBlToTr w="12700" cmpd="sng">
+                      <a:noFill/>
+                      <a:prstDash val="solid"/>
+                    </a:lnBlToTr>
+                  </a:tcPr>
+                </a:tc>
+                <a:tc>
+                  <a:txBody>
+                    <a:bodyPr/>
+                    <a:lstStyle/>
+                    <a:p>
+                      <a:endParaRPr lang="en-US" sz="200" dirty="0"/>
+                    </a:p>
+                  </a:txBody>
+                  <a:tcPr>
+                    <a:lnL w="12700" cap="flat" cmpd="sng" algn="ctr">
+                      <a:solidFill>
+                        <a:schemeClr val="tx1"/>
+                      </a:solidFill>
+                      <a:prstDash val="solid"/>
+                      <a:round/>
+                      <a:headEnd type="none" w="med" len="med"/>
+                      <a:tailEnd type="none" w="med" len="med"/>
+                    </a:lnL>
+                    <a:lnR w="12700" cap="flat" cmpd="sng" algn="ctr">
+                      <a:solidFill>
+                        <a:schemeClr val="tx1"/>
+                      </a:solidFill>
+                      <a:prstDash val="solid"/>
+                      <a:round/>
+                      <a:headEnd type="none" w="med" len="med"/>
+                      <a:tailEnd type="none" w="med" len="med"/>
+                    </a:lnR>
+                    <a:lnT w="12700" cap="flat" cmpd="sng" algn="ctr">
+                      <a:solidFill>
+                        <a:schemeClr val="tx1"/>
+                      </a:solidFill>
+                      <a:prstDash val="solid"/>
+                      <a:round/>
+                      <a:headEnd type="none" w="med" len="med"/>
+                      <a:tailEnd type="none" w="med" len="med"/>
+                    </a:lnT>
+                    <a:lnB w="12700" cap="flat" cmpd="sng" algn="ctr">
+                      <a:solidFill>
+                        <a:schemeClr val="tx1"/>
+                      </a:solidFill>
+                      <a:prstDash val="solid"/>
+                      <a:round/>
+                      <a:headEnd type="none" w="med" len="med"/>
+                      <a:tailEnd type="none" w="med" len="med"/>
+                    </a:lnB>
+                    <a:lnTlToBr w="12700" cmpd="sng">
+                      <a:noFill/>
+                      <a:prstDash val="solid"/>
+                    </a:lnTlToBr>
+                    <a:lnBlToTr w="12700" cmpd="sng">
+                      <a:noFill/>
+                      <a:prstDash val="solid"/>
+                    </a:lnBlToTr>
+                  </a:tcPr>
+                </a:tc>
+                <a:tc>
+                  <a:txBody>
+                    <a:bodyPr/>
+                    <a:lstStyle/>
+                    <a:p>
+                      <a:endParaRPr lang="en-US" sz="200" dirty="0"/>
+                    </a:p>
+                  </a:txBody>
+                  <a:tcPr>
+                    <a:lnL w="12700" cap="flat" cmpd="sng" algn="ctr">
+                      <a:solidFill>
+                        <a:schemeClr val="tx1"/>
+                      </a:solidFill>
+                      <a:prstDash val="solid"/>
+                      <a:round/>
+                      <a:headEnd type="none" w="med" len="med"/>
+                      <a:tailEnd type="none" w="med" len="med"/>
+                    </a:lnL>
+                    <a:lnR w="12700" cap="flat" cmpd="sng" algn="ctr">
+                      <a:solidFill>
+                        <a:schemeClr val="tx1"/>
+                      </a:solidFill>
+                      <a:prstDash val="solid"/>
+                      <a:round/>
+                      <a:headEnd type="none" w="med" len="med"/>
+                      <a:tailEnd type="none" w="med" len="med"/>
+                    </a:lnR>
+                    <a:lnT w="12700" cap="flat" cmpd="sng" algn="ctr">
+                      <a:solidFill>
+                        <a:schemeClr val="tx1"/>
+                      </a:solidFill>
+                      <a:prstDash val="solid"/>
+                      <a:round/>
+                      <a:headEnd type="none" w="med" len="med"/>
+                      <a:tailEnd type="none" w="med" len="med"/>
+                    </a:lnT>
+                    <a:lnB w="12700" cap="flat" cmpd="sng" algn="ctr">
+                      <a:solidFill>
+                        <a:schemeClr val="tx1"/>
+                      </a:solidFill>
+                      <a:prstDash val="solid"/>
+                      <a:round/>
+                      <a:headEnd type="none" w="med" len="med"/>
+                      <a:tailEnd type="none" w="med" len="med"/>
+                    </a:lnB>
+                    <a:lnTlToBr w="12700" cmpd="sng">
+                      <a:noFill/>
+                      <a:prstDash val="solid"/>
+                    </a:lnTlToBr>
+                    <a:lnBlToTr w="12700" cmpd="sng">
+                      <a:noFill/>
+                      <a:prstDash val="solid"/>
+                    </a:lnBlToTr>
+                  </a:tcPr>
+                </a:tc>
+                <a:extLst>
+                  <a:ext uri="{0D108BD9-81ED-4DB2-BD59-A6C34878D82A}">
+                    <a16:rowId xmlns:a16="http://schemas.microsoft.com/office/drawing/2014/main" val="3771074123"/>
+                  </a:ext>
+                </a:extLst>
+              </a:tr>
+            </a:tbl>
+          </a:graphicData>
+        </a:graphic>
+      </p:graphicFrame>
+      <p:graphicFrame>
+        <p:nvGraphicFramePr>
+          <p:cNvPr id="7" name="Table 6">
+            <a:extLst>
+              <a:ext uri="{FF2B5EF4-FFF2-40B4-BE49-F238E27FC236}">
+                <a16:creationId xmlns:a16="http://schemas.microsoft.com/office/drawing/2014/main" id="{1499153B-0AD3-7E03-98B6-7C6A71CF184B}"/>
+              </a:ext>
+            </a:extLst>
+          </p:cNvPr>
+          <p:cNvGraphicFramePr>
+            <a:graphicFrameLocks noGrp="1"/>
+          </p:cNvGraphicFramePr>
+          <p:nvPr>
+            <p:extLst>
+              <p:ext uri="{D42A27DB-BD31-4B8C-83A1-F6EECF244321}">
+                <p14:modId xmlns:p14="http://schemas.microsoft.com/office/powerpoint/2010/main" val="2054917957"/>
+              </p:ext>
+            </p:extLst>
+          </p:nvPr>
+        </p:nvGraphicFramePr>
+        <p:xfrm>
+          <a:off x="8266892" y="2283974"/>
+          <a:ext cx="1596054" cy="182292"/>
+        </p:xfrm>
+        <a:graphic>
+          <a:graphicData uri="http://schemas.openxmlformats.org/drawingml/2006/table">
+            <a:tbl>
+              <a:tblPr firstRow="1" bandRow="1">
+                <a:tableStyleId>{21E4AEA4-8DFA-4A89-87EB-49C32662AFE0}</a:tableStyleId>
+              </a:tblPr>
+              <a:tblGrid>
+                <a:gridCol w="266009">
+                  <a:extLst>
+                    <a:ext uri="{9D8B030D-6E8A-4147-A177-3AD203B41FA5}">
+                      <a16:colId xmlns:a16="http://schemas.microsoft.com/office/drawing/2014/main" val="1452157560"/>
+                    </a:ext>
+                  </a:extLst>
+                </a:gridCol>
+                <a:gridCol w="266009">
+                  <a:extLst>
+                    <a:ext uri="{9D8B030D-6E8A-4147-A177-3AD203B41FA5}">
+                      <a16:colId xmlns:a16="http://schemas.microsoft.com/office/drawing/2014/main" val="2094690716"/>
+                    </a:ext>
+                  </a:extLst>
+                </a:gridCol>
+                <a:gridCol w="266009">
+                  <a:extLst>
+                    <a:ext uri="{9D8B030D-6E8A-4147-A177-3AD203B41FA5}">
+                      <a16:colId xmlns:a16="http://schemas.microsoft.com/office/drawing/2014/main" val="2410800384"/>
+                    </a:ext>
+                  </a:extLst>
+                </a:gridCol>
+                <a:gridCol w="266009">
+                  <a:extLst>
+                    <a:ext uri="{9D8B030D-6E8A-4147-A177-3AD203B41FA5}">
+                      <a16:colId xmlns:a16="http://schemas.microsoft.com/office/drawing/2014/main" val="219437509"/>
+                    </a:ext>
+                  </a:extLst>
+                </a:gridCol>
+                <a:gridCol w="266009">
+                  <a:extLst>
+                    <a:ext uri="{9D8B030D-6E8A-4147-A177-3AD203B41FA5}">
+                      <a16:colId xmlns:a16="http://schemas.microsoft.com/office/drawing/2014/main" val="4092570086"/>
+                    </a:ext>
+                  </a:extLst>
+                </a:gridCol>
+                <a:gridCol w="266009">
+                  <a:extLst>
+                    <a:ext uri="{9D8B030D-6E8A-4147-A177-3AD203B41FA5}">
+                      <a16:colId xmlns:a16="http://schemas.microsoft.com/office/drawing/2014/main" val="2420869638"/>
+                    </a:ext>
+                  </a:extLst>
+                </a:gridCol>
+              </a:tblGrid>
+              <a:tr h="182292">
+                <a:tc>
+                  <a:txBody>
+                    <a:bodyPr/>
+                    <a:lstStyle/>
+                    <a:p>
+                      <a:endParaRPr lang="en-US" sz="200"/>
+                    </a:p>
+                  </a:txBody>
+                  <a:tcPr>
+                    <a:lnL w="12700" cap="flat" cmpd="sng" algn="ctr">
+                      <a:solidFill>
+                        <a:schemeClr val="tx1"/>
+                      </a:solidFill>
+                      <a:prstDash val="solid"/>
+                      <a:round/>
+                      <a:headEnd type="none" w="med" len="med"/>
+                      <a:tailEnd type="none" w="med" len="med"/>
+                    </a:lnL>
+                    <a:lnR w="12700" cap="flat" cmpd="sng" algn="ctr">
+                      <a:solidFill>
+                        <a:schemeClr val="tx1"/>
+                      </a:solidFill>
+                      <a:prstDash val="solid"/>
+                      <a:round/>
+                      <a:headEnd type="none" w="med" len="med"/>
+                      <a:tailEnd type="none" w="med" len="med"/>
+                    </a:lnR>
+                    <a:lnT w="12700" cap="flat" cmpd="sng" algn="ctr">
+                      <a:solidFill>
+                        <a:schemeClr val="tx1"/>
+                      </a:solidFill>
+                      <a:prstDash val="solid"/>
+                      <a:round/>
+                      <a:headEnd type="none" w="med" len="med"/>
+                      <a:tailEnd type="none" w="med" len="med"/>
+                    </a:lnT>
+                    <a:lnB w="12700" cap="flat" cmpd="sng" algn="ctr">
+                      <a:solidFill>
+                        <a:schemeClr val="tx1"/>
+                      </a:solidFill>
+                      <a:prstDash val="solid"/>
+                      <a:round/>
+                      <a:headEnd type="none" w="med" len="med"/>
+                      <a:tailEnd type="none" w="med" len="med"/>
+                    </a:lnB>
+                  </a:tcPr>
+                </a:tc>
+                <a:tc>
+                  <a:txBody>
+                    <a:bodyPr/>
+                    <a:lstStyle/>
+                    <a:p>
+                      <a:endParaRPr lang="en-US" sz="200"/>
+                    </a:p>
+                  </a:txBody>
+                  <a:tcPr>
+                    <a:lnL w="12700" cap="flat" cmpd="sng" algn="ctr">
+                      <a:solidFill>
+                        <a:schemeClr val="tx1"/>
+                      </a:solidFill>
+                      <a:prstDash val="solid"/>
+                      <a:round/>
+                      <a:headEnd type="none" w="med" len="med"/>
+                      <a:tailEnd type="none" w="med" len="med"/>
+                    </a:lnL>
+                    <a:lnR w="12700" cap="flat" cmpd="sng" algn="ctr">
+                      <a:solidFill>
+                        <a:schemeClr val="tx1"/>
+                      </a:solidFill>
+                      <a:prstDash val="solid"/>
+                      <a:round/>
+                      <a:headEnd type="none" w="med" len="med"/>
+                      <a:tailEnd type="none" w="med" len="med"/>
+                    </a:lnR>
+                    <a:lnT w="12700" cap="flat" cmpd="sng" algn="ctr">
+                      <a:solidFill>
+                        <a:schemeClr val="tx1"/>
+                      </a:solidFill>
+                      <a:prstDash val="solid"/>
+                      <a:round/>
+                      <a:headEnd type="none" w="med" len="med"/>
+                      <a:tailEnd type="none" w="med" len="med"/>
+                    </a:lnT>
+                    <a:lnB w="12700" cap="flat" cmpd="sng" algn="ctr">
+                      <a:solidFill>
+                        <a:schemeClr val="tx1"/>
+                      </a:solidFill>
+                      <a:prstDash val="solid"/>
+                      <a:round/>
+                      <a:headEnd type="none" w="med" len="med"/>
+                      <a:tailEnd type="none" w="med" len="med"/>
+                    </a:lnB>
+                  </a:tcPr>
+                </a:tc>
+                <a:tc>
+                  <a:txBody>
+                    <a:bodyPr/>
+                    <a:lstStyle/>
+                    <a:p>
+                      <a:endParaRPr lang="en-US" sz="200"/>
+                    </a:p>
+                  </a:txBody>
+                  <a:tcPr>
+                    <a:lnL w="12700" cap="flat" cmpd="sng" algn="ctr">
+                      <a:solidFill>
+                        <a:schemeClr val="tx1"/>
+                      </a:solidFill>
+                      <a:prstDash val="solid"/>
+                      <a:round/>
+                      <a:headEnd type="none" w="med" len="med"/>
+                      <a:tailEnd type="none" w="med" len="med"/>
+                    </a:lnL>
+                    <a:lnR w="12700" cap="flat" cmpd="sng" algn="ctr">
+                      <a:solidFill>
+                        <a:schemeClr val="tx1"/>
+                      </a:solidFill>
+                      <a:prstDash val="solid"/>
+                      <a:round/>
+                      <a:headEnd type="none" w="med" len="med"/>
+                      <a:tailEnd type="none" w="med" len="med"/>
+                    </a:lnR>
+                    <a:lnT w="12700" cap="flat" cmpd="sng" algn="ctr">
+                      <a:solidFill>
+                        <a:schemeClr val="tx1"/>
+                      </a:solidFill>
+                      <a:prstDash val="solid"/>
+                      <a:round/>
+                      <a:headEnd type="none" w="med" len="med"/>
+                      <a:tailEnd type="none" w="med" len="med"/>
+                    </a:lnT>
+                    <a:lnB w="12700" cap="flat" cmpd="sng" algn="ctr">
+                      <a:solidFill>
+                        <a:schemeClr val="tx1"/>
+                      </a:solidFill>
+                      <a:prstDash val="solid"/>
+                      <a:round/>
+                      <a:headEnd type="none" w="med" len="med"/>
+                      <a:tailEnd type="none" w="med" len="med"/>
+                    </a:lnB>
+                  </a:tcPr>
+                </a:tc>
+                <a:tc>
+                  <a:txBody>
+                    <a:bodyPr/>
+                    <a:lstStyle/>
+                    <a:p>
+                      <a:endParaRPr lang="en-US" sz="200"/>
+                    </a:p>
+                  </a:txBody>
+                  <a:tcPr>
+                    <a:lnL w="12700" cap="flat" cmpd="sng" algn="ctr">
+                      <a:solidFill>
+                        <a:schemeClr val="tx1"/>
+                      </a:solidFill>
+                      <a:prstDash val="solid"/>
+                      <a:round/>
+                      <a:headEnd type="none" w="med" len="med"/>
+                      <a:tailEnd type="none" w="med" len="med"/>
+                    </a:lnL>
+                    <a:lnR w="12700" cap="flat" cmpd="sng" algn="ctr">
+                      <a:solidFill>
+                        <a:schemeClr val="tx1"/>
+                      </a:solidFill>
+                      <a:prstDash val="solid"/>
+                      <a:round/>
+                      <a:headEnd type="none" w="med" len="med"/>
+                      <a:tailEnd type="none" w="med" len="med"/>
+                    </a:lnR>
+                    <a:lnT w="12700" cap="flat" cmpd="sng" algn="ctr">
+                      <a:solidFill>
+                        <a:schemeClr val="tx1"/>
+                      </a:solidFill>
+                      <a:prstDash val="solid"/>
+                      <a:round/>
+                      <a:headEnd type="none" w="med" len="med"/>
+                      <a:tailEnd type="none" w="med" len="med"/>
+                    </a:lnT>
+                    <a:lnB w="12700" cap="flat" cmpd="sng" algn="ctr">
+                      <a:solidFill>
+                        <a:schemeClr val="tx1"/>
+                      </a:solidFill>
+                      <a:prstDash val="solid"/>
+                      <a:round/>
+                      <a:headEnd type="none" w="med" len="med"/>
+                      <a:tailEnd type="none" w="med" len="med"/>
+                    </a:lnB>
+                  </a:tcPr>
+                </a:tc>
+                <a:tc>
+                  <a:txBody>
+                    <a:bodyPr/>
+                    <a:lstStyle/>
+                    <a:p>
+                      <a:endParaRPr lang="en-US" sz="200" dirty="0"/>
+                    </a:p>
+                  </a:txBody>
+                  <a:tcPr>
+                    <a:lnL w="12700" cap="flat" cmpd="sng" algn="ctr">
+                      <a:solidFill>
+                        <a:schemeClr val="tx1"/>
+                      </a:solidFill>
+                      <a:prstDash val="solid"/>
+                      <a:round/>
+                      <a:headEnd type="none" w="med" len="med"/>
+                      <a:tailEnd type="none" w="med" len="med"/>
+                    </a:lnL>
+                    <a:lnR w="12700" cap="flat" cmpd="sng" algn="ctr">
+                      <a:solidFill>
+                        <a:schemeClr val="tx1"/>
+                      </a:solidFill>
+                      <a:prstDash val="solid"/>
+                      <a:round/>
+                      <a:headEnd type="none" w="med" len="med"/>
+                      <a:tailEnd type="none" w="med" len="med"/>
+                    </a:lnR>
+                    <a:lnT w="12700" cap="flat" cmpd="sng" algn="ctr">
+                      <a:solidFill>
+                        <a:schemeClr val="tx1"/>
+                      </a:solidFill>
+                      <a:prstDash val="solid"/>
+                      <a:round/>
+                      <a:headEnd type="none" w="med" len="med"/>
+                      <a:tailEnd type="none" w="med" len="med"/>
+                    </a:lnT>
+                    <a:lnB w="12700" cap="flat" cmpd="sng" algn="ctr">
+                      <a:solidFill>
+                        <a:schemeClr val="tx1"/>
+                      </a:solidFill>
+                      <a:prstDash val="solid"/>
+                      <a:round/>
+                      <a:headEnd type="none" w="med" len="med"/>
+                      <a:tailEnd type="none" w="med" len="med"/>
+                    </a:lnB>
+                  </a:tcPr>
+                </a:tc>
+                <a:tc>
+                  <a:txBody>
+                    <a:bodyPr/>
+                    <a:lstStyle/>
+                    <a:p>
+                      <a:endParaRPr lang="en-US" sz="200" dirty="0"/>
+                    </a:p>
+                  </a:txBody>
+                  <a:tcPr>
+                    <a:lnL w="12700" cap="flat" cmpd="sng" algn="ctr">
+                      <a:solidFill>
+                        <a:schemeClr val="tx1"/>
+                      </a:solidFill>
+                      <a:prstDash val="solid"/>
+                      <a:round/>
+                      <a:headEnd type="none" w="med" len="med"/>
+                      <a:tailEnd type="none" w="med" len="med"/>
+                    </a:lnL>
+                    <a:lnR w="12700" cap="flat" cmpd="sng" algn="ctr">
+                      <a:solidFill>
+                        <a:schemeClr val="tx1"/>
+                      </a:solidFill>
+                      <a:prstDash val="solid"/>
+                      <a:round/>
+                      <a:headEnd type="none" w="med" len="med"/>
+                      <a:tailEnd type="none" w="med" len="med"/>
+                    </a:lnR>
+                    <a:lnT w="12700" cap="flat" cmpd="sng" algn="ctr">
+                      <a:solidFill>
+                        <a:schemeClr val="tx1"/>
+                      </a:solidFill>
+                      <a:prstDash val="solid"/>
+                      <a:round/>
+                      <a:headEnd type="none" w="med" len="med"/>
+                      <a:tailEnd type="none" w="med" len="med"/>
+                    </a:lnT>
+                    <a:lnB w="12700" cap="flat" cmpd="sng" algn="ctr">
+                      <a:solidFill>
+                        <a:schemeClr val="tx1"/>
+                      </a:solidFill>
+                      <a:prstDash val="solid"/>
+                      <a:round/>
+                      <a:headEnd type="none" w="med" len="med"/>
+                      <a:tailEnd type="none" w="med" len="med"/>
+                    </a:lnB>
+                  </a:tcPr>
+                </a:tc>
+                <a:extLst>
+                  <a:ext uri="{0D108BD9-81ED-4DB2-BD59-A6C34878D82A}">
+                    <a16:rowId xmlns:a16="http://schemas.microsoft.com/office/drawing/2014/main" val="3771074123"/>
+                  </a:ext>
+                </a:extLst>
+              </a:tr>
+            </a:tbl>
+          </a:graphicData>
+        </a:graphic>
+      </p:graphicFrame>
+      <p:graphicFrame>
+        <p:nvGraphicFramePr>
+          <p:cNvPr id="8" name="Table 7">
+            <a:extLst>
+              <a:ext uri="{FF2B5EF4-FFF2-40B4-BE49-F238E27FC236}">
+                <a16:creationId xmlns:a16="http://schemas.microsoft.com/office/drawing/2014/main" id="{09D2CD65-D9F8-AB8E-4726-599243B1A6B3}"/>
+              </a:ext>
+            </a:extLst>
+          </p:cNvPr>
+          <p:cNvGraphicFramePr>
+            <a:graphicFrameLocks noGrp="1"/>
+          </p:cNvGraphicFramePr>
+          <p:nvPr>
+            <p:extLst>
+              <p:ext uri="{D42A27DB-BD31-4B8C-83A1-F6EECF244321}">
+                <p14:modId xmlns:p14="http://schemas.microsoft.com/office/powerpoint/2010/main" val="823260046"/>
+              </p:ext>
+            </p:extLst>
+          </p:nvPr>
+        </p:nvGraphicFramePr>
+        <p:xfrm>
+          <a:off x="8266891" y="2537296"/>
+          <a:ext cx="1782664" cy="182292"/>
+        </p:xfrm>
+        <a:graphic>
+          <a:graphicData uri="http://schemas.openxmlformats.org/drawingml/2006/table">
+            <a:tbl>
+              <a:tblPr firstRow="1" bandRow="1">
+                <a:tableStyleId>{F5AB1C69-6EDB-4FF4-983F-18BD219EF322}</a:tableStyleId>
+              </a:tblPr>
+              <a:tblGrid>
+                <a:gridCol w="445666">
+                  <a:extLst>
+                    <a:ext uri="{9D8B030D-6E8A-4147-A177-3AD203B41FA5}">
+                      <a16:colId xmlns:a16="http://schemas.microsoft.com/office/drawing/2014/main" val="1452157560"/>
+                    </a:ext>
+                  </a:extLst>
+                </a:gridCol>
+                <a:gridCol w="445666">
+                  <a:extLst>
+                    <a:ext uri="{9D8B030D-6E8A-4147-A177-3AD203B41FA5}">
+                      <a16:colId xmlns:a16="http://schemas.microsoft.com/office/drawing/2014/main" val="2410800384"/>
+                    </a:ext>
+                  </a:extLst>
+                </a:gridCol>
+                <a:gridCol w="445666">
+                  <a:extLst>
+                    <a:ext uri="{9D8B030D-6E8A-4147-A177-3AD203B41FA5}">
+                      <a16:colId xmlns:a16="http://schemas.microsoft.com/office/drawing/2014/main" val="219437509"/>
+                    </a:ext>
+                  </a:extLst>
+                </a:gridCol>
+                <a:gridCol w="445666">
+                  <a:extLst>
+                    <a:ext uri="{9D8B030D-6E8A-4147-A177-3AD203B41FA5}">
+                      <a16:colId xmlns:a16="http://schemas.microsoft.com/office/drawing/2014/main" val="2787922525"/>
+                    </a:ext>
+                  </a:extLst>
+                </a:gridCol>
+              </a:tblGrid>
+              <a:tr h="182292">
+                <a:tc>
+                  <a:txBody>
+                    <a:bodyPr/>
+                    <a:lstStyle/>
+                    <a:p>
+                      <a:endParaRPr lang="en-US" sz="200"/>
+                    </a:p>
+                  </a:txBody>
+                  <a:tcPr>
+                    <a:lnL w="12700" cap="flat" cmpd="sng" algn="ctr">
+                      <a:solidFill>
+                        <a:schemeClr val="tx1"/>
+                      </a:solidFill>
+                      <a:prstDash val="solid"/>
+                      <a:round/>
+                      <a:headEnd type="none" w="med" len="med"/>
+                      <a:tailEnd type="none" w="med" len="med"/>
+                    </a:lnL>
+                    <a:lnR w="12700" cap="flat" cmpd="sng" algn="ctr">
+                      <a:solidFill>
+                        <a:schemeClr val="tx1"/>
+                      </a:solidFill>
+                      <a:prstDash val="solid"/>
+                      <a:round/>
+                      <a:headEnd type="none" w="med" len="med"/>
+                      <a:tailEnd type="none" w="med" len="med"/>
+                    </a:lnR>
+                    <a:lnT w="12700" cap="flat" cmpd="sng" algn="ctr">
+                      <a:solidFill>
+                        <a:schemeClr val="tx1"/>
+                      </a:solidFill>
+                      <a:prstDash val="solid"/>
+                      <a:round/>
+                      <a:headEnd type="none" w="med" len="med"/>
+                      <a:tailEnd type="none" w="med" len="med"/>
+                    </a:lnT>
+                    <a:lnB w="12700" cap="flat" cmpd="sng" algn="ctr">
+                      <a:solidFill>
+                        <a:schemeClr val="tx1"/>
+                      </a:solidFill>
+                      <a:prstDash val="solid"/>
+                      <a:round/>
+                      <a:headEnd type="none" w="med" len="med"/>
+                      <a:tailEnd type="none" w="med" len="med"/>
+                    </a:lnB>
+                  </a:tcPr>
+                </a:tc>
+                <a:tc>
+                  <a:txBody>
+                    <a:bodyPr/>
+                    <a:lstStyle/>
+                    <a:p>
+                      <a:endParaRPr lang="en-US" sz="200" dirty="0"/>
+                    </a:p>
+                  </a:txBody>
+                  <a:tcPr>
+                    <a:lnL w="12700" cap="flat" cmpd="sng" algn="ctr">
+                      <a:solidFill>
+                        <a:schemeClr val="tx1"/>
+                      </a:solidFill>
+                      <a:prstDash val="solid"/>
+                      <a:round/>
+                      <a:headEnd type="none" w="med" len="med"/>
+                      <a:tailEnd type="none" w="med" len="med"/>
+                    </a:lnL>
+                    <a:lnR w="12700" cap="flat" cmpd="sng" algn="ctr">
+                      <a:solidFill>
+                        <a:schemeClr val="tx1"/>
+                      </a:solidFill>
+                      <a:prstDash val="solid"/>
+                      <a:round/>
+                      <a:headEnd type="none" w="med" len="med"/>
+                      <a:tailEnd type="none" w="med" len="med"/>
+                    </a:lnR>
+                    <a:lnT w="12700" cap="flat" cmpd="sng" algn="ctr">
+                      <a:solidFill>
+                        <a:schemeClr val="tx1"/>
+                      </a:solidFill>
+                      <a:prstDash val="solid"/>
+                      <a:round/>
+                      <a:headEnd type="none" w="med" len="med"/>
+                      <a:tailEnd type="none" w="med" len="med"/>
+                    </a:lnT>
+                    <a:lnB w="12700" cap="flat" cmpd="sng" algn="ctr">
+                      <a:solidFill>
+                        <a:schemeClr val="tx1"/>
+                      </a:solidFill>
+                      <a:prstDash val="solid"/>
+                      <a:round/>
+                      <a:headEnd type="none" w="med" len="med"/>
+                      <a:tailEnd type="none" w="med" len="med"/>
+                    </a:lnB>
+                  </a:tcPr>
+                </a:tc>
+                <a:tc>
+                  <a:txBody>
+                    <a:bodyPr/>
+                    <a:lstStyle/>
+                    <a:p>
+                      <a:endParaRPr lang="en-US" sz="200" dirty="0"/>
+                    </a:p>
+                  </a:txBody>
+                  <a:tcPr>
+                    <a:lnL w="12700" cap="flat" cmpd="sng" algn="ctr">
+                      <a:solidFill>
+                        <a:schemeClr val="tx1"/>
+                      </a:solidFill>
+                      <a:prstDash val="solid"/>
+                      <a:round/>
+                      <a:headEnd type="none" w="med" len="med"/>
+                      <a:tailEnd type="none" w="med" len="med"/>
+                    </a:lnL>
+                    <a:lnR w="12700" cap="flat" cmpd="sng" algn="ctr">
+                      <a:solidFill>
+                        <a:schemeClr val="tx1"/>
+                      </a:solidFill>
+                      <a:prstDash val="solid"/>
+                      <a:round/>
+                      <a:headEnd type="none" w="med" len="med"/>
+                      <a:tailEnd type="none" w="med" len="med"/>
+                    </a:lnR>
+                    <a:lnT w="12700" cap="flat" cmpd="sng" algn="ctr">
+                      <a:solidFill>
+                        <a:schemeClr val="tx1"/>
+                      </a:solidFill>
+                      <a:prstDash val="solid"/>
+                      <a:round/>
+                      <a:headEnd type="none" w="med" len="med"/>
+                      <a:tailEnd type="none" w="med" len="med"/>
+                    </a:lnT>
+                    <a:lnB w="12700" cap="flat" cmpd="sng" algn="ctr">
+                      <a:solidFill>
+                        <a:schemeClr val="tx1"/>
+                      </a:solidFill>
+                      <a:prstDash val="solid"/>
+                      <a:round/>
+                      <a:headEnd type="none" w="med" len="med"/>
+                      <a:tailEnd type="none" w="med" len="med"/>
+                    </a:lnB>
+                  </a:tcPr>
+                </a:tc>
+                <a:tc>
+                  <a:txBody>
+                    <a:bodyPr/>
+                    <a:lstStyle/>
+                    <a:p>
+                      <a:endParaRPr lang="en-US" sz="200" dirty="0"/>
+                    </a:p>
+                  </a:txBody>
+                  <a:tcPr>
+                    <a:lnL w="12700" cap="flat" cmpd="sng" algn="ctr">
+                      <a:solidFill>
+                        <a:schemeClr val="tx1"/>
+                      </a:solidFill>
+                      <a:prstDash val="solid"/>
+                      <a:round/>
+                      <a:headEnd type="none" w="med" len="med"/>
+                      <a:tailEnd type="none" w="med" len="med"/>
+                    </a:lnL>
+                    <a:lnR w="12700" cap="flat" cmpd="sng" algn="ctr">
+                      <a:solidFill>
+                        <a:schemeClr val="tx1"/>
+                      </a:solidFill>
+                      <a:prstDash val="solid"/>
+                      <a:round/>
+                      <a:headEnd type="none" w="med" len="med"/>
+                      <a:tailEnd type="none" w="med" len="med"/>
+                    </a:lnR>
+                    <a:lnT w="12700" cap="flat" cmpd="sng" algn="ctr">
+                      <a:solidFill>
+                        <a:schemeClr val="tx1"/>
+                      </a:solidFill>
+                      <a:prstDash val="solid"/>
+                      <a:round/>
+                      <a:headEnd type="none" w="med" len="med"/>
+                      <a:tailEnd type="none" w="med" len="med"/>
+                    </a:lnT>
+                    <a:lnB w="12700" cap="flat" cmpd="sng" algn="ctr">
+                      <a:solidFill>
+                        <a:schemeClr val="tx1"/>
+                      </a:solidFill>
+                      <a:prstDash val="solid"/>
+                      <a:round/>
+                      <a:headEnd type="none" w="med" len="med"/>
+                      <a:tailEnd type="none" w="med" len="med"/>
+                    </a:lnB>
+                  </a:tcPr>
+                </a:tc>
+                <a:extLst>
+                  <a:ext uri="{0D108BD9-81ED-4DB2-BD59-A6C34878D82A}">
+                    <a16:rowId xmlns:a16="http://schemas.microsoft.com/office/drawing/2014/main" val="3771074123"/>
+                  </a:ext>
+                </a:extLst>
+              </a:tr>
+            </a:tbl>
+          </a:graphicData>
+        </a:graphic>
+      </p:graphicFrame>
+      <p:graphicFrame>
+        <p:nvGraphicFramePr>
+          <p:cNvPr id="9" name="Table 8">
+            <a:extLst>
+              <a:ext uri="{FF2B5EF4-FFF2-40B4-BE49-F238E27FC236}">
+                <a16:creationId xmlns:a16="http://schemas.microsoft.com/office/drawing/2014/main" id="{315E8A18-FCDF-F1D0-6C08-638D434B0B44}"/>
+              </a:ext>
+            </a:extLst>
+          </p:cNvPr>
+          <p:cNvGraphicFramePr>
+            <a:graphicFrameLocks noGrp="1"/>
+          </p:cNvGraphicFramePr>
+          <p:nvPr>
+            <p:extLst>
+              <p:ext uri="{D42A27DB-BD31-4B8C-83A1-F6EECF244321}">
+                <p14:modId xmlns:p14="http://schemas.microsoft.com/office/powerpoint/2010/main" val="793985519"/>
+              </p:ext>
+            </p:extLst>
+          </p:nvPr>
+        </p:nvGraphicFramePr>
+        <p:xfrm>
+          <a:off x="8266890" y="2790618"/>
+          <a:ext cx="1666240" cy="182292"/>
+        </p:xfrm>
+        <a:graphic>
+          <a:graphicData uri="http://schemas.openxmlformats.org/drawingml/2006/table">
+            <a:tbl>
+              <a:tblPr firstRow="1" bandRow="1">
+                <a:tableStyleId>{00A15C55-8517-42AA-B614-E9B94910E393}</a:tableStyleId>
+              </a:tblPr>
+              <a:tblGrid>
+                <a:gridCol w="208280">
+                  <a:extLst>
+                    <a:ext uri="{9D8B030D-6E8A-4147-A177-3AD203B41FA5}">
+                      <a16:colId xmlns:a16="http://schemas.microsoft.com/office/drawing/2014/main" val="1452157560"/>
+                    </a:ext>
+                  </a:extLst>
+                </a:gridCol>
+                <a:gridCol w="208280">
+                  <a:extLst>
+                    <a:ext uri="{9D8B030D-6E8A-4147-A177-3AD203B41FA5}">
+                      <a16:colId xmlns:a16="http://schemas.microsoft.com/office/drawing/2014/main" val="2094690716"/>
+                    </a:ext>
+                  </a:extLst>
+                </a:gridCol>
+                <a:gridCol w="208280">
+                  <a:extLst>
+                    <a:ext uri="{9D8B030D-6E8A-4147-A177-3AD203B41FA5}">
+                      <a16:colId xmlns:a16="http://schemas.microsoft.com/office/drawing/2014/main" val="2410800384"/>
+                    </a:ext>
+                  </a:extLst>
+                </a:gridCol>
+                <a:gridCol w="208280">
+                  <a:extLst>
+                    <a:ext uri="{9D8B030D-6E8A-4147-A177-3AD203B41FA5}">
+                      <a16:colId xmlns:a16="http://schemas.microsoft.com/office/drawing/2014/main" val="219437509"/>
+                    </a:ext>
+                  </a:extLst>
+                </a:gridCol>
+                <a:gridCol w="208280">
+                  <a:extLst>
+                    <a:ext uri="{9D8B030D-6E8A-4147-A177-3AD203B41FA5}">
+                      <a16:colId xmlns:a16="http://schemas.microsoft.com/office/drawing/2014/main" val="2787922525"/>
+                    </a:ext>
+                  </a:extLst>
+                </a:gridCol>
+                <a:gridCol w="208280">
+                  <a:extLst>
+                    <a:ext uri="{9D8B030D-6E8A-4147-A177-3AD203B41FA5}">
+                      <a16:colId xmlns:a16="http://schemas.microsoft.com/office/drawing/2014/main" val="4092570086"/>
+                    </a:ext>
+                  </a:extLst>
+                </a:gridCol>
+                <a:gridCol w="208280">
+                  <a:extLst>
+                    <a:ext uri="{9D8B030D-6E8A-4147-A177-3AD203B41FA5}">
+                      <a16:colId xmlns:a16="http://schemas.microsoft.com/office/drawing/2014/main" val="1624973094"/>
+                    </a:ext>
+                  </a:extLst>
+                </a:gridCol>
+                <a:gridCol w="208280">
+                  <a:extLst>
+                    <a:ext uri="{9D8B030D-6E8A-4147-A177-3AD203B41FA5}">
+                      <a16:colId xmlns:a16="http://schemas.microsoft.com/office/drawing/2014/main" val="2483870472"/>
+                    </a:ext>
+                  </a:extLst>
+                </a:gridCol>
+              </a:tblGrid>
+              <a:tr h="182292">
+                <a:tc>
+                  <a:txBody>
+                    <a:bodyPr/>
+                    <a:lstStyle/>
+                    <a:p>
+                      <a:endParaRPr lang="en-US" sz="200"/>
+                    </a:p>
+                  </a:txBody>
+                  <a:tcPr>
+                    <a:lnL w="12700" cap="flat" cmpd="sng" algn="ctr">
+                      <a:solidFill>
+                        <a:schemeClr val="tx1"/>
+                      </a:solidFill>
+                      <a:prstDash val="solid"/>
+                      <a:round/>
+                      <a:headEnd type="none" w="med" len="med"/>
+                      <a:tailEnd type="none" w="med" len="med"/>
+                    </a:lnL>
+                    <a:lnR w="12700" cap="flat" cmpd="sng" algn="ctr">
+                      <a:solidFill>
+                        <a:schemeClr val="tx1"/>
+                      </a:solidFill>
+                      <a:prstDash val="solid"/>
+                      <a:round/>
+                      <a:headEnd type="none" w="med" len="med"/>
+                      <a:tailEnd type="none" w="med" len="med"/>
+                    </a:lnR>
+                    <a:lnT w="12700" cap="flat" cmpd="sng" algn="ctr">
+                      <a:solidFill>
+                        <a:schemeClr val="tx1"/>
+                      </a:solidFill>
+                      <a:prstDash val="solid"/>
+                      <a:round/>
+                      <a:headEnd type="none" w="med" len="med"/>
+                      <a:tailEnd type="none" w="med" len="med"/>
+                    </a:lnT>
+                    <a:lnB w="12700" cap="flat" cmpd="sng" algn="ctr">
+                      <a:solidFill>
+                        <a:schemeClr val="tx1"/>
+                      </a:solidFill>
+                      <a:prstDash val="solid"/>
+                      <a:round/>
+                      <a:headEnd type="none" w="med" len="med"/>
+                      <a:tailEnd type="none" w="med" len="med"/>
+                    </a:lnB>
+                  </a:tcPr>
+                </a:tc>
+                <a:tc>
+                  <a:txBody>
+                    <a:bodyPr/>
+                    <a:lstStyle/>
+                    <a:p>
+                      <a:endParaRPr lang="en-US" sz="200"/>
+                    </a:p>
+                  </a:txBody>
+                  <a:tcPr>
+                    <a:lnL w="12700" cap="flat" cmpd="sng" algn="ctr">
+                      <a:solidFill>
+                        <a:schemeClr val="tx1"/>
+                      </a:solidFill>
+                      <a:prstDash val="solid"/>
+                      <a:round/>
+                      <a:headEnd type="none" w="med" len="med"/>
+                      <a:tailEnd type="none" w="med" len="med"/>
+                    </a:lnL>
+                    <a:lnR w="12700" cap="flat" cmpd="sng" algn="ctr">
+                      <a:solidFill>
+                        <a:schemeClr val="tx1"/>
+                      </a:solidFill>
+                      <a:prstDash val="solid"/>
+                      <a:round/>
+                      <a:headEnd type="none" w="med" len="med"/>
+                      <a:tailEnd type="none" w="med" len="med"/>
+                    </a:lnR>
+                    <a:lnT w="12700" cap="flat" cmpd="sng" algn="ctr">
+                      <a:solidFill>
+                        <a:schemeClr val="tx1"/>
+                      </a:solidFill>
+                      <a:prstDash val="solid"/>
+                      <a:round/>
+                      <a:headEnd type="none" w="med" len="med"/>
+                      <a:tailEnd type="none" w="med" len="med"/>
+                    </a:lnT>
+                    <a:lnB w="12700" cap="flat" cmpd="sng" algn="ctr">
+                      <a:solidFill>
+                        <a:schemeClr val="tx1"/>
+                      </a:solidFill>
+                      <a:prstDash val="solid"/>
+                      <a:round/>
+                      <a:headEnd type="none" w="med" len="med"/>
+                      <a:tailEnd type="none" w="med" len="med"/>
+                    </a:lnB>
+                  </a:tcPr>
+                </a:tc>
+                <a:tc>
+                  <a:txBody>
+                    <a:bodyPr/>
+                    <a:lstStyle/>
+                    <a:p>
+                      <a:endParaRPr lang="en-US" sz="200"/>
+                    </a:p>
+                  </a:txBody>
+                  <a:tcPr>
+                    <a:lnL w="12700" cap="flat" cmpd="sng" algn="ctr">
+                      <a:solidFill>
+                        <a:schemeClr val="tx1"/>
+                      </a:solidFill>
+                      <a:prstDash val="solid"/>
+                      <a:round/>
+                      <a:headEnd type="none" w="med" len="med"/>
+                      <a:tailEnd type="none" w="med" len="med"/>
+                    </a:lnL>
+                    <a:lnR w="12700" cap="flat" cmpd="sng" algn="ctr">
+                      <a:solidFill>
+                        <a:schemeClr val="tx1"/>
+                      </a:solidFill>
+                      <a:prstDash val="solid"/>
+                      <a:round/>
+                      <a:headEnd type="none" w="med" len="med"/>
+                      <a:tailEnd type="none" w="med" len="med"/>
+                    </a:lnR>
+                    <a:lnT w="12700" cap="flat" cmpd="sng" algn="ctr">
+                      <a:solidFill>
+                        <a:schemeClr val="tx1"/>
+                      </a:solidFill>
+                      <a:prstDash val="solid"/>
+                      <a:round/>
+                      <a:headEnd type="none" w="med" len="med"/>
+                      <a:tailEnd type="none" w="med" len="med"/>
+                    </a:lnT>
+                    <a:lnB w="12700" cap="flat" cmpd="sng" algn="ctr">
+                      <a:solidFill>
+                        <a:schemeClr val="tx1"/>
+                      </a:solidFill>
+                      <a:prstDash val="solid"/>
+                      <a:round/>
+                      <a:headEnd type="none" w="med" len="med"/>
+                      <a:tailEnd type="none" w="med" len="med"/>
+                    </a:lnB>
+                  </a:tcPr>
+                </a:tc>
+                <a:tc>
+                  <a:txBody>
+                    <a:bodyPr/>
+                    <a:lstStyle/>
+                    <a:p>
+                      <a:endParaRPr lang="en-US" sz="200"/>
+                    </a:p>
+                  </a:txBody>
+                  <a:tcPr>
+                    <a:lnL w="12700" cap="flat" cmpd="sng" algn="ctr">
+                      <a:solidFill>
+                        <a:schemeClr val="tx1"/>
+                      </a:solidFill>
+                      <a:prstDash val="solid"/>
+                      <a:round/>
+                      <a:headEnd type="none" w="med" len="med"/>
+                      <a:tailEnd type="none" w="med" len="med"/>
+                    </a:lnL>
+                    <a:lnR w="12700" cap="flat" cmpd="sng" algn="ctr">
+                      <a:solidFill>
+                        <a:schemeClr val="tx1"/>
+                      </a:solidFill>
+                      <a:prstDash val="solid"/>
+                      <a:round/>
+                      <a:headEnd type="none" w="med" len="med"/>
+                      <a:tailEnd type="none" w="med" len="med"/>
+                    </a:lnR>
+                    <a:lnT w="12700" cap="flat" cmpd="sng" algn="ctr">
+                      <a:solidFill>
+                        <a:schemeClr val="tx1"/>
+                      </a:solidFill>
+                      <a:prstDash val="solid"/>
+                      <a:round/>
+                      <a:headEnd type="none" w="med" len="med"/>
+                      <a:tailEnd type="none" w="med" len="med"/>
+                    </a:lnT>
+                    <a:lnB w="12700" cap="flat" cmpd="sng" algn="ctr">
+                      <a:solidFill>
+                        <a:schemeClr val="tx1"/>
+                      </a:solidFill>
+                      <a:prstDash val="solid"/>
+                      <a:round/>
+                      <a:headEnd type="none" w="med" len="med"/>
+                      <a:tailEnd type="none" w="med" len="med"/>
+                    </a:lnB>
+                  </a:tcPr>
+                </a:tc>
+                <a:tc>
+                  <a:txBody>
+                    <a:bodyPr/>
+                    <a:lstStyle/>
+                    <a:p>
+                      <a:endParaRPr lang="en-US" sz="200"/>
+                    </a:p>
+                  </a:txBody>
+                  <a:tcPr>
+                    <a:lnL w="12700" cap="flat" cmpd="sng" algn="ctr">
+                      <a:solidFill>
+                        <a:schemeClr val="tx1"/>
+                      </a:solidFill>
+                      <a:prstDash val="solid"/>
+                      <a:round/>
+                      <a:headEnd type="none" w="med" len="med"/>
+                      <a:tailEnd type="none" w="med" len="med"/>
+                    </a:lnL>
+                    <a:lnR w="12700" cap="flat" cmpd="sng" algn="ctr">
+                      <a:solidFill>
+                        <a:schemeClr val="tx1"/>
+                      </a:solidFill>
+                      <a:prstDash val="solid"/>
+                      <a:round/>
+                      <a:headEnd type="none" w="med" len="med"/>
+                      <a:tailEnd type="none" w="med" len="med"/>
+                    </a:lnR>
+                    <a:lnT w="12700" cap="flat" cmpd="sng" algn="ctr">
+                      <a:solidFill>
+                        <a:schemeClr val="tx1"/>
+                      </a:solidFill>
+                      <a:prstDash val="solid"/>
+                      <a:round/>
+                      <a:headEnd type="none" w="med" len="med"/>
+                      <a:tailEnd type="none" w="med" len="med"/>
+                    </a:lnT>
+                    <a:lnB w="12700" cap="flat" cmpd="sng" algn="ctr">
+                      <a:solidFill>
+                        <a:schemeClr val="tx1"/>
+                      </a:solidFill>
+                      <a:prstDash val="solid"/>
+                      <a:round/>
+                      <a:headEnd type="none" w="med" len="med"/>
+                      <a:tailEnd type="none" w="med" len="med"/>
+                    </a:lnB>
+                  </a:tcPr>
+                </a:tc>
+                <a:tc>
+                  <a:txBody>
+                    <a:bodyPr/>
+                    <a:lstStyle/>
+                    <a:p>
+                      <a:endParaRPr lang="en-US" sz="200"/>
+                    </a:p>
+                  </a:txBody>
+                  <a:tcPr>
+                    <a:lnL w="12700" cap="flat" cmpd="sng" algn="ctr">
+                      <a:solidFill>
+                        <a:schemeClr val="tx1"/>
+                      </a:solidFill>
+                      <a:prstDash val="solid"/>
+                      <a:round/>
+                      <a:headEnd type="none" w="med" len="med"/>
+                      <a:tailEnd type="none" w="med" len="med"/>
+                    </a:lnL>
+                    <a:lnR w="12700" cap="flat" cmpd="sng" algn="ctr">
+                      <a:solidFill>
+                        <a:schemeClr val="tx1"/>
+                      </a:solidFill>
+                      <a:prstDash val="solid"/>
+                      <a:round/>
+                      <a:headEnd type="none" w="med" len="med"/>
+                      <a:tailEnd type="none" w="med" len="med"/>
+                    </a:lnR>
+                    <a:lnT w="12700" cap="flat" cmpd="sng" algn="ctr">
+                      <a:solidFill>
+                        <a:schemeClr val="tx1"/>
+                      </a:solidFill>
+                      <a:prstDash val="solid"/>
+                      <a:round/>
+                      <a:headEnd type="none" w="med" len="med"/>
+                      <a:tailEnd type="none" w="med" len="med"/>
+                    </a:lnT>
+                    <a:lnB w="12700" cap="flat" cmpd="sng" algn="ctr">
+                      <a:solidFill>
+                        <a:schemeClr val="tx1"/>
+                      </a:solidFill>
+                      <a:prstDash val="solid"/>
+                      <a:round/>
+                      <a:headEnd type="none" w="med" len="med"/>
+                      <a:tailEnd type="none" w="med" len="med"/>
+                    </a:lnB>
+                  </a:tcPr>
+                </a:tc>
+                <a:tc>
+                  <a:txBody>
+                    <a:bodyPr/>
+                    <a:lstStyle/>
+                    <a:p>
+                      <a:endParaRPr lang="en-US" sz="200" dirty="0"/>
+                    </a:p>
+                  </a:txBody>
+                  <a:tcPr>
+                    <a:lnL w="12700" cap="flat" cmpd="sng" algn="ctr">
+                      <a:solidFill>
+                        <a:schemeClr val="tx1"/>
+                      </a:solidFill>
+                      <a:prstDash val="solid"/>
+                      <a:round/>
+                      <a:headEnd type="none" w="med" len="med"/>
+                      <a:tailEnd type="none" w="med" len="med"/>
+                    </a:lnL>
+                    <a:lnR w="12700" cap="flat" cmpd="sng" algn="ctr">
+                      <a:solidFill>
+                        <a:schemeClr val="tx1"/>
+                      </a:solidFill>
+                      <a:prstDash val="solid"/>
+                      <a:round/>
+                      <a:headEnd type="none" w="med" len="med"/>
+                      <a:tailEnd type="none" w="med" len="med"/>
+                    </a:lnR>
+                    <a:lnT w="12700" cap="flat" cmpd="sng" algn="ctr">
+                      <a:solidFill>
+                        <a:schemeClr val="tx1"/>
+                      </a:solidFill>
+                      <a:prstDash val="solid"/>
+                      <a:round/>
+                      <a:headEnd type="none" w="med" len="med"/>
+                      <a:tailEnd type="none" w="med" len="med"/>
+                    </a:lnT>
+                    <a:lnB w="12700" cap="flat" cmpd="sng" algn="ctr">
+                      <a:solidFill>
+                        <a:schemeClr val="tx1"/>
+                      </a:solidFill>
+                      <a:prstDash val="solid"/>
+                      <a:round/>
+                      <a:headEnd type="none" w="med" len="med"/>
+                      <a:tailEnd type="none" w="med" len="med"/>
+                    </a:lnB>
+                  </a:tcPr>
+                </a:tc>
+                <a:tc>
+                  <a:txBody>
+                    <a:bodyPr/>
+                    <a:lstStyle/>
+                    <a:p>
+                      <a:endParaRPr lang="en-US" sz="200" dirty="0"/>
+                    </a:p>
+                  </a:txBody>
+                  <a:tcPr>
+                    <a:lnL w="12700" cap="flat" cmpd="sng" algn="ctr">
+                      <a:solidFill>
+                        <a:schemeClr val="tx1"/>
+                      </a:solidFill>
+                      <a:prstDash val="solid"/>
+                      <a:round/>
+                      <a:headEnd type="none" w="med" len="med"/>
+                      <a:tailEnd type="none" w="med" len="med"/>
+                    </a:lnL>
+                    <a:lnR w="12700" cap="flat" cmpd="sng" algn="ctr">
+                      <a:solidFill>
+                        <a:schemeClr val="tx1"/>
+                      </a:solidFill>
+                      <a:prstDash val="solid"/>
+                      <a:round/>
+                      <a:headEnd type="none" w="med" len="med"/>
+                      <a:tailEnd type="none" w="med" len="med"/>
+                    </a:lnR>
+                    <a:lnT w="12700" cap="flat" cmpd="sng" algn="ctr">
+                      <a:solidFill>
+                        <a:schemeClr val="tx1"/>
+                      </a:solidFill>
+                      <a:prstDash val="solid"/>
+                      <a:round/>
+                      <a:headEnd type="none" w="med" len="med"/>
+                      <a:tailEnd type="none" w="med" len="med"/>
+                    </a:lnT>
+                    <a:lnB w="12700" cap="flat" cmpd="sng" algn="ctr">
+                      <a:solidFill>
+                        <a:schemeClr val="tx1"/>
+                      </a:solidFill>
+                      <a:prstDash val="solid"/>
+                      <a:round/>
+                      <a:headEnd type="none" w="med" len="med"/>
+                      <a:tailEnd type="none" w="med" len="med"/>
+                    </a:lnB>
+                  </a:tcPr>
+                </a:tc>
+                <a:extLst>
+                  <a:ext uri="{0D108BD9-81ED-4DB2-BD59-A6C34878D82A}">
+                    <a16:rowId xmlns:a16="http://schemas.microsoft.com/office/drawing/2014/main" val="3771074123"/>
+                  </a:ext>
+                </a:extLst>
+              </a:tr>
+            </a:tbl>
+          </a:graphicData>
+        </a:graphic>
+      </p:graphicFrame>
+      <p:sp>
+        <p:nvSpPr>
+          <p:cNvPr id="10" name="Rectangle: Rounded Corners 9">
+            <a:extLst>
+              <a:ext uri="{FF2B5EF4-FFF2-40B4-BE49-F238E27FC236}">
+                <a16:creationId xmlns:a16="http://schemas.microsoft.com/office/drawing/2014/main" id="{87C1B9FE-9ADD-5730-5074-00B154FB3187}"/>
+              </a:ext>
+            </a:extLst>
+          </p:cNvPr>
+          <p:cNvSpPr/>
+          <p:nvPr/>
+        </p:nvSpPr>
+        <p:spPr>
+          <a:xfrm>
+            <a:off x="9186475" y="1630770"/>
+            <a:ext cx="550506" cy="291173"/>
+          </a:xfrm>
+          <a:prstGeom prst="roundRect">
+            <a:avLst/>
+          </a:prstGeom>
+        </p:spPr>
+        <p:style>
+          <a:lnRef idx="0">
+            <a:schemeClr val="accent1"/>
+          </a:lnRef>
+          <a:fillRef idx="3">
+            <a:schemeClr val="accent1"/>
+          </a:fillRef>
+          <a:effectRef idx="3">
+            <a:schemeClr val="accent1"/>
+          </a:effectRef>
+          <a:fontRef idx="minor">
+            <a:schemeClr val="lt1"/>
+          </a:fontRef>
+        </p:style>
+        <p:txBody>
+          <a:bodyPr rtlCol="0" anchor="ctr"/>
+          <a:lstStyle/>
+          <a:p>
+            <a:pPr algn="ctr"/>
+            <a:r>
+              <a:rPr lang="en-US" dirty="0"/>
+              <a:t>ECS</a:t>
+            </a:r>
+          </a:p>
+        </p:txBody>
+      </p:sp>
+      <p:sp>
+        <p:nvSpPr>
+          <p:cNvPr id="3" name="Rectangle: Rounded Corners 2">
+            <a:extLst>
+              <a:ext uri="{FF2B5EF4-FFF2-40B4-BE49-F238E27FC236}">
+                <a16:creationId xmlns:a16="http://schemas.microsoft.com/office/drawing/2014/main" id="{67138047-1435-4CFC-D361-44E0446CC57E}"/>
+              </a:ext>
+            </a:extLst>
+          </p:cNvPr>
+          <p:cNvSpPr/>
+          <p:nvPr/>
+        </p:nvSpPr>
+        <p:spPr>
+          <a:xfrm>
+            <a:off x="420900" y="5246725"/>
+            <a:ext cx="2712098" cy="1166516"/>
+          </a:xfrm>
+          <a:prstGeom prst="roundRect">
+            <a:avLst>
+              <a:gd name="adj" fmla="val 12160"/>
+            </a:avLst>
+          </a:prstGeom>
+        </p:spPr>
+        <p:style>
+          <a:lnRef idx="1">
+            <a:schemeClr val="accent1"/>
+          </a:lnRef>
+          <a:fillRef idx="2">
+            <a:schemeClr val="accent1"/>
+          </a:fillRef>
+          <a:effectRef idx="1">
+            <a:schemeClr val="accent1"/>
+          </a:effectRef>
+          <a:fontRef idx="minor">
+            <a:schemeClr val="dk1"/>
+          </a:fontRef>
+        </p:style>
+        <p:txBody>
+          <a:bodyPr rtlCol="0" anchor="ctr"/>
+          <a:lstStyle/>
+          <a:p>
+            <a:pPr marL="285750" indent="-216000">
+              <a:buFont typeface="Arial" panose="020B0604020202020204" pitchFamily="34" charset="0"/>
+              <a:buChar char="•"/>
+            </a:pPr>
+            <a:r>
+              <a:rPr lang="en-US" sz="1400" dirty="0"/>
+              <a:t>Like </a:t>
+            </a:r>
+            <a:r>
+              <a:rPr lang="pl-PL" sz="1400" dirty="0" err="1"/>
+              <a:t>unique_ptr</a:t>
+            </a:r>
+            <a:endParaRPr lang="pl-PL" sz="1400" dirty="0"/>
+          </a:p>
+          <a:p>
+            <a:pPr marL="285750" indent="-216000">
+              <a:buFont typeface="Arial" panose="020B0604020202020204" pitchFamily="34" charset="0"/>
+              <a:buChar char="•"/>
+            </a:pPr>
+            <a:r>
+              <a:rPr lang="pl-PL" sz="1400" dirty="0" err="1"/>
+              <a:t>Like</a:t>
+            </a:r>
+            <a:r>
+              <a:rPr lang="pl-PL" sz="1400" dirty="0"/>
+              <a:t> lock </a:t>
+            </a:r>
+            <a:r>
+              <a:rPr lang="pl-PL" sz="1400" dirty="0" err="1"/>
+              <a:t>guard</a:t>
+            </a:r>
+            <a:endParaRPr lang="en-US" sz="1400" dirty="0"/>
+          </a:p>
+        </p:txBody>
+      </p:sp>
+      <p:sp>
+        <p:nvSpPr>
+          <p:cNvPr id="12" name="Rectangle: Rounded Corners 11">
+            <a:extLst>
+              <a:ext uri="{FF2B5EF4-FFF2-40B4-BE49-F238E27FC236}">
+                <a16:creationId xmlns:a16="http://schemas.microsoft.com/office/drawing/2014/main" id="{320E7630-0CFD-004A-B609-E0DE138512AF}"/>
+              </a:ext>
+            </a:extLst>
+          </p:cNvPr>
+          <p:cNvSpPr/>
+          <p:nvPr/>
+        </p:nvSpPr>
+        <p:spPr>
+          <a:xfrm>
+            <a:off x="523542" y="5073844"/>
+            <a:ext cx="2506816" cy="291173"/>
+          </a:xfrm>
+          <a:prstGeom prst="roundRect">
+            <a:avLst/>
+          </a:prstGeom>
+        </p:spPr>
+        <p:style>
+          <a:lnRef idx="0">
+            <a:schemeClr val="accent1"/>
+          </a:lnRef>
+          <a:fillRef idx="3">
+            <a:schemeClr val="accent1"/>
+          </a:fillRef>
+          <a:effectRef idx="3">
+            <a:schemeClr val="accent1"/>
+          </a:effectRef>
+          <a:fontRef idx="minor">
+            <a:schemeClr val="lt1"/>
+          </a:fontRef>
+        </p:style>
+        <p:txBody>
+          <a:bodyPr rtlCol="0" anchor="ctr"/>
+          <a:lstStyle/>
+          <a:p>
+            <a:pPr algn="ctr"/>
+            <a:r>
+              <a:rPr lang="en-US" dirty="0"/>
+              <a:t>Asset</a:t>
+            </a:r>
+            <a:r>
+              <a:rPr lang="pl-PL" dirty="0"/>
+              <a:t>User</a:t>
+            </a:r>
+            <a:r>
+              <a:rPr lang="en-US" dirty="0"/>
+              <a:t>&lt;</a:t>
+            </a:r>
+            <a:r>
+              <a:rPr lang="en-US" dirty="0" err="1"/>
+              <a:t>tnAsset</a:t>
+            </a:r>
+            <a:r>
+              <a:rPr lang="en-US" dirty="0"/>
+              <a:t>&gt;</a:t>
+            </a:r>
+          </a:p>
+        </p:txBody>
+      </p:sp>
+      <p:sp>
+        <p:nvSpPr>
+          <p:cNvPr id="13" name="Rectangle: Rounded Corners 12">
+            <a:extLst>
+              <a:ext uri="{FF2B5EF4-FFF2-40B4-BE49-F238E27FC236}">
+                <a16:creationId xmlns:a16="http://schemas.microsoft.com/office/drawing/2014/main" id="{6334484C-A69B-18E0-6EA3-9161B22140C0}"/>
+              </a:ext>
+            </a:extLst>
+          </p:cNvPr>
+          <p:cNvSpPr/>
+          <p:nvPr/>
+        </p:nvSpPr>
+        <p:spPr>
+          <a:xfrm>
+            <a:off x="9014643" y="4228943"/>
+            <a:ext cx="1444678" cy="291173"/>
+          </a:xfrm>
+          <a:prstGeom prst="roundRect">
+            <a:avLst/>
+          </a:prstGeom>
+        </p:spPr>
+        <p:style>
+          <a:lnRef idx="0">
+            <a:schemeClr val="accent1"/>
+          </a:lnRef>
+          <a:fillRef idx="3">
+            <a:schemeClr val="accent1"/>
+          </a:fillRef>
+          <a:effectRef idx="3">
+            <a:schemeClr val="accent1"/>
+          </a:effectRef>
+          <a:fontRef idx="minor">
+            <a:schemeClr val="lt1"/>
+          </a:fontRef>
+        </p:style>
+        <p:txBody>
+          <a:bodyPr rtlCol="0" anchor="ctr"/>
+          <a:lstStyle/>
+          <a:p>
+            <a:pPr algn="ctr"/>
+            <a:r>
+              <a:rPr lang="en-US" dirty="0"/>
+              <a:t>Asset</a:t>
+            </a:r>
+            <a:r>
+              <a:rPr lang="pl-PL" dirty="0" err="1"/>
+              <a:t>Loaders</a:t>
+            </a:r>
+            <a:endParaRPr lang="en-US" dirty="0"/>
+          </a:p>
+        </p:txBody>
+      </p:sp>
+      <p:sp>
+        <p:nvSpPr>
+          <p:cNvPr id="15" name="Rectangle: Rounded Corners 14">
+            <a:extLst>
+              <a:ext uri="{FF2B5EF4-FFF2-40B4-BE49-F238E27FC236}">
+                <a16:creationId xmlns:a16="http://schemas.microsoft.com/office/drawing/2014/main" id="{20318DE5-E77C-5009-EA86-699CDE0425AB}"/>
+              </a:ext>
+            </a:extLst>
+          </p:cNvPr>
+          <p:cNvSpPr/>
+          <p:nvPr/>
+        </p:nvSpPr>
+        <p:spPr>
+          <a:xfrm>
+            <a:off x="3333607" y="5248555"/>
+            <a:ext cx="2712098" cy="1166516"/>
+          </a:xfrm>
+          <a:prstGeom prst="roundRect">
+            <a:avLst>
+              <a:gd name="adj" fmla="val 12160"/>
+            </a:avLst>
+          </a:prstGeom>
+        </p:spPr>
+        <p:style>
+          <a:lnRef idx="1">
+            <a:schemeClr val="accent1"/>
+          </a:lnRef>
+          <a:fillRef idx="2">
+            <a:schemeClr val="accent1"/>
+          </a:fillRef>
+          <a:effectRef idx="1">
+            <a:schemeClr val="accent1"/>
+          </a:effectRef>
+          <a:fontRef idx="minor">
+            <a:schemeClr val="dk1"/>
+          </a:fontRef>
+        </p:style>
+        <p:txBody>
+          <a:bodyPr rtlCol="0" anchor="b"/>
+          <a:lstStyle/>
+          <a:p>
+            <a:pPr marL="285750" indent="-216000">
+              <a:buFont typeface="Arial" panose="020B0604020202020204" pitchFamily="34" charset="0"/>
+              <a:buChar char="•"/>
+            </a:pPr>
+            <a:r>
+              <a:rPr lang="en-US" sz="1400" dirty="0"/>
+              <a:t>Like </a:t>
+            </a:r>
+            <a:r>
+              <a:rPr lang="pl-PL" sz="1400" dirty="0" err="1"/>
+              <a:t>shared</a:t>
+            </a:r>
+            <a:r>
+              <a:rPr lang="en-US" sz="1400" dirty="0"/>
+              <a:t>_</a:t>
+            </a:r>
+            <a:r>
+              <a:rPr lang="en-US" sz="1400" dirty="0" err="1"/>
+              <a:t>ptr</a:t>
+            </a:r>
+            <a:endParaRPr lang="pl-PL" sz="1400" dirty="0"/>
+          </a:p>
+          <a:p>
+            <a:pPr marL="285750" indent="-216000">
+              <a:buFont typeface="Arial" panose="020B0604020202020204" pitchFamily="34" charset="0"/>
+              <a:buChar char="•"/>
+            </a:pPr>
+            <a:r>
+              <a:rPr lang="pl-PL" sz="1400" dirty="0" err="1"/>
+              <a:t>Like</a:t>
+            </a:r>
+            <a:r>
+              <a:rPr lang="pl-PL" sz="1400" dirty="0"/>
+              <a:t> lock </a:t>
+            </a:r>
+            <a:r>
+              <a:rPr lang="pl-PL" sz="1400" dirty="0" err="1"/>
+              <a:t>guard</a:t>
+            </a:r>
+            <a:endParaRPr lang="pl-PL" sz="1400" dirty="0"/>
+          </a:p>
+          <a:p>
+            <a:pPr marL="285750" indent="-216000">
+              <a:buFont typeface="Arial" panose="020B0604020202020204" pitchFamily="34" charset="0"/>
+              <a:buChar char="•"/>
+            </a:pPr>
+            <a:r>
+              <a:rPr lang="pl-PL" sz="1400" dirty="0" err="1"/>
+              <a:t>Gives</a:t>
+            </a:r>
+            <a:r>
+              <a:rPr lang="pl-PL" sz="1400" dirty="0"/>
+              <a:t> </a:t>
+            </a:r>
+            <a:r>
+              <a:rPr lang="pl-PL" sz="1400" dirty="0" err="1"/>
+              <a:t>access</a:t>
+            </a:r>
+            <a:r>
+              <a:rPr lang="pl-PL" sz="1400" dirty="0"/>
+              <a:t> </a:t>
+            </a:r>
+            <a:r>
+              <a:rPr lang="pl-PL" sz="1400" dirty="0" err="1"/>
+              <a:t>only</a:t>
+            </a:r>
+            <a:r>
+              <a:rPr lang="pl-PL" sz="1400" dirty="0"/>
+              <a:t> to </a:t>
+            </a:r>
+            <a:r>
+              <a:rPr lang="pl-PL" sz="1400" dirty="0" err="1"/>
+              <a:t>const</a:t>
+            </a:r>
+            <a:r>
+              <a:rPr lang="pl-PL" sz="1400" dirty="0"/>
+              <a:t> </a:t>
+            </a:r>
+            <a:r>
+              <a:rPr lang="pl-PL" sz="1400" dirty="0" err="1"/>
+              <a:t>methods</a:t>
+            </a:r>
+            <a:r>
+              <a:rPr lang="pl-PL" sz="1400" dirty="0"/>
+              <a:t> of </a:t>
+            </a:r>
+            <a:r>
+              <a:rPr lang="en-US" sz="1400" dirty="0" err="1"/>
+              <a:t>tnA</a:t>
+            </a:r>
+            <a:r>
+              <a:rPr lang="pl-PL" sz="1400" dirty="0" err="1"/>
+              <a:t>sset</a:t>
+            </a:r>
+            <a:endParaRPr lang="en-US" sz="1400" dirty="0"/>
+          </a:p>
+        </p:txBody>
+      </p:sp>
+      <p:sp>
+        <p:nvSpPr>
+          <p:cNvPr id="27" name="Rectangle: Rounded Corners 26">
+            <a:extLst>
+              <a:ext uri="{FF2B5EF4-FFF2-40B4-BE49-F238E27FC236}">
+                <a16:creationId xmlns:a16="http://schemas.microsoft.com/office/drawing/2014/main" id="{4A759DC1-565C-90B3-E60A-0DE5E49147DE}"/>
+              </a:ext>
+            </a:extLst>
+          </p:cNvPr>
+          <p:cNvSpPr/>
+          <p:nvPr/>
+        </p:nvSpPr>
+        <p:spPr>
+          <a:xfrm>
+            <a:off x="3436249" y="5075674"/>
+            <a:ext cx="2506816" cy="291173"/>
+          </a:xfrm>
+          <a:prstGeom prst="roundRect">
+            <a:avLst/>
+          </a:prstGeom>
+        </p:spPr>
+        <p:style>
+          <a:lnRef idx="0">
+            <a:schemeClr val="accent1"/>
+          </a:lnRef>
+          <a:fillRef idx="3">
+            <a:schemeClr val="accent1"/>
+          </a:fillRef>
+          <a:effectRef idx="3">
+            <a:schemeClr val="accent1"/>
+          </a:effectRef>
+          <a:fontRef idx="minor">
+            <a:schemeClr val="lt1"/>
+          </a:fontRef>
+        </p:style>
+        <p:txBody>
+          <a:bodyPr rtlCol="0" anchor="ctr"/>
+          <a:lstStyle/>
+          <a:p>
+            <a:pPr algn="ctr"/>
+            <a:r>
+              <a:rPr lang="en-US" dirty="0"/>
+              <a:t>Asset</a:t>
+            </a:r>
+            <a:r>
+              <a:rPr lang="pl-PL" dirty="0" err="1"/>
+              <a:t>Observer</a:t>
+            </a:r>
+            <a:r>
+              <a:rPr lang="en-US" dirty="0"/>
+              <a:t>&lt;</a:t>
+            </a:r>
+            <a:r>
+              <a:rPr lang="en-US" dirty="0" err="1"/>
+              <a:t>tnAsset</a:t>
+            </a:r>
+            <a:r>
+              <a:rPr lang="en-US" dirty="0"/>
+              <a:t>&gt;</a:t>
+            </a:r>
+          </a:p>
+        </p:txBody>
+      </p:sp>
+      <p:cxnSp>
+        <p:nvCxnSpPr>
+          <p:cNvPr id="33" name="Straight Arrow Connector 32">
+            <a:extLst>
+              <a:ext uri="{FF2B5EF4-FFF2-40B4-BE49-F238E27FC236}">
+                <a16:creationId xmlns:a16="http://schemas.microsoft.com/office/drawing/2014/main" id="{E6D48294-6737-74AC-867B-EE0086B7CEA3}"/>
+              </a:ext>
+            </a:extLst>
+          </p:cNvPr>
+          <p:cNvCxnSpPr>
+            <a:cxnSpLocks/>
+            <a:stCxn id="49" idx="2"/>
+          </p:cNvCxnSpPr>
+          <p:nvPr/>
+        </p:nvCxnSpPr>
+        <p:spPr>
+          <a:xfrm flipH="1">
+            <a:off x="2411431" y="4374807"/>
+            <a:ext cx="843119" cy="699037"/>
+          </a:xfrm>
+          <a:prstGeom prst="straightConnector1">
+            <a:avLst/>
+          </a:prstGeom>
+          <a:ln>
+            <a:prstDash val="dash"/>
+            <a:headEnd type="none" w="med" len="med"/>
+            <a:tailEnd type="arrow" w="med" len="med"/>
+          </a:ln>
+        </p:spPr>
+        <p:style>
+          <a:lnRef idx="3">
+            <a:schemeClr val="accent1"/>
+          </a:lnRef>
+          <a:fillRef idx="0">
+            <a:schemeClr val="accent1"/>
+          </a:fillRef>
+          <a:effectRef idx="2">
+            <a:schemeClr val="accent1"/>
+          </a:effectRef>
+          <a:fontRef idx="minor">
+            <a:schemeClr val="tx1"/>
+          </a:fontRef>
+        </p:style>
+      </p:cxnSp>
+      <p:cxnSp>
+        <p:nvCxnSpPr>
+          <p:cNvPr id="35" name="Straight Arrow Connector 34">
+            <a:extLst>
+              <a:ext uri="{FF2B5EF4-FFF2-40B4-BE49-F238E27FC236}">
+                <a16:creationId xmlns:a16="http://schemas.microsoft.com/office/drawing/2014/main" id="{B96B30E5-A163-FFDD-B309-CB6827B1DACF}"/>
+              </a:ext>
+            </a:extLst>
+          </p:cNvPr>
+          <p:cNvCxnSpPr>
+            <a:cxnSpLocks/>
+            <a:stCxn id="49" idx="2"/>
+          </p:cNvCxnSpPr>
+          <p:nvPr/>
+        </p:nvCxnSpPr>
+        <p:spPr>
+          <a:xfrm>
+            <a:off x="3254550" y="4374807"/>
+            <a:ext cx="796210" cy="699037"/>
+          </a:xfrm>
+          <a:prstGeom prst="straightConnector1">
+            <a:avLst/>
+          </a:prstGeom>
+          <a:ln>
+            <a:prstDash val="dash"/>
+            <a:headEnd type="none" w="med" len="med"/>
+            <a:tailEnd type="arrow" w="med" len="med"/>
+          </a:ln>
+        </p:spPr>
+        <p:style>
+          <a:lnRef idx="3">
+            <a:schemeClr val="accent1"/>
+          </a:lnRef>
+          <a:fillRef idx="0">
+            <a:schemeClr val="accent1"/>
+          </a:fillRef>
+          <a:effectRef idx="2">
+            <a:schemeClr val="accent1"/>
+          </a:effectRef>
+          <a:fontRef idx="minor">
+            <a:schemeClr val="tx1"/>
+          </a:fontRef>
+        </p:style>
+      </p:cxnSp>
+      <p:sp>
+        <p:nvSpPr>
+          <p:cNvPr id="46" name="Rectangle: Rounded Corners 45">
+            <a:extLst>
+              <a:ext uri="{FF2B5EF4-FFF2-40B4-BE49-F238E27FC236}">
+                <a16:creationId xmlns:a16="http://schemas.microsoft.com/office/drawing/2014/main" id="{9BDF7E11-BE2C-6836-175E-2E7D81F34479}"/>
+              </a:ext>
+            </a:extLst>
+          </p:cNvPr>
+          <p:cNvSpPr/>
+          <p:nvPr/>
+        </p:nvSpPr>
+        <p:spPr>
+          <a:xfrm>
+            <a:off x="3698530" y="4450392"/>
+            <a:ext cx="987487" cy="291173"/>
+          </a:xfrm>
+          <a:prstGeom prst="roundRect">
+            <a:avLst/>
+          </a:prstGeom>
+        </p:spPr>
+        <p:style>
+          <a:lnRef idx="1">
+            <a:schemeClr val="accent1"/>
+          </a:lnRef>
+          <a:fillRef idx="2">
+            <a:schemeClr val="accent1"/>
+          </a:fillRef>
+          <a:effectRef idx="1">
+            <a:schemeClr val="accent1"/>
+          </a:effectRef>
+          <a:fontRef idx="minor">
+            <a:schemeClr val="dk1"/>
+          </a:fontRef>
+        </p:style>
+        <p:txBody>
+          <a:bodyPr rtlCol="0" anchor="ctr"/>
+          <a:lstStyle/>
+          <a:p>
+            <a:pPr algn="ctr"/>
+            <a:r>
+              <a:rPr lang="pl-PL" sz="1400" dirty="0"/>
+              <a:t>.</a:t>
+            </a:r>
+            <a:r>
+              <a:rPr lang="pl-PL" sz="1400" dirty="0" err="1"/>
+              <a:t>Observe</a:t>
+            </a:r>
+            <a:r>
+              <a:rPr lang="pl-PL" sz="1400" dirty="0"/>
+              <a:t>()</a:t>
+            </a:r>
+            <a:endParaRPr lang="en-US" sz="1400" dirty="0"/>
+          </a:p>
+        </p:txBody>
+      </p:sp>
+      <p:sp>
+        <p:nvSpPr>
+          <p:cNvPr id="47" name="Rectangle: Rounded Corners 46">
+            <a:extLst>
+              <a:ext uri="{FF2B5EF4-FFF2-40B4-BE49-F238E27FC236}">
+                <a16:creationId xmlns:a16="http://schemas.microsoft.com/office/drawing/2014/main" id="{7D075B01-F2E4-A506-EC5C-080F6BCCAE10}"/>
+              </a:ext>
+            </a:extLst>
+          </p:cNvPr>
+          <p:cNvSpPr/>
+          <p:nvPr/>
+        </p:nvSpPr>
+        <p:spPr>
+          <a:xfrm>
+            <a:off x="2162621" y="4450392"/>
+            <a:ext cx="641728" cy="291173"/>
+          </a:xfrm>
+          <a:prstGeom prst="roundRect">
+            <a:avLst/>
+          </a:prstGeom>
+        </p:spPr>
+        <p:style>
+          <a:lnRef idx="1">
+            <a:schemeClr val="accent1"/>
+          </a:lnRef>
+          <a:fillRef idx="2">
+            <a:schemeClr val="accent1"/>
+          </a:fillRef>
+          <a:effectRef idx="1">
+            <a:schemeClr val="accent1"/>
+          </a:effectRef>
+          <a:fontRef idx="minor">
+            <a:schemeClr val="dk1"/>
+          </a:fontRef>
+        </p:style>
+        <p:txBody>
+          <a:bodyPr rtlCol="0" anchor="ctr"/>
+          <a:lstStyle/>
+          <a:p>
+            <a:pPr algn="ctr"/>
+            <a:r>
+              <a:rPr lang="pl-PL" sz="1400" dirty="0"/>
+              <a:t>.</a:t>
+            </a:r>
+            <a:r>
+              <a:rPr lang="pl-PL" sz="1400" dirty="0" err="1"/>
+              <a:t>Use</a:t>
+            </a:r>
+            <a:r>
+              <a:rPr lang="pl-PL" sz="1400" dirty="0"/>
+              <a:t>()</a:t>
+            </a:r>
+            <a:endParaRPr lang="en-US" sz="1400" dirty="0"/>
+          </a:p>
+        </p:txBody>
+      </p:sp>
+      <p:cxnSp>
+        <p:nvCxnSpPr>
+          <p:cNvPr id="52" name="Straight Arrow Connector 51">
+            <a:extLst>
+              <a:ext uri="{FF2B5EF4-FFF2-40B4-BE49-F238E27FC236}">
+                <a16:creationId xmlns:a16="http://schemas.microsoft.com/office/drawing/2014/main" id="{A99E177F-E1DD-DFA3-27B9-C9851D0BB2FD}"/>
+              </a:ext>
+            </a:extLst>
+          </p:cNvPr>
+          <p:cNvCxnSpPr/>
+          <p:nvPr/>
+        </p:nvCxnSpPr>
+        <p:spPr>
+          <a:xfrm>
+            <a:off x="5411755" y="3317066"/>
+            <a:ext cx="0" cy="1756778"/>
+          </a:xfrm>
+          <a:prstGeom prst="straightConnector1">
+            <a:avLst/>
+          </a:prstGeom>
+          <a:ln>
+            <a:tailEnd type="triangle"/>
+          </a:ln>
+        </p:spPr>
+        <p:style>
+          <a:lnRef idx="3">
+            <a:schemeClr val="accent1"/>
+          </a:lnRef>
+          <a:fillRef idx="0">
+            <a:schemeClr val="accent1"/>
+          </a:fillRef>
+          <a:effectRef idx="2">
+            <a:schemeClr val="accent1"/>
+          </a:effectRef>
+          <a:fontRef idx="minor">
+            <a:schemeClr val="tx1"/>
+          </a:fontRef>
+        </p:style>
+      </p:cxnSp>
+      <p:cxnSp>
+        <p:nvCxnSpPr>
+          <p:cNvPr id="53" name="Straight Arrow Connector 52">
+            <a:extLst>
+              <a:ext uri="{FF2B5EF4-FFF2-40B4-BE49-F238E27FC236}">
+                <a16:creationId xmlns:a16="http://schemas.microsoft.com/office/drawing/2014/main" id="{352011AB-C22B-7C34-E7C8-7EB78FCBCE6D}"/>
+              </a:ext>
+            </a:extLst>
+          </p:cNvPr>
+          <p:cNvCxnSpPr>
+            <a:cxnSpLocks/>
+          </p:cNvCxnSpPr>
+          <p:nvPr/>
+        </p:nvCxnSpPr>
+        <p:spPr>
+          <a:xfrm flipH="1">
+            <a:off x="1148041" y="3317066"/>
+            <a:ext cx="21396" cy="1756778"/>
+          </a:xfrm>
+          <a:prstGeom prst="straightConnector1">
+            <a:avLst/>
+          </a:prstGeom>
+          <a:ln>
+            <a:tailEnd type="triangle"/>
+          </a:ln>
+        </p:spPr>
+        <p:style>
+          <a:lnRef idx="3">
+            <a:schemeClr val="accent1"/>
+          </a:lnRef>
+          <a:fillRef idx="0">
+            <a:schemeClr val="accent1"/>
+          </a:fillRef>
+          <a:effectRef idx="2">
+            <a:schemeClr val="accent1"/>
+          </a:effectRef>
+          <a:fontRef idx="minor">
+            <a:schemeClr val="tx1"/>
+          </a:fontRef>
+        </p:style>
+      </p:cxnSp>
+    </p:spTree>
+    <p:extLst>
+      <p:ext uri="{BB962C8B-B14F-4D97-AF65-F5344CB8AC3E}">
+        <p14:creationId xmlns:p14="http://schemas.microsoft.com/office/powerpoint/2010/main" val="21460416"/>
       </p:ext>
     </p:extLst>
   </p:cSld>

</xml_diff>

<commit_message>
Design of geometry assets
</commit_message>
<xml_diff>
--- a/Documentation/Asset Pipeline.pptx
+++ b/Documentation/Asset Pipeline.pptx
@@ -5,13 +5,14 @@
     <p:sldMasterId id="2147483648" r:id="rId1"/>
   </p:sldMasterIdLst>
   <p:notesMasterIdLst>
-    <p:notesMasterId r:id="rId6"/>
+    <p:notesMasterId r:id="rId7"/>
   </p:notesMasterIdLst>
   <p:sldIdLst>
     <p:sldId id="256" r:id="rId2"/>
     <p:sldId id="261" r:id="rId3"/>
     <p:sldId id="260" r:id="rId4"/>
     <p:sldId id="262" r:id="rId5"/>
+    <p:sldId id="263" r:id="rId6"/>
   </p:sldIdLst>
   <p:sldSz cx="12192000" cy="6858000"/>
   <p:notesSz cx="6858000" cy="9144000"/>
@@ -212,7 +213,7 @@
           <a:p>
             <a:fld id="{D0E2DD2C-27F7-4F93-96E8-CD28AD9267D9}" type="datetimeFigureOut">
               <a:rPr lang="en-US" smtClean="0"/>
-              <a:t>5/2/2025</a:t>
+              <a:t>5/13/2025</a:t>
             </a:fld>
             <a:endParaRPr lang="en-US"/>
           </a:p>
@@ -711,7 +712,7 @@
           <a:p>
             <a:fld id="{783DC7D5-4D76-4679-A391-31CBAFA90932}" type="datetimeFigureOut">
               <a:rPr lang="en-US" smtClean="0"/>
-              <a:t>5/2/2025</a:t>
+              <a:t>5/13/2025</a:t>
             </a:fld>
             <a:endParaRPr lang="en-US"/>
           </a:p>
@@ -909,7 +910,7 @@
           <a:p>
             <a:fld id="{783DC7D5-4D76-4679-A391-31CBAFA90932}" type="datetimeFigureOut">
               <a:rPr lang="en-US" smtClean="0"/>
-              <a:t>5/2/2025</a:t>
+              <a:t>5/13/2025</a:t>
             </a:fld>
             <a:endParaRPr lang="en-US"/>
           </a:p>
@@ -1117,7 +1118,7 @@
           <a:p>
             <a:fld id="{783DC7D5-4D76-4679-A391-31CBAFA90932}" type="datetimeFigureOut">
               <a:rPr lang="en-US" smtClean="0"/>
-              <a:t>5/2/2025</a:t>
+              <a:t>5/13/2025</a:t>
             </a:fld>
             <a:endParaRPr lang="en-US"/>
           </a:p>
@@ -1315,7 +1316,7 @@
           <a:p>
             <a:fld id="{783DC7D5-4D76-4679-A391-31CBAFA90932}" type="datetimeFigureOut">
               <a:rPr lang="en-US" smtClean="0"/>
-              <a:t>5/2/2025</a:t>
+              <a:t>5/13/2025</a:t>
             </a:fld>
             <a:endParaRPr lang="en-US"/>
           </a:p>
@@ -1590,7 +1591,7 @@
           <a:p>
             <a:fld id="{783DC7D5-4D76-4679-A391-31CBAFA90932}" type="datetimeFigureOut">
               <a:rPr lang="en-US" smtClean="0"/>
-              <a:t>5/2/2025</a:t>
+              <a:t>5/13/2025</a:t>
             </a:fld>
             <a:endParaRPr lang="en-US"/>
           </a:p>
@@ -1855,7 +1856,7 @@
           <a:p>
             <a:fld id="{783DC7D5-4D76-4679-A391-31CBAFA90932}" type="datetimeFigureOut">
               <a:rPr lang="en-US" smtClean="0"/>
-              <a:t>5/2/2025</a:t>
+              <a:t>5/13/2025</a:t>
             </a:fld>
             <a:endParaRPr lang="en-US"/>
           </a:p>
@@ -2267,7 +2268,7 @@
           <a:p>
             <a:fld id="{783DC7D5-4D76-4679-A391-31CBAFA90932}" type="datetimeFigureOut">
               <a:rPr lang="en-US" smtClean="0"/>
-              <a:t>5/2/2025</a:t>
+              <a:t>5/13/2025</a:t>
             </a:fld>
             <a:endParaRPr lang="en-US"/>
           </a:p>
@@ -2408,7 +2409,7 @@
           <a:p>
             <a:fld id="{783DC7D5-4D76-4679-A391-31CBAFA90932}" type="datetimeFigureOut">
               <a:rPr lang="en-US" smtClean="0"/>
-              <a:t>5/2/2025</a:t>
+              <a:t>5/13/2025</a:t>
             </a:fld>
             <a:endParaRPr lang="en-US"/>
           </a:p>
@@ -2521,7 +2522,7 @@
           <a:p>
             <a:fld id="{783DC7D5-4D76-4679-A391-31CBAFA90932}" type="datetimeFigureOut">
               <a:rPr lang="en-US" smtClean="0"/>
-              <a:t>5/2/2025</a:t>
+              <a:t>5/13/2025</a:t>
             </a:fld>
             <a:endParaRPr lang="en-US"/>
           </a:p>
@@ -2832,7 +2833,7 @@
           <a:p>
             <a:fld id="{783DC7D5-4D76-4679-A391-31CBAFA90932}" type="datetimeFigureOut">
               <a:rPr lang="en-US" smtClean="0"/>
-              <a:t>5/2/2025</a:t>
+              <a:t>5/13/2025</a:t>
             </a:fld>
             <a:endParaRPr lang="en-US"/>
           </a:p>
@@ -3120,7 +3121,7 @@
           <a:p>
             <a:fld id="{783DC7D5-4D76-4679-A391-31CBAFA90932}" type="datetimeFigureOut">
               <a:rPr lang="en-US" smtClean="0"/>
-              <a:t>5/2/2025</a:t>
+              <a:t>5/13/2025</a:t>
             </a:fld>
             <a:endParaRPr lang="en-US"/>
           </a:p>
@@ -3361,7 +3362,7 @@
           <a:p>
             <a:fld id="{783DC7D5-4D76-4679-A391-31CBAFA90932}" type="datetimeFigureOut">
               <a:rPr lang="en-US" smtClean="0"/>
-              <a:t>5/2/2025</a:t>
+              <a:t>5/13/2025</a:t>
             </a:fld>
             <a:endParaRPr lang="en-US"/>
           </a:p>
@@ -8697,6 +8698,1344 @@
     <p:extLst>
       <p:ext uri="{BB962C8B-B14F-4D97-AF65-F5344CB8AC3E}">
         <p14:creationId xmlns:p14="http://schemas.microsoft.com/office/powerpoint/2010/main" val="786740795"/>
+      </p:ext>
+    </p:extLst>
+  </p:cSld>
+  <p:clrMapOvr>
+    <a:masterClrMapping/>
+  </p:clrMapOvr>
+</p:sld>
+</file>
+
+<file path=ppt/slides/slide5.xml><?xml version="1.0" encoding="utf-8"?>
+<p:sld xmlns:a="http://schemas.openxmlformats.org/drawingml/2006/main" xmlns:r="http://schemas.openxmlformats.org/officeDocument/2006/relationships" xmlns:p="http://schemas.openxmlformats.org/presentationml/2006/main">
+  <p:cSld>
+    <p:spTree>
+      <p:nvGrpSpPr>
+        <p:cNvPr id="1" name=""/>
+        <p:cNvGrpSpPr/>
+        <p:nvPr/>
+      </p:nvGrpSpPr>
+      <p:grpSpPr>
+        <a:xfrm>
+          <a:off x="0" y="0"/>
+          <a:ext cx="0" cy="0"/>
+          <a:chOff x="0" y="0"/>
+          <a:chExt cx="0" cy="0"/>
+        </a:xfrm>
+      </p:grpSpPr>
+      <p:sp>
+        <p:nvSpPr>
+          <p:cNvPr id="16" name="Prostokąt: zaokrąglone rogi 15">
+            <a:extLst>
+              <a:ext uri="{FF2B5EF4-FFF2-40B4-BE49-F238E27FC236}">
+                <a16:creationId xmlns:a16="http://schemas.microsoft.com/office/drawing/2014/main" id="{2A0423BC-C930-8484-D2D7-D42A2484E299}"/>
+              </a:ext>
+            </a:extLst>
+          </p:cNvPr>
+          <p:cNvSpPr/>
+          <p:nvPr/>
+        </p:nvSpPr>
+        <p:spPr>
+          <a:xfrm>
+            <a:off x="3446108" y="3344138"/>
+            <a:ext cx="7352524" cy="582346"/>
+          </a:xfrm>
+          <a:prstGeom prst="roundRect">
+            <a:avLst/>
+          </a:prstGeom>
+        </p:spPr>
+        <p:style>
+          <a:lnRef idx="1">
+            <a:schemeClr val="accent3"/>
+          </a:lnRef>
+          <a:fillRef idx="2">
+            <a:schemeClr val="accent3"/>
+          </a:fillRef>
+          <a:effectRef idx="1">
+            <a:schemeClr val="accent3"/>
+          </a:effectRef>
+          <a:fontRef idx="minor">
+            <a:schemeClr val="dk1"/>
+          </a:fontRef>
+        </p:style>
+        <p:txBody>
+          <a:bodyPr rtlCol="0" anchor="ctr"/>
+          <a:lstStyle/>
+          <a:p>
+            <a:pPr algn="ctr"/>
+            <a:endParaRPr lang="en-US" sz="2000" b="1" dirty="0"/>
+          </a:p>
+        </p:txBody>
+      </p:sp>
+      <p:sp>
+        <p:nvSpPr>
+          <p:cNvPr id="2" name="Rectangle: Rounded Corners 3">
+            <a:extLst>
+              <a:ext uri="{FF2B5EF4-FFF2-40B4-BE49-F238E27FC236}">
+                <a16:creationId xmlns:a16="http://schemas.microsoft.com/office/drawing/2014/main" id="{404DC3D8-F878-872E-5898-6AFED02B9CDC}"/>
+              </a:ext>
+            </a:extLst>
+          </p:cNvPr>
+          <p:cNvSpPr/>
+          <p:nvPr/>
+        </p:nvSpPr>
+        <p:spPr>
+          <a:xfrm>
+            <a:off x="4057794" y="378414"/>
+            <a:ext cx="3566358" cy="582346"/>
+          </a:xfrm>
+          <a:prstGeom prst="roundRect">
+            <a:avLst/>
+          </a:prstGeom>
+        </p:spPr>
+        <p:style>
+          <a:lnRef idx="0">
+            <a:schemeClr val="accent1"/>
+          </a:lnRef>
+          <a:fillRef idx="3">
+            <a:schemeClr val="accent1"/>
+          </a:fillRef>
+          <a:effectRef idx="3">
+            <a:schemeClr val="accent1"/>
+          </a:effectRef>
+          <a:fontRef idx="minor">
+            <a:schemeClr val="lt1"/>
+          </a:fontRef>
+        </p:style>
+        <p:txBody>
+          <a:bodyPr rtlCol="0" anchor="ctr"/>
+          <a:lstStyle/>
+          <a:p>
+            <a:pPr algn="ctr"/>
+            <a:r>
+              <a:rPr lang="en-US" dirty="0"/>
+              <a:t>Geometry Assets</a:t>
+            </a:r>
+          </a:p>
+        </p:txBody>
+      </p:sp>
+      <p:sp>
+        <p:nvSpPr>
+          <p:cNvPr id="6" name="Prostokąt: zaokrąglone rogi 5">
+            <a:extLst>
+              <a:ext uri="{FF2B5EF4-FFF2-40B4-BE49-F238E27FC236}">
+                <a16:creationId xmlns:a16="http://schemas.microsoft.com/office/drawing/2014/main" id="{7DC1B869-0D55-DBE5-CB6D-B52A1D9AB747}"/>
+              </a:ext>
+            </a:extLst>
+          </p:cNvPr>
+          <p:cNvSpPr/>
+          <p:nvPr/>
+        </p:nvSpPr>
+        <p:spPr>
+          <a:xfrm>
+            <a:off x="5097624" y="3404013"/>
+            <a:ext cx="1996752" cy="454090"/>
+          </a:xfrm>
+          <a:prstGeom prst="roundRect">
+            <a:avLst/>
+          </a:prstGeom>
+        </p:spPr>
+        <p:style>
+          <a:lnRef idx="1">
+            <a:schemeClr val="accent1"/>
+          </a:lnRef>
+          <a:fillRef idx="2">
+            <a:schemeClr val="accent1"/>
+          </a:fillRef>
+          <a:effectRef idx="1">
+            <a:schemeClr val="accent1"/>
+          </a:effectRef>
+          <a:fontRef idx="minor">
+            <a:schemeClr val="dk1"/>
+          </a:fontRef>
+        </p:style>
+        <p:txBody>
+          <a:bodyPr rtlCol="0" anchor="ctr"/>
+          <a:lstStyle/>
+          <a:p>
+            <a:pPr algn="ctr"/>
+            <a:r>
+              <a:rPr lang="en-US" dirty="0"/>
+              <a:t>Mesh</a:t>
+            </a:r>
+          </a:p>
+        </p:txBody>
+      </p:sp>
+      <p:sp>
+        <p:nvSpPr>
+          <p:cNvPr id="7" name="Prostokąt: zaokrąglone rogi 6">
+            <a:extLst>
+              <a:ext uri="{FF2B5EF4-FFF2-40B4-BE49-F238E27FC236}">
+                <a16:creationId xmlns:a16="http://schemas.microsoft.com/office/drawing/2014/main" id="{BA477DC3-49B8-4D7A-AF02-F386BACC8A94}"/>
+              </a:ext>
+            </a:extLst>
+          </p:cNvPr>
+          <p:cNvSpPr/>
+          <p:nvPr/>
+        </p:nvSpPr>
+        <p:spPr>
+          <a:xfrm>
+            <a:off x="7181465" y="3404013"/>
+            <a:ext cx="1996752" cy="454090"/>
+          </a:xfrm>
+          <a:prstGeom prst="roundRect">
+            <a:avLst/>
+          </a:prstGeom>
+        </p:spPr>
+        <p:style>
+          <a:lnRef idx="1">
+            <a:schemeClr val="accent1"/>
+          </a:lnRef>
+          <a:fillRef idx="2">
+            <a:schemeClr val="accent1"/>
+          </a:fillRef>
+          <a:effectRef idx="1">
+            <a:schemeClr val="accent1"/>
+          </a:effectRef>
+          <a:fontRef idx="minor">
+            <a:schemeClr val="dk1"/>
+          </a:fontRef>
+        </p:style>
+        <p:txBody>
+          <a:bodyPr rtlCol="0" anchor="ctr"/>
+          <a:lstStyle/>
+          <a:p>
+            <a:pPr algn="ctr"/>
+            <a:r>
+              <a:rPr lang="en-US" dirty="0" err="1"/>
+              <a:t>MaterialInstance</a:t>
+            </a:r>
+            <a:endParaRPr lang="en-US" dirty="0"/>
+          </a:p>
+        </p:txBody>
+      </p:sp>
+      <p:sp>
+        <p:nvSpPr>
+          <p:cNvPr id="13" name="Prostokąt: zaokrąglone rogi 12">
+            <a:extLst>
+              <a:ext uri="{FF2B5EF4-FFF2-40B4-BE49-F238E27FC236}">
+                <a16:creationId xmlns:a16="http://schemas.microsoft.com/office/drawing/2014/main" id="{A0FD60EF-87B6-6B13-F32F-D0B4B552008D}"/>
+              </a:ext>
+            </a:extLst>
+          </p:cNvPr>
+          <p:cNvSpPr/>
+          <p:nvPr/>
+        </p:nvSpPr>
+        <p:spPr>
+          <a:xfrm>
+            <a:off x="3446108" y="1217291"/>
+            <a:ext cx="7352524" cy="582346"/>
+          </a:xfrm>
+          <a:prstGeom prst="roundRect">
+            <a:avLst/>
+          </a:prstGeom>
+        </p:spPr>
+        <p:style>
+          <a:lnRef idx="1">
+            <a:schemeClr val="accent3"/>
+          </a:lnRef>
+          <a:fillRef idx="2">
+            <a:schemeClr val="accent3"/>
+          </a:fillRef>
+          <a:effectRef idx="1">
+            <a:schemeClr val="accent3"/>
+          </a:effectRef>
+          <a:fontRef idx="minor">
+            <a:schemeClr val="dk1"/>
+          </a:fontRef>
+        </p:style>
+        <p:txBody>
+          <a:bodyPr rtlCol="0" anchor="ctr"/>
+          <a:lstStyle/>
+          <a:p>
+            <a:pPr algn="ctr"/>
+            <a:endParaRPr lang="en-US"/>
+          </a:p>
+        </p:txBody>
+      </p:sp>
+      <p:sp>
+        <p:nvSpPr>
+          <p:cNvPr id="14" name="Prostokąt: zaokrąglone rogi 13">
+            <a:extLst>
+              <a:ext uri="{FF2B5EF4-FFF2-40B4-BE49-F238E27FC236}">
+                <a16:creationId xmlns:a16="http://schemas.microsoft.com/office/drawing/2014/main" id="{897FECBC-4C47-1445-96DB-428BA58D01CB}"/>
+              </a:ext>
+            </a:extLst>
+          </p:cNvPr>
+          <p:cNvSpPr/>
+          <p:nvPr/>
+        </p:nvSpPr>
+        <p:spPr>
+          <a:xfrm>
+            <a:off x="3446108" y="1926240"/>
+            <a:ext cx="7352524" cy="582346"/>
+          </a:xfrm>
+          <a:prstGeom prst="roundRect">
+            <a:avLst/>
+          </a:prstGeom>
+        </p:spPr>
+        <p:style>
+          <a:lnRef idx="1">
+            <a:schemeClr val="accent3"/>
+          </a:lnRef>
+          <a:fillRef idx="2">
+            <a:schemeClr val="accent3"/>
+          </a:fillRef>
+          <a:effectRef idx="1">
+            <a:schemeClr val="accent3"/>
+          </a:effectRef>
+          <a:fontRef idx="minor">
+            <a:schemeClr val="dk1"/>
+          </a:fontRef>
+        </p:style>
+        <p:txBody>
+          <a:bodyPr rtlCol="0" anchor="ctr"/>
+          <a:lstStyle/>
+          <a:p>
+            <a:pPr algn="ctr"/>
+            <a:endParaRPr lang="en-US" sz="1800" b="1" dirty="0"/>
+          </a:p>
+        </p:txBody>
+      </p:sp>
+      <p:sp>
+        <p:nvSpPr>
+          <p:cNvPr id="15" name="Prostokąt: zaokrąglone rogi 14">
+            <a:extLst>
+              <a:ext uri="{FF2B5EF4-FFF2-40B4-BE49-F238E27FC236}">
+                <a16:creationId xmlns:a16="http://schemas.microsoft.com/office/drawing/2014/main" id="{B94F2211-64DC-A131-4117-28163CC5E325}"/>
+              </a:ext>
+            </a:extLst>
+          </p:cNvPr>
+          <p:cNvSpPr/>
+          <p:nvPr/>
+        </p:nvSpPr>
+        <p:spPr>
+          <a:xfrm>
+            <a:off x="3446108" y="2635189"/>
+            <a:ext cx="7352524" cy="582346"/>
+          </a:xfrm>
+          <a:prstGeom prst="roundRect">
+            <a:avLst/>
+          </a:prstGeom>
+        </p:spPr>
+        <p:style>
+          <a:lnRef idx="1">
+            <a:schemeClr val="accent3"/>
+          </a:lnRef>
+          <a:fillRef idx="2">
+            <a:schemeClr val="accent3"/>
+          </a:fillRef>
+          <a:effectRef idx="1">
+            <a:schemeClr val="accent3"/>
+          </a:effectRef>
+          <a:fontRef idx="minor">
+            <a:schemeClr val="dk1"/>
+          </a:fontRef>
+        </p:style>
+        <p:txBody>
+          <a:bodyPr rtlCol="0" anchor="ctr"/>
+          <a:lstStyle/>
+          <a:p>
+            <a:pPr algn="ctr"/>
+            <a:endParaRPr lang="en-US"/>
+          </a:p>
+        </p:txBody>
+      </p:sp>
+      <p:sp>
+        <p:nvSpPr>
+          <p:cNvPr id="17" name="Prostokąt: zaokrąglone rogi 16">
+            <a:extLst>
+              <a:ext uri="{FF2B5EF4-FFF2-40B4-BE49-F238E27FC236}">
+                <a16:creationId xmlns:a16="http://schemas.microsoft.com/office/drawing/2014/main" id="{29B3EDB4-AA20-7B1E-2E67-D0B4A67C0906}"/>
+              </a:ext>
+            </a:extLst>
+          </p:cNvPr>
+          <p:cNvSpPr/>
+          <p:nvPr/>
+        </p:nvSpPr>
+        <p:spPr>
+          <a:xfrm>
+            <a:off x="3446108" y="4053087"/>
+            <a:ext cx="7352524" cy="582346"/>
+          </a:xfrm>
+          <a:prstGeom prst="roundRect">
+            <a:avLst/>
+          </a:prstGeom>
+        </p:spPr>
+        <p:style>
+          <a:lnRef idx="1">
+            <a:schemeClr val="accent3"/>
+          </a:lnRef>
+          <a:fillRef idx="2">
+            <a:schemeClr val="accent3"/>
+          </a:fillRef>
+          <a:effectRef idx="1">
+            <a:schemeClr val="accent3"/>
+          </a:effectRef>
+          <a:fontRef idx="minor">
+            <a:schemeClr val="dk1"/>
+          </a:fontRef>
+        </p:style>
+        <p:txBody>
+          <a:bodyPr rtlCol="0" anchor="ctr"/>
+          <a:lstStyle/>
+          <a:p>
+            <a:pPr algn="ctr"/>
+            <a:endParaRPr lang="en-US" sz="2000" b="1" dirty="0"/>
+          </a:p>
+        </p:txBody>
+      </p:sp>
+      <p:sp>
+        <p:nvSpPr>
+          <p:cNvPr id="18" name="Prostokąt: zaokrąglone rogi 17">
+            <a:extLst>
+              <a:ext uri="{FF2B5EF4-FFF2-40B4-BE49-F238E27FC236}">
+                <a16:creationId xmlns:a16="http://schemas.microsoft.com/office/drawing/2014/main" id="{154721C8-F29E-2243-06B1-A602C584922D}"/>
+              </a:ext>
+            </a:extLst>
+          </p:cNvPr>
+          <p:cNvSpPr/>
+          <p:nvPr/>
+        </p:nvSpPr>
+        <p:spPr>
+          <a:xfrm>
+            <a:off x="3446108" y="4762035"/>
+            <a:ext cx="7352524" cy="582346"/>
+          </a:xfrm>
+          <a:prstGeom prst="roundRect">
+            <a:avLst/>
+          </a:prstGeom>
+        </p:spPr>
+        <p:style>
+          <a:lnRef idx="1">
+            <a:schemeClr val="accent3"/>
+          </a:lnRef>
+          <a:fillRef idx="2">
+            <a:schemeClr val="accent3"/>
+          </a:fillRef>
+          <a:effectRef idx="1">
+            <a:schemeClr val="accent3"/>
+          </a:effectRef>
+          <a:fontRef idx="minor">
+            <a:schemeClr val="dk1"/>
+          </a:fontRef>
+        </p:style>
+        <p:txBody>
+          <a:bodyPr rtlCol="0" anchor="ctr"/>
+          <a:lstStyle/>
+          <a:p>
+            <a:pPr algn="ctr"/>
+            <a:endParaRPr lang="en-US"/>
+          </a:p>
+        </p:txBody>
+      </p:sp>
+      <p:sp>
+        <p:nvSpPr>
+          <p:cNvPr id="19" name="Prostokąt: zaokrąglone rogi 18">
+            <a:extLst>
+              <a:ext uri="{FF2B5EF4-FFF2-40B4-BE49-F238E27FC236}">
+                <a16:creationId xmlns:a16="http://schemas.microsoft.com/office/drawing/2014/main" id="{AB90DAFD-234B-7A84-A8D3-4555CC31A120}"/>
+              </a:ext>
+            </a:extLst>
+          </p:cNvPr>
+          <p:cNvSpPr/>
+          <p:nvPr/>
+        </p:nvSpPr>
+        <p:spPr>
+          <a:xfrm>
+            <a:off x="6183089" y="4117212"/>
+            <a:ext cx="1996752" cy="454091"/>
+          </a:xfrm>
+          <a:prstGeom prst="roundRect">
+            <a:avLst/>
+          </a:prstGeom>
+        </p:spPr>
+        <p:style>
+          <a:lnRef idx="1">
+            <a:schemeClr val="accent1"/>
+          </a:lnRef>
+          <a:fillRef idx="2">
+            <a:schemeClr val="accent1"/>
+          </a:fillRef>
+          <a:effectRef idx="1">
+            <a:schemeClr val="accent1"/>
+          </a:effectRef>
+          <a:fontRef idx="minor">
+            <a:schemeClr val="dk1"/>
+          </a:fontRef>
+        </p:style>
+        <p:txBody>
+          <a:bodyPr rtlCol="0" anchor="t"/>
+          <a:lstStyle/>
+          <a:p>
+            <a:pPr algn="ctr"/>
+            <a:r>
+              <a:rPr lang="en-US" dirty="0"/>
+              <a:t>N × </a:t>
+            </a:r>
+            <a:r>
+              <a:rPr lang="en-US" dirty="0" err="1"/>
+              <a:t>RenderMesh</a:t>
+            </a:r>
+            <a:endParaRPr lang="en-US" dirty="0"/>
+          </a:p>
+        </p:txBody>
+      </p:sp>
+      <p:sp>
+        <p:nvSpPr>
+          <p:cNvPr id="21" name="Prostokąt: zaokrąglone rogi 20">
+            <a:extLst>
+              <a:ext uri="{FF2B5EF4-FFF2-40B4-BE49-F238E27FC236}">
+                <a16:creationId xmlns:a16="http://schemas.microsoft.com/office/drawing/2014/main" id="{D583FA01-2820-1FD4-E0D6-EFDA0DDBFAC3}"/>
+              </a:ext>
+            </a:extLst>
+          </p:cNvPr>
+          <p:cNvSpPr/>
+          <p:nvPr/>
+        </p:nvSpPr>
+        <p:spPr>
+          <a:xfrm>
+            <a:off x="3446108" y="5470983"/>
+            <a:ext cx="7352524" cy="582346"/>
+          </a:xfrm>
+          <a:prstGeom prst="roundRect">
+            <a:avLst/>
+          </a:prstGeom>
+        </p:spPr>
+        <p:style>
+          <a:lnRef idx="1">
+            <a:schemeClr val="accent3"/>
+          </a:lnRef>
+          <a:fillRef idx="2">
+            <a:schemeClr val="accent3"/>
+          </a:fillRef>
+          <a:effectRef idx="1">
+            <a:schemeClr val="accent3"/>
+          </a:effectRef>
+          <a:fontRef idx="minor">
+            <a:schemeClr val="dk1"/>
+          </a:fontRef>
+        </p:style>
+        <p:txBody>
+          <a:bodyPr rtlCol="0" anchor="ctr"/>
+          <a:lstStyle/>
+          <a:p>
+            <a:pPr algn="ctr"/>
+            <a:endParaRPr lang="en-US" sz="1800" b="1" dirty="0"/>
+          </a:p>
+        </p:txBody>
+      </p:sp>
+      <p:sp>
+        <p:nvSpPr>
+          <p:cNvPr id="22" name="Prostokąt: zaokrąglone rogi 21">
+            <a:extLst>
+              <a:ext uri="{FF2B5EF4-FFF2-40B4-BE49-F238E27FC236}">
+                <a16:creationId xmlns:a16="http://schemas.microsoft.com/office/drawing/2014/main" id="{BF595126-B4DB-766D-BB40-875AEB9834EA}"/>
+              </a:ext>
+            </a:extLst>
+          </p:cNvPr>
+          <p:cNvSpPr/>
+          <p:nvPr/>
+        </p:nvSpPr>
+        <p:spPr>
+          <a:xfrm>
+            <a:off x="4040153" y="5543383"/>
+            <a:ext cx="1996752" cy="454091"/>
+          </a:xfrm>
+          <a:prstGeom prst="roundRect">
+            <a:avLst/>
+          </a:prstGeom>
+        </p:spPr>
+        <p:style>
+          <a:lnRef idx="1">
+            <a:schemeClr val="accent1"/>
+          </a:lnRef>
+          <a:fillRef idx="2">
+            <a:schemeClr val="accent1"/>
+          </a:fillRef>
+          <a:effectRef idx="1">
+            <a:schemeClr val="accent1"/>
+          </a:effectRef>
+          <a:fontRef idx="minor">
+            <a:schemeClr val="dk1"/>
+          </a:fontRef>
+        </p:style>
+        <p:txBody>
+          <a:bodyPr rtlCol="0" anchor="t"/>
+          <a:lstStyle/>
+          <a:p>
+            <a:pPr algn="ctr"/>
+            <a:r>
+              <a:rPr lang="en-US" dirty="0"/>
+              <a:t>Skeleton</a:t>
+            </a:r>
+          </a:p>
+        </p:txBody>
+      </p:sp>
+      <p:sp>
+        <p:nvSpPr>
+          <p:cNvPr id="23" name="Prostokąt: zaokrąglone rogi 22">
+            <a:extLst>
+              <a:ext uri="{FF2B5EF4-FFF2-40B4-BE49-F238E27FC236}">
+                <a16:creationId xmlns:a16="http://schemas.microsoft.com/office/drawing/2014/main" id="{3E9B9E4D-B225-7EED-713C-596F474BCFDF}"/>
+              </a:ext>
+            </a:extLst>
+          </p:cNvPr>
+          <p:cNvSpPr/>
+          <p:nvPr/>
+        </p:nvSpPr>
+        <p:spPr>
+          <a:xfrm>
+            <a:off x="6123994" y="5543383"/>
+            <a:ext cx="1996752" cy="454091"/>
+          </a:xfrm>
+          <a:prstGeom prst="roundRect">
+            <a:avLst/>
+          </a:prstGeom>
+        </p:spPr>
+        <p:style>
+          <a:lnRef idx="1">
+            <a:schemeClr val="accent1"/>
+          </a:lnRef>
+          <a:fillRef idx="2">
+            <a:schemeClr val="accent1"/>
+          </a:fillRef>
+          <a:effectRef idx="1">
+            <a:schemeClr val="accent1"/>
+          </a:effectRef>
+          <a:fontRef idx="minor">
+            <a:schemeClr val="dk1"/>
+          </a:fontRef>
+        </p:style>
+        <p:txBody>
+          <a:bodyPr rtlCol="0" anchor="t"/>
+          <a:lstStyle/>
+          <a:p>
+            <a:pPr algn="ctr"/>
+            <a:r>
+              <a:rPr lang="en-US" dirty="0"/>
+              <a:t>Model</a:t>
+            </a:r>
+          </a:p>
+        </p:txBody>
+      </p:sp>
+      <p:sp>
+        <p:nvSpPr>
+          <p:cNvPr id="24" name="Prostokąt: zaokrąglone rogi 23">
+            <a:extLst>
+              <a:ext uri="{FF2B5EF4-FFF2-40B4-BE49-F238E27FC236}">
+                <a16:creationId xmlns:a16="http://schemas.microsoft.com/office/drawing/2014/main" id="{CA4F5D74-F9C0-33DB-A6C3-11AF9EF90C8F}"/>
+              </a:ext>
+            </a:extLst>
+          </p:cNvPr>
+          <p:cNvSpPr/>
+          <p:nvPr/>
+        </p:nvSpPr>
+        <p:spPr>
+          <a:xfrm>
+            <a:off x="4049486" y="1990365"/>
+            <a:ext cx="1996752" cy="454090"/>
+          </a:xfrm>
+          <a:prstGeom prst="roundRect">
+            <a:avLst/>
+          </a:prstGeom>
+        </p:spPr>
+        <p:style>
+          <a:lnRef idx="1">
+            <a:schemeClr val="accent1"/>
+          </a:lnRef>
+          <a:fillRef idx="2">
+            <a:schemeClr val="accent1"/>
+          </a:fillRef>
+          <a:effectRef idx="1">
+            <a:schemeClr val="accent1"/>
+          </a:effectRef>
+          <a:fontRef idx="minor">
+            <a:schemeClr val="dk1"/>
+          </a:fontRef>
+        </p:style>
+        <p:txBody>
+          <a:bodyPr rtlCol="0" anchor="ctr"/>
+          <a:lstStyle/>
+          <a:p>
+            <a:pPr algn="ctr"/>
+            <a:r>
+              <a:rPr lang="en-US" dirty="0"/>
+              <a:t>Material</a:t>
+            </a:r>
+          </a:p>
+        </p:txBody>
+      </p:sp>
+      <p:sp>
+        <p:nvSpPr>
+          <p:cNvPr id="25" name="Prostokąt: zaokrąglone rogi 24">
+            <a:extLst>
+              <a:ext uri="{FF2B5EF4-FFF2-40B4-BE49-F238E27FC236}">
+                <a16:creationId xmlns:a16="http://schemas.microsoft.com/office/drawing/2014/main" id="{7B90A194-A5C2-66A5-F7C2-BEDE06203A33}"/>
+              </a:ext>
+            </a:extLst>
+          </p:cNvPr>
+          <p:cNvSpPr/>
+          <p:nvPr/>
+        </p:nvSpPr>
+        <p:spPr>
+          <a:xfrm>
+            <a:off x="6127101" y="1990171"/>
+            <a:ext cx="1996752" cy="454091"/>
+          </a:xfrm>
+          <a:prstGeom prst="roundRect">
+            <a:avLst/>
+          </a:prstGeom>
+        </p:spPr>
+        <p:style>
+          <a:lnRef idx="1">
+            <a:schemeClr val="accent1"/>
+          </a:lnRef>
+          <a:fillRef idx="2">
+            <a:schemeClr val="accent1"/>
+          </a:fillRef>
+          <a:effectRef idx="1">
+            <a:schemeClr val="accent1"/>
+          </a:effectRef>
+          <a:fontRef idx="minor">
+            <a:schemeClr val="dk1"/>
+          </a:fontRef>
+        </p:style>
+        <p:txBody>
+          <a:bodyPr rtlCol="0" anchor="t"/>
+          <a:lstStyle/>
+          <a:p>
+            <a:pPr algn="ctr"/>
+            <a:r>
+              <a:rPr lang="en-US" sz="1800" b="1" dirty="0"/>
+              <a:t>N × </a:t>
+            </a:r>
+            <a:r>
+              <a:rPr lang="en-US" dirty="0"/>
+              <a:t>Texture</a:t>
+            </a:r>
+          </a:p>
+        </p:txBody>
+      </p:sp>
+      <p:sp>
+        <p:nvSpPr>
+          <p:cNvPr id="26" name="Prostokąt: zaokrąglone rogi 25">
+            <a:extLst>
+              <a:ext uri="{FF2B5EF4-FFF2-40B4-BE49-F238E27FC236}">
+                <a16:creationId xmlns:a16="http://schemas.microsoft.com/office/drawing/2014/main" id="{F42F88EB-1A34-1A30-5484-700E344CD7B0}"/>
+              </a:ext>
+            </a:extLst>
+          </p:cNvPr>
+          <p:cNvSpPr/>
+          <p:nvPr/>
+        </p:nvSpPr>
+        <p:spPr>
+          <a:xfrm>
+            <a:off x="5097624" y="1281419"/>
+            <a:ext cx="1996752" cy="454090"/>
+          </a:xfrm>
+          <a:prstGeom prst="roundRect">
+            <a:avLst/>
+          </a:prstGeom>
+        </p:spPr>
+        <p:style>
+          <a:lnRef idx="1">
+            <a:schemeClr val="accent1"/>
+          </a:lnRef>
+          <a:fillRef idx="2">
+            <a:schemeClr val="accent1"/>
+          </a:fillRef>
+          <a:effectRef idx="1">
+            <a:schemeClr val="accent1"/>
+          </a:effectRef>
+          <a:fontRef idx="minor">
+            <a:schemeClr val="dk1"/>
+          </a:fontRef>
+        </p:style>
+        <p:txBody>
+          <a:bodyPr rtlCol="0" anchor="ctr"/>
+          <a:lstStyle/>
+          <a:p>
+            <a:pPr algn="ctr"/>
+            <a:r>
+              <a:rPr lang="en-US" dirty="0"/>
+              <a:t>Shader</a:t>
+            </a:r>
+          </a:p>
+        </p:txBody>
+      </p:sp>
+      <p:sp>
+        <p:nvSpPr>
+          <p:cNvPr id="27" name="Prostokąt: zaokrąglone rogi 26">
+            <a:extLst>
+              <a:ext uri="{FF2B5EF4-FFF2-40B4-BE49-F238E27FC236}">
+                <a16:creationId xmlns:a16="http://schemas.microsoft.com/office/drawing/2014/main" id="{569493F9-F3EC-0062-A180-C93A667ADF67}"/>
+              </a:ext>
+            </a:extLst>
+          </p:cNvPr>
+          <p:cNvSpPr/>
+          <p:nvPr/>
+        </p:nvSpPr>
+        <p:spPr>
+          <a:xfrm>
+            <a:off x="7181465" y="1281419"/>
+            <a:ext cx="1996752" cy="454090"/>
+          </a:xfrm>
+          <a:prstGeom prst="roundRect">
+            <a:avLst/>
+          </a:prstGeom>
+        </p:spPr>
+        <p:style>
+          <a:lnRef idx="1">
+            <a:schemeClr val="accent4"/>
+          </a:lnRef>
+          <a:fillRef idx="2">
+            <a:schemeClr val="accent4"/>
+          </a:fillRef>
+          <a:effectRef idx="1">
+            <a:schemeClr val="accent4"/>
+          </a:effectRef>
+          <a:fontRef idx="minor">
+            <a:schemeClr val="dk1"/>
+          </a:fontRef>
+        </p:style>
+        <p:txBody>
+          <a:bodyPr rtlCol="0" anchor="ctr"/>
+          <a:lstStyle/>
+          <a:p>
+            <a:pPr algn="ctr"/>
+            <a:r>
+              <a:rPr lang="en-US" sz="1400" dirty="0"/>
+              <a:t>Shader parameters (samplers, uniforms)</a:t>
+            </a:r>
+          </a:p>
+        </p:txBody>
+      </p:sp>
+      <p:sp>
+        <p:nvSpPr>
+          <p:cNvPr id="28" name="Prostokąt: zaokrąglone rogi 27">
+            <a:extLst>
+              <a:ext uri="{FF2B5EF4-FFF2-40B4-BE49-F238E27FC236}">
+                <a16:creationId xmlns:a16="http://schemas.microsoft.com/office/drawing/2014/main" id="{5C27AB83-49D2-7C3E-5AC5-6488022D575E}"/>
+              </a:ext>
+            </a:extLst>
+          </p:cNvPr>
+          <p:cNvSpPr/>
+          <p:nvPr/>
+        </p:nvSpPr>
+        <p:spPr>
+          <a:xfrm>
+            <a:off x="8204716" y="1990172"/>
+            <a:ext cx="1996752" cy="454090"/>
+          </a:xfrm>
+          <a:prstGeom prst="roundRect">
+            <a:avLst/>
+          </a:prstGeom>
+        </p:spPr>
+        <p:style>
+          <a:lnRef idx="1">
+            <a:schemeClr val="accent4"/>
+          </a:lnRef>
+          <a:fillRef idx="2">
+            <a:schemeClr val="accent4"/>
+          </a:fillRef>
+          <a:effectRef idx="1">
+            <a:schemeClr val="accent4"/>
+          </a:effectRef>
+          <a:fontRef idx="minor">
+            <a:schemeClr val="dk1"/>
+          </a:fontRef>
+        </p:style>
+        <p:txBody>
+          <a:bodyPr rtlCol="0" anchor="ctr"/>
+          <a:lstStyle/>
+          <a:p>
+            <a:pPr algn="ctr"/>
+            <a:r>
+              <a:rPr lang="en-US" sz="1400" dirty="0"/>
+              <a:t>Uniform Values</a:t>
+            </a:r>
+          </a:p>
+        </p:txBody>
+      </p:sp>
+      <p:sp>
+        <p:nvSpPr>
+          <p:cNvPr id="29" name="Prostokąt: zaokrąglone rogi 28">
+            <a:extLst>
+              <a:ext uri="{FF2B5EF4-FFF2-40B4-BE49-F238E27FC236}">
+                <a16:creationId xmlns:a16="http://schemas.microsoft.com/office/drawing/2014/main" id="{ABDC9015-5091-503D-A9A9-AB69ED341999}"/>
+              </a:ext>
+            </a:extLst>
+          </p:cNvPr>
+          <p:cNvSpPr/>
+          <p:nvPr/>
+        </p:nvSpPr>
+        <p:spPr>
+          <a:xfrm>
+            <a:off x="6123994" y="2699315"/>
+            <a:ext cx="1996752" cy="454090"/>
+          </a:xfrm>
+          <a:prstGeom prst="roundRect">
+            <a:avLst/>
+          </a:prstGeom>
+        </p:spPr>
+        <p:style>
+          <a:lnRef idx="1">
+            <a:schemeClr val="accent4"/>
+          </a:lnRef>
+          <a:fillRef idx="2">
+            <a:schemeClr val="accent4"/>
+          </a:fillRef>
+          <a:effectRef idx="1">
+            <a:schemeClr val="accent4"/>
+          </a:effectRef>
+          <a:fontRef idx="minor">
+            <a:schemeClr val="dk1"/>
+          </a:fontRef>
+        </p:style>
+        <p:txBody>
+          <a:bodyPr rtlCol="0" anchor="ctr"/>
+          <a:lstStyle/>
+          <a:p>
+            <a:pPr algn="ctr"/>
+            <a:r>
+              <a:rPr lang="en-US" sz="1400" dirty="0"/>
+              <a:t>Vertices and Indices</a:t>
+            </a:r>
+          </a:p>
+        </p:txBody>
+      </p:sp>
+      <p:sp>
+        <p:nvSpPr>
+          <p:cNvPr id="30" name="Prostokąt: zaokrąglone rogi 29">
+            <a:extLst>
+              <a:ext uri="{FF2B5EF4-FFF2-40B4-BE49-F238E27FC236}">
+                <a16:creationId xmlns:a16="http://schemas.microsoft.com/office/drawing/2014/main" id="{99303775-020C-8FCE-35FF-1F7E6C962DA7}"/>
+              </a:ext>
+            </a:extLst>
+          </p:cNvPr>
+          <p:cNvSpPr/>
+          <p:nvPr/>
+        </p:nvSpPr>
+        <p:spPr>
+          <a:xfrm>
+            <a:off x="6183089" y="4826163"/>
+            <a:ext cx="1996752" cy="454090"/>
+          </a:xfrm>
+          <a:prstGeom prst="roundRect">
+            <a:avLst/>
+          </a:prstGeom>
+        </p:spPr>
+        <p:style>
+          <a:lnRef idx="1">
+            <a:schemeClr val="accent4"/>
+          </a:lnRef>
+          <a:fillRef idx="2">
+            <a:schemeClr val="accent4"/>
+          </a:fillRef>
+          <a:effectRef idx="1">
+            <a:schemeClr val="accent4"/>
+          </a:effectRef>
+          <a:fontRef idx="minor">
+            <a:schemeClr val="dk1"/>
+          </a:fontRef>
+        </p:style>
+        <p:txBody>
+          <a:bodyPr rtlCol="0" anchor="ctr"/>
+          <a:lstStyle/>
+          <a:p>
+            <a:pPr algn="ctr"/>
+            <a:r>
+              <a:rPr lang="en-US" sz="1100" dirty="0"/>
+              <a:t>Hierarchy of transforms with default values (base pose)</a:t>
+            </a:r>
+          </a:p>
+        </p:txBody>
+      </p:sp>
+      <p:sp>
+        <p:nvSpPr>
+          <p:cNvPr id="5" name="Prostokąt: zaokrąglone rogi 4">
+            <a:extLst>
+              <a:ext uri="{FF2B5EF4-FFF2-40B4-BE49-F238E27FC236}">
+                <a16:creationId xmlns:a16="http://schemas.microsoft.com/office/drawing/2014/main" id="{557E3F4A-60E9-DCA0-D97F-434355F2C91D}"/>
+              </a:ext>
+            </a:extLst>
+          </p:cNvPr>
+          <p:cNvSpPr/>
+          <p:nvPr/>
+        </p:nvSpPr>
+        <p:spPr>
+          <a:xfrm>
+            <a:off x="1539550" y="3408263"/>
+            <a:ext cx="1996752" cy="454091"/>
+          </a:xfrm>
+          <a:prstGeom prst="roundRect">
+            <a:avLst/>
+          </a:prstGeom>
+        </p:spPr>
+        <p:style>
+          <a:lnRef idx="1">
+            <a:schemeClr val="accent1"/>
+          </a:lnRef>
+          <a:fillRef idx="2">
+            <a:schemeClr val="accent1"/>
+          </a:fillRef>
+          <a:effectRef idx="1">
+            <a:schemeClr val="accent1"/>
+          </a:effectRef>
+          <a:fontRef idx="minor">
+            <a:schemeClr val="dk1"/>
+          </a:fontRef>
+        </p:style>
+        <p:txBody>
+          <a:bodyPr rtlCol="0" anchor="t"/>
+          <a:lstStyle/>
+          <a:p>
+            <a:pPr algn="ctr"/>
+            <a:r>
+              <a:rPr lang="en-US" dirty="0" err="1"/>
+              <a:t>RenderMesh</a:t>
+            </a:r>
+            <a:endParaRPr lang="en-US" dirty="0"/>
+          </a:p>
+        </p:txBody>
+      </p:sp>
+      <p:sp>
+        <p:nvSpPr>
+          <p:cNvPr id="3" name="Prostokąt: zaokrąglone rogi 2">
+            <a:extLst>
+              <a:ext uri="{FF2B5EF4-FFF2-40B4-BE49-F238E27FC236}">
+                <a16:creationId xmlns:a16="http://schemas.microsoft.com/office/drawing/2014/main" id="{C4776758-F8EB-4357-8F25-C44477D42B3E}"/>
+              </a:ext>
+            </a:extLst>
+          </p:cNvPr>
+          <p:cNvSpPr/>
+          <p:nvPr/>
+        </p:nvSpPr>
+        <p:spPr>
+          <a:xfrm>
+            <a:off x="1539549" y="2699315"/>
+            <a:ext cx="1996752" cy="454090"/>
+          </a:xfrm>
+          <a:prstGeom prst="roundRect">
+            <a:avLst/>
+          </a:prstGeom>
+        </p:spPr>
+        <p:style>
+          <a:lnRef idx="1">
+            <a:schemeClr val="accent1"/>
+          </a:lnRef>
+          <a:fillRef idx="2">
+            <a:schemeClr val="accent1"/>
+          </a:fillRef>
+          <a:effectRef idx="1">
+            <a:schemeClr val="accent1"/>
+          </a:effectRef>
+          <a:fontRef idx="minor">
+            <a:schemeClr val="dk1"/>
+          </a:fontRef>
+        </p:style>
+        <p:txBody>
+          <a:bodyPr rtlCol="0" anchor="ctr"/>
+          <a:lstStyle/>
+          <a:p>
+            <a:pPr algn="ctr"/>
+            <a:r>
+              <a:rPr lang="en-US" dirty="0"/>
+              <a:t>Mesh</a:t>
+            </a:r>
+          </a:p>
+        </p:txBody>
+      </p:sp>
+      <p:sp>
+        <p:nvSpPr>
+          <p:cNvPr id="4" name="Prostokąt: zaokrąglone rogi 3">
+            <a:extLst>
+              <a:ext uri="{FF2B5EF4-FFF2-40B4-BE49-F238E27FC236}">
+                <a16:creationId xmlns:a16="http://schemas.microsoft.com/office/drawing/2014/main" id="{8052E21F-3AB5-BDE8-DC91-780EA97C6F68}"/>
+              </a:ext>
+            </a:extLst>
+          </p:cNvPr>
+          <p:cNvSpPr/>
+          <p:nvPr/>
+        </p:nvSpPr>
+        <p:spPr>
+          <a:xfrm>
+            <a:off x="1539549" y="1990367"/>
+            <a:ext cx="1996752" cy="454090"/>
+          </a:xfrm>
+          <a:prstGeom prst="roundRect">
+            <a:avLst/>
+          </a:prstGeom>
+        </p:spPr>
+        <p:style>
+          <a:lnRef idx="1">
+            <a:schemeClr val="accent1"/>
+          </a:lnRef>
+          <a:fillRef idx="2">
+            <a:schemeClr val="accent1"/>
+          </a:fillRef>
+          <a:effectRef idx="1">
+            <a:schemeClr val="accent1"/>
+          </a:effectRef>
+          <a:fontRef idx="minor">
+            <a:schemeClr val="dk1"/>
+          </a:fontRef>
+        </p:style>
+        <p:txBody>
+          <a:bodyPr rtlCol="0" anchor="ctr"/>
+          <a:lstStyle/>
+          <a:p>
+            <a:pPr algn="ctr"/>
+            <a:r>
+              <a:rPr lang="en-US" dirty="0" err="1"/>
+              <a:t>MaterialInstance</a:t>
+            </a:r>
+            <a:endParaRPr lang="en-US" dirty="0"/>
+          </a:p>
+        </p:txBody>
+      </p:sp>
+      <p:sp>
+        <p:nvSpPr>
+          <p:cNvPr id="8" name="Prostokąt: zaokrąglone rogi 7">
+            <a:extLst>
+              <a:ext uri="{FF2B5EF4-FFF2-40B4-BE49-F238E27FC236}">
+                <a16:creationId xmlns:a16="http://schemas.microsoft.com/office/drawing/2014/main" id="{09686041-2BBF-BF0F-1A49-FF7BCFEAFFEC}"/>
+              </a:ext>
+            </a:extLst>
+          </p:cNvPr>
+          <p:cNvSpPr/>
+          <p:nvPr/>
+        </p:nvSpPr>
+        <p:spPr>
+          <a:xfrm>
+            <a:off x="1539549" y="4117212"/>
+            <a:ext cx="1996752" cy="454091"/>
+          </a:xfrm>
+          <a:prstGeom prst="roundRect">
+            <a:avLst/>
+          </a:prstGeom>
+        </p:spPr>
+        <p:style>
+          <a:lnRef idx="1">
+            <a:schemeClr val="accent1"/>
+          </a:lnRef>
+          <a:fillRef idx="2">
+            <a:schemeClr val="accent1"/>
+          </a:fillRef>
+          <a:effectRef idx="1">
+            <a:schemeClr val="accent1"/>
+          </a:effectRef>
+          <a:fontRef idx="minor">
+            <a:schemeClr val="dk1"/>
+          </a:fontRef>
+        </p:style>
+        <p:txBody>
+          <a:bodyPr rtlCol="0" anchor="t"/>
+          <a:lstStyle/>
+          <a:p>
+            <a:pPr algn="ctr"/>
+            <a:r>
+              <a:rPr lang="en-US" dirty="0"/>
+              <a:t>Model</a:t>
+            </a:r>
+          </a:p>
+        </p:txBody>
+      </p:sp>
+      <p:sp>
+        <p:nvSpPr>
+          <p:cNvPr id="9" name="Prostokąt: zaokrąglone rogi 8">
+            <a:extLst>
+              <a:ext uri="{FF2B5EF4-FFF2-40B4-BE49-F238E27FC236}">
+                <a16:creationId xmlns:a16="http://schemas.microsoft.com/office/drawing/2014/main" id="{855B2F68-687D-EDD6-4E78-2D44B5FF46A4}"/>
+              </a:ext>
+            </a:extLst>
+          </p:cNvPr>
+          <p:cNvSpPr/>
+          <p:nvPr/>
+        </p:nvSpPr>
+        <p:spPr>
+          <a:xfrm>
+            <a:off x="1539549" y="4826163"/>
+            <a:ext cx="1996752" cy="454091"/>
+          </a:xfrm>
+          <a:prstGeom prst="roundRect">
+            <a:avLst/>
+          </a:prstGeom>
+        </p:spPr>
+        <p:style>
+          <a:lnRef idx="1">
+            <a:schemeClr val="accent1"/>
+          </a:lnRef>
+          <a:fillRef idx="2">
+            <a:schemeClr val="accent1"/>
+          </a:fillRef>
+          <a:effectRef idx="1">
+            <a:schemeClr val="accent1"/>
+          </a:effectRef>
+          <a:fontRef idx="minor">
+            <a:schemeClr val="dk1"/>
+          </a:fontRef>
+        </p:style>
+        <p:txBody>
+          <a:bodyPr rtlCol="0" anchor="t"/>
+          <a:lstStyle/>
+          <a:p>
+            <a:pPr algn="ctr"/>
+            <a:r>
+              <a:rPr lang="en-US" dirty="0"/>
+              <a:t>Skeleton</a:t>
+            </a:r>
+          </a:p>
+        </p:txBody>
+      </p:sp>
+      <p:sp>
+        <p:nvSpPr>
+          <p:cNvPr id="10" name="Prostokąt: zaokrąglone rogi 9">
+            <a:extLst>
+              <a:ext uri="{FF2B5EF4-FFF2-40B4-BE49-F238E27FC236}">
+                <a16:creationId xmlns:a16="http://schemas.microsoft.com/office/drawing/2014/main" id="{CF0201FE-182B-A715-5EFB-89E3DB288C39}"/>
+              </a:ext>
+            </a:extLst>
+          </p:cNvPr>
+          <p:cNvSpPr/>
+          <p:nvPr/>
+        </p:nvSpPr>
+        <p:spPr>
+          <a:xfrm>
+            <a:off x="1539549" y="1281419"/>
+            <a:ext cx="1996752" cy="454090"/>
+          </a:xfrm>
+          <a:prstGeom prst="roundRect">
+            <a:avLst/>
+          </a:prstGeom>
+        </p:spPr>
+        <p:style>
+          <a:lnRef idx="1">
+            <a:schemeClr val="accent1"/>
+          </a:lnRef>
+          <a:fillRef idx="2">
+            <a:schemeClr val="accent1"/>
+          </a:fillRef>
+          <a:effectRef idx="1">
+            <a:schemeClr val="accent1"/>
+          </a:effectRef>
+          <a:fontRef idx="minor">
+            <a:schemeClr val="dk1"/>
+          </a:fontRef>
+        </p:style>
+        <p:txBody>
+          <a:bodyPr rtlCol="0" anchor="ctr"/>
+          <a:lstStyle/>
+          <a:p>
+            <a:pPr algn="ctr"/>
+            <a:r>
+              <a:rPr lang="en-US" dirty="0"/>
+              <a:t>Material</a:t>
+            </a:r>
+          </a:p>
+        </p:txBody>
+      </p:sp>
+      <p:sp>
+        <p:nvSpPr>
+          <p:cNvPr id="20" name="Prostokąt: zaokrąglone rogi 19">
+            <a:extLst>
+              <a:ext uri="{FF2B5EF4-FFF2-40B4-BE49-F238E27FC236}">
+                <a16:creationId xmlns:a16="http://schemas.microsoft.com/office/drawing/2014/main" id="{E974B9BC-FF5E-6BA1-5D41-9FA952D76AE8}"/>
+              </a:ext>
+            </a:extLst>
+          </p:cNvPr>
+          <p:cNvSpPr/>
+          <p:nvPr/>
+        </p:nvSpPr>
+        <p:spPr>
+          <a:xfrm>
+            <a:off x="1539549" y="5535108"/>
+            <a:ext cx="1996752" cy="454091"/>
+          </a:xfrm>
+          <a:prstGeom prst="roundRect">
+            <a:avLst/>
+          </a:prstGeom>
+        </p:spPr>
+        <p:style>
+          <a:lnRef idx="1">
+            <a:schemeClr val="accent1"/>
+          </a:lnRef>
+          <a:fillRef idx="2">
+            <a:schemeClr val="accent1"/>
+          </a:fillRef>
+          <a:effectRef idx="1">
+            <a:schemeClr val="accent1"/>
+          </a:effectRef>
+          <a:fontRef idx="minor">
+            <a:schemeClr val="dk1"/>
+          </a:fontRef>
+        </p:style>
+        <p:txBody>
+          <a:bodyPr rtlCol="0" anchor="t"/>
+          <a:lstStyle/>
+          <a:p>
+            <a:pPr algn="ctr"/>
+            <a:r>
+              <a:rPr lang="en-US" dirty="0" err="1"/>
+              <a:t>SkinnedModel</a:t>
+            </a:r>
+            <a:endParaRPr lang="en-US" dirty="0"/>
+          </a:p>
+        </p:txBody>
+      </p:sp>
+      <p:sp>
+        <p:nvSpPr>
+          <p:cNvPr id="32" name="Prostokąt: zaokrąglone rogi 31">
+            <a:extLst>
+              <a:ext uri="{FF2B5EF4-FFF2-40B4-BE49-F238E27FC236}">
+                <a16:creationId xmlns:a16="http://schemas.microsoft.com/office/drawing/2014/main" id="{EDDA5CDE-6FD3-ACBF-8E5B-F0BE562B71B9}"/>
+              </a:ext>
+            </a:extLst>
+          </p:cNvPr>
+          <p:cNvSpPr/>
+          <p:nvPr/>
+        </p:nvSpPr>
+        <p:spPr>
+          <a:xfrm>
+            <a:off x="8204716" y="5543384"/>
+            <a:ext cx="1996752" cy="454090"/>
+          </a:xfrm>
+          <a:prstGeom prst="roundRect">
+            <a:avLst/>
+          </a:prstGeom>
+        </p:spPr>
+        <p:style>
+          <a:lnRef idx="1">
+            <a:schemeClr val="accent4"/>
+          </a:lnRef>
+          <a:fillRef idx="2">
+            <a:schemeClr val="accent4"/>
+          </a:fillRef>
+          <a:effectRef idx="1">
+            <a:schemeClr val="accent4"/>
+          </a:effectRef>
+          <a:fontRef idx="minor">
+            <a:schemeClr val="dk1"/>
+          </a:fontRef>
+        </p:style>
+        <p:txBody>
+          <a:bodyPr rtlCol="0" anchor="ctr"/>
+          <a:lstStyle/>
+          <a:p>
+            <a:pPr algn="ctr"/>
+            <a:r>
+              <a:rPr lang="en-US" sz="1400" dirty="0"/>
+              <a:t>Skinning</a:t>
+            </a:r>
+          </a:p>
+        </p:txBody>
+      </p:sp>
+    </p:spTree>
+    <p:extLst>
+      <p:ext uri="{BB962C8B-B14F-4D97-AF65-F5344CB8AC3E}">
+        <p14:creationId xmlns:p14="http://schemas.microsoft.com/office/powerpoint/2010/main" val="3986972889"/>
       </p:ext>
     </p:extLst>
   </p:cSld>

</xml_diff>

<commit_message>
Major asset system symplification - single registry
</commit_message>
<xml_diff>
--- a/Documentation/Asset Pipeline.pptx
+++ b/Documentation/Asset Pipeline.pptx
@@ -213,7 +213,7 @@
           <a:p>
             <a:fld id="{D0E2DD2C-27F7-4F93-96E8-CD28AD9267D9}" type="datetimeFigureOut">
               <a:rPr lang="en-US" smtClean="0"/>
-              <a:t>5/13/2025</a:t>
+              <a:t>5/15/2025</a:t>
             </a:fld>
             <a:endParaRPr lang="en-US"/>
           </a:p>
@@ -712,7 +712,7 @@
           <a:p>
             <a:fld id="{783DC7D5-4D76-4679-A391-31CBAFA90932}" type="datetimeFigureOut">
               <a:rPr lang="en-US" smtClean="0"/>
-              <a:t>5/13/2025</a:t>
+              <a:t>5/15/2025</a:t>
             </a:fld>
             <a:endParaRPr lang="en-US"/>
           </a:p>
@@ -910,7 +910,7 @@
           <a:p>
             <a:fld id="{783DC7D5-4D76-4679-A391-31CBAFA90932}" type="datetimeFigureOut">
               <a:rPr lang="en-US" smtClean="0"/>
-              <a:t>5/13/2025</a:t>
+              <a:t>5/15/2025</a:t>
             </a:fld>
             <a:endParaRPr lang="en-US"/>
           </a:p>
@@ -1118,7 +1118,7 @@
           <a:p>
             <a:fld id="{783DC7D5-4D76-4679-A391-31CBAFA90932}" type="datetimeFigureOut">
               <a:rPr lang="en-US" smtClean="0"/>
-              <a:t>5/13/2025</a:t>
+              <a:t>5/15/2025</a:t>
             </a:fld>
             <a:endParaRPr lang="en-US"/>
           </a:p>
@@ -1316,7 +1316,7 @@
           <a:p>
             <a:fld id="{783DC7D5-4D76-4679-A391-31CBAFA90932}" type="datetimeFigureOut">
               <a:rPr lang="en-US" smtClean="0"/>
-              <a:t>5/13/2025</a:t>
+              <a:t>5/15/2025</a:t>
             </a:fld>
             <a:endParaRPr lang="en-US"/>
           </a:p>
@@ -1591,7 +1591,7 @@
           <a:p>
             <a:fld id="{783DC7D5-4D76-4679-A391-31CBAFA90932}" type="datetimeFigureOut">
               <a:rPr lang="en-US" smtClean="0"/>
-              <a:t>5/13/2025</a:t>
+              <a:t>5/15/2025</a:t>
             </a:fld>
             <a:endParaRPr lang="en-US"/>
           </a:p>
@@ -1856,7 +1856,7 @@
           <a:p>
             <a:fld id="{783DC7D5-4D76-4679-A391-31CBAFA90932}" type="datetimeFigureOut">
               <a:rPr lang="en-US" smtClean="0"/>
-              <a:t>5/13/2025</a:t>
+              <a:t>5/15/2025</a:t>
             </a:fld>
             <a:endParaRPr lang="en-US"/>
           </a:p>
@@ -2268,7 +2268,7 @@
           <a:p>
             <a:fld id="{783DC7D5-4D76-4679-A391-31CBAFA90932}" type="datetimeFigureOut">
               <a:rPr lang="en-US" smtClean="0"/>
-              <a:t>5/13/2025</a:t>
+              <a:t>5/15/2025</a:t>
             </a:fld>
             <a:endParaRPr lang="en-US"/>
           </a:p>
@@ -2409,7 +2409,7 @@
           <a:p>
             <a:fld id="{783DC7D5-4D76-4679-A391-31CBAFA90932}" type="datetimeFigureOut">
               <a:rPr lang="en-US" smtClean="0"/>
-              <a:t>5/13/2025</a:t>
+              <a:t>5/15/2025</a:t>
             </a:fld>
             <a:endParaRPr lang="en-US"/>
           </a:p>
@@ -2522,7 +2522,7 @@
           <a:p>
             <a:fld id="{783DC7D5-4D76-4679-A391-31CBAFA90932}" type="datetimeFigureOut">
               <a:rPr lang="en-US" smtClean="0"/>
-              <a:t>5/13/2025</a:t>
+              <a:t>5/15/2025</a:t>
             </a:fld>
             <a:endParaRPr lang="en-US"/>
           </a:p>
@@ -2833,7 +2833,7 @@
           <a:p>
             <a:fld id="{783DC7D5-4D76-4679-A391-31CBAFA90932}" type="datetimeFigureOut">
               <a:rPr lang="en-US" smtClean="0"/>
-              <a:t>5/13/2025</a:t>
+              <a:t>5/15/2025</a:t>
             </a:fld>
             <a:endParaRPr lang="en-US"/>
           </a:p>
@@ -3121,7 +3121,7 @@
           <a:p>
             <a:fld id="{783DC7D5-4D76-4679-A391-31CBAFA90932}" type="datetimeFigureOut">
               <a:rPr lang="en-US" smtClean="0"/>
-              <a:t>5/13/2025</a:t>
+              <a:t>5/15/2025</a:t>
             </a:fld>
             <a:endParaRPr lang="en-US"/>
           </a:p>
@@ -3362,7 +3362,7 @@
           <a:p>
             <a:fld id="{783DC7D5-4D76-4679-A391-31CBAFA90932}" type="datetimeFigureOut">
               <a:rPr lang="en-US" smtClean="0"/>
-              <a:t>5/13/2025</a:t>
+              <a:t>5/15/2025</a:t>
             </a:fld>
             <a:endParaRPr lang="en-US"/>
           </a:p>
@@ -3945,7 +3945,7 @@
         <p:spPr>
           <a:xfrm>
             <a:off x="7947164" y="529233"/>
-            <a:ext cx="3813106" cy="2950584"/>
+            <a:ext cx="3813106" cy="2498052"/>
           </a:xfrm>
           <a:prstGeom prst="roundRect">
             <a:avLst>
@@ -3977,21 +3977,6 @@
             </a:pPr>
             <a:r>
               <a:rPr lang="en-US" sz="1400" dirty="0"/>
-              <a:t>Creates and manages </a:t>
-            </a:r>
-            <a:r>
-              <a:rPr lang="en-US" sz="1400" dirty="0" err="1"/>
-              <a:t>ECSes</a:t>
-            </a:r>
-            <a:endParaRPr lang="en-US" sz="1400" dirty="0"/>
-          </a:p>
-          <a:p>
-            <a:pPr marL="285750" indent="-216000">
-              <a:buFont typeface="Arial" panose="020B0604020202020204" pitchFamily="34" charset="0"/>
-              <a:buChar char="•"/>
-            </a:pPr>
-            <a:r>
-              <a:rPr lang="en-US" sz="1400" dirty="0"/>
               <a:t>Decides what to load and what to unload</a:t>
             </a:r>
           </a:p>
@@ -4101,10 +4086,10 @@
       </p:sp>
       <p:sp>
         <p:nvSpPr>
-          <p:cNvPr id="19" name="Rectangle: Rounded Corners 18">
-            <a:extLst>
-              <a:ext uri="{FF2B5EF4-FFF2-40B4-BE49-F238E27FC236}">
-                <a16:creationId xmlns:a16="http://schemas.microsoft.com/office/drawing/2014/main" id="{E17A3AEF-BF67-EBEA-4830-45261C24924E}"/>
+          <p:cNvPr id="5" name="Rectangle: Rounded Corners 4">
+            <a:extLst>
+              <a:ext uri="{FF2B5EF4-FFF2-40B4-BE49-F238E27FC236}">
+                <a16:creationId xmlns:a16="http://schemas.microsoft.com/office/drawing/2014/main" id="{13CE2984-FC23-7C9A-CFFB-B97F55D2AF3C}"/>
               </a:ext>
             </a:extLst>
           </p:cNvPr>
@@ -4113,145 +4098,7 @@
         </p:nvSpPr>
         <p:spPr>
           <a:xfrm>
-            <a:off x="8709159" y="1818805"/>
-            <a:ext cx="2712098" cy="1380037"/>
-          </a:xfrm>
-          <a:prstGeom prst="roundRect">
-            <a:avLst>
-              <a:gd name="adj" fmla="val 12160"/>
-            </a:avLst>
-          </a:prstGeom>
-        </p:spPr>
-        <p:style>
-          <a:lnRef idx="1">
-            <a:schemeClr val="accent1"/>
-          </a:lnRef>
-          <a:fillRef idx="2">
-            <a:schemeClr val="accent1"/>
-          </a:fillRef>
-          <a:effectRef idx="1">
-            <a:schemeClr val="accent1"/>
-          </a:effectRef>
-          <a:fontRef idx="minor">
-            <a:schemeClr val="dk1"/>
-          </a:fontRef>
-        </p:style>
-        <p:txBody>
-          <a:bodyPr rtlCol="0" anchor="t"/>
-          <a:lstStyle/>
-          <a:p>
-            <a:pPr algn="ctr"/>
-            <a:endParaRPr lang="en-US" dirty="0"/>
-          </a:p>
-        </p:txBody>
-      </p:sp>
-      <p:sp>
-        <p:nvSpPr>
-          <p:cNvPr id="18" name="Rectangle: Rounded Corners 17">
-            <a:extLst>
-              <a:ext uri="{FF2B5EF4-FFF2-40B4-BE49-F238E27FC236}">
-                <a16:creationId xmlns:a16="http://schemas.microsoft.com/office/drawing/2014/main" id="{3E2D51CF-C98F-8A87-43A8-BEB30D37DF26}"/>
-              </a:ext>
-            </a:extLst>
-          </p:cNvPr>
-          <p:cNvSpPr/>
-          <p:nvPr/>
-        </p:nvSpPr>
-        <p:spPr>
-          <a:xfrm>
-            <a:off x="8556759" y="1666405"/>
-            <a:ext cx="2712098" cy="1380037"/>
-          </a:xfrm>
-          <a:prstGeom prst="roundRect">
-            <a:avLst>
-              <a:gd name="adj" fmla="val 12160"/>
-            </a:avLst>
-          </a:prstGeom>
-        </p:spPr>
-        <p:style>
-          <a:lnRef idx="1">
-            <a:schemeClr val="accent1"/>
-          </a:lnRef>
-          <a:fillRef idx="2">
-            <a:schemeClr val="accent1"/>
-          </a:fillRef>
-          <a:effectRef idx="1">
-            <a:schemeClr val="accent1"/>
-          </a:effectRef>
-          <a:fontRef idx="minor">
-            <a:schemeClr val="dk1"/>
-          </a:fontRef>
-        </p:style>
-        <p:txBody>
-          <a:bodyPr rtlCol="0" anchor="t"/>
-          <a:lstStyle/>
-          <a:p>
-            <a:pPr algn="ctr"/>
-            <a:endParaRPr lang="en-US" dirty="0"/>
-          </a:p>
-        </p:txBody>
-      </p:sp>
-      <p:sp>
-        <p:nvSpPr>
-          <p:cNvPr id="17" name="Rectangle: Rounded Corners 16">
-            <a:extLst>
-              <a:ext uri="{FF2B5EF4-FFF2-40B4-BE49-F238E27FC236}">
-                <a16:creationId xmlns:a16="http://schemas.microsoft.com/office/drawing/2014/main" id="{B6959E22-4E2A-ACFF-40F8-6DC52736ECB6}"/>
-              </a:ext>
-            </a:extLst>
-          </p:cNvPr>
-          <p:cNvSpPr/>
-          <p:nvPr/>
-        </p:nvSpPr>
-        <p:spPr>
-          <a:xfrm>
-            <a:off x="8404359" y="1514005"/>
-            <a:ext cx="2712098" cy="1380037"/>
-          </a:xfrm>
-          <a:prstGeom prst="roundRect">
-            <a:avLst>
-              <a:gd name="adj" fmla="val 12160"/>
-            </a:avLst>
-          </a:prstGeom>
-        </p:spPr>
-        <p:style>
-          <a:lnRef idx="1">
-            <a:schemeClr val="accent1"/>
-          </a:lnRef>
-          <a:fillRef idx="2">
-            <a:schemeClr val="accent1"/>
-          </a:fillRef>
-          <a:effectRef idx="1">
-            <a:schemeClr val="accent1"/>
-          </a:effectRef>
-          <a:fontRef idx="minor">
-            <a:schemeClr val="dk1"/>
-          </a:fontRef>
-        </p:style>
-        <p:txBody>
-          <a:bodyPr rtlCol="0" anchor="t"/>
-          <a:lstStyle/>
-          <a:p>
-            <a:pPr algn="ctr"/>
-            <a:endParaRPr lang="en-US" dirty="0"/>
-          </a:p>
-        </p:txBody>
-      </p:sp>
-      <p:sp>
-        <p:nvSpPr>
-          <p:cNvPr id="5" name="Rectangle: Rounded Corners 4">
-            <a:extLst>
-              <a:ext uri="{FF2B5EF4-FFF2-40B4-BE49-F238E27FC236}">
-                <a16:creationId xmlns:a16="http://schemas.microsoft.com/office/drawing/2014/main" id="{13CE2984-FC23-7C9A-CFFB-B97F55D2AF3C}"/>
-              </a:ext>
-            </a:extLst>
-          </p:cNvPr>
-          <p:cNvSpPr/>
-          <p:nvPr/>
-        </p:nvSpPr>
-        <p:spPr>
-          <a:xfrm>
-            <a:off x="8251959" y="1361605"/>
+            <a:off x="8512371" y="1285365"/>
             <a:ext cx="2712098" cy="1380037"/>
           </a:xfrm>
           <a:prstGeom prst="roundRect">
@@ -4298,13 +4145,13 @@
           <p:nvPr>
             <p:extLst>
               <p:ext uri="{D42A27DB-BD31-4B8C-83A1-F6EECF244321}">
-                <p14:modId xmlns:p14="http://schemas.microsoft.com/office/powerpoint/2010/main" val="606179892"/>
+                <p14:modId xmlns:p14="http://schemas.microsoft.com/office/powerpoint/2010/main" val="3611313631"/>
               </p:ext>
             </p:extLst>
           </p:nvPr>
         </p:nvGraphicFramePr>
         <p:xfrm>
-          <a:off x="8413173" y="1607628"/>
+          <a:off x="8673585" y="1531388"/>
           <a:ext cx="2389670" cy="182292"/>
         </p:xfrm>
         <a:graphic>
@@ -4961,13 +4808,13 @@
           <p:nvPr>
             <p:extLst>
               <p:ext uri="{D42A27DB-BD31-4B8C-83A1-F6EECF244321}">
-                <p14:modId xmlns:p14="http://schemas.microsoft.com/office/powerpoint/2010/main" val="251418482"/>
+                <p14:modId xmlns:p14="http://schemas.microsoft.com/office/powerpoint/2010/main" val="3983933751"/>
               </p:ext>
             </p:extLst>
           </p:nvPr>
         </p:nvGraphicFramePr>
         <p:xfrm>
-          <a:off x="8413172" y="1860950"/>
+          <a:off x="8673584" y="1784710"/>
           <a:ext cx="1596054" cy="182292"/>
         </p:xfrm>
         <a:graphic>
@@ -5328,13 +5175,13 @@
           <p:nvPr>
             <p:extLst>
               <p:ext uri="{D42A27DB-BD31-4B8C-83A1-F6EECF244321}">
-                <p14:modId xmlns:p14="http://schemas.microsoft.com/office/powerpoint/2010/main" val="654300718"/>
+                <p14:modId xmlns:p14="http://schemas.microsoft.com/office/powerpoint/2010/main" val="2363325901"/>
               </p:ext>
             </p:extLst>
           </p:nvPr>
         </p:nvGraphicFramePr>
         <p:xfrm>
-          <a:off x="8413171" y="2114272"/>
+          <a:off x="8673583" y="2038032"/>
           <a:ext cx="1782664" cy="182292"/>
         </p:xfrm>
         <a:graphic>
@@ -5587,13 +5434,13 @@
           <p:nvPr>
             <p:extLst>
               <p:ext uri="{D42A27DB-BD31-4B8C-83A1-F6EECF244321}">
-                <p14:modId xmlns:p14="http://schemas.microsoft.com/office/powerpoint/2010/main" val="1525885701"/>
+                <p14:modId xmlns:p14="http://schemas.microsoft.com/office/powerpoint/2010/main" val="1101792248"/>
               </p:ext>
             </p:extLst>
           </p:nvPr>
         </p:nvGraphicFramePr>
         <p:xfrm>
-          <a:off x="8413170" y="2367594"/>
+          <a:off x="8673582" y="2291354"/>
           <a:ext cx="1666240" cy="182292"/>
         </p:xfrm>
         <a:graphic>
@@ -6061,7 +5908,7 @@
         </p:nvSpPr>
         <p:spPr>
           <a:xfrm>
-            <a:off x="9332755" y="1207746"/>
+            <a:off x="9593167" y="1131506"/>
             <a:ext cx="550506" cy="291173"/>
           </a:xfrm>
           <a:prstGeom prst="roundRect">
@@ -6108,8 +5955,8 @@
         </p:nvSpPr>
         <p:spPr>
           <a:xfrm>
-            <a:off x="318784" y="972443"/>
-            <a:ext cx="7326164" cy="2369880"/>
+            <a:off x="431730" y="1498919"/>
+            <a:ext cx="5915164" cy="646331"/>
           </a:xfrm>
           <a:prstGeom prst="rect">
             <a:avLst/>
@@ -6132,14 +5979,7 @@
             <a:pPr algn="just"/>
             <a:r>
               <a:rPr lang="en-US" sz="1600" dirty="0"/>
-              <a:t>Assets are broken down into components and stored in ECS (each asset type has its own - runtime ID may be identical for multiple assets as long, as they are different types).</a:t>
-            </a:r>
-          </a:p>
-          <a:p>
-            <a:pPr algn="just"/>
-            <a:r>
-              <a:rPr lang="en-US" sz="1600" dirty="0"/>
-              <a:t>This gives flexibility of allowing easy creation of asset subtypes (e.g. standalone mesh and mesh that is part of a model), connections and dependencies between assets without redesigning whole asset system or fighting with poorly predicted inheritance hierarchy. Lack of complex interactions between assets (only loading dependencies and similar) makes ECS perfect fit.</a:t>
+              <a:t>Assets are broken down into components and stored in ECS.</a:t>
             </a:r>
           </a:p>
         </p:txBody>
@@ -6158,7 +5998,7 @@
         </p:nvSpPr>
         <p:spPr>
           <a:xfrm>
-            <a:off x="313542" y="3339413"/>
+            <a:off x="312655" y="3025032"/>
             <a:ext cx="11554998" cy="1138773"/>
           </a:xfrm>
           <a:prstGeom prst="rect">
@@ -6275,7 +6115,7 @@
         </p:nvSpPr>
         <p:spPr>
           <a:xfrm>
-            <a:off x="312654" y="4512309"/>
+            <a:off x="312654" y="4376524"/>
             <a:ext cx="6441821" cy="1077218"/>
           </a:xfrm>
           <a:prstGeom prst="rect">

</xml_diff>

<commit_message>
Rearchitected asset observers and asset users
</commit_message>
<xml_diff>
--- a/Documentation/Asset Pipeline.pptx
+++ b/Documentation/Asset Pipeline.pptx
@@ -5,14 +5,16 @@
     <p:sldMasterId id="2147483648" r:id="rId1"/>
   </p:sldMasterIdLst>
   <p:notesMasterIdLst>
-    <p:notesMasterId r:id="rId7"/>
+    <p:notesMasterId r:id="rId9"/>
   </p:notesMasterIdLst>
   <p:sldIdLst>
     <p:sldId id="256" r:id="rId2"/>
     <p:sldId id="261" r:id="rId3"/>
-    <p:sldId id="260" r:id="rId4"/>
-    <p:sldId id="262" r:id="rId5"/>
-    <p:sldId id="263" r:id="rId6"/>
+    <p:sldId id="265" r:id="rId4"/>
+    <p:sldId id="260" r:id="rId5"/>
+    <p:sldId id="264" r:id="rId6"/>
+    <p:sldId id="262" r:id="rId7"/>
+    <p:sldId id="263" r:id="rId8"/>
   </p:sldIdLst>
   <p:sldSz cx="12192000" cy="6858000"/>
   <p:notesSz cx="6858000" cy="9144000"/>
@@ -213,7 +215,7 @@
           <a:p>
             <a:fld id="{D0E2DD2C-27F7-4F93-96E8-CD28AD9267D9}" type="datetimeFigureOut">
               <a:rPr lang="en-US" smtClean="0"/>
-              <a:t>5/15/2025</a:t>
+              <a:t>5/20/2025</a:t>
             </a:fld>
             <a:endParaRPr lang="en-US"/>
           </a:p>
@@ -565,6 +567,114 @@
 </p:notes>
 </file>
 
+<file path=ppt/notesSlides/notesSlide2.xml><?xml version="1.0" encoding="utf-8"?>
+<p:notes xmlns:a="http://schemas.openxmlformats.org/drawingml/2006/main" xmlns:r="http://schemas.openxmlformats.org/officeDocument/2006/relationships" xmlns:p="http://schemas.openxmlformats.org/presentationml/2006/main">
+  <p:cSld>
+    <p:spTree>
+      <p:nvGrpSpPr>
+        <p:cNvPr id="1" name="">
+          <a:extLst>
+            <a:ext uri="{FF2B5EF4-FFF2-40B4-BE49-F238E27FC236}">
+              <a16:creationId xmlns:a16="http://schemas.microsoft.com/office/drawing/2014/main" id="{B3AE9004-0E1D-91B1-7106-A42D2DA27530}"/>
+            </a:ext>
+          </a:extLst>
+        </p:cNvPr>
+        <p:cNvGrpSpPr/>
+        <p:nvPr/>
+      </p:nvGrpSpPr>
+      <p:grpSpPr>
+        <a:xfrm>
+          <a:off x="0" y="0"/>
+          <a:ext cx="0" cy="0"/>
+          <a:chOff x="0" y="0"/>
+          <a:chExt cx="0" cy="0"/>
+        </a:xfrm>
+      </p:grpSpPr>
+      <p:sp>
+        <p:nvSpPr>
+          <p:cNvPr id="2" name="Symbol zastępczy obrazu slajdu 1">
+            <a:extLst>
+              <a:ext uri="{FF2B5EF4-FFF2-40B4-BE49-F238E27FC236}">
+                <a16:creationId xmlns:a16="http://schemas.microsoft.com/office/drawing/2014/main" id="{0EFF6D5C-AE87-B77E-F61A-025730E69D89}"/>
+              </a:ext>
+            </a:extLst>
+          </p:cNvPr>
+          <p:cNvSpPr>
+            <a:spLocks noGrp="1" noRot="1" noChangeAspect="1"/>
+          </p:cNvSpPr>
+          <p:nvPr>
+            <p:ph type="sldImg"/>
+          </p:nvPr>
+        </p:nvSpPr>
+        <p:spPr/>
+      </p:sp>
+      <p:sp>
+        <p:nvSpPr>
+          <p:cNvPr id="3" name="Symbol zastępczy notatek 2">
+            <a:extLst>
+              <a:ext uri="{FF2B5EF4-FFF2-40B4-BE49-F238E27FC236}">
+                <a16:creationId xmlns:a16="http://schemas.microsoft.com/office/drawing/2014/main" id="{7E028B0B-CCA9-81FA-00C2-7561697CAA36}"/>
+              </a:ext>
+            </a:extLst>
+          </p:cNvPr>
+          <p:cNvSpPr>
+            <a:spLocks noGrp="1"/>
+          </p:cNvSpPr>
+          <p:nvPr>
+            <p:ph type="body" idx="1"/>
+          </p:nvPr>
+        </p:nvSpPr>
+        <p:spPr/>
+        <p:txBody>
+          <a:bodyPr/>
+          <a:lstStyle/>
+          <a:p>
+            <a:endParaRPr lang="en-US" dirty="0"/>
+          </a:p>
+        </p:txBody>
+      </p:sp>
+      <p:sp>
+        <p:nvSpPr>
+          <p:cNvPr id="4" name="Symbol zastępczy numeru slajdu 3">
+            <a:extLst>
+              <a:ext uri="{FF2B5EF4-FFF2-40B4-BE49-F238E27FC236}">
+                <a16:creationId xmlns:a16="http://schemas.microsoft.com/office/drawing/2014/main" id="{66199B2E-9142-202B-185F-A384DBA2AE70}"/>
+              </a:ext>
+            </a:extLst>
+          </p:cNvPr>
+          <p:cNvSpPr>
+            <a:spLocks noGrp="1"/>
+          </p:cNvSpPr>
+          <p:nvPr>
+            <p:ph type="sldNum" sz="quarter" idx="5"/>
+          </p:nvPr>
+        </p:nvSpPr>
+        <p:spPr/>
+        <p:txBody>
+          <a:bodyPr/>
+          <a:lstStyle/>
+          <a:p>
+            <a:fld id="{583D7F03-7197-42E4-9778-D52D335F305D}" type="slidenum">
+              <a:rPr lang="en-US" smtClean="0"/>
+              <a:t>3</a:t>
+            </a:fld>
+            <a:endParaRPr lang="en-US"/>
+          </a:p>
+        </p:txBody>
+      </p:sp>
+    </p:spTree>
+    <p:extLst>
+      <p:ext uri="{BB962C8B-B14F-4D97-AF65-F5344CB8AC3E}">
+        <p14:creationId xmlns:p14="http://schemas.microsoft.com/office/powerpoint/2010/main" val="112674718"/>
+      </p:ext>
+    </p:extLst>
+  </p:cSld>
+  <p:clrMapOvr>
+    <a:masterClrMapping/>
+  </p:clrMapOvr>
+</p:notes>
+</file>
+
 <file path=ppt/slideLayouts/slideLayout1.xml><?xml version="1.0" encoding="utf-8"?>
 <p:sldLayout xmlns:a="http://schemas.openxmlformats.org/drawingml/2006/main" xmlns:r="http://schemas.openxmlformats.org/officeDocument/2006/relationships" xmlns:p="http://schemas.openxmlformats.org/presentationml/2006/main" type="title" preserve="1">
   <p:cSld name="Title Slide">
@@ -712,7 +822,7 @@
           <a:p>
             <a:fld id="{783DC7D5-4D76-4679-A391-31CBAFA90932}" type="datetimeFigureOut">
               <a:rPr lang="en-US" smtClean="0"/>
-              <a:t>5/15/2025</a:t>
+              <a:t>5/20/2025</a:t>
             </a:fld>
             <a:endParaRPr lang="en-US"/>
           </a:p>
@@ -910,7 +1020,7 @@
           <a:p>
             <a:fld id="{783DC7D5-4D76-4679-A391-31CBAFA90932}" type="datetimeFigureOut">
               <a:rPr lang="en-US" smtClean="0"/>
-              <a:t>5/15/2025</a:t>
+              <a:t>5/20/2025</a:t>
             </a:fld>
             <a:endParaRPr lang="en-US"/>
           </a:p>
@@ -1118,7 +1228,7 @@
           <a:p>
             <a:fld id="{783DC7D5-4D76-4679-A391-31CBAFA90932}" type="datetimeFigureOut">
               <a:rPr lang="en-US" smtClean="0"/>
-              <a:t>5/15/2025</a:t>
+              <a:t>5/20/2025</a:t>
             </a:fld>
             <a:endParaRPr lang="en-US"/>
           </a:p>
@@ -1316,7 +1426,7 @@
           <a:p>
             <a:fld id="{783DC7D5-4D76-4679-A391-31CBAFA90932}" type="datetimeFigureOut">
               <a:rPr lang="en-US" smtClean="0"/>
-              <a:t>5/15/2025</a:t>
+              <a:t>5/20/2025</a:t>
             </a:fld>
             <a:endParaRPr lang="en-US"/>
           </a:p>
@@ -1591,7 +1701,7 @@
           <a:p>
             <a:fld id="{783DC7D5-4D76-4679-A391-31CBAFA90932}" type="datetimeFigureOut">
               <a:rPr lang="en-US" smtClean="0"/>
-              <a:t>5/15/2025</a:t>
+              <a:t>5/20/2025</a:t>
             </a:fld>
             <a:endParaRPr lang="en-US"/>
           </a:p>
@@ -1856,7 +1966,7 @@
           <a:p>
             <a:fld id="{783DC7D5-4D76-4679-A391-31CBAFA90932}" type="datetimeFigureOut">
               <a:rPr lang="en-US" smtClean="0"/>
-              <a:t>5/15/2025</a:t>
+              <a:t>5/20/2025</a:t>
             </a:fld>
             <a:endParaRPr lang="en-US"/>
           </a:p>
@@ -2268,7 +2378,7 @@
           <a:p>
             <a:fld id="{783DC7D5-4D76-4679-A391-31CBAFA90932}" type="datetimeFigureOut">
               <a:rPr lang="en-US" smtClean="0"/>
-              <a:t>5/15/2025</a:t>
+              <a:t>5/20/2025</a:t>
             </a:fld>
             <a:endParaRPr lang="en-US"/>
           </a:p>
@@ -2409,7 +2519,7 @@
           <a:p>
             <a:fld id="{783DC7D5-4D76-4679-A391-31CBAFA90932}" type="datetimeFigureOut">
               <a:rPr lang="en-US" smtClean="0"/>
-              <a:t>5/15/2025</a:t>
+              <a:t>5/20/2025</a:t>
             </a:fld>
             <a:endParaRPr lang="en-US"/>
           </a:p>
@@ -2522,7 +2632,7 @@
           <a:p>
             <a:fld id="{783DC7D5-4D76-4679-A391-31CBAFA90932}" type="datetimeFigureOut">
               <a:rPr lang="en-US" smtClean="0"/>
-              <a:t>5/15/2025</a:t>
+              <a:t>5/20/2025</a:t>
             </a:fld>
             <a:endParaRPr lang="en-US"/>
           </a:p>
@@ -2833,7 +2943,7 @@
           <a:p>
             <a:fld id="{783DC7D5-4D76-4679-A391-31CBAFA90932}" type="datetimeFigureOut">
               <a:rPr lang="en-US" smtClean="0"/>
-              <a:t>5/15/2025</a:t>
+              <a:t>5/20/2025</a:t>
             </a:fld>
             <a:endParaRPr lang="en-US"/>
           </a:p>
@@ -3121,7 +3231,7 @@
           <a:p>
             <a:fld id="{783DC7D5-4D76-4679-A391-31CBAFA90932}" type="datetimeFigureOut">
               <a:rPr lang="en-US" smtClean="0"/>
-              <a:t>5/15/2025</a:t>
+              <a:t>5/20/2025</a:t>
             </a:fld>
             <a:endParaRPr lang="en-US"/>
           </a:p>
@@ -3362,7 +3472,7 @@
           <a:p>
             <a:fld id="{783DC7D5-4D76-4679-A391-31CBAFA90932}" type="datetimeFigureOut">
               <a:rPr lang="en-US" smtClean="0"/>
-              <a:t>5/15/2025</a:t>
+              <a:t>5/20/2025</a:t>
             </a:fld>
             <a:endParaRPr lang="en-US"/>
           </a:p>
@@ -3944,7 +4054,7 @@
         </p:nvSpPr>
         <p:spPr>
           <a:xfrm>
-            <a:off x="7947164" y="529233"/>
+            <a:off x="7609411" y="3428682"/>
             <a:ext cx="3813106" cy="2498052"/>
           </a:xfrm>
           <a:prstGeom prst="roundRect">
@@ -3975,10 +4085,7 @@
               <a:buFont typeface="Arial" panose="020B0604020202020204" pitchFamily="34" charset="0"/>
               <a:buChar char="•"/>
             </a:pPr>
-            <a:r>
-              <a:rPr lang="en-US" sz="1400" dirty="0"/>
-              <a:t>Decides what to load and what to unload</a:t>
-            </a:r>
+            <a:endParaRPr lang="en-US" sz="1400" dirty="0"/>
           </a:p>
         </p:txBody>
       </p:sp>
@@ -3996,7 +4103,7 @@
         </p:nvSpPr>
         <p:spPr>
           <a:xfrm>
-            <a:off x="2603249" y="385855"/>
+            <a:off x="3958192" y="384937"/>
             <a:ext cx="2712098" cy="582346"/>
           </a:xfrm>
           <a:prstGeom prst="roundRect">
@@ -4023,8 +4130,8 @@
           <a:p>
             <a:pPr algn="ctr"/>
             <a:r>
-              <a:rPr lang="en-US" dirty="0"/>
-              <a:t>Runtime Management</a:t>
+              <a:rPr lang="en-US" sz="1800" dirty="0"/>
+              <a:t>Storage structure</a:t>
             </a:r>
           </a:p>
           <a:p>
@@ -4050,7 +4157,7 @@
         </p:nvSpPr>
         <p:spPr>
           <a:xfrm>
-            <a:off x="9063722" y="366800"/>
+            <a:off x="8725969" y="3266249"/>
             <a:ext cx="1698172" cy="291173"/>
           </a:xfrm>
           <a:prstGeom prst="roundRect">
@@ -4098,7 +4205,7 @@
         </p:nvSpPr>
         <p:spPr>
           <a:xfrm>
-            <a:off x="8512371" y="1285365"/>
+            <a:off x="8174618" y="4184814"/>
             <a:ext cx="2712098" cy="1380037"/>
           </a:xfrm>
           <a:prstGeom prst="roundRect">
@@ -4145,13 +4252,13 @@
           <p:nvPr>
             <p:extLst>
               <p:ext uri="{D42A27DB-BD31-4B8C-83A1-F6EECF244321}">
-                <p14:modId xmlns:p14="http://schemas.microsoft.com/office/powerpoint/2010/main" val="3611313631"/>
+                <p14:modId xmlns:p14="http://schemas.microsoft.com/office/powerpoint/2010/main" val="2668751953"/>
               </p:ext>
             </p:extLst>
           </p:nvPr>
         </p:nvGraphicFramePr>
         <p:xfrm>
-          <a:off x="8673585" y="1531388"/>
+          <a:off x="8335832" y="4430837"/>
           <a:ext cx="2389670" cy="182292"/>
         </p:xfrm>
         <a:graphic>
@@ -4808,13 +4915,13 @@
           <p:nvPr>
             <p:extLst>
               <p:ext uri="{D42A27DB-BD31-4B8C-83A1-F6EECF244321}">
-                <p14:modId xmlns:p14="http://schemas.microsoft.com/office/powerpoint/2010/main" val="3983933751"/>
+                <p14:modId xmlns:p14="http://schemas.microsoft.com/office/powerpoint/2010/main" val="863077694"/>
               </p:ext>
             </p:extLst>
           </p:nvPr>
         </p:nvGraphicFramePr>
         <p:xfrm>
-          <a:off x="8673584" y="1784710"/>
+          <a:off x="8335831" y="4684159"/>
           <a:ext cx="1596054" cy="182292"/>
         </p:xfrm>
         <a:graphic>
@@ -5175,13 +5282,13 @@
           <p:nvPr>
             <p:extLst>
               <p:ext uri="{D42A27DB-BD31-4B8C-83A1-F6EECF244321}">
-                <p14:modId xmlns:p14="http://schemas.microsoft.com/office/powerpoint/2010/main" val="2363325901"/>
+                <p14:modId xmlns:p14="http://schemas.microsoft.com/office/powerpoint/2010/main" val="286022438"/>
               </p:ext>
             </p:extLst>
           </p:nvPr>
         </p:nvGraphicFramePr>
         <p:xfrm>
-          <a:off x="8673583" y="2038032"/>
+          <a:off x="8335830" y="4937481"/>
           <a:ext cx="1782664" cy="182292"/>
         </p:xfrm>
         <a:graphic>
@@ -5434,13 +5541,13 @@
           <p:nvPr>
             <p:extLst>
               <p:ext uri="{D42A27DB-BD31-4B8C-83A1-F6EECF244321}">
-                <p14:modId xmlns:p14="http://schemas.microsoft.com/office/powerpoint/2010/main" val="1101792248"/>
+                <p14:modId xmlns:p14="http://schemas.microsoft.com/office/powerpoint/2010/main" val="3682411830"/>
               </p:ext>
             </p:extLst>
           </p:nvPr>
         </p:nvGraphicFramePr>
         <p:xfrm>
-          <a:off x="8673582" y="2291354"/>
+          <a:off x="8335829" y="5190803"/>
           <a:ext cx="1666240" cy="182292"/>
         </p:xfrm>
         <a:graphic>
@@ -5908,7 +6015,7 @@
         </p:nvSpPr>
         <p:spPr>
           <a:xfrm>
-            <a:off x="9593167" y="1131506"/>
+            <a:off x="9255414" y="4030955"/>
             <a:ext cx="550506" cy="291173"/>
           </a:xfrm>
           <a:prstGeom prst="roundRect">
@@ -5955,8 +6062,8 @@
         </p:nvSpPr>
         <p:spPr>
           <a:xfrm>
-            <a:off x="431730" y="1498919"/>
-            <a:ext cx="5915164" cy="646331"/>
+            <a:off x="1335260" y="1436114"/>
+            <a:ext cx="6686158" cy="4770537"/>
           </a:xfrm>
           <a:prstGeom prst="rect">
             <a:avLst/>
@@ -5971,201 +6078,186 @@
           <a:p>
             <a:pPr algn="just"/>
             <a:r>
-              <a:rPr lang="en-US" sz="2000" dirty="0"/>
-              <a:t>Storage structure:</a:t>
-            </a:r>
-          </a:p>
-          <a:p>
-            <a:pPr algn="just"/>
-            <a:r>
               <a:rPr lang="en-US" sz="1600" dirty="0"/>
               <a:t>Assets are broken down into components and stored in ECS.</a:t>
             </a:r>
           </a:p>
-        </p:txBody>
-      </p:sp>
-      <p:sp>
-        <p:nvSpPr>
-          <p:cNvPr id="38" name="TextBox 174">
-            <a:extLst>
-              <a:ext uri="{FF2B5EF4-FFF2-40B4-BE49-F238E27FC236}">
-                <a16:creationId xmlns:a16="http://schemas.microsoft.com/office/drawing/2014/main" id="{BDD77A1B-BA92-8A1E-BB64-ABBB1A3CDDC1}"/>
-              </a:ext>
-            </a:extLst>
-          </p:cNvPr>
-          <p:cNvSpPr txBox="1"/>
-          <p:nvPr/>
-        </p:nvSpPr>
-        <p:spPr>
-          <a:xfrm>
-            <a:off x="312655" y="3025032"/>
-            <a:ext cx="11554998" cy="1138773"/>
-          </a:xfrm>
-          <a:prstGeom prst="rect">
-            <a:avLst/>
-          </a:prstGeom>
-          <a:noFill/>
-        </p:spPr>
-        <p:txBody>
-          <a:bodyPr wrap="square" rtlCol="0">
-            <a:spAutoFit/>
-          </a:bodyPr>
-          <a:lstStyle/>
           <a:p>
             <a:pPr algn="just"/>
-            <a:r>
-              <a:rPr lang="en-US" sz="2000" dirty="0"/>
-              <a:t>Centralized streaming:</a:t>
-            </a:r>
+            <a:endParaRPr lang="en-US" sz="1600" dirty="0"/>
           </a:p>
           <a:p>
             <a:pPr algn="just"/>
             <a:r>
+              <a:rPr lang="en-US" sz="1600" dirty="0" err="1"/>
+              <a:t>AssetManager</a:t>
+            </a:r>
+            <a:r>
               <a:rPr lang="en-US" sz="1600" dirty="0"/>
-              <a:t>You can never assume an asset is loaded and there is no explicit asset loading request possibility. Instead, a handle to the asset has a loading priority value - </a:t>
-            </a:r>
+              <a:t> creates assets and decides what to load and what to unload.</a:t>
+            </a:r>
+          </a:p>
+          <a:p>
+            <a:pPr algn="just"/>
+            <a:endParaRPr lang="en-US" sz="1600" dirty="0"/>
+          </a:p>
+          <a:p>
+            <a:pPr algn="just"/>
+            <a:r>
+              <a:rPr lang="en-US" sz="1600" dirty="0"/>
+              <a:t>Asset Types:</a:t>
+            </a:r>
+          </a:p>
+          <a:p>
+            <a:pPr marL="285750" indent="-285750" algn="just">
+              <a:buFont typeface="Arial" panose="020B0604020202020204" pitchFamily="34" charset="0"/>
+              <a:buChar char="•"/>
+            </a:pPr>
+            <a:r>
+              <a:rPr lang="en-US" sz="1600" dirty="0"/>
+              <a:t>Texture,</a:t>
+            </a:r>
+          </a:p>
+          <a:p>
+            <a:pPr marL="285750" indent="-285750" algn="just">
+              <a:buFont typeface="Arial" panose="020B0604020202020204" pitchFamily="34" charset="0"/>
+              <a:buChar char="•"/>
+            </a:pPr>
+            <a:r>
+              <a:rPr lang="en-US" sz="1600" dirty="0"/>
+              <a:t>Texture2D,</a:t>
+            </a:r>
+          </a:p>
+          <a:p>
+            <a:pPr marL="285750" indent="-285750" algn="just">
+              <a:buFont typeface="Arial" panose="020B0604020202020204" pitchFamily="34" charset="0"/>
+              <a:buChar char="•"/>
+            </a:pPr>
+            <a:r>
+              <a:rPr lang="en-US" sz="1600" dirty="0"/>
+              <a:t>Shader,</a:t>
+            </a:r>
+          </a:p>
+          <a:p>
+            <a:pPr marL="285750" indent="-285750" algn="just">
+              <a:buFont typeface="Arial" panose="020B0604020202020204" pitchFamily="34" charset="0"/>
+              <a:buChar char="•"/>
+            </a:pPr>
             <a:r>
               <a:rPr lang="en-US" sz="1600" dirty="0" err="1"/>
-              <a:t>enum</a:t>
+              <a:t>ShadingModel</a:t>
             </a:r>
             <a:r>
               <a:rPr lang="en-US" sz="1600" dirty="0"/>
-              <a:t>. Asset handles of each loading priority are atomically counted in a component of that asset (reference counting). Asset Manager uses those counts to decide centrally which assets to load and unload:</a:t>
-            </a:r>
-          </a:p>
-        </p:txBody>
-      </p:sp>
-      <p:pic>
-        <p:nvPicPr>
-          <p:cNvPr id="13" name="Obraz 12">
-            <a:extLst>
-              <a:ext uri="{FF2B5EF4-FFF2-40B4-BE49-F238E27FC236}">
-                <a16:creationId xmlns:a16="http://schemas.microsoft.com/office/drawing/2014/main" id="{84415EB4-3E81-1A80-86C1-42A88B5DF9FB}"/>
-              </a:ext>
-            </a:extLst>
-          </p:cNvPr>
-          <p:cNvPicPr>
-            <a:picLocks noChangeAspect="1"/>
-          </p:cNvPicPr>
-          <p:nvPr/>
-        </p:nvPicPr>
-        <p:blipFill>
-          <a:blip r:embed="rId3"/>
-          <a:stretch>
-            <a:fillRect/>
-          </a:stretch>
-        </p:blipFill>
-        <p:spPr>
-          <a:xfrm>
-            <a:off x="8845419" y="4251664"/>
-            <a:ext cx="2709325" cy="1377753"/>
-          </a:xfrm>
-          <a:prstGeom prst="rect">
-            <a:avLst/>
-          </a:prstGeom>
-        </p:spPr>
-      </p:pic>
-      <p:sp>
-        <p:nvSpPr>
-          <p:cNvPr id="14" name="TextBox 174">
-            <a:extLst>
-              <a:ext uri="{FF2B5EF4-FFF2-40B4-BE49-F238E27FC236}">
-                <a16:creationId xmlns:a16="http://schemas.microsoft.com/office/drawing/2014/main" id="{78B6CFE9-200C-0178-2827-812534C4F41B}"/>
-              </a:ext>
-            </a:extLst>
-          </p:cNvPr>
-          <p:cNvSpPr txBox="1"/>
-          <p:nvPr/>
-        </p:nvSpPr>
-        <p:spPr>
-          <a:xfrm>
-            <a:off x="312654" y="5666461"/>
-            <a:ext cx="11554999" cy="830997"/>
-          </a:xfrm>
-          <a:prstGeom prst="rect">
-            <a:avLst/>
-          </a:prstGeom>
-          <a:noFill/>
-        </p:spPr>
-        <p:txBody>
-          <a:bodyPr wrap="square" rtlCol="0">
-            <a:spAutoFit/>
-          </a:bodyPr>
-          <a:lstStyle/>
-          <a:p>
-            <a:pPr algn="just"/>
+              <a:t>,</a:t>
+            </a:r>
+          </a:p>
+          <a:p>
+            <a:pPr marL="285750" indent="-285750" algn="just">
+              <a:buFont typeface="Arial" panose="020B0604020202020204" pitchFamily="34" charset="0"/>
+              <a:buChar char="•"/>
+            </a:pPr>
             <a:r>
               <a:rPr lang="en-US" sz="1600" dirty="0"/>
-              <a:t>This makes dynamic adaptive asset loading management much easier and safer (e.g. preloading assets for next level simply by setting their handles from None to Low). Asset loading/unloading and score calculation/sorting runs in an asynchronous loop, but in a foreground (structured concurrency).</a:t>
-            </a:r>
-          </a:p>
-        </p:txBody>
-      </p:sp>
-      <p:sp>
-        <p:nvSpPr>
-          <p:cNvPr id="15" name="TextBox 174">
-            <a:extLst>
-              <a:ext uri="{FF2B5EF4-FFF2-40B4-BE49-F238E27FC236}">
-                <a16:creationId xmlns:a16="http://schemas.microsoft.com/office/drawing/2014/main" id="{1ACE7A83-40FF-0BAB-3E5A-4AF60264ED2A}"/>
-              </a:ext>
-            </a:extLst>
-          </p:cNvPr>
-          <p:cNvSpPr txBox="1"/>
-          <p:nvPr/>
-        </p:nvSpPr>
-        <p:spPr>
-          <a:xfrm>
-            <a:off x="312654" y="4376524"/>
-            <a:ext cx="6441821" cy="1077218"/>
-          </a:xfrm>
-          <a:prstGeom prst="rect">
-            <a:avLst/>
-          </a:prstGeom>
-          <a:noFill/>
-        </p:spPr>
-        <p:txBody>
-          <a:bodyPr wrap="square" rtlCol="0">
-            <a:spAutoFit/>
-          </a:bodyPr>
-          <a:lstStyle/>
-          <a:p>
-            <a:pPr marL="342900" indent="-342900" algn="just">
-              <a:buFont typeface="+mj-lt"/>
-              <a:buAutoNum type="arabicPeriod"/>
+              <a:t>Material,</a:t>
+            </a:r>
+          </a:p>
+          <a:p>
+            <a:pPr marL="285750" indent="-285750" algn="just">
+              <a:buFont typeface="Arial" panose="020B0604020202020204" pitchFamily="34" charset="0"/>
+              <a:buChar char="•"/>
             </a:pPr>
             <a:r>
               <a:rPr lang="en-US" sz="1600" dirty="0"/>
-              <a:t>Calculates score of each asset as ∑ of count*priority</a:t>
-            </a:r>
-          </a:p>
-          <a:p>
-            <a:pPr marL="342900" indent="-342900" algn="just">
-              <a:buFont typeface="+mj-lt"/>
-              <a:buAutoNum type="arabicPeriod"/>
+              <a:t>Mesh,</a:t>
+            </a:r>
+          </a:p>
+          <a:p>
+            <a:pPr marL="285750" indent="-285750" algn="just">
+              <a:buFont typeface="Arial" panose="020B0604020202020204" pitchFamily="34" charset="0"/>
+              <a:buChar char="•"/>
             </a:pPr>
             <a:r>
+              <a:rPr lang="en-US" sz="1600" dirty="0" err="1"/>
+              <a:t>RenderMesh</a:t>
+            </a:r>
+            <a:r>
               <a:rPr lang="en-US" sz="1600" dirty="0"/>
-              <a:t>Sorts those scores</a:t>
-            </a:r>
-          </a:p>
-          <a:p>
-            <a:pPr marL="342900" indent="-342900" algn="just">
-              <a:buFont typeface="+mj-lt"/>
-              <a:buAutoNum type="arabicPeriod"/>
+              <a:t>,</a:t>
+            </a:r>
+          </a:p>
+          <a:p>
+            <a:pPr marL="285750" indent="-285750" algn="just">
+              <a:buFont typeface="Arial" panose="020B0604020202020204" pitchFamily="34" charset="0"/>
+              <a:buChar char="•"/>
             </a:pPr>
             <a:r>
               <a:rPr lang="en-US" sz="1600" dirty="0"/>
-              <a:t>Unloads assets with score 0</a:t>
-            </a:r>
-          </a:p>
-          <a:p>
-            <a:pPr marL="342900" indent="-342900" algn="just">
-              <a:buFont typeface="+mj-lt"/>
-              <a:buAutoNum type="arabicPeriod"/>
+              <a:t>Model,</a:t>
+            </a:r>
+          </a:p>
+          <a:p>
+            <a:pPr marL="285750" indent="-285750" algn="just">
+              <a:buFont typeface="Arial" panose="020B0604020202020204" pitchFamily="34" charset="0"/>
+              <a:buChar char="•"/>
             </a:pPr>
             <a:r>
               <a:rPr lang="en-US" sz="1600" dirty="0"/>
-              <a:t>Load as many assets as much memory is available</a:t>
+              <a:t>Skeleton,</a:t>
+            </a:r>
+          </a:p>
+          <a:p>
+            <a:pPr marL="285750" indent="-285750" algn="just">
+              <a:buFont typeface="Arial" panose="020B0604020202020204" pitchFamily="34" charset="0"/>
+              <a:buChar char="•"/>
+            </a:pPr>
+            <a:r>
+              <a:rPr lang="en-US" sz="1600" dirty="0" err="1"/>
+              <a:t>SkinnedModel</a:t>
+            </a:r>
+            <a:r>
+              <a:rPr lang="en-US" sz="1600" dirty="0"/>
+              <a:t>,</a:t>
+            </a:r>
+          </a:p>
+          <a:p>
+            <a:pPr marL="285750" indent="-285750" algn="just">
+              <a:buFont typeface="Arial" panose="020B0604020202020204" pitchFamily="34" charset="0"/>
+              <a:buChar char="•"/>
+            </a:pPr>
+            <a:r>
+              <a:rPr lang="en-US" sz="1600" dirty="0"/>
+              <a:t>Animation,</a:t>
+            </a:r>
+          </a:p>
+          <a:p>
+            <a:pPr marL="285750" indent="-285750" algn="just">
+              <a:buFont typeface="Arial" panose="020B0604020202020204" pitchFamily="34" charset="0"/>
+              <a:buChar char="•"/>
+            </a:pPr>
+            <a:r>
+              <a:rPr lang="en-US" sz="1600" dirty="0"/>
+              <a:t>Scene,</a:t>
+            </a:r>
+          </a:p>
+          <a:p>
+            <a:pPr marL="285750" indent="-285750" algn="just">
+              <a:buFont typeface="Arial" panose="020B0604020202020204" pitchFamily="34" charset="0"/>
+              <a:buChar char="•"/>
+            </a:pPr>
+            <a:r>
+              <a:rPr lang="en-US" sz="1600" dirty="0"/>
+              <a:t>Prefab,</a:t>
+            </a:r>
+          </a:p>
+          <a:p>
+            <a:pPr marL="285750" indent="-285750" algn="just">
+              <a:buFont typeface="Arial" panose="020B0604020202020204" pitchFamily="34" charset="0"/>
+              <a:buChar char="•"/>
+            </a:pPr>
+            <a:r>
+              <a:rPr lang="en-US" sz="1600" dirty="0"/>
+              <a:t>Audio</a:t>
             </a:r>
           </a:p>
         </p:txBody>
@@ -6188,6 +6280,272 @@
   <p:cSld>
     <p:spTree>
       <p:nvGrpSpPr>
+        <p:cNvPr id="1" name="">
+          <a:extLst>
+            <a:ext uri="{FF2B5EF4-FFF2-40B4-BE49-F238E27FC236}">
+              <a16:creationId xmlns:a16="http://schemas.microsoft.com/office/drawing/2014/main" id="{D96993B2-9C15-E053-B6AC-8093773B3FB6}"/>
+            </a:ext>
+          </a:extLst>
+        </p:cNvPr>
+        <p:cNvGrpSpPr/>
+        <p:nvPr/>
+      </p:nvGrpSpPr>
+      <p:grpSpPr>
+        <a:xfrm>
+          <a:off x="0" y="0"/>
+          <a:ext cx="0" cy="0"/>
+          <a:chOff x="0" y="0"/>
+          <a:chExt cx="0" cy="0"/>
+        </a:xfrm>
+      </p:grpSpPr>
+      <p:sp>
+        <p:nvSpPr>
+          <p:cNvPr id="4" name="Rectangle: Rounded Corners 3">
+            <a:extLst>
+              <a:ext uri="{FF2B5EF4-FFF2-40B4-BE49-F238E27FC236}">
+                <a16:creationId xmlns:a16="http://schemas.microsoft.com/office/drawing/2014/main" id="{819009C1-B0A4-2B26-6A41-BBFA67D35DBE}"/>
+              </a:ext>
+            </a:extLst>
+          </p:cNvPr>
+          <p:cNvSpPr/>
+          <p:nvPr/>
+        </p:nvSpPr>
+        <p:spPr>
+          <a:xfrm>
+            <a:off x="4734104" y="360542"/>
+            <a:ext cx="2712098" cy="582346"/>
+          </a:xfrm>
+          <a:prstGeom prst="roundRect">
+            <a:avLst/>
+          </a:prstGeom>
+        </p:spPr>
+        <p:style>
+          <a:lnRef idx="0">
+            <a:schemeClr val="accent1"/>
+          </a:lnRef>
+          <a:fillRef idx="3">
+            <a:schemeClr val="accent1"/>
+          </a:fillRef>
+          <a:effectRef idx="3">
+            <a:schemeClr val="accent1"/>
+          </a:effectRef>
+          <a:fontRef idx="minor">
+            <a:schemeClr val="lt1"/>
+          </a:fontRef>
+        </p:style>
+        <p:txBody>
+          <a:bodyPr rtlCol="0" anchor="ctr"/>
+          <a:lstStyle/>
+          <a:p>
+            <a:pPr algn="ctr"/>
+            <a:r>
+              <a:rPr lang="en-US" dirty="0"/>
+              <a:t>Runtime Management</a:t>
+            </a:r>
+          </a:p>
+          <a:p>
+            <a:pPr algn="ctr"/>
+            <a:r>
+              <a:rPr lang="en-US" sz="1200" dirty="0"/>
+              <a:t>Editor and Game</a:t>
+            </a:r>
+          </a:p>
+        </p:txBody>
+      </p:sp>
+      <p:sp>
+        <p:nvSpPr>
+          <p:cNvPr id="38" name="TextBox 174">
+            <a:extLst>
+              <a:ext uri="{FF2B5EF4-FFF2-40B4-BE49-F238E27FC236}">
+                <a16:creationId xmlns:a16="http://schemas.microsoft.com/office/drawing/2014/main" id="{1A69DFC9-6799-E624-E84B-8D5F2BB38FE5}"/>
+              </a:ext>
+            </a:extLst>
+          </p:cNvPr>
+          <p:cNvSpPr txBox="1"/>
+          <p:nvPr/>
+        </p:nvSpPr>
+        <p:spPr>
+          <a:xfrm>
+            <a:off x="431008" y="1590588"/>
+            <a:ext cx="11318290" cy="1138773"/>
+          </a:xfrm>
+          <a:prstGeom prst="rect">
+            <a:avLst/>
+          </a:prstGeom>
+          <a:noFill/>
+        </p:spPr>
+        <p:txBody>
+          <a:bodyPr wrap="square" rtlCol="0">
+            <a:spAutoFit/>
+          </a:bodyPr>
+          <a:lstStyle/>
+          <a:p>
+            <a:pPr algn="just"/>
+            <a:r>
+              <a:rPr lang="en-US" sz="2000" dirty="0"/>
+              <a:t>Centralized streaming:</a:t>
+            </a:r>
+          </a:p>
+          <a:p>
+            <a:pPr algn="just"/>
+            <a:r>
+              <a:rPr lang="en-US" sz="1600" dirty="0"/>
+              <a:t>You can never assume an asset is loaded and there is no explicit asset loading request possibility. Instead, a handle to the asset has a loading priority value - </a:t>
+            </a:r>
+            <a:r>
+              <a:rPr lang="en-US" sz="1600" dirty="0" err="1"/>
+              <a:t>enum</a:t>
+            </a:r>
+            <a:r>
+              <a:rPr lang="en-US" sz="1600" dirty="0"/>
+              <a:t>. Asset handles of each loading priority are atomically counted in a component of that asset (reference counting). Asset Manager uses those counts to decide centrally which assets to load and unload:</a:t>
+            </a:r>
+          </a:p>
+        </p:txBody>
+      </p:sp>
+      <p:pic>
+        <p:nvPicPr>
+          <p:cNvPr id="13" name="Obraz 12">
+            <a:extLst>
+              <a:ext uri="{FF2B5EF4-FFF2-40B4-BE49-F238E27FC236}">
+                <a16:creationId xmlns:a16="http://schemas.microsoft.com/office/drawing/2014/main" id="{AD2F7317-A225-74F6-A24D-D9A75BD890A2}"/>
+              </a:ext>
+            </a:extLst>
+          </p:cNvPr>
+          <p:cNvPicPr>
+            <a:picLocks noChangeAspect="1"/>
+          </p:cNvPicPr>
+          <p:nvPr/>
+        </p:nvPicPr>
+        <p:blipFill>
+          <a:blip r:embed="rId3"/>
+          <a:stretch>
+            <a:fillRect/>
+          </a:stretch>
+        </p:blipFill>
+        <p:spPr>
+          <a:xfrm>
+            <a:off x="8921619" y="3929834"/>
+            <a:ext cx="2709325" cy="1377753"/>
+          </a:xfrm>
+          <a:prstGeom prst="rect">
+            <a:avLst/>
+          </a:prstGeom>
+        </p:spPr>
+      </p:pic>
+      <p:sp>
+        <p:nvSpPr>
+          <p:cNvPr id="14" name="TextBox 174">
+            <a:extLst>
+              <a:ext uri="{FF2B5EF4-FFF2-40B4-BE49-F238E27FC236}">
+                <a16:creationId xmlns:a16="http://schemas.microsoft.com/office/drawing/2014/main" id="{FC3B3CC7-1C9E-A7B9-E246-AF24F12BB258}"/>
+              </a:ext>
+            </a:extLst>
+          </p:cNvPr>
+          <p:cNvSpPr txBox="1"/>
+          <p:nvPr/>
+        </p:nvSpPr>
+        <p:spPr>
+          <a:xfrm>
+            <a:off x="431008" y="4618710"/>
+            <a:ext cx="7821696" cy="1077218"/>
+          </a:xfrm>
+          <a:prstGeom prst="rect">
+            <a:avLst/>
+          </a:prstGeom>
+          <a:noFill/>
+        </p:spPr>
+        <p:txBody>
+          <a:bodyPr wrap="square" rtlCol="0">
+            <a:spAutoFit/>
+          </a:bodyPr>
+          <a:lstStyle/>
+          <a:p>
+            <a:pPr algn="just"/>
+            <a:r>
+              <a:rPr lang="en-US" sz="1600" dirty="0"/>
+              <a:t>This makes dynamic adaptive asset loading management much easier and safer (e.g. preloading assets for next level simply by setting their handles from None to Low). Asset loading/unloading and score calculation/sorting runs in an asynchronous loop, but in a foreground (structured concurrency).</a:t>
+            </a:r>
+          </a:p>
+        </p:txBody>
+      </p:sp>
+      <p:sp>
+        <p:nvSpPr>
+          <p:cNvPr id="15" name="TextBox 174">
+            <a:extLst>
+              <a:ext uri="{FF2B5EF4-FFF2-40B4-BE49-F238E27FC236}">
+                <a16:creationId xmlns:a16="http://schemas.microsoft.com/office/drawing/2014/main" id="{067B7CED-B707-54A5-6971-56978590A6DF}"/>
+              </a:ext>
+            </a:extLst>
+          </p:cNvPr>
+          <p:cNvSpPr txBox="1"/>
+          <p:nvPr/>
+        </p:nvSpPr>
+        <p:spPr>
+          <a:xfrm>
+            <a:off x="369804" y="3043024"/>
+            <a:ext cx="6441821" cy="1077218"/>
+          </a:xfrm>
+          <a:prstGeom prst="rect">
+            <a:avLst/>
+          </a:prstGeom>
+          <a:noFill/>
+        </p:spPr>
+        <p:txBody>
+          <a:bodyPr wrap="square" rtlCol="0">
+            <a:spAutoFit/>
+          </a:bodyPr>
+          <a:lstStyle/>
+          <a:p>
+            <a:pPr marL="342900" indent="-342900" algn="just">
+              <a:buFont typeface="+mj-lt"/>
+              <a:buAutoNum type="arabicPeriod"/>
+            </a:pPr>
+            <a:r>
+              <a:rPr lang="en-US" sz="1600" dirty="0"/>
+              <a:t>Calculates score of each asset as ∑ of count*priority</a:t>
+            </a:r>
+          </a:p>
+          <a:p>
+            <a:pPr marL="342900" indent="-342900" algn="just">
+              <a:buFont typeface="+mj-lt"/>
+              <a:buAutoNum type="arabicPeriod"/>
+            </a:pPr>
+            <a:r>
+              <a:rPr lang="en-US" sz="1600" dirty="0"/>
+              <a:t>Sorts assets based on theirs scores:</a:t>
+            </a:r>
+          </a:p>
+          <a:p>
+            <a:pPr marL="342900" indent="-342900" algn="just">
+              <a:buFont typeface="+mj-lt"/>
+              <a:buAutoNum type="arabicPeriod"/>
+            </a:pPr>
+            <a:r>
+              <a:rPr lang="en-US" sz="1600" dirty="0"/>
+              <a:t>Load as many assets as much memory is available going from highest score down (and unloading going from lowest score up).</a:t>
+            </a:r>
+          </a:p>
+        </p:txBody>
+      </p:sp>
+    </p:spTree>
+    <p:extLst>
+      <p:ext uri="{BB962C8B-B14F-4D97-AF65-F5344CB8AC3E}">
+        <p14:creationId xmlns:p14="http://schemas.microsoft.com/office/powerpoint/2010/main" val="4008094631"/>
+      </p:ext>
+    </p:extLst>
+  </p:cSld>
+  <p:clrMapOvr>
+    <a:masterClrMapping/>
+  </p:clrMapOvr>
+</p:sld>
+</file>
+
+<file path=ppt/slides/slide4.xml><?xml version="1.0" encoding="utf-8"?>
+<p:sld xmlns:a="http://schemas.openxmlformats.org/drawingml/2006/main" xmlns:r="http://schemas.openxmlformats.org/officeDocument/2006/relationships" xmlns:p="http://schemas.openxmlformats.org/presentationml/2006/main">
+  <p:cSld>
+    <p:spTree>
+      <p:nvGrpSpPr>
         <p:cNvPr id="1" name=""/>
         <p:cNvGrpSpPr/>
         <p:nvPr/>
@@ -6214,7 +6572,7 @@
         </p:nvSpPr>
         <p:spPr>
           <a:xfrm>
-            <a:off x="1877012" y="4165973"/>
+            <a:off x="4777672" y="4165973"/>
             <a:ext cx="2712098" cy="403767"/>
           </a:xfrm>
           <a:prstGeom prst="roundRect">
@@ -6272,7 +6630,7 @@
         </p:nvSpPr>
         <p:spPr>
           <a:xfrm>
-            <a:off x="1866509" y="415174"/>
+            <a:off x="4591959" y="415174"/>
             <a:ext cx="2712098" cy="582346"/>
           </a:xfrm>
           <a:prstGeom prst="roundRect">
@@ -6319,7 +6677,7 @@
         </p:nvSpPr>
         <p:spPr>
           <a:xfrm>
-            <a:off x="2077621" y="1586433"/>
+            <a:off x="3557853" y="1479899"/>
             <a:ext cx="2396644" cy="363190"/>
           </a:xfrm>
           <a:prstGeom prst="roundRect">
@@ -6346,10 +6704,7 @@
           <a:bodyPr rtlCol="0" anchor="b"/>
           <a:lstStyle/>
           <a:p>
-            <a:pPr marL="285750" indent="-216000">
-              <a:buFont typeface="Arial" panose="020B0604020202020204" pitchFamily="34" charset="0"/>
-              <a:buChar char="•"/>
-            </a:pPr>
+            <a:pPr marL="69750" algn="ctr"/>
             <a:r>
               <a:rPr lang="en-US" sz="1400" dirty="0"/>
               <a:t>Generic interface to ECS</a:t>
@@ -6371,8 +6726,8 @@
         </p:nvSpPr>
         <p:spPr>
           <a:xfrm>
-            <a:off x="2902720" y="1354406"/>
-            <a:ext cx="746446" cy="291173"/>
+            <a:off x="3921204" y="1247872"/>
+            <a:ext cx="1669942" cy="291173"/>
           </a:xfrm>
           <a:prstGeom prst="roundRect">
             <a:avLst/>
@@ -6398,9 +6753,10 @@
           <a:p>
             <a:pPr algn="ctr"/>
             <a:r>
-              <a:rPr lang="en-US" dirty="0"/>
-              <a:t>Asset</a:t>
-            </a:r>
+              <a:rPr lang="en-US" dirty="0" err="1"/>
+              <a:t>AssetInterface</a:t>
+            </a:r>
+            <a:endParaRPr lang="en-US" dirty="0"/>
           </a:p>
         </p:txBody>
       </p:sp>
@@ -6418,8 +6774,8 @@
         </p:nvSpPr>
         <p:spPr>
           <a:xfrm>
-            <a:off x="576948" y="2167078"/>
-            <a:ext cx="5312226" cy="1645323"/>
+            <a:off x="396659" y="2228295"/>
+            <a:ext cx="2806535" cy="2277994"/>
           </a:xfrm>
           <a:prstGeom prst="roundRect">
             <a:avLst>
@@ -6451,7 +6807,7 @@
             </a:pPr>
             <a:r>
               <a:rPr lang="en-US" sz="1400" dirty="0"/>
-              <a:t>Concrete Asset</a:t>
+              <a:t>Interface to a concrete Asset</a:t>
             </a:r>
           </a:p>
           <a:p>
@@ -6461,14 +6817,7 @@
             </a:pPr>
             <a:r>
               <a:rPr lang="en-US" sz="1400" dirty="0"/>
-              <a:t>Public only methods specific to its</a:t>
-            </a:r>
-            <a:br>
-              <a:rPr lang="en-US" sz="1400" dirty="0"/>
-            </a:br>
-            <a:r>
-              <a:rPr lang="en-US" sz="1400" dirty="0"/>
-              <a:t>asset type</a:t>
+              <a:t>Public only methods specific to its asset type</a:t>
             </a:r>
           </a:p>
           <a:p>
@@ -6478,21 +6827,25 @@
             </a:pPr>
             <a:r>
               <a:rPr lang="en-US" sz="1400" dirty="0"/>
-              <a:t>Can be conceptualized as an asset</a:t>
-            </a:r>
-            <a:br>
+              <a:t>Can be conceptualized as an asset itself, but actually is just an ECS handle (Asset ID + Registry </a:t>
+            </a:r>
+            <a:r>
+              <a:rPr lang="en-US" sz="1400" dirty="0" err="1"/>
+              <a:t>ptr</a:t>
+            </a:r>
+            <a:r>
               <a:rPr lang="en-US" sz="1400" dirty="0"/>
-            </a:br>
+              <a:t>)</a:t>
+            </a:r>
+          </a:p>
+          <a:p>
+            <a:pPr marL="285750" indent="-216000">
+              <a:buFont typeface="Arial" panose="020B0604020202020204" pitchFamily="34" charset="0"/>
+              <a:buChar char="•"/>
+            </a:pPr>
             <a:r>
               <a:rPr lang="en-US" sz="1400" dirty="0"/>
-              <a:t>itself, but actually is just an interface</a:t>
-            </a:r>
-            <a:br>
-              <a:rPr lang="en-US" sz="1400" dirty="0"/>
-            </a:br>
-            <a:r>
-              <a:rPr lang="en-US" sz="1400" dirty="0"/>
-              <a:t>to ECS</a:t>
+              <a:t>Treats Asset as const</a:t>
             </a:r>
           </a:p>
         </p:txBody>
@@ -6511,8 +6864,8 @@
         </p:nvSpPr>
         <p:spPr>
           <a:xfrm>
-            <a:off x="4110914" y="2262272"/>
-            <a:ext cx="1698172" cy="291173"/>
+            <a:off x="4037553" y="2155738"/>
+            <a:ext cx="1846864" cy="291173"/>
           </a:xfrm>
           <a:prstGeom prst="roundRect">
             <a:avLst/>
@@ -6537,9 +6890,10 @@
           <a:lstStyle/>
           <a:p>
             <a:r>
-              <a:rPr lang="en-US" dirty="0"/>
-              <a:t>Texture : Asset</a:t>
-            </a:r>
+              <a:rPr lang="en-US" dirty="0" err="1"/>
+              <a:t>TextureObserver</a:t>
+            </a:r>
+            <a:endParaRPr lang="en-US" dirty="0"/>
           </a:p>
         </p:txBody>
       </p:sp>
@@ -6557,8 +6911,8 @@
         </p:nvSpPr>
         <p:spPr>
           <a:xfrm>
-            <a:off x="4110914" y="2647068"/>
-            <a:ext cx="1698172" cy="291173"/>
+            <a:off x="4037553" y="2540534"/>
+            <a:ext cx="1846864" cy="291173"/>
           </a:xfrm>
           <a:prstGeom prst="roundRect">
             <a:avLst/>
@@ -6583,9 +6937,10 @@
           <a:lstStyle/>
           <a:p>
             <a:r>
-              <a:rPr lang="en-US" dirty="0"/>
-              <a:t>Shader : Asset</a:t>
-            </a:r>
+              <a:rPr lang="en-US" dirty="0" err="1"/>
+              <a:t>ShaderObserver</a:t>
+            </a:r>
+            <a:endParaRPr lang="en-US" dirty="0"/>
           </a:p>
         </p:txBody>
       </p:sp>
@@ -6603,8 +6958,8 @@
         </p:nvSpPr>
         <p:spPr>
           <a:xfrm>
-            <a:off x="4110914" y="3031864"/>
-            <a:ext cx="1698172" cy="291173"/>
+            <a:off x="4037553" y="2925330"/>
+            <a:ext cx="1846864" cy="291173"/>
           </a:xfrm>
           <a:prstGeom prst="roundRect">
             <a:avLst/>
@@ -6629,9 +6984,10 @@
           <a:lstStyle/>
           <a:p>
             <a:r>
-              <a:rPr lang="en-US" dirty="0"/>
-              <a:t>Material : Asset</a:t>
-            </a:r>
+              <a:rPr lang="en-US" dirty="0" err="1"/>
+              <a:t>MaterialObserver</a:t>
+            </a:r>
+            <a:endParaRPr lang="en-US" dirty="0"/>
           </a:p>
         </p:txBody>
       </p:sp>
@@ -6649,8 +7005,8 @@
         </p:nvSpPr>
         <p:spPr>
           <a:xfrm>
-            <a:off x="4110914" y="3416660"/>
-            <a:ext cx="1698172" cy="291173"/>
+            <a:off x="4037553" y="3310126"/>
+            <a:ext cx="1846864" cy="291173"/>
           </a:xfrm>
           <a:prstGeom prst="roundRect">
             <a:avLst/>
@@ -6675,9 +7031,10 @@
           <a:lstStyle/>
           <a:p>
             <a:r>
-              <a:rPr lang="en-US" dirty="0"/>
-              <a:t>Audio : Asset</a:t>
-            </a:r>
+              <a:rPr lang="en-US" dirty="0" err="1"/>
+              <a:t>AudioObserver</a:t>
+            </a:r>
+            <a:endParaRPr lang="en-US" dirty="0"/>
           </a:p>
         </p:txBody>
       </p:sp>
@@ -6697,7 +7054,7 @@
         </p:nvCxnSpPr>
         <p:spPr>
           <a:xfrm>
-            <a:off x="3736914" y="1949623"/>
+            <a:off x="3663553" y="1843089"/>
             <a:ext cx="0" cy="217455"/>
           </a:xfrm>
           <a:prstGeom prst="straightConnector1">
@@ -6732,14 +7089,15 @@
             </a:extLst>
           </p:cNvPr>
           <p:cNvCxnSpPr>
+            <a:cxnSpLocks/>
             <a:endCxn id="32" idx="1"/>
           </p:cNvCxnSpPr>
           <p:nvPr/>
         </p:nvCxnSpPr>
         <p:spPr>
           <a:xfrm rot="16200000" flipH="1">
-            <a:off x="3226330" y="2677662"/>
-            <a:ext cx="1395169" cy="374000"/>
+            <a:off x="3152968" y="2571128"/>
+            <a:ext cx="1395170" cy="374000"/>
           </a:xfrm>
           <a:prstGeom prst="bentConnector2">
             <a:avLst/>
@@ -6773,14 +7131,15 @@
             </a:extLst>
           </p:cNvPr>
           <p:cNvCxnSpPr>
+            <a:cxnSpLocks/>
             <a:endCxn id="31" idx="1"/>
           </p:cNvCxnSpPr>
           <p:nvPr/>
         </p:nvCxnSpPr>
         <p:spPr>
           <a:xfrm rot="16200000" flipH="1">
-            <a:off x="3418726" y="2485263"/>
-            <a:ext cx="1010374" cy="374001"/>
+            <a:off x="3345365" y="2378729"/>
+            <a:ext cx="1010374" cy="374002"/>
           </a:xfrm>
           <a:prstGeom prst="bentConnector2">
             <a:avLst/>
@@ -6814,14 +7173,15 @@
             </a:extLst>
           </p:cNvPr>
           <p:cNvCxnSpPr>
+            <a:cxnSpLocks/>
             <a:endCxn id="30" idx="1"/>
           </p:cNvCxnSpPr>
           <p:nvPr/>
         </p:nvCxnSpPr>
         <p:spPr>
           <a:xfrm rot="16200000" flipH="1">
-            <a:off x="3611123" y="2292863"/>
-            <a:ext cx="625579" cy="374003"/>
+            <a:off x="3537761" y="2186329"/>
+            <a:ext cx="625580" cy="374004"/>
           </a:xfrm>
           <a:prstGeom prst="bentConnector2">
             <a:avLst/>
@@ -6855,18 +7215,19 @@
             </a:extLst>
           </p:cNvPr>
           <p:cNvCxnSpPr>
+            <a:cxnSpLocks/>
             <a:endCxn id="29" idx="1"/>
           </p:cNvCxnSpPr>
           <p:nvPr/>
         </p:nvCxnSpPr>
         <p:spPr>
           <a:xfrm>
-            <a:off x="3736910" y="2167074"/>
+            <a:off x="3663549" y="2060540"/>
             <a:ext cx="374004" cy="240785"/>
           </a:xfrm>
           <a:prstGeom prst="bentConnector3">
             <a:avLst>
-              <a:gd name="adj1" fmla="val 104"/>
+              <a:gd name="adj1" fmla="val 152"/>
             </a:avLst>
           </a:prstGeom>
           <a:ln>
@@ -6902,8 +7263,8 @@
         </p:nvSpPr>
         <p:spPr>
           <a:xfrm>
-            <a:off x="2077621" y="3993092"/>
-            <a:ext cx="2310881" cy="291173"/>
+            <a:off x="4901321" y="3993092"/>
+            <a:ext cx="2464802" cy="291173"/>
           </a:xfrm>
           <a:prstGeom prst="roundRect">
             <a:avLst/>
@@ -6934,7 +7295,7 @@
             </a:r>
             <a:r>
               <a:rPr lang="en-US" dirty="0"/>
-              <a:t>&lt;</a:t>
+              <a:t>&lt; </a:t>
             </a:r>
             <a:r>
               <a:rPr lang="en-US" dirty="0" err="1"/>
@@ -6942,7 +7303,7 @@
             </a:r>
             <a:r>
               <a:rPr lang="en-US" dirty="0"/>
-              <a:t>&gt;</a:t>
+              <a:t> &gt;</a:t>
             </a:r>
           </a:p>
         </p:txBody>
@@ -6961,8 +7322,8 @@
         </p:nvSpPr>
         <p:spPr>
           <a:xfrm>
-            <a:off x="601344" y="5379773"/>
-            <a:ext cx="2272508" cy="890403"/>
+            <a:off x="6383940" y="5379773"/>
+            <a:ext cx="2391760" cy="1114648"/>
           </a:xfrm>
           <a:prstGeom prst="roundRect">
             <a:avLst>
@@ -6985,7 +7346,7 @@
           </a:fontRef>
         </p:style>
         <p:txBody>
-          <a:bodyPr rtlCol="0" anchor="ctr"/>
+          <a:bodyPr rtlCol="0" anchor="b"/>
           <a:lstStyle/>
           <a:p>
             <a:pPr marL="285750" indent="-216000">
@@ -6994,13 +7355,8 @@
             </a:pPr>
             <a:r>
               <a:rPr lang="en-US" sz="1400" dirty="0"/>
-              <a:t>Like </a:t>
-            </a:r>
-            <a:r>
-              <a:rPr lang="en-US" sz="1400" dirty="0" err="1"/>
-              <a:t>unique_ptr</a:t>
-            </a:r>
-            <a:endParaRPr lang="en-US" sz="1400" dirty="0"/>
+              <a:t>Common (templated) derivation of all users</a:t>
+            </a:r>
           </a:p>
           <a:p>
             <a:pPr marL="285750" indent="-216000">
@@ -7009,7 +7365,7 @@
             </a:pPr>
             <a:r>
               <a:rPr lang="en-US" sz="1400" dirty="0"/>
-              <a:t>Like lock guard</a:t>
+              <a:t>Acting like a unique lock guard</a:t>
             </a:r>
           </a:p>
         </p:txBody>
@@ -7028,8 +7384,8 @@
         </p:nvSpPr>
         <p:spPr>
           <a:xfrm>
-            <a:off x="423019" y="5194447"/>
-            <a:ext cx="2668044" cy="291173"/>
+            <a:off x="6205614" y="5194447"/>
+            <a:ext cx="2790711" cy="291173"/>
           </a:xfrm>
           <a:prstGeom prst="roundRect">
             <a:avLst/>
@@ -7060,13 +7416,16 @@
             </a:r>
             <a:r>
               <a:rPr lang="en-US" dirty="0"/>
-              <a:t>&lt;&gt; : </a:t>
+              <a:t>&lt; </a:t>
             </a:r>
             <a:r>
               <a:rPr lang="en-US" dirty="0" err="1"/>
               <a:t>tnAsset</a:t>
             </a:r>
-            <a:endParaRPr lang="en-US" dirty="0"/>
+            <a:r>
+              <a:rPr lang="en-US" dirty="0"/>
+              <a:t> &gt;</a:t>
+            </a:r>
           </a:p>
         </p:txBody>
       </p:sp>
@@ -7084,8 +7443,8 @@
         </p:nvSpPr>
         <p:spPr>
           <a:xfrm>
-            <a:off x="3555506" y="5381603"/>
-            <a:ext cx="2272508" cy="890403"/>
+            <a:off x="3371850" y="5379773"/>
+            <a:ext cx="2509494" cy="1114648"/>
           </a:xfrm>
           <a:prstGeom prst="roundRect">
             <a:avLst>
@@ -7117,13 +7476,8 @@
             </a:pPr>
             <a:r>
               <a:rPr lang="en-US" sz="1400" dirty="0"/>
-              <a:t>Like </a:t>
-            </a:r>
-            <a:r>
-              <a:rPr lang="en-US" sz="1400" dirty="0" err="1"/>
-              <a:t>shared_ptr</a:t>
-            </a:r>
-            <a:endParaRPr lang="en-US" sz="1400" dirty="0"/>
+              <a:t>Common (templated) derivation of all observers</a:t>
+            </a:r>
           </a:p>
           <a:p>
             <a:pPr marL="285750" indent="-216000">
@@ -7132,17 +7486,7 @@
             </a:pPr>
             <a:r>
               <a:rPr lang="en-US" sz="1400" dirty="0"/>
-              <a:t>Like lock guard</a:t>
-            </a:r>
-          </a:p>
-          <a:p>
-            <a:pPr marL="285750" indent="-216000">
-              <a:buFont typeface="Arial" panose="020B0604020202020204" pitchFamily="34" charset="0"/>
-              <a:buChar char="•"/>
-            </a:pPr>
-            <a:r>
-              <a:rPr lang="en-US" sz="1400" dirty="0"/>
-              <a:t>Always const</a:t>
+              <a:t>Acting like a shared lock guard</a:t>
             </a:r>
           </a:p>
         </p:txBody>
@@ -7161,8 +7505,8 @@
         </p:nvSpPr>
         <p:spPr>
           <a:xfrm>
-            <a:off x="3377181" y="5196277"/>
-            <a:ext cx="2668044" cy="291173"/>
+            <a:off x="3203194" y="5194447"/>
+            <a:ext cx="2856243" cy="291173"/>
           </a:xfrm>
           <a:prstGeom prst="roundRect">
             <a:avLst/>
@@ -7193,13 +7537,16 @@
             </a:r>
             <a:r>
               <a:rPr lang="en-US" dirty="0"/>
-              <a:t>&lt;&gt; : </a:t>
+              <a:t>&lt; </a:t>
             </a:r>
             <a:r>
               <a:rPr lang="en-US" dirty="0" err="1"/>
               <a:t>tnAsset</a:t>
             </a:r>
-            <a:endParaRPr lang="en-US" dirty="0"/>
+            <a:r>
+              <a:rPr lang="en-US" dirty="0"/>
+              <a:t> &gt;</a:t>
+            </a:r>
           </a:p>
         </p:txBody>
       </p:sp>
@@ -7220,7 +7567,7 @@
         </p:nvCxnSpPr>
         <p:spPr>
           <a:xfrm flipH="1">
-            <a:off x="2602017" y="4569740"/>
+            <a:off x="5502677" y="4569740"/>
             <a:ext cx="631044" cy="616038"/>
           </a:xfrm>
           <a:prstGeom prst="straightConnector1">
@@ -7264,7 +7611,7 @@
         </p:nvCxnSpPr>
         <p:spPr>
           <a:xfrm>
-            <a:off x="3233061" y="4569740"/>
+            <a:off x="6133721" y="4569740"/>
             <a:ext cx="631044" cy="624707"/>
           </a:xfrm>
           <a:prstGeom prst="straightConnector1">
@@ -7305,7 +7652,7 @@
         </p:nvSpPr>
         <p:spPr>
           <a:xfrm>
-            <a:off x="3739548" y="4679880"/>
+            <a:off x="4634206" y="4688448"/>
             <a:ext cx="987487" cy="291173"/>
           </a:xfrm>
           <a:prstGeom prst="roundRect">
@@ -7352,7 +7699,7 @@
         </p:nvSpPr>
         <p:spPr>
           <a:xfrm>
-            <a:off x="2074712" y="4679779"/>
+            <a:off x="6647986" y="4688448"/>
             <a:ext cx="641728" cy="291173"/>
           </a:xfrm>
           <a:prstGeom prst="roundRect">
@@ -7385,24 +7732,213 @@
           </a:p>
         </p:txBody>
       </p:sp>
+      <p:sp>
+        <p:nvSpPr>
+          <p:cNvPr id="13" name="Rectangle: Rounded Corners 28">
+            <a:extLst>
+              <a:ext uri="{FF2B5EF4-FFF2-40B4-BE49-F238E27FC236}">
+                <a16:creationId xmlns:a16="http://schemas.microsoft.com/office/drawing/2014/main" id="{0896CC2F-843C-0E59-F288-040DB1E9FA70}"/>
+              </a:ext>
+            </a:extLst>
+          </p:cNvPr>
+          <p:cNvSpPr/>
+          <p:nvPr/>
+        </p:nvSpPr>
+        <p:spPr>
+          <a:xfrm>
+            <a:off x="6359316" y="2155738"/>
+            <a:ext cx="1846864" cy="291173"/>
+          </a:xfrm>
+          <a:prstGeom prst="roundRect">
+            <a:avLst/>
+          </a:prstGeom>
+        </p:spPr>
+        <p:style>
+          <a:lnRef idx="0">
+            <a:schemeClr val="accent1"/>
+          </a:lnRef>
+          <a:fillRef idx="3">
+            <a:schemeClr val="accent1"/>
+          </a:fillRef>
+          <a:effectRef idx="3">
+            <a:schemeClr val="accent1"/>
+          </a:effectRef>
+          <a:fontRef idx="minor">
+            <a:schemeClr val="lt1"/>
+          </a:fontRef>
+        </p:style>
+        <p:txBody>
+          <a:bodyPr rtlCol="0" anchor="ctr"/>
+          <a:lstStyle/>
+          <a:p>
+            <a:r>
+              <a:rPr lang="en-US" dirty="0" err="1"/>
+              <a:t>TextureUser</a:t>
+            </a:r>
+            <a:endParaRPr lang="en-US" dirty="0"/>
+          </a:p>
+        </p:txBody>
+      </p:sp>
+      <p:sp>
+        <p:nvSpPr>
+          <p:cNvPr id="14" name="Rectangle: Rounded Corners 29">
+            <a:extLst>
+              <a:ext uri="{FF2B5EF4-FFF2-40B4-BE49-F238E27FC236}">
+                <a16:creationId xmlns:a16="http://schemas.microsoft.com/office/drawing/2014/main" id="{4840085D-FFDE-E329-56F6-30F9E9CF84B2}"/>
+              </a:ext>
+            </a:extLst>
+          </p:cNvPr>
+          <p:cNvSpPr/>
+          <p:nvPr/>
+        </p:nvSpPr>
+        <p:spPr>
+          <a:xfrm>
+            <a:off x="6359316" y="2540534"/>
+            <a:ext cx="1846864" cy="291173"/>
+          </a:xfrm>
+          <a:prstGeom prst="roundRect">
+            <a:avLst/>
+          </a:prstGeom>
+        </p:spPr>
+        <p:style>
+          <a:lnRef idx="0">
+            <a:schemeClr val="accent1"/>
+          </a:lnRef>
+          <a:fillRef idx="3">
+            <a:schemeClr val="accent1"/>
+          </a:fillRef>
+          <a:effectRef idx="3">
+            <a:schemeClr val="accent1"/>
+          </a:effectRef>
+          <a:fontRef idx="minor">
+            <a:schemeClr val="lt1"/>
+          </a:fontRef>
+        </p:style>
+        <p:txBody>
+          <a:bodyPr rtlCol="0" anchor="ctr"/>
+          <a:lstStyle/>
+          <a:p>
+            <a:r>
+              <a:rPr lang="en-US" dirty="0" err="1"/>
+              <a:t>ShaderUser</a:t>
+            </a:r>
+            <a:endParaRPr lang="en-US" dirty="0"/>
+          </a:p>
+        </p:txBody>
+      </p:sp>
+      <p:sp>
+        <p:nvSpPr>
+          <p:cNvPr id="16" name="Rectangle: Rounded Corners 30">
+            <a:extLst>
+              <a:ext uri="{FF2B5EF4-FFF2-40B4-BE49-F238E27FC236}">
+                <a16:creationId xmlns:a16="http://schemas.microsoft.com/office/drawing/2014/main" id="{AC2AC64B-3BDA-A2AE-3384-2B457D81E504}"/>
+              </a:ext>
+            </a:extLst>
+          </p:cNvPr>
+          <p:cNvSpPr/>
+          <p:nvPr/>
+        </p:nvSpPr>
+        <p:spPr>
+          <a:xfrm>
+            <a:off x="6359316" y="2925330"/>
+            <a:ext cx="1846864" cy="291173"/>
+          </a:xfrm>
+          <a:prstGeom prst="roundRect">
+            <a:avLst/>
+          </a:prstGeom>
+        </p:spPr>
+        <p:style>
+          <a:lnRef idx="0">
+            <a:schemeClr val="accent1"/>
+          </a:lnRef>
+          <a:fillRef idx="3">
+            <a:schemeClr val="accent1"/>
+          </a:fillRef>
+          <a:effectRef idx="3">
+            <a:schemeClr val="accent1"/>
+          </a:effectRef>
+          <a:fontRef idx="minor">
+            <a:schemeClr val="lt1"/>
+          </a:fontRef>
+        </p:style>
+        <p:txBody>
+          <a:bodyPr rtlCol="0" anchor="ctr"/>
+          <a:lstStyle/>
+          <a:p>
+            <a:r>
+              <a:rPr lang="en-US" dirty="0" err="1"/>
+              <a:t>MaterialUser</a:t>
+            </a:r>
+            <a:endParaRPr lang="en-US" dirty="0"/>
+          </a:p>
+        </p:txBody>
+      </p:sp>
+      <p:sp>
+        <p:nvSpPr>
+          <p:cNvPr id="17" name="Rectangle: Rounded Corners 31">
+            <a:extLst>
+              <a:ext uri="{FF2B5EF4-FFF2-40B4-BE49-F238E27FC236}">
+                <a16:creationId xmlns:a16="http://schemas.microsoft.com/office/drawing/2014/main" id="{B1E38D9D-25A5-1EAB-1193-0981584CD309}"/>
+              </a:ext>
+            </a:extLst>
+          </p:cNvPr>
+          <p:cNvSpPr/>
+          <p:nvPr/>
+        </p:nvSpPr>
+        <p:spPr>
+          <a:xfrm>
+            <a:off x="6359316" y="3310126"/>
+            <a:ext cx="1846864" cy="291173"/>
+          </a:xfrm>
+          <a:prstGeom prst="roundRect">
+            <a:avLst/>
+          </a:prstGeom>
+        </p:spPr>
+        <p:style>
+          <a:lnRef idx="0">
+            <a:schemeClr val="accent1"/>
+          </a:lnRef>
+          <a:fillRef idx="3">
+            <a:schemeClr val="accent1"/>
+          </a:fillRef>
+          <a:effectRef idx="3">
+            <a:schemeClr val="accent1"/>
+          </a:effectRef>
+          <a:fontRef idx="minor">
+            <a:schemeClr val="lt1"/>
+          </a:fontRef>
+        </p:style>
+        <p:txBody>
+          <a:bodyPr rtlCol="0" anchor="ctr"/>
+          <a:lstStyle/>
+          <a:p>
+            <a:r>
+              <a:rPr lang="en-US" dirty="0" err="1"/>
+              <a:t>AudioUser</a:t>
+            </a:r>
+            <a:endParaRPr lang="en-US" dirty="0"/>
+          </a:p>
+        </p:txBody>
+      </p:sp>
       <p:cxnSp>
         <p:nvCxnSpPr>
-          <p:cNvPr id="52" name="Straight Arrow Connector 51">
-            <a:extLst>
-              <a:ext uri="{FF2B5EF4-FFF2-40B4-BE49-F238E27FC236}">
-                <a16:creationId xmlns:a16="http://schemas.microsoft.com/office/drawing/2014/main" id="{A99E177F-E1DD-DFA3-27B9-C9851D0BB2FD}"/>
+          <p:cNvPr id="19" name="Łącznik prosty ze strzałką 18">
+            <a:extLst>
+              <a:ext uri="{FF2B5EF4-FFF2-40B4-BE49-F238E27FC236}">
+                <a16:creationId xmlns:a16="http://schemas.microsoft.com/office/drawing/2014/main" id="{F6749D9A-BB9C-69AD-FE8F-C9B62FBCBE02}"/>
               </a:ext>
             </a:extLst>
           </p:cNvPr>
           <p:cNvCxnSpPr>
-            <a:cxnSpLocks/>
+            <a:stCxn id="29" idx="3"/>
+            <a:endCxn id="13" idx="1"/>
           </p:cNvCxnSpPr>
           <p:nvPr/>
         </p:nvCxnSpPr>
         <p:spPr>
           <a:xfrm>
-            <a:off x="5413849" y="3812401"/>
-            <a:ext cx="0" cy="1382046"/>
+            <a:off x="5884417" y="2301325"/>
+            <a:ext cx="474899" cy="0"/>
           </a:xfrm>
           <a:prstGeom prst="straightConnector1">
             <a:avLst/>
@@ -7428,22 +7964,23 @@
       </p:cxnSp>
       <p:cxnSp>
         <p:nvCxnSpPr>
-          <p:cNvPr id="53" name="Straight Arrow Connector 52">
-            <a:extLst>
-              <a:ext uri="{FF2B5EF4-FFF2-40B4-BE49-F238E27FC236}">
-                <a16:creationId xmlns:a16="http://schemas.microsoft.com/office/drawing/2014/main" id="{352011AB-C22B-7C34-E7C8-7EB78FCBCE6D}"/>
+          <p:cNvPr id="28" name="Łącznik prosty ze strzałką 27">
+            <a:extLst>
+              <a:ext uri="{FF2B5EF4-FFF2-40B4-BE49-F238E27FC236}">
+                <a16:creationId xmlns:a16="http://schemas.microsoft.com/office/drawing/2014/main" id="{61B5217A-FF17-A3F2-2FC0-E3E534D02189}"/>
               </a:ext>
             </a:extLst>
           </p:cNvPr>
           <p:cNvCxnSpPr>
-            <a:cxnSpLocks/>
+            <a:stCxn id="30" idx="3"/>
+            <a:endCxn id="14" idx="1"/>
           </p:cNvCxnSpPr>
           <p:nvPr/>
         </p:nvCxnSpPr>
         <p:spPr>
-          <a:xfrm flipH="1">
-            <a:off x="1150135" y="3812401"/>
-            <a:ext cx="25404" cy="1382046"/>
+          <a:xfrm>
+            <a:off x="5884417" y="2686121"/>
+            <a:ext cx="474899" cy="0"/>
           </a:xfrm>
           <a:prstGeom prst="straightConnector1">
             <a:avLst/>
@@ -7467,12 +8004,96 @@
           </a:fontRef>
         </p:style>
       </p:cxnSp>
-      <p:sp>
-        <p:nvSpPr>
-          <p:cNvPr id="7" name="Rectangle: Rounded Corners 3">
-            <a:extLst>
-              <a:ext uri="{FF2B5EF4-FFF2-40B4-BE49-F238E27FC236}">
-                <a16:creationId xmlns:a16="http://schemas.microsoft.com/office/drawing/2014/main" id="{2AC0048E-D772-5FE3-D7BA-FDBAF51C3A99}"/>
+      <p:cxnSp>
+        <p:nvCxnSpPr>
+          <p:cNvPr id="37" name="Łącznik prosty ze strzałką 36">
+            <a:extLst>
+              <a:ext uri="{FF2B5EF4-FFF2-40B4-BE49-F238E27FC236}">
+                <a16:creationId xmlns:a16="http://schemas.microsoft.com/office/drawing/2014/main" id="{D80D36D1-1DFA-487F-298F-053B0BBE9EEA}"/>
+              </a:ext>
+            </a:extLst>
+          </p:cNvPr>
+          <p:cNvCxnSpPr>
+            <a:stCxn id="31" idx="3"/>
+            <a:endCxn id="16" idx="1"/>
+          </p:cNvCxnSpPr>
+          <p:nvPr/>
+        </p:nvCxnSpPr>
+        <p:spPr>
+          <a:xfrm>
+            <a:off x="5884417" y="3070917"/>
+            <a:ext cx="474899" cy="0"/>
+          </a:xfrm>
+          <a:prstGeom prst="straightConnector1">
+            <a:avLst/>
+          </a:prstGeom>
+          <a:ln>
+            <a:tailEnd type="triangle"/>
+          </a:ln>
+        </p:spPr>
+        <p:style>
+          <a:lnRef idx="3">
+            <a:schemeClr val="accent1"/>
+          </a:lnRef>
+          <a:fillRef idx="0">
+            <a:schemeClr val="accent1"/>
+          </a:fillRef>
+          <a:effectRef idx="2">
+            <a:schemeClr val="accent1"/>
+          </a:effectRef>
+          <a:fontRef idx="minor">
+            <a:schemeClr val="tx1"/>
+          </a:fontRef>
+        </p:style>
+      </p:cxnSp>
+      <p:cxnSp>
+        <p:nvCxnSpPr>
+          <p:cNvPr id="42" name="Łącznik prosty ze strzałką 41">
+            <a:extLst>
+              <a:ext uri="{FF2B5EF4-FFF2-40B4-BE49-F238E27FC236}">
+                <a16:creationId xmlns:a16="http://schemas.microsoft.com/office/drawing/2014/main" id="{23EFA2F2-C238-92D0-0045-E0178B4F4989}"/>
+              </a:ext>
+            </a:extLst>
+          </p:cNvPr>
+          <p:cNvCxnSpPr>
+            <a:stCxn id="32" idx="3"/>
+            <a:endCxn id="17" idx="1"/>
+          </p:cNvCxnSpPr>
+          <p:nvPr/>
+        </p:nvCxnSpPr>
+        <p:spPr>
+          <a:xfrm>
+            <a:off x="5884417" y="3455713"/>
+            <a:ext cx="474899" cy="0"/>
+          </a:xfrm>
+          <a:prstGeom prst="straightConnector1">
+            <a:avLst/>
+          </a:prstGeom>
+          <a:ln>
+            <a:tailEnd type="triangle"/>
+          </a:ln>
+        </p:spPr>
+        <p:style>
+          <a:lnRef idx="3">
+            <a:schemeClr val="accent1"/>
+          </a:lnRef>
+          <a:fillRef idx="0">
+            <a:schemeClr val="accent1"/>
+          </a:fillRef>
+          <a:effectRef idx="2">
+            <a:schemeClr val="accent1"/>
+          </a:effectRef>
+          <a:fontRef idx="minor">
+            <a:schemeClr val="tx1"/>
+          </a:fontRef>
+        </p:style>
+      </p:cxnSp>
+      <p:sp>
+        <p:nvSpPr>
+          <p:cNvPr id="76" name="Rectangle: Rounded Corners 25">
+            <a:extLst>
+              <a:ext uri="{FF2B5EF4-FFF2-40B4-BE49-F238E27FC236}">
+                <a16:creationId xmlns:a16="http://schemas.microsoft.com/office/drawing/2014/main" id="{86D5CA39-305F-1B73-C391-3C5BD1BF811B}"/>
               </a:ext>
             </a:extLst>
           </p:cNvPr>
@@ -7481,8 +8102,60 @@
         </p:nvSpPr>
         <p:spPr>
           <a:xfrm>
-            <a:off x="7613393" y="415174"/>
-            <a:ext cx="2712098" cy="582346"/>
+            <a:off x="8996326" y="2228293"/>
+            <a:ext cx="2806535" cy="2277995"/>
+          </a:xfrm>
+          <a:prstGeom prst="roundRect">
+            <a:avLst>
+              <a:gd name="adj" fmla="val 7245"/>
+            </a:avLst>
+          </a:prstGeom>
+        </p:spPr>
+        <p:style>
+          <a:lnRef idx="1">
+            <a:schemeClr val="accent1"/>
+          </a:lnRef>
+          <a:fillRef idx="2">
+            <a:schemeClr val="accent1"/>
+          </a:fillRef>
+          <a:effectRef idx="1">
+            <a:schemeClr val="accent1"/>
+          </a:effectRef>
+          <a:fontRef idx="minor">
+            <a:schemeClr val="dk1"/>
+          </a:fontRef>
+        </p:style>
+        <p:txBody>
+          <a:bodyPr rtlCol="0" anchor="ctr"/>
+          <a:lstStyle/>
+          <a:p>
+            <a:pPr marL="285750" indent="-216000">
+              <a:buFont typeface="Arial" panose="020B0604020202020204" pitchFamily="34" charset="0"/>
+              <a:buChar char="•"/>
+            </a:pPr>
+            <a:r>
+              <a:rPr lang="en-US" sz="1400" dirty="0"/>
+              <a:t>Extends Observer adding methods modifying an Asset</a:t>
+            </a:r>
+          </a:p>
+        </p:txBody>
+      </p:sp>
+      <p:sp>
+        <p:nvSpPr>
+          <p:cNvPr id="77" name="Rectangle: Rounded Corners 24">
+            <a:extLst>
+              <a:ext uri="{FF2B5EF4-FFF2-40B4-BE49-F238E27FC236}">
+                <a16:creationId xmlns:a16="http://schemas.microsoft.com/office/drawing/2014/main" id="{2C67E1BD-3604-E857-D9D4-04E029E2D43A}"/>
+              </a:ext>
+            </a:extLst>
+          </p:cNvPr>
+          <p:cNvSpPr/>
+          <p:nvPr/>
+        </p:nvSpPr>
+        <p:spPr>
+          <a:xfrm>
+            <a:off x="918846" y="2060540"/>
+            <a:ext cx="1669942" cy="291173"/>
           </a:xfrm>
           <a:prstGeom prst="roundRect">
             <a:avLst/>
@@ -7509,6 +8182,651 @@
             <a:pPr algn="ctr"/>
             <a:r>
               <a:rPr lang="en-US" dirty="0"/>
+              <a:t>Observer</a:t>
+            </a:r>
+          </a:p>
+        </p:txBody>
+      </p:sp>
+      <p:sp>
+        <p:nvSpPr>
+          <p:cNvPr id="78" name="Rectangle: Rounded Corners 24">
+            <a:extLst>
+              <a:ext uri="{FF2B5EF4-FFF2-40B4-BE49-F238E27FC236}">
+                <a16:creationId xmlns:a16="http://schemas.microsoft.com/office/drawing/2014/main" id="{2DAC3360-27C2-5575-730D-27956685787F}"/>
+              </a:ext>
+            </a:extLst>
+          </p:cNvPr>
+          <p:cNvSpPr/>
+          <p:nvPr/>
+        </p:nvSpPr>
+        <p:spPr>
+          <a:xfrm>
+            <a:off x="9564622" y="2035345"/>
+            <a:ext cx="1669942" cy="291173"/>
+          </a:xfrm>
+          <a:prstGeom prst="roundRect">
+            <a:avLst/>
+          </a:prstGeom>
+        </p:spPr>
+        <p:style>
+          <a:lnRef idx="0">
+            <a:schemeClr val="accent1"/>
+          </a:lnRef>
+          <a:fillRef idx="3">
+            <a:schemeClr val="accent1"/>
+          </a:fillRef>
+          <a:effectRef idx="3">
+            <a:schemeClr val="accent1"/>
+          </a:effectRef>
+          <a:fontRef idx="minor">
+            <a:schemeClr val="lt1"/>
+          </a:fontRef>
+        </p:style>
+        <p:txBody>
+          <a:bodyPr rtlCol="0" anchor="ctr"/>
+          <a:lstStyle/>
+          <a:p>
+            <a:pPr algn="ctr"/>
+            <a:r>
+              <a:rPr lang="en-US" dirty="0"/>
+              <a:t>User</a:t>
+            </a:r>
+          </a:p>
+        </p:txBody>
+      </p:sp>
+    </p:spTree>
+    <p:extLst>
+      <p:ext uri="{BB962C8B-B14F-4D97-AF65-F5344CB8AC3E}">
+        <p14:creationId xmlns:p14="http://schemas.microsoft.com/office/powerpoint/2010/main" val="21460416"/>
+      </p:ext>
+    </p:extLst>
+  </p:cSld>
+  <p:clrMapOvr>
+    <a:masterClrMapping/>
+  </p:clrMapOvr>
+</p:sld>
+</file>
+
+<file path=ppt/slides/slide5.xml><?xml version="1.0" encoding="utf-8"?>
+<p:sld xmlns:a="http://schemas.openxmlformats.org/drawingml/2006/main" xmlns:r="http://schemas.openxmlformats.org/officeDocument/2006/relationships" xmlns:p="http://schemas.openxmlformats.org/presentationml/2006/main">
+  <p:cSld>
+    <p:spTree>
+      <p:nvGrpSpPr>
+        <p:cNvPr id="1" name="">
+          <a:extLst>
+            <a:ext uri="{FF2B5EF4-FFF2-40B4-BE49-F238E27FC236}">
+              <a16:creationId xmlns:a16="http://schemas.microsoft.com/office/drawing/2014/main" id="{351CFD3B-E715-9A28-0B3A-269C4D8BF0DE}"/>
+            </a:ext>
+          </a:extLst>
+        </p:cNvPr>
+        <p:cNvGrpSpPr/>
+        <p:nvPr/>
+      </p:nvGrpSpPr>
+      <p:grpSpPr>
+        <a:xfrm>
+          <a:off x="0" y="0"/>
+          <a:ext cx="0" cy="0"/>
+          <a:chOff x="0" y="0"/>
+          <a:chExt cx="0" cy="0"/>
+        </a:xfrm>
+      </p:grpSpPr>
+      <p:sp>
+        <p:nvSpPr>
+          <p:cNvPr id="49" name="Rectangle: Rounded Corners 48">
+            <a:extLst>
+              <a:ext uri="{FF2B5EF4-FFF2-40B4-BE49-F238E27FC236}">
+                <a16:creationId xmlns:a16="http://schemas.microsoft.com/office/drawing/2014/main" id="{C90EF193-3B60-0144-7139-C03A4D6A6332}"/>
+              </a:ext>
+            </a:extLst>
+          </p:cNvPr>
+          <p:cNvSpPr/>
+          <p:nvPr/>
+        </p:nvSpPr>
+        <p:spPr>
+          <a:xfrm>
+            <a:off x="7750394" y="1067061"/>
+            <a:ext cx="2712098" cy="403767"/>
+          </a:xfrm>
+          <a:prstGeom prst="roundRect">
+            <a:avLst>
+              <a:gd name="adj" fmla="val 12160"/>
+            </a:avLst>
+          </a:prstGeom>
+        </p:spPr>
+        <p:style>
+          <a:lnRef idx="1">
+            <a:schemeClr val="accent1"/>
+          </a:lnRef>
+          <a:fillRef idx="2">
+            <a:schemeClr val="accent1"/>
+          </a:fillRef>
+          <a:effectRef idx="1">
+            <a:schemeClr val="accent1"/>
+          </a:effectRef>
+          <a:fontRef idx="minor">
+            <a:schemeClr val="dk1"/>
+          </a:fontRef>
+        </p:style>
+        <p:txBody>
+          <a:bodyPr rtlCol="0" anchor="b"/>
+          <a:lstStyle/>
+          <a:p>
+            <a:pPr marL="69750" algn="ctr"/>
+            <a:r>
+              <a:rPr lang="en-US" sz="1400" dirty="0" err="1"/>
+              <a:t>AssetID</a:t>
+            </a:r>
+            <a:r>
+              <a:rPr lang="en-US" sz="1400" dirty="0"/>
+              <a:t> + </a:t>
+            </a:r>
+            <a:r>
+              <a:rPr lang="en-US" sz="1400" dirty="0" err="1"/>
+              <a:t>AssetLoadingPriority</a:t>
+            </a:r>
+            <a:endParaRPr lang="en-US" sz="1400" dirty="0"/>
+          </a:p>
+        </p:txBody>
+      </p:sp>
+      <p:sp>
+        <p:nvSpPr>
+          <p:cNvPr id="48" name="Rectangle: Rounded Corners 47">
+            <a:extLst>
+              <a:ext uri="{FF2B5EF4-FFF2-40B4-BE49-F238E27FC236}">
+                <a16:creationId xmlns:a16="http://schemas.microsoft.com/office/drawing/2014/main" id="{BB6E1BE3-B0F0-1E2D-0D47-3B40084323D3}"/>
+              </a:ext>
+            </a:extLst>
+          </p:cNvPr>
+          <p:cNvSpPr/>
+          <p:nvPr/>
+        </p:nvSpPr>
+        <p:spPr>
+          <a:xfrm>
+            <a:off x="7887787" y="894180"/>
+            <a:ext cx="2437314" cy="291173"/>
+          </a:xfrm>
+          <a:prstGeom prst="roundRect">
+            <a:avLst/>
+          </a:prstGeom>
+        </p:spPr>
+        <p:style>
+          <a:lnRef idx="0">
+            <a:schemeClr val="accent1"/>
+          </a:lnRef>
+          <a:fillRef idx="3">
+            <a:schemeClr val="accent1"/>
+          </a:fillRef>
+          <a:effectRef idx="3">
+            <a:schemeClr val="accent1"/>
+          </a:effectRef>
+          <a:fontRef idx="minor">
+            <a:schemeClr val="lt1"/>
+          </a:fontRef>
+        </p:style>
+        <p:txBody>
+          <a:bodyPr rtlCol="0" anchor="ctr"/>
+          <a:lstStyle/>
+          <a:p>
+            <a:pPr algn="ctr"/>
+            <a:r>
+              <a:rPr lang="en-US" dirty="0" err="1"/>
+              <a:t>AssetHandle</a:t>
+            </a:r>
+            <a:r>
+              <a:rPr lang="en-US" dirty="0"/>
+              <a:t>&lt; </a:t>
+            </a:r>
+            <a:r>
+              <a:rPr lang="en-US" dirty="0" err="1"/>
+              <a:t>tnAsset</a:t>
+            </a:r>
+            <a:r>
+              <a:rPr lang="en-US" dirty="0"/>
+              <a:t> &gt;</a:t>
+            </a:r>
+          </a:p>
+        </p:txBody>
+      </p:sp>
+      <p:sp>
+        <p:nvSpPr>
+          <p:cNvPr id="3" name="Rectangle: Rounded Corners 2">
+            <a:extLst>
+              <a:ext uri="{FF2B5EF4-FFF2-40B4-BE49-F238E27FC236}">
+                <a16:creationId xmlns:a16="http://schemas.microsoft.com/office/drawing/2014/main" id="{B4409D1D-162C-0453-9D8C-6E62DD5C9B56}"/>
+              </a:ext>
+            </a:extLst>
+          </p:cNvPr>
+          <p:cNvSpPr/>
+          <p:nvPr/>
+        </p:nvSpPr>
+        <p:spPr>
+          <a:xfrm>
+            <a:off x="9356662" y="2280861"/>
+            <a:ext cx="2272508" cy="659189"/>
+          </a:xfrm>
+          <a:prstGeom prst="roundRect">
+            <a:avLst>
+              <a:gd name="adj" fmla="val 12160"/>
+            </a:avLst>
+          </a:prstGeom>
+        </p:spPr>
+        <p:style>
+          <a:lnRef idx="1">
+            <a:schemeClr val="accent1"/>
+          </a:lnRef>
+          <a:fillRef idx="2">
+            <a:schemeClr val="accent1"/>
+          </a:fillRef>
+          <a:effectRef idx="1">
+            <a:schemeClr val="accent1"/>
+          </a:effectRef>
+          <a:fontRef idx="minor">
+            <a:schemeClr val="dk1"/>
+          </a:fontRef>
+        </p:style>
+        <p:txBody>
+          <a:bodyPr rtlCol="0" anchor="b"/>
+          <a:lstStyle/>
+          <a:p>
+            <a:pPr marL="69750" algn="ctr"/>
+            <a:r>
+              <a:rPr lang="en-US" sz="1400" dirty="0"/>
+              <a:t>Acting like a unique lock guard</a:t>
+            </a:r>
+          </a:p>
+        </p:txBody>
+      </p:sp>
+      <p:sp>
+        <p:nvSpPr>
+          <p:cNvPr id="12" name="Rectangle: Rounded Corners 11">
+            <a:extLst>
+              <a:ext uri="{FF2B5EF4-FFF2-40B4-BE49-F238E27FC236}">
+                <a16:creationId xmlns:a16="http://schemas.microsoft.com/office/drawing/2014/main" id="{AB5E67B0-0507-9DF8-925C-CAADBC511F41}"/>
+              </a:ext>
+            </a:extLst>
+          </p:cNvPr>
+          <p:cNvSpPr/>
+          <p:nvPr/>
+        </p:nvSpPr>
+        <p:spPr>
+          <a:xfrm>
+            <a:off x="9178337" y="2095535"/>
+            <a:ext cx="2668044" cy="291173"/>
+          </a:xfrm>
+          <a:prstGeom prst="roundRect">
+            <a:avLst/>
+          </a:prstGeom>
+        </p:spPr>
+        <p:style>
+          <a:lnRef idx="0">
+            <a:schemeClr val="accent1"/>
+          </a:lnRef>
+          <a:fillRef idx="3">
+            <a:schemeClr val="accent1"/>
+          </a:fillRef>
+          <a:effectRef idx="3">
+            <a:schemeClr val="accent1"/>
+          </a:effectRef>
+          <a:fontRef idx="minor">
+            <a:schemeClr val="lt1"/>
+          </a:fontRef>
+        </p:style>
+        <p:txBody>
+          <a:bodyPr rtlCol="0" anchor="ctr"/>
+          <a:lstStyle/>
+          <a:p>
+            <a:pPr algn="ctr"/>
+            <a:r>
+              <a:rPr lang="en-US" dirty="0" err="1"/>
+              <a:t>AssetUser</a:t>
+            </a:r>
+            <a:r>
+              <a:rPr lang="en-US" dirty="0"/>
+              <a:t>&lt; </a:t>
+            </a:r>
+            <a:r>
+              <a:rPr lang="en-US" dirty="0" err="1"/>
+              <a:t>tnAsset</a:t>
+            </a:r>
+            <a:r>
+              <a:rPr lang="en-US" dirty="0"/>
+              <a:t> &gt;</a:t>
+            </a:r>
+          </a:p>
+        </p:txBody>
+      </p:sp>
+      <p:sp>
+        <p:nvSpPr>
+          <p:cNvPr id="15" name="Rectangle: Rounded Corners 14">
+            <a:extLst>
+              <a:ext uri="{FF2B5EF4-FFF2-40B4-BE49-F238E27FC236}">
+                <a16:creationId xmlns:a16="http://schemas.microsoft.com/office/drawing/2014/main" id="{44633F3C-AB34-9C61-3961-F9E42249B95A}"/>
+              </a:ext>
+            </a:extLst>
+          </p:cNvPr>
+          <p:cNvSpPr/>
+          <p:nvPr/>
+        </p:nvSpPr>
+        <p:spPr>
+          <a:xfrm>
+            <a:off x="6542440" y="2280861"/>
+            <a:ext cx="2272508" cy="659189"/>
+          </a:xfrm>
+          <a:prstGeom prst="roundRect">
+            <a:avLst>
+              <a:gd name="adj" fmla="val 12160"/>
+            </a:avLst>
+          </a:prstGeom>
+        </p:spPr>
+        <p:style>
+          <a:lnRef idx="1">
+            <a:schemeClr val="accent1"/>
+          </a:lnRef>
+          <a:fillRef idx="2">
+            <a:schemeClr val="accent1"/>
+          </a:fillRef>
+          <a:effectRef idx="1">
+            <a:schemeClr val="accent1"/>
+          </a:effectRef>
+          <a:fontRef idx="minor">
+            <a:schemeClr val="dk1"/>
+          </a:fontRef>
+        </p:style>
+        <p:txBody>
+          <a:bodyPr rtlCol="0" anchor="b"/>
+          <a:lstStyle/>
+          <a:p>
+            <a:pPr marL="69750" algn="ctr"/>
+            <a:r>
+              <a:rPr lang="en-US" sz="1400" dirty="0"/>
+              <a:t>Acting like a shared lock guard</a:t>
+            </a:r>
+          </a:p>
+        </p:txBody>
+      </p:sp>
+      <p:sp>
+        <p:nvSpPr>
+          <p:cNvPr id="27" name="Rectangle: Rounded Corners 26">
+            <a:extLst>
+              <a:ext uri="{FF2B5EF4-FFF2-40B4-BE49-F238E27FC236}">
+                <a16:creationId xmlns:a16="http://schemas.microsoft.com/office/drawing/2014/main" id="{F1496BFC-596A-3840-58AD-FCE4E0863FF6}"/>
+              </a:ext>
+            </a:extLst>
+          </p:cNvPr>
+          <p:cNvSpPr/>
+          <p:nvPr/>
+        </p:nvSpPr>
+        <p:spPr>
+          <a:xfrm>
+            <a:off x="6364115" y="2095535"/>
+            <a:ext cx="2668044" cy="291173"/>
+          </a:xfrm>
+          <a:prstGeom prst="roundRect">
+            <a:avLst/>
+          </a:prstGeom>
+        </p:spPr>
+        <p:style>
+          <a:lnRef idx="0">
+            <a:schemeClr val="accent1"/>
+          </a:lnRef>
+          <a:fillRef idx="3">
+            <a:schemeClr val="accent1"/>
+          </a:fillRef>
+          <a:effectRef idx="3">
+            <a:schemeClr val="accent1"/>
+          </a:effectRef>
+          <a:fontRef idx="minor">
+            <a:schemeClr val="lt1"/>
+          </a:fontRef>
+        </p:style>
+        <p:txBody>
+          <a:bodyPr rtlCol="0" anchor="ctr"/>
+          <a:lstStyle/>
+          <a:p>
+            <a:pPr algn="ctr"/>
+            <a:r>
+              <a:rPr lang="en-US" dirty="0" err="1"/>
+              <a:t>AssetObserver</a:t>
+            </a:r>
+            <a:r>
+              <a:rPr lang="en-US" dirty="0"/>
+              <a:t>&lt; </a:t>
+            </a:r>
+            <a:r>
+              <a:rPr lang="en-US" dirty="0" err="1"/>
+              <a:t>tnAsset</a:t>
+            </a:r>
+            <a:r>
+              <a:rPr lang="en-US" dirty="0"/>
+              <a:t> &gt;</a:t>
+            </a:r>
+          </a:p>
+        </p:txBody>
+      </p:sp>
+      <p:cxnSp>
+        <p:nvCxnSpPr>
+          <p:cNvPr id="33" name="Straight Arrow Connector 32">
+            <a:extLst>
+              <a:ext uri="{FF2B5EF4-FFF2-40B4-BE49-F238E27FC236}">
+                <a16:creationId xmlns:a16="http://schemas.microsoft.com/office/drawing/2014/main" id="{33C77421-9C74-63FD-9BC5-9EA83A080BA6}"/>
+              </a:ext>
+            </a:extLst>
+          </p:cNvPr>
+          <p:cNvCxnSpPr>
+            <a:cxnSpLocks/>
+            <a:stCxn id="49" idx="2"/>
+          </p:cNvCxnSpPr>
+          <p:nvPr/>
+        </p:nvCxnSpPr>
+        <p:spPr>
+          <a:xfrm flipH="1">
+            <a:off x="8475399" y="1470828"/>
+            <a:ext cx="631044" cy="616038"/>
+          </a:xfrm>
+          <a:prstGeom prst="straightConnector1">
+            <a:avLst/>
+          </a:prstGeom>
+          <a:ln>
+            <a:prstDash val="dash"/>
+            <a:headEnd type="none" w="med" len="med"/>
+            <a:tailEnd type="arrow" w="med" len="med"/>
+          </a:ln>
+        </p:spPr>
+        <p:style>
+          <a:lnRef idx="3">
+            <a:schemeClr val="accent1"/>
+          </a:lnRef>
+          <a:fillRef idx="0">
+            <a:schemeClr val="accent1"/>
+          </a:fillRef>
+          <a:effectRef idx="2">
+            <a:schemeClr val="accent1"/>
+          </a:effectRef>
+          <a:fontRef idx="minor">
+            <a:schemeClr val="tx1"/>
+          </a:fontRef>
+        </p:style>
+      </p:cxnSp>
+      <p:cxnSp>
+        <p:nvCxnSpPr>
+          <p:cNvPr id="35" name="Straight Arrow Connector 34">
+            <a:extLst>
+              <a:ext uri="{FF2B5EF4-FFF2-40B4-BE49-F238E27FC236}">
+                <a16:creationId xmlns:a16="http://schemas.microsoft.com/office/drawing/2014/main" id="{F3623534-411D-E25E-3503-C6D061B1320E}"/>
+              </a:ext>
+            </a:extLst>
+          </p:cNvPr>
+          <p:cNvCxnSpPr>
+            <a:cxnSpLocks/>
+            <a:stCxn id="49" idx="2"/>
+          </p:cNvCxnSpPr>
+          <p:nvPr/>
+        </p:nvCxnSpPr>
+        <p:spPr>
+          <a:xfrm>
+            <a:off x="9106443" y="1470828"/>
+            <a:ext cx="631044" cy="624707"/>
+          </a:xfrm>
+          <a:prstGeom prst="straightConnector1">
+            <a:avLst/>
+          </a:prstGeom>
+          <a:ln>
+            <a:prstDash val="dash"/>
+            <a:headEnd type="none" w="med" len="med"/>
+            <a:tailEnd type="arrow" w="med" len="med"/>
+          </a:ln>
+        </p:spPr>
+        <p:style>
+          <a:lnRef idx="3">
+            <a:schemeClr val="accent1"/>
+          </a:lnRef>
+          <a:fillRef idx="0">
+            <a:schemeClr val="accent1"/>
+          </a:fillRef>
+          <a:effectRef idx="2">
+            <a:schemeClr val="accent1"/>
+          </a:effectRef>
+          <a:fontRef idx="minor">
+            <a:schemeClr val="tx1"/>
+          </a:fontRef>
+        </p:style>
+      </p:cxnSp>
+      <p:sp>
+        <p:nvSpPr>
+          <p:cNvPr id="46" name="Rectangle: Rounded Corners 45">
+            <a:extLst>
+              <a:ext uri="{FF2B5EF4-FFF2-40B4-BE49-F238E27FC236}">
+                <a16:creationId xmlns:a16="http://schemas.microsoft.com/office/drawing/2014/main" id="{3BAA4C64-0BC4-A1AE-2D00-AEC38A76DBC4}"/>
+              </a:ext>
+            </a:extLst>
+          </p:cNvPr>
+          <p:cNvSpPr/>
+          <p:nvPr/>
+        </p:nvSpPr>
+        <p:spPr>
+          <a:xfrm>
+            <a:off x="7606928" y="1589536"/>
+            <a:ext cx="987487" cy="291173"/>
+          </a:xfrm>
+          <a:prstGeom prst="roundRect">
+            <a:avLst/>
+          </a:prstGeom>
+        </p:spPr>
+        <p:style>
+          <a:lnRef idx="1">
+            <a:schemeClr val="accent1"/>
+          </a:lnRef>
+          <a:fillRef idx="2">
+            <a:schemeClr val="accent1"/>
+          </a:fillRef>
+          <a:effectRef idx="1">
+            <a:schemeClr val="accent1"/>
+          </a:effectRef>
+          <a:fontRef idx="minor">
+            <a:schemeClr val="dk1"/>
+          </a:fontRef>
+        </p:style>
+        <p:txBody>
+          <a:bodyPr rtlCol="0" anchor="ctr"/>
+          <a:lstStyle/>
+          <a:p>
+            <a:pPr algn="ctr"/>
+            <a:r>
+              <a:rPr lang="en-US" sz="1400" dirty="0"/>
+              <a:t>.Observe()</a:t>
+            </a:r>
+          </a:p>
+        </p:txBody>
+      </p:sp>
+      <p:sp>
+        <p:nvSpPr>
+          <p:cNvPr id="47" name="Rectangle: Rounded Corners 46">
+            <a:extLst>
+              <a:ext uri="{FF2B5EF4-FFF2-40B4-BE49-F238E27FC236}">
+                <a16:creationId xmlns:a16="http://schemas.microsoft.com/office/drawing/2014/main" id="{EB7A9D6F-89DC-2474-3811-B5FCC4E02593}"/>
+              </a:ext>
+            </a:extLst>
+          </p:cNvPr>
+          <p:cNvSpPr/>
+          <p:nvPr/>
+        </p:nvSpPr>
+        <p:spPr>
+          <a:xfrm>
+            <a:off x="9620708" y="1589536"/>
+            <a:ext cx="641728" cy="291173"/>
+          </a:xfrm>
+          <a:prstGeom prst="roundRect">
+            <a:avLst/>
+          </a:prstGeom>
+        </p:spPr>
+        <p:style>
+          <a:lnRef idx="1">
+            <a:schemeClr val="accent1"/>
+          </a:lnRef>
+          <a:fillRef idx="2">
+            <a:schemeClr val="accent1"/>
+          </a:fillRef>
+          <a:effectRef idx="1">
+            <a:schemeClr val="accent1"/>
+          </a:effectRef>
+          <a:fontRef idx="minor">
+            <a:schemeClr val="dk1"/>
+          </a:fontRef>
+        </p:style>
+        <p:txBody>
+          <a:bodyPr rtlCol="0" anchor="ctr"/>
+          <a:lstStyle/>
+          <a:p>
+            <a:pPr algn="ctr"/>
+            <a:r>
+              <a:rPr lang="en-US" sz="1400" dirty="0"/>
+              <a:t>.Use()</a:t>
+            </a:r>
+          </a:p>
+        </p:txBody>
+      </p:sp>
+      <p:sp>
+        <p:nvSpPr>
+          <p:cNvPr id="7" name="Rectangle: Rounded Corners 3">
+            <a:extLst>
+              <a:ext uri="{FF2B5EF4-FFF2-40B4-BE49-F238E27FC236}">
+                <a16:creationId xmlns:a16="http://schemas.microsoft.com/office/drawing/2014/main" id="{67F84B00-962E-DE15-4464-21748DEC7603}"/>
+              </a:ext>
+            </a:extLst>
+          </p:cNvPr>
+          <p:cNvSpPr/>
+          <p:nvPr/>
+        </p:nvSpPr>
+        <p:spPr>
+          <a:xfrm>
+            <a:off x="4739951" y="389476"/>
+            <a:ext cx="2712098" cy="582346"/>
+          </a:xfrm>
+          <a:prstGeom prst="roundRect">
+            <a:avLst/>
+          </a:prstGeom>
+        </p:spPr>
+        <p:style>
+          <a:lnRef idx="0">
+            <a:schemeClr val="accent1"/>
+          </a:lnRef>
+          <a:fillRef idx="3">
+            <a:schemeClr val="accent1"/>
+          </a:fillRef>
+          <a:effectRef idx="3">
+            <a:schemeClr val="accent1"/>
+          </a:effectRef>
+          <a:fontRef idx="minor">
+            <a:schemeClr val="lt1"/>
+          </a:fontRef>
+        </p:style>
+        <p:txBody>
+          <a:bodyPr rtlCol="0" anchor="ctr"/>
+          <a:lstStyle/>
+          <a:p>
+            <a:pPr algn="ctr"/>
+            <a:r>
+              <a:rPr lang="en-US" dirty="0"/>
               <a:t>Synchronization</a:t>
             </a:r>
           </a:p>
@@ -7519,7 +8837,7 @@
           <p:cNvPr id="20" name="Prostokąt: zaokrąglone rogi 19">
             <a:extLst>
               <a:ext uri="{FF2B5EF4-FFF2-40B4-BE49-F238E27FC236}">
-                <a16:creationId xmlns:a16="http://schemas.microsoft.com/office/drawing/2014/main" id="{6D35BE75-E2AA-4E05-6BD5-2F27FE44E115}"/>
+                <a16:creationId xmlns:a16="http://schemas.microsoft.com/office/drawing/2014/main" id="{05FEAA22-7D45-1AA8-71E5-73155C542963}"/>
               </a:ext>
             </a:extLst>
           </p:cNvPr>
@@ -7528,8 +8846,8 @@
         </p:nvSpPr>
         <p:spPr>
           <a:xfrm>
-            <a:off x="7563572" y="1465205"/>
-            <a:ext cx="1317466" cy="360747"/>
+            <a:off x="1990625" y="2675868"/>
+            <a:ext cx="2143616" cy="360747"/>
           </a:xfrm>
           <a:prstGeom prst="roundRect">
             <a:avLst/>
@@ -7566,7 +8884,7 @@
           <p:cNvPr id="21" name="Prostokąt: zaokrąglone rogi 20">
             <a:extLst>
               <a:ext uri="{FF2B5EF4-FFF2-40B4-BE49-F238E27FC236}">
-                <a16:creationId xmlns:a16="http://schemas.microsoft.com/office/drawing/2014/main" id="{912EC7EA-FC82-EC0B-4756-0A02D27862F8}"/>
+                <a16:creationId xmlns:a16="http://schemas.microsoft.com/office/drawing/2014/main" id="{FF3FE17A-1407-9982-8858-1A0FF1E22792}"/>
               </a:ext>
             </a:extLst>
           </p:cNvPr>
@@ -7575,8 +8893,8 @@
         </p:nvSpPr>
         <p:spPr>
           <a:xfrm>
-            <a:off x="9155996" y="1465205"/>
-            <a:ext cx="1317466" cy="360747"/>
+            <a:off x="2166706" y="4019274"/>
+            <a:ext cx="1851784" cy="360747"/>
           </a:xfrm>
           <a:prstGeom prst="roundRect">
             <a:avLst/>
@@ -7613,7 +8931,7 @@
           <p:cNvPr id="22" name="Prostokąt: zaokrąglone rogi 21">
             <a:extLst>
               <a:ext uri="{FF2B5EF4-FFF2-40B4-BE49-F238E27FC236}">
-                <a16:creationId xmlns:a16="http://schemas.microsoft.com/office/drawing/2014/main" id="{3BB90B92-4C3B-8A32-48AD-0C693331AE68}"/>
+                <a16:creationId xmlns:a16="http://schemas.microsoft.com/office/drawing/2014/main" id="{231E5F2B-D162-22DE-DDCE-3DAAD86D1E79}"/>
               </a:ext>
             </a:extLst>
           </p:cNvPr>
@@ -7622,8 +8940,8 @@
         </p:nvSpPr>
         <p:spPr>
           <a:xfrm>
-            <a:off x="7563572" y="2040667"/>
-            <a:ext cx="2909887" cy="360747"/>
+            <a:off x="1111251" y="5819065"/>
+            <a:ext cx="4124162" cy="360747"/>
           </a:xfrm>
           <a:prstGeom prst="roundRect">
             <a:avLst/>
@@ -7660,7 +8978,7 @@
           <p:cNvPr id="40" name="Tabela 39">
             <a:extLst>
               <a:ext uri="{FF2B5EF4-FFF2-40B4-BE49-F238E27FC236}">
-                <a16:creationId xmlns:a16="http://schemas.microsoft.com/office/drawing/2014/main" id="{5CAEC3CA-DFF1-04E5-5A19-BD7B29C94EE8}"/>
+                <a16:creationId xmlns:a16="http://schemas.microsoft.com/office/drawing/2014/main" id="{9B76C2DB-7CF3-54A7-F889-E75F23AFCA9C}"/>
               </a:ext>
             </a:extLst>
           </p:cNvPr>
@@ -7670,14 +8988,14 @@
           <p:nvPr>
             <p:extLst>
               <p:ext uri="{D42A27DB-BD31-4B8C-83A1-F6EECF244321}">
-                <p14:modId xmlns:p14="http://schemas.microsoft.com/office/powerpoint/2010/main" val="3966715361"/>
+                <p14:modId xmlns:p14="http://schemas.microsoft.com/office/powerpoint/2010/main" val="1259015543"/>
               </p:ext>
             </p:extLst>
           </p:nvPr>
         </p:nvGraphicFramePr>
         <p:xfrm>
-          <a:off x="6520218" y="2718753"/>
-          <a:ext cx="4995026" cy="3060006"/>
+          <a:off x="6904903" y="3317356"/>
+          <a:ext cx="4403082" cy="3060006"/>
         </p:xfrm>
         <a:graphic>
           <a:graphicData uri="http://schemas.openxmlformats.org/drawingml/2006/table">
@@ -7686,14 +9004,14 @@
                 <a:tableStyleId>{5940675A-B579-460E-94D1-54222C63F5DA}</a:tableStyleId>
               </a:tblPr>
               <a:tblGrid>
-                <a:gridCol w="2497513">
+                <a:gridCol w="2201541">
                   <a:extLst>
                     <a:ext uri="{9D8B030D-6E8A-4147-A177-3AD203B41FA5}">
                       <a16:colId xmlns:a16="http://schemas.microsoft.com/office/drawing/2014/main" val="2271414279"/>
                     </a:ext>
                   </a:extLst>
                 </a:gridCol>
-                <a:gridCol w="2497513">
+                <a:gridCol w="2201541">
                   <a:extLst>
                     <a:ext uri="{9D8B030D-6E8A-4147-A177-3AD203B41FA5}">
                       <a16:colId xmlns:a16="http://schemas.microsoft.com/office/drawing/2014/main" val="1892622944"/>
@@ -7919,10 +9237,1401 @@
           </a:graphicData>
         </a:graphic>
       </p:graphicFrame>
+      <p:sp>
+        <p:nvSpPr>
+          <p:cNvPr id="5" name="Prostokąt: zaokrąglone rogi 4">
+            <a:extLst>
+              <a:ext uri="{FF2B5EF4-FFF2-40B4-BE49-F238E27FC236}">
+                <a16:creationId xmlns:a16="http://schemas.microsoft.com/office/drawing/2014/main" id="{91A2592E-6DB3-3A67-065D-BDBB51DAAB72}"/>
+              </a:ext>
+            </a:extLst>
+          </p:cNvPr>
+          <p:cNvSpPr/>
+          <p:nvPr/>
+        </p:nvSpPr>
+        <p:spPr>
+          <a:xfrm>
+            <a:off x="489839" y="1373579"/>
+            <a:ext cx="1366795" cy="655684"/>
+          </a:xfrm>
+          <a:prstGeom prst="roundRect">
+            <a:avLst/>
+          </a:prstGeom>
+        </p:spPr>
+        <p:style>
+          <a:lnRef idx="0">
+            <a:schemeClr val="accent6"/>
+          </a:lnRef>
+          <a:fillRef idx="3">
+            <a:schemeClr val="accent6"/>
+          </a:fillRef>
+          <a:effectRef idx="3">
+            <a:schemeClr val="accent6"/>
+          </a:effectRef>
+          <a:fontRef idx="minor">
+            <a:schemeClr val="lt1"/>
+          </a:fontRef>
+        </p:style>
+        <p:txBody>
+          <a:bodyPr rtlCol="0" anchor="ctr"/>
+          <a:lstStyle/>
+          <a:p>
+            <a:pPr algn="ctr"/>
+            <a:r>
+              <a:rPr lang="en-US" dirty="0"/>
+              <a:t>Observer constructor</a:t>
+            </a:r>
+          </a:p>
+        </p:txBody>
+      </p:sp>
+      <p:cxnSp>
+        <p:nvCxnSpPr>
+          <p:cNvPr id="8" name="Łącznik prosty ze strzałką 7">
+            <a:extLst>
+              <a:ext uri="{FF2B5EF4-FFF2-40B4-BE49-F238E27FC236}">
+                <a16:creationId xmlns:a16="http://schemas.microsoft.com/office/drawing/2014/main" id="{18DDACD0-C801-EB8C-0B1C-2F7BD6A267C4}"/>
+              </a:ext>
+            </a:extLst>
+          </p:cNvPr>
+          <p:cNvCxnSpPr>
+            <a:cxnSpLocks/>
+          </p:cNvCxnSpPr>
+          <p:nvPr/>
+        </p:nvCxnSpPr>
+        <p:spPr>
+          <a:xfrm>
+            <a:off x="1813615" y="2008768"/>
+            <a:ext cx="367198" cy="665793"/>
+          </a:xfrm>
+          <a:prstGeom prst="straightConnector1">
+            <a:avLst/>
+          </a:prstGeom>
+          <a:ln>
+            <a:tailEnd type="triangle"/>
+          </a:ln>
+        </p:spPr>
+        <p:style>
+          <a:lnRef idx="3">
+            <a:schemeClr val="accent6"/>
+          </a:lnRef>
+          <a:fillRef idx="0">
+            <a:schemeClr val="accent6"/>
+          </a:fillRef>
+          <a:effectRef idx="2">
+            <a:schemeClr val="accent6"/>
+          </a:effectRef>
+          <a:fontRef idx="minor">
+            <a:schemeClr val="tx1"/>
+          </a:fontRef>
+        </p:style>
+      </p:cxnSp>
+      <p:cxnSp>
+        <p:nvCxnSpPr>
+          <p:cNvPr id="11" name="Łącznik prosty ze strzałką 10">
+            <a:extLst>
+              <a:ext uri="{FF2B5EF4-FFF2-40B4-BE49-F238E27FC236}">
+                <a16:creationId xmlns:a16="http://schemas.microsoft.com/office/drawing/2014/main" id="{EF78121E-16CB-1E5E-068D-36E8A889E726}"/>
+              </a:ext>
+            </a:extLst>
+          </p:cNvPr>
+          <p:cNvCxnSpPr>
+            <a:cxnSpLocks/>
+          </p:cNvCxnSpPr>
+          <p:nvPr/>
+        </p:nvCxnSpPr>
+        <p:spPr>
+          <a:xfrm flipH="1">
+            <a:off x="1263931" y="3035961"/>
+            <a:ext cx="902775" cy="1163686"/>
+          </a:xfrm>
+          <a:prstGeom prst="straightConnector1">
+            <a:avLst/>
+          </a:prstGeom>
+          <a:ln>
+            <a:tailEnd type="triangle"/>
+          </a:ln>
+        </p:spPr>
+        <p:style>
+          <a:lnRef idx="3">
+            <a:schemeClr val="accent6"/>
+          </a:lnRef>
+          <a:fillRef idx="0">
+            <a:schemeClr val="accent6"/>
+          </a:fillRef>
+          <a:effectRef idx="2">
+            <a:schemeClr val="accent6"/>
+          </a:effectRef>
+          <a:fontRef idx="minor">
+            <a:schemeClr val="tx1"/>
+          </a:fontRef>
+        </p:style>
+      </p:cxnSp>
+      <p:cxnSp>
+        <p:nvCxnSpPr>
+          <p:cNvPr id="23" name="Łącznik prosty ze strzałką 22">
+            <a:extLst>
+              <a:ext uri="{FF2B5EF4-FFF2-40B4-BE49-F238E27FC236}">
+                <a16:creationId xmlns:a16="http://schemas.microsoft.com/office/drawing/2014/main" id="{D967AE62-E1A0-131C-0E74-54057CEF730C}"/>
+              </a:ext>
+            </a:extLst>
+          </p:cNvPr>
+          <p:cNvCxnSpPr>
+            <a:cxnSpLocks/>
+          </p:cNvCxnSpPr>
+          <p:nvPr/>
+        </p:nvCxnSpPr>
+        <p:spPr>
+          <a:xfrm>
+            <a:off x="1263931" y="4200565"/>
+            <a:ext cx="0" cy="1618500"/>
+          </a:xfrm>
+          <a:prstGeom prst="straightConnector1">
+            <a:avLst/>
+          </a:prstGeom>
+          <a:ln>
+            <a:tailEnd type="triangle"/>
+          </a:ln>
+        </p:spPr>
+        <p:style>
+          <a:lnRef idx="3">
+            <a:schemeClr val="accent6"/>
+          </a:lnRef>
+          <a:fillRef idx="0">
+            <a:schemeClr val="accent6"/>
+          </a:fillRef>
+          <a:effectRef idx="2">
+            <a:schemeClr val="accent6"/>
+          </a:effectRef>
+          <a:fontRef idx="minor">
+            <a:schemeClr val="tx1"/>
+          </a:fontRef>
+        </p:style>
+      </p:cxnSp>
+      <p:cxnSp>
+        <p:nvCxnSpPr>
+          <p:cNvPr id="55" name="Łącznik prosty ze strzałką 54">
+            <a:extLst>
+              <a:ext uri="{FF2B5EF4-FFF2-40B4-BE49-F238E27FC236}">
+                <a16:creationId xmlns:a16="http://schemas.microsoft.com/office/drawing/2014/main" id="{53AEB3C7-B099-78D0-7E9A-30C2549FBC78}"/>
+              </a:ext>
+            </a:extLst>
+          </p:cNvPr>
+          <p:cNvCxnSpPr>
+            <a:cxnSpLocks/>
+          </p:cNvCxnSpPr>
+          <p:nvPr/>
+        </p:nvCxnSpPr>
+        <p:spPr>
+          <a:xfrm flipV="1">
+            <a:off x="1361221" y="5130125"/>
+            <a:ext cx="672543" cy="678042"/>
+          </a:xfrm>
+          <a:prstGeom prst="straightConnector1">
+            <a:avLst/>
+          </a:prstGeom>
+          <a:ln>
+            <a:tailEnd type="triangle"/>
+          </a:ln>
+        </p:spPr>
+        <p:style>
+          <a:lnRef idx="3">
+            <a:schemeClr val="accent6"/>
+          </a:lnRef>
+          <a:fillRef idx="0">
+            <a:schemeClr val="accent6"/>
+          </a:fillRef>
+          <a:effectRef idx="2">
+            <a:schemeClr val="accent6"/>
+          </a:effectRef>
+          <a:fontRef idx="minor">
+            <a:schemeClr val="tx1"/>
+          </a:fontRef>
+        </p:style>
+      </p:cxnSp>
+      <p:cxnSp>
+        <p:nvCxnSpPr>
+          <p:cNvPr id="57" name="Łącznik prosty ze strzałką 56">
+            <a:extLst>
+              <a:ext uri="{FF2B5EF4-FFF2-40B4-BE49-F238E27FC236}">
+                <a16:creationId xmlns:a16="http://schemas.microsoft.com/office/drawing/2014/main" id="{27F9A589-51A5-3F2B-BCCB-A2ED878A2281}"/>
+              </a:ext>
+            </a:extLst>
+          </p:cNvPr>
+          <p:cNvCxnSpPr>
+            <a:cxnSpLocks/>
+          </p:cNvCxnSpPr>
+          <p:nvPr/>
+        </p:nvCxnSpPr>
+        <p:spPr>
+          <a:xfrm flipH="1" flipV="1">
+            <a:off x="1811593" y="4199647"/>
+            <a:ext cx="225131" cy="930478"/>
+          </a:xfrm>
+          <a:prstGeom prst="straightConnector1">
+            <a:avLst/>
+          </a:prstGeom>
+          <a:ln>
+            <a:tailEnd type="triangle"/>
+          </a:ln>
+        </p:spPr>
+        <p:style>
+          <a:lnRef idx="3">
+            <a:schemeClr val="accent6"/>
+          </a:lnRef>
+          <a:fillRef idx="0">
+            <a:schemeClr val="accent6"/>
+          </a:fillRef>
+          <a:effectRef idx="2">
+            <a:schemeClr val="accent6"/>
+          </a:effectRef>
+          <a:fontRef idx="minor">
+            <a:schemeClr val="tx1"/>
+          </a:fontRef>
+        </p:style>
+      </p:cxnSp>
+      <p:cxnSp>
+        <p:nvCxnSpPr>
+          <p:cNvPr id="59" name="Łącznik prosty ze strzałką 58">
+            <a:extLst>
+              <a:ext uri="{FF2B5EF4-FFF2-40B4-BE49-F238E27FC236}">
+                <a16:creationId xmlns:a16="http://schemas.microsoft.com/office/drawing/2014/main" id="{51D4B5D6-D7AA-4450-2AB6-04C1D5FE8F6F}"/>
+              </a:ext>
+            </a:extLst>
+          </p:cNvPr>
+          <p:cNvCxnSpPr>
+            <a:cxnSpLocks/>
+          </p:cNvCxnSpPr>
+          <p:nvPr/>
+        </p:nvCxnSpPr>
+        <p:spPr>
+          <a:xfrm flipV="1">
+            <a:off x="1811593" y="3596481"/>
+            <a:ext cx="622045" cy="603166"/>
+          </a:xfrm>
+          <a:prstGeom prst="straightConnector1">
+            <a:avLst/>
+          </a:prstGeom>
+          <a:ln>
+            <a:tailEnd type="triangle"/>
+          </a:ln>
+        </p:spPr>
+        <p:style>
+          <a:lnRef idx="3">
+            <a:schemeClr val="accent6"/>
+          </a:lnRef>
+          <a:fillRef idx="0">
+            <a:schemeClr val="accent6"/>
+          </a:fillRef>
+          <a:effectRef idx="2">
+            <a:schemeClr val="accent6"/>
+          </a:effectRef>
+          <a:fontRef idx="minor">
+            <a:schemeClr val="tx1"/>
+          </a:fontRef>
+        </p:style>
+      </p:cxnSp>
+      <p:cxnSp>
+        <p:nvCxnSpPr>
+          <p:cNvPr id="61" name="Łącznik prosty ze strzałką 60">
+            <a:extLst>
+              <a:ext uri="{FF2B5EF4-FFF2-40B4-BE49-F238E27FC236}">
+                <a16:creationId xmlns:a16="http://schemas.microsoft.com/office/drawing/2014/main" id="{1FBADFE4-2252-8725-FE83-2C5A5C8CEBBE}"/>
+              </a:ext>
+            </a:extLst>
+          </p:cNvPr>
+          <p:cNvCxnSpPr/>
+          <p:nvPr/>
+        </p:nvCxnSpPr>
+        <p:spPr>
+          <a:xfrm flipV="1">
+            <a:off x="2450786" y="3035961"/>
+            <a:ext cx="0" cy="529003"/>
+          </a:xfrm>
+          <a:prstGeom prst="straightConnector1">
+            <a:avLst/>
+          </a:prstGeom>
+          <a:ln>
+            <a:tailEnd type="triangle"/>
+          </a:ln>
+        </p:spPr>
+        <p:style>
+          <a:lnRef idx="3">
+            <a:schemeClr val="accent6"/>
+          </a:lnRef>
+          <a:fillRef idx="0">
+            <a:schemeClr val="accent6"/>
+          </a:fillRef>
+          <a:effectRef idx="2">
+            <a:schemeClr val="accent6"/>
+          </a:effectRef>
+          <a:fontRef idx="minor">
+            <a:schemeClr val="tx1"/>
+          </a:fontRef>
+        </p:style>
+      </p:cxnSp>
+      <p:cxnSp>
+        <p:nvCxnSpPr>
+          <p:cNvPr id="76" name="Łącznik prosty ze strzałką 75">
+            <a:extLst>
+              <a:ext uri="{FF2B5EF4-FFF2-40B4-BE49-F238E27FC236}">
+                <a16:creationId xmlns:a16="http://schemas.microsoft.com/office/drawing/2014/main" id="{FFB796AF-01E9-3B47-6B70-1EE5CA070405}"/>
+              </a:ext>
+            </a:extLst>
+          </p:cNvPr>
+          <p:cNvCxnSpPr>
+            <a:cxnSpLocks/>
+          </p:cNvCxnSpPr>
+          <p:nvPr/>
+        </p:nvCxnSpPr>
+        <p:spPr>
+          <a:xfrm flipV="1">
+            <a:off x="2053873" y="4380021"/>
+            <a:ext cx="396913" cy="719522"/>
+          </a:xfrm>
+          <a:prstGeom prst="straightConnector1">
+            <a:avLst/>
+          </a:prstGeom>
+          <a:ln>
+            <a:prstDash val="dash"/>
+            <a:tailEnd type="triangle"/>
+          </a:ln>
+        </p:spPr>
+        <p:style>
+          <a:lnRef idx="3">
+            <a:schemeClr val="accent6"/>
+          </a:lnRef>
+          <a:fillRef idx="0">
+            <a:schemeClr val="accent6"/>
+          </a:fillRef>
+          <a:effectRef idx="2">
+            <a:schemeClr val="accent6"/>
+          </a:effectRef>
+          <a:fontRef idx="minor">
+            <a:schemeClr val="tx1"/>
+          </a:fontRef>
+        </p:style>
+      </p:cxnSp>
+      <p:cxnSp>
+        <p:nvCxnSpPr>
+          <p:cNvPr id="78" name="Łącznik prosty ze strzałką 77">
+            <a:extLst>
+              <a:ext uri="{FF2B5EF4-FFF2-40B4-BE49-F238E27FC236}">
+                <a16:creationId xmlns:a16="http://schemas.microsoft.com/office/drawing/2014/main" id="{4D95AD7F-2DD6-3BD8-DBC8-D306CED70357}"/>
+              </a:ext>
+            </a:extLst>
+          </p:cNvPr>
+          <p:cNvCxnSpPr>
+            <a:cxnSpLocks/>
+          </p:cNvCxnSpPr>
+          <p:nvPr/>
+        </p:nvCxnSpPr>
+        <p:spPr>
+          <a:xfrm flipV="1">
+            <a:off x="2450786" y="3596481"/>
+            <a:ext cx="0" cy="422793"/>
+          </a:xfrm>
+          <a:prstGeom prst="straightConnector1">
+            <a:avLst/>
+          </a:prstGeom>
+          <a:ln>
+            <a:prstDash val="dash"/>
+            <a:tailEnd type="triangle"/>
+          </a:ln>
+        </p:spPr>
+        <p:style>
+          <a:lnRef idx="3">
+            <a:schemeClr val="accent6"/>
+          </a:lnRef>
+          <a:fillRef idx="0">
+            <a:schemeClr val="accent6"/>
+          </a:fillRef>
+          <a:effectRef idx="2">
+            <a:schemeClr val="accent6"/>
+          </a:effectRef>
+          <a:fontRef idx="minor">
+            <a:schemeClr val="tx1"/>
+          </a:fontRef>
+        </p:style>
+      </p:cxnSp>
+      <p:sp>
+        <p:nvSpPr>
+          <p:cNvPr id="86" name="Prostokąt: zaokrąglone rogi 85">
+            <a:extLst>
+              <a:ext uri="{FF2B5EF4-FFF2-40B4-BE49-F238E27FC236}">
+                <a16:creationId xmlns:a16="http://schemas.microsoft.com/office/drawing/2014/main" id="{36F31DE1-EE6E-CD8D-E09A-D9A409456634}"/>
+              </a:ext>
+            </a:extLst>
+          </p:cNvPr>
+          <p:cNvSpPr/>
+          <p:nvPr/>
+        </p:nvSpPr>
+        <p:spPr>
+          <a:xfrm>
+            <a:off x="2255097" y="1416543"/>
+            <a:ext cx="2335181" cy="403767"/>
+          </a:xfrm>
+          <a:prstGeom prst="roundRect">
+            <a:avLst/>
+          </a:prstGeom>
+        </p:spPr>
+        <p:style>
+          <a:lnRef idx="1">
+            <a:schemeClr val="accent6"/>
+          </a:lnRef>
+          <a:fillRef idx="2">
+            <a:schemeClr val="accent6"/>
+          </a:fillRef>
+          <a:effectRef idx="1">
+            <a:schemeClr val="accent6"/>
+          </a:effectRef>
+          <a:fontRef idx="minor">
+            <a:schemeClr val="dk1"/>
+          </a:fontRef>
+        </p:style>
+        <p:txBody>
+          <a:bodyPr rtlCol="0" anchor="ctr"/>
+          <a:lstStyle/>
+          <a:p>
+            <a:pPr algn="ctr"/>
+            <a:r>
+              <a:rPr lang="en-US" dirty="0"/>
+              <a:t>Observing</a:t>
+            </a:r>
+          </a:p>
+        </p:txBody>
+      </p:sp>
+      <p:cxnSp>
+        <p:nvCxnSpPr>
+          <p:cNvPr id="87" name="Łącznik prosty ze strzałką 86">
+            <a:extLst>
+              <a:ext uri="{FF2B5EF4-FFF2-40B4-BE49-F238E27FC236}">
+                <a16:creationId xmlns:a16="http://schemas.microsoft.com/office/drawing/2014/main" id="{5881CDA8-706E-AFDF-8700-116917FB122F}"/>
+              </a:ext>
+            </a:extLst>
+          </p:cNvPr>
+          <p:cNvCxnSpPr>
+            <a:cxnSpLocks/>
+          </p:cNvCxnSpPr>
+          <p:nvPr/>
+        </p:nvCxnSpPr>
+        <p:spPr>
+          <a:xfrm flipV="1">
+            <a:off x="2456822" y="1826660"/>
+            <a:ext cx="0" cy="837328"/>
+          </a:xfrm>
+          <a:prstGeom prst="straightConnector1">
+            <a:avLst/>
+          </a:prstGeom>
+          <a:ln>
+            <a:tailEnd type="triangle"/>
+          </a:ln>
+        </p:spPr>
+        <p:style>
+          <a:lnRef idx="3">
+            <a:schemeClr val="accent6"/>
+          </a:lnRef>
+          <a:fillRef idx="0">
+            <a:schemeClr val="accent6"/>
+          </a:fillRef>
+          <a:effectRef idx="2">
+            <a:schemeClr val="accent6"/>
+          </a:effectRef>
+          <a:fontRef idx="minor">
+            <a:schemeClr val="tx1"/>
+          </a:fontRef>
+        </p:style>
+      </p:cxnSp>
+      <p:cxnSp>
+        <p:nvCxnSpPr>
+          <p:cNvPr id="91" name="Łącznik prosty ze strzałką 90">
+            <a:extLst>
+              <a:ext uri="{FF2B5EF4-FFF2-40B4-BE49-F238E27FC236}">
+                <a16:creationId xmlns:a16="http://schemas.microsoft.com/office/drawing/2014/main" id="{4DCC9B42-3178-C128-1853-37C9471EB5D3}"/>
+              </a:ext>
+            </a:extLst>
+          </p:cNvPr>
+          <p:cNvCxnSpPr>
+            <a:cxnSpLocks/>
+          </p:cNvCxnSpPr>
+          <p:nvPr/>
+        </p:nvCxnSpPr>
+        <p:spPr>
+          <a:xfrm>
+            <a:off x="5085283" y="4153420"/>
+            <a:ext cx="0" cy="1655267"/>
+          </a:xfrm>
+          <a:prstGeom prst="straightConnector1">
+            <a:avLst/>
+          </a:prstGeom>
+          <a:ln>
+            <a:tailEnd type="triangle"/>
+          </a:ln>
+        </p:spPr>
+        <p:style>
+          <a:lnRef idx="3">
+            <a:schemeClr val="accent6"/>
+          </a:lnRef>
+          <a:fillRef idx="0">
+            <a:schemeClr val="accent6"/>
+          </a:fillRef>
+          <a:effectRef idx="2">
+            <a:schemeClr val="accent6"/>
+          </a:effectRef>
+          <a:fontRef idx="minor">
+            <a:schemeClr val="tx1"/>
+          </a:fontRef>
+        </p:style>
+      </p:cxnSp>
+      <p:cxnSp>
+        <p:nvCxnSpPr>
+          <p:cNvPr id="95" name="Łącznik prosty ze strzałką 94">
+            <a:extLst>
+              <a:ext uri="{FF2B5EF4-FFF2-40B4-BE49-F238E27FC236}">
+                <a16:creationId xmlns:a16="http://schemas.microsoft.com/office/drawing/2014/main" id="{0585CF5E-A744-D917-3A7E-922FD29F107F}"/>
+              </a:ext>
+            </a:extLst>
+          </p:cNvPr>
+          <p:cNvCxnSpPr>
+            <a:cxnSpLocks/>
+          </p:cNvCxnSpPr>
+          <p:nvPr/>
+        </p:nvCxnSpPr>
+        <p:spPr>
+          <a:xfrm flipH="1" flipV="1">
+            <a:off x="4330700" y="5182306"/>
+            <a:ext cx="638312" cy="625861"/>
+          </a:xfrm>
+          <a:prstGeom prst="straightConnector1">
+            <a:avLst/>
+          </a:prstGeom>
+          <a:ln>
+            <a:tailEnd type="triangle"/>
+          </a:ln>
+        </p:spPr>
+        <p:style>
+          <a:lnRef idx="3">
+            <a:schemeClr val="accent6"/>
+          </a:lnRef>
+          <a:fillRef idx="0">
+            <a:schemeClr val="accent6"/>
+          </a:fillRef>
+          <a:effectRef idx="2">
+            <a:schemeClr val="accent6"/>
+          </a:effectRef>
+          <a:fontRef idx="minor">
+            <a:schemeClr val="tx1"/>
+          </a:fontRef>
+        </p:style>
+      </p:cxnSp>
+      <p:cxnSp>
+        <p:nvCxnSpPr>
+          <p:cNvPr id="96" name="Łącznik prosty ze strzałką 95">
+            <a:extLst>
+              <a:ext uri="{FF2B5EF4-FFF2-40B4-BE49-F238E27FC236}">
+                <a16:creationId xmlns:a16="http://schemas.microsoft.com/office/drawing/2014/main" id="{976B2C71-8F0B-6B9E-2528-41939295E856}"/>
+              </a:ext>
+            </a:extLst>
+          </p:cNvPr>
+          <p:cNvCxnSpPr>
+            <a:cxnSpLocks/>
+          </p:cNvCxnSpPr>
+          <p:nvPr/>
+        </p:nvCxnSpPr>
+        <p:spPr>
+          <a:xfrm flipV="1">
+            <a:off x="4362840" y="4238423"/>
+            <a:ext cx="172266" cy="943883"/>
+          </a:xfrm>
+          <a:prstGeom prst="straightConnector1">
+            <a:avLst/>
+          </a:prstGeom>
+          <a:ln>
+            <a:tailEnd type="triangle"/>
+          </a:ln>
+        </p:spPr>
+        <p:style>
+          <a:lnRef idx="3">
+            <a:schemeClr val="accent6"/>
+          </a:lnRef>
+          <a:fillRef idx="0">
+            <a:schemeClr val="accent6"/>
+          </a:fillRef>
+          <a:effectRef idx="2">
+            <a:schemeClr val="accent6"/>
+          </a:effectRef>
+          <a:fontRef idx="minor">
+            <a:schemeClr val="tx1"/>
+          </a:fontRef>
+        </p:style>
+      </p:cxnSp>
+      <p:cxnSp>
+        <p:nvCxnSpPr>
+          <p:cNvPr id="97" name="Łącznik prosty ze strzałką 96">
+            <a:extLst>
+              <a:ext uri="{FF2B5EF4-FFF2-40B4-BE49-F238E27FC236}">
+                <a16:creationId xmlns:a16="http://schemas.microsoft.com/office/drawing/2014/main" id="{088525AB-0CAB-48C0-2312-5F4CEDF49C85}"/>
+              </a:ext>
+            </a:extLst>
+          </p:cNvPr>
+          <p:cNvCxnSpPr>
+            <a:cxnSpLocks/>
+            <a:endCxn id="103" idx="2"/>
+          </p:cNvCxnSpPr>
+          <p:nvPr/>
+        </p:nvCxnSpPr>
+        <p:spPr>
+          <a:xfrm flipH="1" flipV="1">
+            <a:off x="4120277" y="3698847"/>
+            <a:ext cx="414829" cy="539576"/>
+          </a:xfrm>
+          <a:prstGeom prst="straightConnector1">
+            <a:avLst/>
+          </a:prstGeom>
+          <a:ln>
+            <a:tailEnd type="triangle"/>
+          </a:ln>
+        </p:spPr>
+        <p:style>
+          <a:lnRef idx="3">
+            <a:schemeClr val="accent6"/>
+          </a:lnRef>
+          <a:fillRef idx="0">
+            <a:schemeClr val="accent6"/>
+          </a:fillRef>
+          <a:effectRef idx="2">
+            <a:schemeClr val="accent6"/>
+          </a:effectRef>
+          <a:fontRef idx="minor">
+            <a:schemeClr val="tx1"/>
+          </a:fontRef>
+        </p:style>
+      </p:cxnSp>
+      <p:cxnSp>
+        <p:nvCxnSpPr>
+          <p:cNvPr id="98" name="Łącznik prosty ze strzałką 97">
+            <a:extLst>
+              <a:ext uri="{FF2B5EF4-FFF2-40B4-BE49-F238E27FC236}">
+                <a16:creationId xmlns:a16="http://schemas.microsoft.com/office/drawing/2014/main" id="{9F091C5C-6F9C-F730-7B98-58037DC33DA3}"/>
+              </a:ext>
+            </a:extLst>
+          </p:cNvPr>
+          <p:cNvCxnSpPr>
+            <a:cxnSpLocks/>
+          </p:cNvCxnSpPr>
+          <p:nvPr/>
+        </p:nvCxnSpPr>
+        <p:spPr>
+          <a:xfrm flipH="1" flipV="1">
+            <a:off x="3832240" y="4390919"/>
+            <a:ext cx="498460" cy="791387"/>
+          </a:xfrm>
+          <a:prstGeom prst="straightConnector1">
+            <a:avLst/>
+          </a:prstGeom>
+          <a:ln>
+            <a:prstDash val="dash"/>
+            <a:tailEnd type="triangle"/>
+          </a:ln>
+        </p:spPr>
+        <p:style>
+          <a:lnRef idx="3">
+            <a:schemeClr val="accent6"/>
+          </a:lnRef>
+          <a:fillRef idx="0">
+            <a:schemeClr val="accent6"/>
+          </a:fillRef>
+          <a:effectRef idx="2">
+            <a:schemeClr val="accent6"/>
+          </a:effectRef>
+          <a:fontRef idx="minor">
+            <a:schemeClr val="tx1"/>
+          </a:fontRef>
+        </p:style>
+      </p:cxnSp>
+      <p:cxnSp>
+        <p:nvCxnSpPr>
+          <p:cNvPr id="99" name="Łącznik prosty ze strzałką 98">
+            <a:extLst>
+              <a:ext uri="{FF2B5EF4-FFF2-40B4-BE49-F238E27FC236}">
+                <a16:creationId xmlns:a16="http://schemas.microsoft.com/office/drawing/2014/main" id="{38EA0E44-53B0-3047-9488-AC8F1B2A51E7}"/>
+              </a:ext>
+            </a:extLst>
+          </p:cNvPr>
+          <p:cNvCxnSpPr>
+            <a:cxnSpLocks/>
+            <a:endCxn id="103" idx="2"/>
+          </p:cNvCxnSpPr>
+          <p:nvPr/>
+        </p:nvCxnSpPr>
+        <p:spPr>
+          <a:xfrm flipV="1">
+            <a:off x="3832240" y="3698847"/>
+            <a:ext cx="288037" cy="331325"/>
+          </a:xfrm>
+          <a:prstGeom prst="straightConnector1">
+            <a:avLst/>
+          </a:prstGeom>
+          <a:ln>
+            <a:prstDash val="dash"/>
+            <a:tailEnd type="triangle"/>
+          </a:ln>
+        </p:spPr>
+        <p:style>
+          <a:lnRef idx="3">
+            <a:schemeClr val="accent6"/>
+          </a:lnRef>
+          <a:fillRef idx="0">
+            <a:schemeClr val="accent6"/>
+          </a:fillRef>
+          <a:effectRef idx="2">
+            <a:schemeClr val="accent6"/>
+          </a:effectRef>
+          <a:fontRef idx="minor">
+            <a:schemeClr val="tx1"/>
+          </a:fontRef>
+        </p:style>
+      </p:cxnSp>
+      <p:sp>
+        <p:nvSpPr>
+          <p:cNvPr id="103" name="Prostokąt: zaokrąglone rogi 102">
+            <a:extLst>
+              <a:ext uri="{FF2B5EF4-FFF2-40B4-BE49-F238E27FC236}">
+                <a16:creationId xmlns:a16="http://schemas.microsoft.com/office/drawing/2014/main" id="{99E78C9D-FABC-6D42-8A44-48D5E654AE3C}"/>
+              </a:ext>
+            </a:extLst>
+          </p:cNvPr>
+          <p:cNvSpPr/>
+          <p:nvPr/>
+        </p:nvSpPr>
+        <p:spPr>
+          <a:xfrm>
+            <a:off x="3796622" y="3295080"/>
+            <a:ext cx="647309" cy="403767"/>
+          </a:xfrm>
+          <a:prstGeom prst="roundRect">
+            <a:avLst/>
+          </a:prstGeom>
+        </p:spPr>
+        <p:style>
+          <a:lnRef idx="0">
+            <a:schemeClr val="accent6"/>
+          </a:lnRef>
+          <a:fillRef idx="3">
+            <a:schemeClr val="accent6"/>
+          </a:fillRef>
+          <a:effectRef idx="3">
+            <a:schemeClr val="accent6"/>
+          </a:effectRef>
+          <a:fontRef idx="minor">
+            <a:schemeClr val="lt1"/>
+          </a:fontRef>
+        </p:style>
+        <p:txBody>
+          <a:bodyPr rtlCol="0" anchor="ctr"/>
+          <a:lstStyle/>
+          <a:p>
+            <a:pPr algn="ctr"/>
+            <a:r>
+              <a:rPr lang="en-US" dirty="0"/>
+              <a:t>End</a:t>
+            </a:r>
+          </a:p>
+        </p:txBody>
+      </p:sp>
+      <p:sp>
+        <p:nvSpPr>
+          <p:cNvPr id="104" name="Prostokąt: zaokrąglone rogi 103">
+            <a:extLst>
+              <a:ext uri="{FF2B5EF4-FFF2-40B4-BE49-F238E27FC236}">
+                <a16:creationId xmlns:a16="http://schemas.microsoft.com/office/drawing/2014/main" id="{7092512B-A66C-FA80-869C-3C4D2A134D0F}"/>
+              </a:ext>
+            </a:extLst>
+          </p:cNvPr>
+          <p:cNvSpPr/>
+          <p:nvPr/>
+        </p:nvSpPr>
+        <p:spPr>
+          <a:xfrm>
+            <a:off x="4797211" y="1407280"/>
+            <a:ext cx="1343237" cy="655684"/>
+          </a:xfrm>
+          <a:prstGeom prst="roundRect">
+            <a:avLst/>
+          </a:prstGeom>
+        </p:spPr>
+        <p:style>
+          <a:lnRef idx="0">
+            <a:schemeClr val="accent2"/>
+          </a:lnRef>
+          <a:fillRef idx="3">
+            <a:schemeClr val="accent2"/>
+          </a:fillRef>
+          <a:effectRef idx="3">
+            <a:schemeClr val="accent2"/>
+          </a:effectRef>
+          <a:fontRef idx="minor">
+            <a:schemeClr val="lt1"/>
+          </a:fontRef>
+        </p:style>
+        <p:txBody>
+          <a:bodyPr rtlCol="0" anchor="ctr"/>
+          <a:lstStyle/>
+          <a:p>
+            <a:pPr algn="ctr"/>
+            <a:r>
+              <a:rPr lang="en-US" dirty="0"/>
+              <a:t>User constructor</a:t>
+            </a:r>
+          </a:p>
+        </p:txBody>
+      </p:sp>
+      <p:cxnSp>
+        <p:nvCxnSpPr>
+          <p:cNvPr id="106" name="Łącznik prosty ze strzałką 105">
+            <a:extLst>
+              <a:ext uri="{FF2B5EF4-FFF2-40B4-BE49-F238E27FC236}">
+                <a16:creationId xmlns:a16="http://schemas.microsoft.com/office/drawing/2014/main" id="{85C4BAFC-FD3D-F9FC-3C4F-FF58B9880C5A}"/>
+              </a:ext>
+            </a:extLst>
+          </p:cNvPr>
+          <p:cNvCxnSpPr>
+            <a:cxnSpLocks/>
+          </p:cNvCxnSpPr>
+          <p:nvPr/>
+        </p:nvCxnSpPr>
+        <p:spPr>
+          <a:xfrm flipH="1">
+            <a:off x="2783183" y="1984985"/>
+            <a:ext cx="2014029" cy="673336"/>
+          </a:xfrm>
+          <a:prstGeom prst="straightConnector1">
+            <a:avLst/>
+          </a:prstGeom>
+          <a:ln>
+            <a:tailEnd type="triangle"/>
+          </a:ln>
+        </p:spPr>
+        <p:style>
+          <a:lnRef idx="3">
+            <a:schemeClr val="accent2"/>
+          </a:lnRef>
+          <a:fillRef idx="0">
+            <a:schemeClr val="accent2"/>
+          </a:fillRef>
+          <a:effectRef idx="2">
+            <a:schemeClr val="accent2"/>
+          </a:effectRef>
+          <a:fontRef idx="minor">
+            <a:schemeClr val="tx1"/>
+          </a:fontRef>
+        </p:style>
+      </p:cxnSp>
+      <p:cxnSp>
+        <p:nvCxnSpPr>
+          <p:cNvPr id="108" name="Łącznik prosty ze strzałką 107">
+            <a:extLst>
+              <a:ext uri="{FF2B5EF4-FFF2-40B4-BE49-F238E27FC236}">
+                <a16:creationId xmlns:a16="http://schemas.microsoft.com/office/drawing/2014/main" id="{B300A2BC-F5AA-64F6-0744-86C25D6EACDF}"/>
+              </a:ext>
+            </a:extLst>
+          </p:cNvPr>
+          <p:cNvCxnSpPr>
+            <a:cxnSpLocks/>
+          </p:cNvCxnSpPr>
+          <p:nvPr/>
+        </p:nvCxnSpPr>
+        <p:spPr>
+          <a:xfrm>
+            <a:off x="2775290" y="3034813"/>
+            <a:ext cx="7893" cy="973563"/>
+          </a:xfrm>
+          <a:prstGeom prst="straightConnector1">
+            <a:avLst/>
+          </a:prstGeom>
+          <a:ln>
+            <a:tailEnd type="triangle"/>
+          </a:ln>
+        </p:spPr>
+        <p:style>
+          <a:lnRef idx="3">
+            <a:schemeClr val="accent2"/>
+          </a:lnRef>
+          <a:fillRef idx="0">
+            <a:schemeClr val="accent2"/>
+          </a:fillRef>
+          <a:effectRef idx="2">
+            <a:schemeClr val="accent2"/>
+          </a:effectRef>
+          <a:fontRef idx="minor">
+            <a:schemeClr val="tx1"/>
+          </a:fontRef>
+        </p:style>
+      </p:cxnSp>
+      <p:sp>
+        <p:nvSpPr>
+          <p:cNvPr id="112" name="Prostokąt: zaokrąglone rogi 111">
+            <a:extLst>
+              <a:ext uri="{FF2B5EF4-FFF2-40B4-BE49-F238E27FC236}">
+                <a16:creationId xmlns:a16="http://schemas.microsoft.com/office/drawing/2014/main" id="{249C346F-10BA-C44A-33B6-366BB587BB83}"/>
+              </a:ext>
+            </a:extLst>
+          </p:cNvPr>
+          <p:cNvSpPr/>
+          <p:nvPr/>
+        </p:nvSpPr>
+        <p:spPr>
+          <a:xfrm>
+            <a:off x="2720087" y="5037690"/>
+            <a:ext cx="784275" cy="403767"/>
+          </a:xfrm>
+          <a:prstGeom prst="roundRect">
+            <a:avLst/>
+          </a:prstGeom>
+        </p:spPr>
+        <p:style>
+          <a:lnRef idx="1">
+            <a:schemeClr val="accent2"/>
+          </a:lnRef>
+          <a:fillRef idx="2">
+            <a:schemeClr val="accent2"/>
+          </a:fillRef>
+          <a:effectRef idx="1">
+            <a:schemeClr val="accent2"/>
+          </a:effectRef>
+          <a:fontRef idx="minor">
+            <a:schemeClr val="dk1"/>
+          </a:fontRef>
+        </p:style>
+        <p:txBody>
+          <a:bodyPr rtlCol="0" anchor="ctr"/>
+          <a:lstStyle/>
+          <a:p>
+            <a:pPr algn="ctr"/>
+            <a:r>
+              <a:rPr lang="en-US" dirty="0"/>
+              <a:t>Using</a:t>
+            </a:r>
+          </a:p>
+        </p:txBody>
+      </p:sp>
+      <p:cxnSp>
+        <p:nvCxnSpPr>
+          <p:cNvPr id="125" name="Łącznik prosty ze strzałką 124">
+            <a:extLst>
+              <a:ext uri="{FF2B5EF4-FFF2-40B4-BE49-F238E27FC236}">
+                <a16:creationId xmlns:a16="http://schemas.microsoft.com/office/drawing/2014/main" id="{ED9221AD-34D7-5E50-1BBE-C9B88EDD5E6F}"/>
+              </a:ext>
+            </a:extLst>
+          </p:cNvPr>
+          <p:cNvCxnSpPr>
+            <a:cxnSpLocks/>
+            <a:endCxn id="112" idx="0"/>
+          </p:cNvCxnSpPr>
+          <p:nvPr/>
+        </p:nvCxnSpPr>
+        <p:spPr>
+          <a:xfrm>
+            <a:off x="2767397" y="4371975"/>
+            <a:ext cx="344828" cy="665715"/>
+          </a:xfrm>
+          <a:prstGeom prst="straightConnector1">
+            <a:avLst/>
+          </a:prstGeom>
+          <a:ln>
+            <a:tailEnd type="triangle"/>
+          </a:ln>
+        </p:spPr>
+        <p:style>
+          <a:lnRef idx="3">
+            <a:schemeClr val="accent2"/>
+          </a:lnRef>
+          <a:fillRef idx="0">
+            <a:schemeClr val="accent2"/>
+          </a:fillRef>
+          <a:effectRef idx="2">
+            <a:schemeClr val="accent2"/>
+          </a:effectRef>
+          <a:fontRef idx="minor">
+            <a:schemeClr val="tx1"/>
+          </a:fontRef>
+        </p:style>
+      </p:cxnSp>
+      <p:cxnSp>
+        <p:nvCxnSpPr>
+          <p:cNvPr id="127" name="Łącznik prosty ze strzałką 126">
+            <a:extLst>
+              <a:ext uri="{FF2B5EF4-FFF2-40B4-BE49-F238E27FC236}">
+                <a16:creationId xmlns:a16="http://schemas.microsoft.com/office/drawing/2014/main" id="{81D2EB34-285C-2B4B-759D-EC150E10B312}"/>
+              </a:ext>
+            </a:extLst>
+          </p:cNvPr>
+          <p:cNvCxnSpPr>
+            <a:cxnSpLocks/>
+            <a:stCxn id="112" idx="0"/>
+          </p:cNvCxnSpPr>
+          <p:nvPr/>
+        </p:nvCxnSpPr>
+        <p:spPr>
+          <a:xfrm flipV="1">
+            <a:off x="3112225" y="4390919"/>
+            <a:ext cx="177075" cy="646771"/>
+          </a:xfrm>
+          <a:prstGeom prst="straightConnector1">
+            <a:avLst/>
+          </a:prstGeom>
+          <a:ln>
+            <a:tailEnd type="triangle"/>
+          </a:ln>
+        </p:spPr>
+        <p:style>
+          <a:lnRef idx="3">
+            <a:schemeClr val="accent2"/>
+          </a:lnRef>
+          <a:fillRef idx="0">
+            <a:schemeClr val="accent2"/>
+          </a:fillRef>
+          <a:effectRef idx="2">
+            <a:schemeClr val="accent2"/>
+          </a:effectRef>
+          <a:fontRef idx="minor">
+            <a:schemeClr val="tx1"/>
+          </a:fontRef>
+        </p:style>
+      </p:cxnSp>
+      <p:cxnSp>
+        <p:nvCxnSpPr>
+          <p:cNvPr id="131" name="Łącznik prosty ze strzałką 130">
+            <a:extLst>
+              <a:ext uri="{FF2B5EF4-FFF2-40B4-BE49-F238E27FC236}">
+                <a16:creationId xmlns:a16="http://schemas.microsoft.com/office/drawing/2014/main" id="{8C37F702-4EE0-4F21-55E6-716A66807B7A}"/>
+              </a:ext>
+            </a:extLst>
+          </p:cNvPr>
+          <p:cNvCxnSpPr>
+            <a:cxnSpLocks/>
+          </p:cNvCxnSpPr>
+          <p:nvPr/>
+        </p:nvCxnSpPr>
+        <p:spPr>
+          <a:xfrm flipV="1">
+            <a:off x="3289300" y="3032820"/>
+            <a:ext cx="289263" cy="980491"/>
+          </a:xfrm>
+          <a:prstGeom prst="straightConnector1">
+            <a:avLst/>
+          </a:prstGeom>
+          <a:ln>
+            <a:tailEnd type="triangle"/>
+          </a:ln>
+        </p:spPr>
+        <p:style>
+          <a:lnRef idx="3">
+            <a:schemeClr val="accent2"/>
+          </a:lnRef>
+          <a:fillRef idx="0">
+            <a:schemeClr val="accent2"/>
+          </a:fillRef>
+          <a:effectRef idx="2">
+            <a:schemeClr val="accent2"/>
+          </a:effectRef>
+          <a:fontRef idx="minor">
+            <a:schemeClr val="tx1"/>
+          </a:fontRef>
+        </p:style>
+      </p:cxnSp>
+      <p:cxnSp>
+        <p:nvCxnSpPr>
+          <p:cNvPr id="135" name="Łącznik prosty ze strzałką 134">
+            <a:extLst>
+              <a:ext uri="{FF2B5EF4-FFF2-40B4-BE49-F238E27FC236}">
+                <a16:creationId xmlns:a16="http://schemas.microsoft.com/office/drawing/2014/main" id="{50077E2F-48B9-FC6A-AA3C-6E8933FD931B}"/>
+              </a:ext>
+            </a:extLst>
+          </p:cNvPr>
+          <p:cNvCxnSpPr>
+            <a:cxnSpLocks/>
+          </p:cNvCxnSpPr>
+          <p:nvPr/>
+        </p:nvCxnSpPr>
+        <p:spPr>
+          <a:xfrm flipV="1">
+            <a:off x="3626765" y="2437463"/>
+            <a:ext cx="1246929" cy="214555"/>
+          </a:xfrm>
+          <a:prstGeom prst="straightConnector1">
+            <a:avLst/>
+          </a:prstGeom>
+          <a:ln>
+            <a:tailEnd type="triangle"/>
+          </a:ln>
+        </p:spPr>
+        <p:style>
+          <a:lnRef idx="3">
+            <a:schemeClr val="accent2"/>
+          </a:lnRef>
+          <a:fillRef idx="0">
+            <a:schemeClr val="accent2"/>
+          </a:fillRef>
+          <a:effectRef idx="2">
+            <a:schemeClr val="accent2"/>
+          </a:effectRef>
+          <a:fontRef idx="minor">
+            <a:schemeClr val="tx1"/>
+          </a:fontRef>
+        </p:style>
+      </p:cxnSp>
+      <p:sp>
+        <p:nvSpPr>
+          <p:cNvPr id="140" name="Prostokąt: zaokrąglone rogi 139">
+            <a:extLst>
+              <a:ext uri="{FF2B5EF4-FFF2-40B4-BE49-F238E27FC236}">
+                <a16:creationId xmlns:a16="http://schemas.microsoft.com/office/drawing/2014/main" id="{4CF63BC0-AA90-2A5D-C086-DDF8FCEC3116}"/>
+              </a:ext>
+            </a:extLst>
+          </p:cNvPr>
+          <p:cNvSpPr/>
+          <p:nvPr/>
+        </p:nvSpPr>
+        <p:spPr>
+          <a:xfrm>
+            <a:off x="4882433" y="2280861"/>
+            <a:ext cx="647309" cy="403767"/>
+          </a:xfrm>
+          <a:prstGeom prst="roundRect">
+            <a:avLst/>
+          </a:prstGeom>
+        </p:spPr>
+        <p:style>
+          <a:lnRef idx="0">
+            <a:schemeClr val="accent2"/>
+          </a:lnRef>
+          <a:fillRef idx="3">
+            <a:schemeClr val="accent2"/>
+          </a:fillRef>
+          <a:effectRef idx="3">
+            <a:schemeClr val="accent2"/>
+          </a:effectRef>
+          <a:fontRef idx="minor">
+            <a:schemeClr val="lt1"/>
+          </a:fontRef>
+        </p:style>
+        <p:txBody>
+          <a:bodyPr rtlCol="0" anchor="ctr"/>
+          <a:lstStyle/>
+          <a:p>
+            <a:pPr algn="ctr"/>
+            <a:r>
+              <a:rPr lang="en-US" dirty="0"/>
+              <a:t>End</a:t>
+            </a:r>
+          </a:p>
+        </p:txBody>
+      </p:sp>
+      <p:sp>
+        <p:nvSpPr>
+          <p:cNvPr id="142" name="pole tekstowe 141">
+            <a:extLst>
+              <a:ext uri="{FF2B5EF4-FFF2-40B4-BE49-F238E27FC236}">
+                <a16:creationId xmlns:a16="http://schemas.microsoft.com/office/drawing/2014/main" id="{5BD10849-C690-7389-9412-40CCFCF03196}"/>
+              </a:ext>
+            </a:extLst>
+          </p:cNvPr>
+          <p:cNvSpPr txBox="1"/>
+          <p:nvPr/>
+        </p:nvSpPr>
+        <p:spPr>
+          <a:xfrm>
+            <a:off x="2053872" y="4865638"/>
+            <a:ext cx="704913" cy="230832"/>
+          </a:xfrm>
+          <a:prstGeom prst="rect">
+            <a:avLst/>
+          </a:prstGeom>
+          <a:noFill/>
+        </p:spPr>
+        <p:txBody>
+          <a:bodyPr wrap="square" rtlCol="0">
+            <a:spAutoFit/>
+          </a:bodyPr>
+          <a:lstStyle/>
+          <a:p>
+            <a:pPr algn="ctr"/>
+            <a:r>
+              <a:rPr lang="en-US" sz="900" b="1" dirty="0">
+                <a:solidFill>
+                  <a:schemeClr val="accent6"/>
+                </a:solidFill>
+              </a:rPr>
+              <a:t>Count == 1</a:t>
+            </a:r>
+          </a:p>
+        </p:txBody>
+      </p:sp>
+      <p:sp>
+        <p:nvSpPr>
+          <p:cNvPr id="150" name="pole tekstowe 149">
+            <a:extLst>
+              <a:ext uri="{FF2B5EF4-FFF2-40B4-BE49-F238E27FC236}">
+                <a16:creationId xmlns:a16="http://schemas.microsoft.com/office/drawing/2014/main" id="{8C2DB64A-CCF9-36F7-CF8C-633E8FD81625}"/>
+              </a:ext>
+            </a:extLst>
+          </p:cNvPr>
+          <p:cNvSpPr txBox="1"/>
+          <p:nvPr/>
+        </p:nvSpPr>
+        <p:spPr>
+          <a:xfrm>
+            <a:off x="1361376" y="4868711"/>
+            <a:ext cx="704913" cy="230832"/>
+          </a:xfrm>
+          <a:prstGeom prst="rect">
+            <a:avLst/>
+          </a:prstGeom>
+          <a:noFill/>
+        </p:spPr>
+        <p:txBody>
+          <a:bodyPr wrap="square" rtlCol="0">
+            <a:spAutoFit/>
+          </a:bodyPr>
+          <a:lstStyle/>
+          <a:p>
+            <a:pPr algn="ctr"/>
+            <a:r>
+              <a:rPr lang="en-US" sz="900" b="1" dirty="0">
+                <a:solidFill>
+                  <a:schemeClr val="accent6"/>
+                </a:solidFill>
+              </a:rPr>
+              <a:t>Count &gt; 1</a:t>
+            </a:r>
+          </a:p>
+        </p:txBody>
+      </p:sp>
+      <p:cxnSp>
+        <p:nvCxnSpPr>
+          <p:cNvPr id="157" name="Łącznik prosty ze strzałką 156">
+            <a:extLst>
+              <a:ext uri="{FF2B5EF4-FFF2-40B4-BE49-F238E27FC236}">
+                <a16:creationId xmlns:a16="http://schemas.microsoft.com/office/drawing/2014/main" id="{16AB6119-D2BB-81C7-0979-C118B580D150}"/>
+              </a:ext>
+            </a:extLst>
+          </p:cNvPr>
+          <p:cNvCxnSpPr>
+            <a:cxnSpLocks/>
+          </p:cNvCxnSpPr>
+          <p:nvPr/>
+        </p:nvCxnSpPr>
+        <p:spPr>
+          <a:xfrm>
+            <a:off x="4386783" y="1826660"/>
+            <a:ext cx="704970" cy="2292095"/>
+          </a:xfrm>
+          <a:prstGeom prst="straightConnector1">
+            <a:avLst/>
+          </a:prstGeom>
+          <a:ln>
+            <a:tailEnd type="triangle"/>
+          </a:ln>
+        </p:spPr>
+        <p:style>
+          <a:lnRef idx="3">
+            <a:schemeClr val="accent6"/>
+          </a:lnRef>
+          <a:fillRef idx="0">
+            <a:schemeClr val="accent6"/>
+          </a:fillRef>
+          <a:effectRef idx="2">
+            <a:schemeClr val="accent6"/>
+          </a:effectRef>
+          <a:fontRef idx="minor">
+            <a:schemeClr val="tx1"/>
+          </a:fontRef>
+        </p:style>
+      </p:cxnSp>
+      <p:sp>
+        <p:nvSpPr>
+          <p:cNvPr id="174" name="pole tekstowe 173">
+            <a:extLst>
+              <a:ext uri="{FF2B5EF4-FFF2-40B4-BE49-F238E27FC236}">
+                <a16:creationId xmlns:a16="http://schemas.microsoft.com/office/drawing/2014/main" id="{EB848076-E837-A7D2-506C-9A9B97D7DE23}"/>
+              </a:ext>
+            </a:extLst>
+          </p:cNvPr>
+          <p:cNvSpPr txBox="1"/>
+          <p:nvPr/>
+        </p:nvSpPr>
+        <p:spPr>
+          <a:xfrm>
+            <a:off x="3555683" y="4876015"/>
+            <a:ext cx="704913" cy="230832"/>
+          </a:xfrm>
+          <a:prstGeom prst="rect">
+            <a:avLst/>
+          </a:prstGeom>
+          <a:noFill/>
+        </p:spPr>
+        <p:txBody>
+          <a:bodyPr wrap="square" rtlCol="0">
+            <a:spAutoFit/>
+          </a:bodyPr>
+          <a:lstStyle/>
+          <a:p>
+            <a:pPr algn="ctr"/>
+            <a:r>
+              <a:rPr lang="en-US" sz="900" b="1" dirty="0">
+                <a:solidFill>
+                  <a:schemeClr val="accent6"/>
+                </a:solidFill>
+              </a:rPr>
+              <a:t>Count == 0</a:t>
+            </a:r>
+          </a:p>
+        </p:txBody>
+      </p:sp>
+      <p:sp>
+        <p:nvSpPr>
+          <p:cNvPr id="175" name="pole tekstowe 174">
+            <a:extLst>
+              <a:ext uri="{FF2B5EF4-FFF2-40B4-BE49-F238E27FC236}">
+                <a16:creationId xmlns:a16="http://schemas.microsoft.com/office/drawing/2014/main" id="{E95DA522-7C24-B0E0-ED2E-6144E72C42DA}"/>
+              </a:ext>
+            </a:extLst>
+          </p:cNvPr>
+          <p:cNvSpPr txBox="1"/>
+          <p:nvPr/>
+        </p:nvSpPr>
+        <p:spPr>
+          <a:xfrm>
+            <a:off x="4305567" y="4884688"/>
+            <a:ext cx="704913" cy="230832"/>
+          </a:xfrm>
+          <a:prstGeom prst="rect">
+            <a:avLst/>
+          </a:prstGeom>
+          <a:noFill/>
+        </p:spPr>
+        <p:txBody>
+          <a:bodyPr wrap="square" rtlCol="0">
+            <a:spAutoFit/>
+          </a:bodyPr>
+          <a:lstStyle/>
+          <a:p>
+            <a:pPr algn="ctr"/>
+            <a:r>
+              <a:rPr lang="en-US" sz="900" b="1" dirty="0">
+                <a:solidFill>
+                  <a:schemeClr val="accent6"/>
+                </a:solidFill>
+              </a:rPr>
+              <a:t>Count &gt; 0</a:t>
+            </a:r>
+          </a:p>
+        </p:txBody>
+      </p:sp>
     </p:spTree>
     <p:extLst>
       <p:ext uri="{BB962C8B-B14F-4D97-AF65-F5344CB8AC3E}">
-        <p14:creationId xmlns:p14="http://schemas.microsoft.com/office/powerpoint/2010/main" val="21460416"/>
+        <p14:creationId xmlns:p14="http://schemas.microsoft.com/office/powerpoint/2010/main" val="2132662021"/>
       </p:ext>
     </p:extLst>
   </p:cSld>
@@ -7932,7 +10641,7 @@
 </p:sld>
 </file>
 
-<file path=ppt/slides/slide4.xml><?xml version="1.0" encoding="utf-8"?>
+<file path=ppt/slides/slide6.xml><?xml version="1.0" encoding="utf-8"?>
 <p:sld xmlns:a="http://schemas.openxmlformats.org/drawingml/2006/main" xmlns:r="http://schemas.openxmlformats.org/officeDocument/2006/relationships" xmlns:p="http://schemas.openxmlformats.org/presentationml/2006/main">
   <p:cSld>
     <p:spTree>
@@ -7957,10 +10666,10 @@
       </p:grpSpPr>
       <p:pic>
         <p:nvPicPr>
-          <p:cNvPr id="75" name="Obraz 74">
-            <a:extLst>
-              <a:ext uri="{FF2B5EF4-FFF2-40B4-BE49-F238E27FC236}">
-                <a16:creationId xmlns:a16="http://schemas.microsoft.com/office/drawing/2014/main" id="{BECE016E-6725-9C7E-171C-398650795766}"/>
+          <p:cNvPr id="5" name="Obraz 4">
+            <a:extLst>
+              <a:ext uri="{FF2B5EF4-FFF2-40B4-BE49-F238E27FC236}">
+                <a16:creationId xmlns:a16="http://schemas.microsoft.com/office/drawing/2014/main" id="{2D34841B-C04C-FFF1-87C8-72881EFBEEFE}"/>
               </a:ext>
             </a:extLst>
           </p:cNvPr>
@@ -7977,8 +10686,8 @@
         </p:blipFill>
         <p:spPr>
           <a:xfrm>
-            <a:off x="3122647" y="2556587"/>
-            <a:ext cx="7588900" cy="2129997"/>
+            <a:off x="2270799" y="1255893"/>
+            <a:ext cx="8371801" cy="2603914"/>
           </a:xfrm>
           <a:prstGeom prst="rect">
             <a:avLst/>
@@ -8054,8 +10763,8 @@
         </p:nvSpPr>
         <p:spPr>
           <a:xfrm>
-            <a:off x="335901" y="3265715"/>
-            <a:ext cx="2264230" cy="833532"/>
+            <a:off x="479842" y="2101330"/>
+            <a:ext cx="1435749" cy="1219199"/>
           </a:xfrm>
           <a:prstGeom prst="roundRect">
             <a:avLst/>
@@ -8063,13 +10772,13 @@
         </p:spPr>
         <p:style>
           <a:lnRef idx="1">
-            <a:schemeClr val="accent1"/>
+            <a:schemeClr val="accent6"/>
           </a:lnRef>
           <a:fillRef idx="2">
-            <a:schemeClr val="accent1"/>
+            <a:schemeClr val="accent6"/>
           </a:fillRef>
           <a:effectRef idx="1">
-            <a:schemeClr val="accent1"/>
+            <a:schemeClr val="accent6"/>
           </a:effectRef>
           <a:fontRef idx="minor">
             <a:schemeClr val="dk1"/>
@@ -8086,7 +10795,7 @@
             </a:r>
             <a:r>
               <a:rPr lang="en-US" sz="1200" dirty="0" err="1"/>
-              <a:t>shaderUser</a:t>
+              <a:t>shader_observer</a:t>
             </a:r>
             <a:r>
               <a:rPr lang="en-US" sz="1200" dirty="0"/>
@@ -8109,7 +10818,7 @@
         </p:nvSpPr>
         <p:spPr>
           <a:xfrm>
-            <a:off x="2662334" y="3072880"/>
+            <a:off x="1970184" y="2133080"/>
             <a:ext cx="367004" cy="1219200"/>
           </a:xfrm>
           <a:prstGeom prst="leftBrace">
@@ -8120,7 +10829,7 @@
           </a:prstGeom>
           <a:ln w="38100">
             <a:solidFill>
-              <a:srgbClr val="FF0000"/>
+              <a:schemeClr val="accent6"/>
             </a:solidFill>
           </a:ln>
         </p:spPr>
@@ -8161,7 +10870,7 @@
         </p:nvCxnSpPr>
         <p:spPr>
           <a:xfrm>
-            <a:off x="5984035" y="3072880"/>
+            <a:off x="6131773" y="2101330"/>
             <a:ext cx="734009" cy="0"/>
           </a:xfrm>
           <a:prstGeom prst="line">
@@ -8169,7 +10878,7 @@
           </a:prstGeom>
           <a:ln w="28575">
             <a:solidFill>
-              <a:srgbClr val="FF0000"/>
+              <a:srgbClr val="FFFF00"/>
             </a:solidFill>
           </a:ln>
         </p:spPr>
@@ -8203,16 +10912,16 @@
           <p:nvPr/>
         </p:nvCxnSpPr>
         <p:spPr>
-          <a:xfrm>
-            <a:off x="5050974" y="4624872"/>
-            <a:ext cx="391886" cy="0"/>
+          <a:xfrm flipV="1">
+            <a:off x="7112000" y="3747092"/>
+            <a:ext cx="650655" cy="1480"/>
           </a:xfrm>
           <a:prstGeom prst="line">
             <a:avLst/>
           </a:prstGeom>
           <a:ln w="38100">
             <a:solidFill>
-              <a:srgbClr val="FF0000"/>
+              <a:srgbClr val="FFFF00"/>
             </a:solidFill>
           </a:ln>
         </p:spPr>
@@ -8245,7 +10954,7 @@
         </p:nvSpPr>
         <p:spPr>
           <a:xfrm>
-            <a:off x="6562535" y="1395605"/>
+            <a:off x="7803372" y="4297645"/>
             <a:ext cx="3645156" cy="666621"/>
           </a:xfrm>
           <a:prstGeom prst="roundRect">
@@ -8254,13 +10963,13 @@
         </p:spPr>
         <p:style>
           <a:lnRef idx="1">
-            <a:schemeClr val="accent1"/>
+            <a:schemeClr val="accent4"/>
           </a:lnRef>
           <a:fillRef idx="2">
-            <a:schemeClr val="accent1"/>
+            <a:schemeClr val="accent4"/>
           </a:fillRef>
           <a:effectRef idx="1">
-            <a:schemeClr val="accent1"/>
+            <a:schemeClr val="accent4"/>
           </a:effectRef>
           <a:fontRef idx="minor">
             <a:schemeClr val="dk1"/>
@@ -8300,9 +11009,9 @@
           <p:nvPr/>
         </p:nvCxnSpPr>
         <p:spPr>
-          <a:xfrm>
-            <a:off x="4708851" y="3387009"/>
-            <a:ext cx="4012163" cy="0"/>
+          <a:xfrm flipV="1">
+            <a:off x="4358824" y="2443024"/>
+            <a:ext cx="3779030" cy="10241"/>
           </a:xfrm>
           <a:prstGeom prst="line">
             <a:avLst/>
@@ -8328,41 +11037,167 @@
           </a:fontRef>
         </p:style>
       </p:cxnSp>
+      <p:sp>
+        <p:nvSpPr>
+          <p:cNvPr id="81" name="Prostokąt: zaokrąglone rogi 80">
+            <a:extLst>
+              <a:ext uri="{FF2B5EF4-FFF2-40B4-BE49-F238E27FC236}">
+                <a16:creationId xmlns:a16="http://schemas.microsoft.com/office/drawing/2014/main" id="{247C19A0-D2AE-C068-79EF-8EFAF8DC93C6}"/>
+              </a:ext>
+            </a:extLst>
+          </p:cNvPr>
+          <p:cNvSpPr/>
+          <p:nvPr/>
+        </p:nvSpPr>
+        <p:spPr>
+          <a:xfrm>
+            <a:off x="1238085" y="4434874"/>
+            <a:ext cx="4086802" cy="1058784"/>
+          </a:xfrm>
+          <a:prstGeom prst="roundRect">
+            <a:avLst/>
+          </a:prstGeom>
+        </p:spPr>
+        <p:style>
+          <a:lnRef idx="1">
+            <a:schemeClr val="accent2"/>
+          </a:lnRef>
+          <a:fillRef idx="2">
+            <a:schemeClr val="accent2"/>
+          </a:fillRef>
+          <a:effectRef idx="1">
+            <a:schemeClr val="accent2"/>
+          </a:effectRef>
+          <a:fontRef idx="minor">
+            <a:schemeClr val="dk1"/>
+          </a:fontRef>
+        </p:style>
+        <p:txBody>
+          <a:bodyPr rtlCol="0" anchor="ctr"/>
+          <a:lstStyle/>
+          <a:p>
+            <a:pPr algn="ctr"/>
+            <a:r>
+              <a:rPr lang="en-US" sz="1200" dirty="0" err="1"/>
+              <a:t>AssetHandle</a:t>
+            </a:r>
+            <a:r>
+              <a:rPr lang="en-US" sz="1200" dirty="0"/>
+              <a:t> is constructible on the fly.</a:t>
+            </a:r>
+          </a:p>
+          <a:p>
+            <a:pPr algn="ctr"/>
+            <a:endParaRPr lang="en-US" sz="1200" dirty="0"/>
+          </a:p>
+          <a:p>
+            <a:pPr algn="ctr"/>
+            <a:r>
+              <a:rPr lang="en-US" sz="1200" dirty="0" err="1"/>
+              <a:t>AssetHandles</a:t>
+            </a:r>
+            <a:r>
+              <a:rPr lang="en-US" sz="1200" dirty="0"/>
+              <a:t> with </a:t>
+            </a:r>
+            <a:r>
+              <a:rPr lang="en-US" sz="1200" dirty="0" err="1"/>
+              <a:t>AssetLoadingPriority</a:t>
+            </a:r>
+            <a:r>
+              <a:rPr lang="en-US" sz="1200" dirty="0"/>
+              <a:t>::None are not globally counted – no hidden cost.</a:t>
+            </a:r>
+          </a:p>
+        </p:txBody>
+      </p:sp>
+      <p:sp>
+        <p:nvSpPr>
+          <p:cNvPr id="94" name="Łuk 93">
+            <a:extLst>
+              <a:ext uri="{FF2B5EF4-FFF2-40B4-BE49-F238E27FC236}">
+                <a16:creationId xmlns:a16="http://schemas.microsoft.com/office/drawing/2014/main" id="{A4E96E68-DB85-581D-84BA-BFE55E13D1FC}"/>
+              </a:ext>
+            </a:extLst>
+          </p:cNvPr>
+          <p:cNvSpPr/>
+          <p:nvPr/>
+        </p:nvSpPr>
+        <p:spPr>
+          <a:xfrm flipH="1">
+            <a:off x="2133267" y="2448144"/>
+            <a:ext cx="4451114" cy="3957526"/>
+          </a:xfrm>
+          <a:prstGeom prst="arc">
+            <a:avLst/>
+          </a:prstGeom>
+          <a:ln w="28575">
+            <a:solidFill>
+              <a:srgbClr val="FF0000"/>
+            </a:solidFill>
+            <a:headEnd type="none" w="med" len="med"/>
+            <a:tailEnd type="triangle" w="med" len="med"/>
+          </a:ln>
+        </p:spPr>
+        <p:style>
+          <a:lnRef idx="1">
+            <a:schemeClr val="accent1"/>
+          </a:lnRef>
+          <a:fillRef idx="0">
+            <a:schemeClr val="accent1"/>
+          </a:fillRef>
+          <a:effectRef idx="0">
+            <a:schemeClr val="accent1"/>
+          </a:effectRef>
+          <a:fontRef idx="minor">
+            <a:schemeClr val="tx1"/>
+          </a:fontRef>
+        </p:style>
+        <p:txBody>
+          <a:bodyPr rtlCol="0" anchor="ctr"/>
+          <a:lstStyle/>
+          <a:p>
+            <a:pPr algn="ctr"/>
+            <a:endParaRPr lang="en-US"/>
+          </a:p>
+        </p:txBody>
+      </p:sp>
       <p:cxnSp>
         <p:nvCxnSpPr>
-          <p:cNvPr id="78" name="Łącznik: zakrzywiony 77">
-            <a:extLst>
-              <a:ext uri="{FF2B5EF4-FFF2-40B4-BE49-F238E27FC236}">
-                <a16:creationId xmlns:a16="http://schemas.microsoft.com/office/drawing/2014/main" id="{626567C6-750C-9D8B-C424-13B23134FA21}"/>
+          <p:cNvPr id="14" name="Łącznik prosty 13">
+            <a:extLst>
+              <a:ext uri="{FF2B5EF4-FFF2-40B4-BE49-F238E27FC236}">
+                <a16:creationId xmlns:a16="http://schemas.microsoft.com/office/drawing/2014/main" id="{650A180E-92C1-8DFE-E570-0D3884EF6749}"/>
               </a:ext>
             </a:extLst>
           </p:cNvPr>
           <p:cNvCxnSpPr>
             <a:cxnSpLocks/>
-            <a:endCxn id="63" idx="2"/>
           </p:cNvCxnSpPr>
           <p:nvPr/>
         </p:nvCxnSpPr>
         <p:spPr>
-          <a:xfrm flipV="1">
-            <a:off x="6714932" y="2062226"/>
-            <a:ext cx="1670181" cy="1010654"/>
-          </a:xfrm>
-          <a:prstGeom prst="curvedConnector2">
+          <a:xfrm>
+            <a:off x="4214548" y="1946173"/>
+            <a:ext cx="5272352" cy="0"/>
+          </a:xfrm>
+          <a:prstGeom prst="line">
             <a:avLst/>
           </a:prstGeom>
           <a:ln w="28575">
-            <a:tailEnd type="triangle"/>
+            <a:solidFill>
+              <a:srgbClr val="FF0000"/>
+            </a:solidFill>
           </a:ln>
         </p:spPr>
         <p:style>
-          <a:lnRef idx="1">
+          <a:lnRef idx="3">
             <a:schemeClr val="accent1"/>
           </a:lnRef>
           <a:fillRef idx="0">
             <a:schemeClr val="accent1"/>
           </a:fillRef>
-          <a:effectRef idx="0">
+          <a:effectRef idx="2">
             <a:schemeClr val="accent1"/>
           </a:effectRef>
           <a:fontRef idx="minor">
@@ -8370,41 +11205,201 @@
           </a:fontRef>
         </p:style>
       </p:cxnSp>
+      <p:sp>
+        <p:nvSpPr>
+          <p:cNvPr id="22" name="Łuk 21">
+            <a:extLst>
+              <a:ext uri="{FF2B5EF4-FFF2-40B4-BE49-F238E27FC236}">
+                <a16:creationId xmlns:a16="http://schemas.microsoft.com/office/drawing/2014/main" id="{AD27090E-36E8-26A3-3128-8420F7C6807A}"/>
+              </a:ext>
+            </a:extLst>
+          </p:cNvPr>
+          <p:cNvSpPr/>
+          <p:nvPr/>
+        </p:nvSpPr>
+        <p:spPr>
+          <a:xfrm rot="5400000" flipH="1" flipV="1">
+            <a:off x="4590577" y="1466807"/>
+            <a:ext cx="4412787" cy="5681834"/>
+          </a:xfrm>
+          <a:prstGeom prst="arc">
+            <a:avLst>
+              <a:gd name="adj1" fmla="val 87858"/>
+              <a:gd name="adj2" fmla="val 5365406"/>
+            </a:avLst>
+          </a:prstGeom>
+          <a:ln w="28575">
+            <a:solidFill>
+              <a:srgbClr val="FFFF00"/>
+            </a:solidFill>
+            <a:headEnd type="none" w="med" len="med"/>
+            <a:tailEnd type="triangle" w="med" len="med"/>
+          </a:ln>
+        </p:spPr>
+        <p:style>
+          <a:lnRef idx="1">
+            <a:schemeClr val="accent1"/>
+          </a:lnRef>
+          <a:fillRef idx="0">
+            <a:schemeClr val="accent1"/>
+          </a:fillRef>
+          <a:effectRef idx="0">
+            <a:schemeClr val="accent1"/>
+          </a:effectRef>
+          <a:fontRef idx="minor">
+            <a:schemeClr val="tx1"/>
+          </a:fontRef>
+        </p:style>
+        <p:txBody>
+          <a:bodyPr rtlCol="0" anchor="ctr"/>
+          <a:lstStyle/>
+          <a:p>
+            <a:pPr algn="ctr"/>
+            <a:endParaRPr lang="en-US"/>
+          </a:p>
+        </p:txBody>
+      </p:sp>
+      <p:sp>
+        <p:nvSpPr>
+          <p:cNvPr id="26" name="Łuk 25">
+            <a:extLst>
+              <a:ext uri="{FF2B5EF4-FFF2-40B4-BE49-F238E27FC236}">
+                <a16:creationId xmlns:a16="http://schemas.microsoft.com/office/drawing/2014/main" id="{FB6D6F38-CC39-19D6-79BD-D8E177A58D93}"/>
+              </a:ext>
+            </a:extLst>
+          </p:cNvPr>
+          <p:cNvSpPr/>
+          <p:nvPr/>
+        </p:nvSpPr>
+        <p:spPr>
+          <a:xfrm flipH="1">
+            <a:off x="2130534" y="1946173"/>
+            <a:ext cx="4155966" cy="4960461"/>
+          </a:xfrm>
+          <a:prstGeom prst="arc">
+            <a:avLst/>
+          </a:prstGeom>
+          <a:ln w="28575">
+            <a:solidFill>
+              <a:srgbClr val="FF0000"/>
+            </a:solidFill>
+            <a:headEnd type="none" w="med" len="med"/>
+            <a:tailEnd type="triangle" w="med" len="med"/>
+          </a:ln>
+        </p:spPr>
+        <p:style>
+          <a:lnRef idx="1">
+            <a:schemeClr val="accent1"/>
+          </a:lnRef>
+          <a:fillRef idx="0">
+            <a:schemeClr val="accent1"/>
+          </a:fillRef>
+          <a:effectRef idx="0">
+            <a:schemeClr val="accent1"/>
+          </a:effectRef>
+          <a:fontRef idx="minor">
+            <a:schemeClr val="tx1"/>
+          </a:fontRef>
+        </p:style>
+        <p:txBody>
+          <a:bodyPr rtlCol="0" anchor="ctr"/>
+          <a:lstStyle/>
+          <a:p>
+            <a:pPr algn="ctr"/>
+            <a:endParaRPr lang="en-US"/>
+          </a:p>
+        </p:txBody>
+      </p:sp>
+      <p:sp>
+        <p:nvSpPr>
+          <p:cNvPr id="28" name="Łuk 27">
+            <a:extLst>
+              <a:ext uri="{FF2B5EF4-FFF2-40B4-BE49-F238E27FC236}">
+                <a16:creationId xmlns:a16="http://schemas.microsoft.com/office/drawing/2014/main" id="{7AE2D700-25D6-7916-5ED2-1ABDBBBDD08E}"/>
+              </a:ext>
+            </a:extLst>
+          </p:cNvPr>
+          <p:cNvSpPr/>
+          <p:nvPr/>
+        </p:nvSpPr>
+        <p:spPr>
+          <a:xfrm rot="5400000" flipH="1" flipV="1">
+            <a:off x="7150852" y="2374740"/>
+            <a:ext cx="1115577" cy="3847582"/>
+          </a:xfrm>
+          <a:prstGeom prst="arc">
+            <a:avLst>
+              <a:gd name="adj1" fmla="val 87858"/>
+              <a:gd name="adj2" fmla="val 5365406"/>
+            </a:avLst>
+          </a:prstGeom>
+          <a:ln w="28575">
+            <a:solidFill>
+              <a:srgbClr val="FFFF00"/>
+            </a:solidFill>
+            <a:headEnd type="none" w="med" len="med"/>
+            <a:tailEnd type="triangle" w="med" len="med"/>
+          </a:ln>
+        </p:spPr>
+        <p:style>
+          <a:lnRef idx="1">
+            <a:schemeClr val="accent1"/>
+          </a:lnRef>
+          <a:fillRef idx="0">
+            <a:schemeClr val="accent1"/>
+          </a:fillRef>
+          <a:effectRef idx="0">
+            <a:schemeClr val="accent1"/>
+          </a:effectRef>
+          <a:fontRef idx="minor">
+            <a:schemeClr val="tx1"/>
+          </a:fontRef>
+        </p:style>
+        <p:txBody>
+          <a:bodyPr rtlCol="0" anchor="ctr"/>
+          <a:lstStyle/>
+          <a:p>
+            <a:pPr algn="ctr"/>
+            <a:endParaRPr lang="en-US"/>
+          </a:p>
+        </p:txBody>
+      </p:sp>
       <p:cxnSp>
         <p:nvCxnSpPr>
-          <p:cNvPr id="80" name="Łącznik: zakrzywiony 79">
-            <a:extLst>
-              <a:ext uri="{FF2B5EF4-FFF2-40B4-BE49-F238E27FC236}">
-                <a16:creationId xmlns:a16="http://schemas.microsoft.com/office/drawing/2014/main" id="{B5245C15-7103-9FC9-F784-DB209C24C8AB}"/>
+          <p:cNvPr id="29" name="Łącznik prosty 28">
+            <a:extLst>
+              <a:ext uri="{FF2B5EF4-FFF2-40B4-BE49-F238E27FC236}">
+                <a16:creationId xmlns:a16="http://schemas.microsoft.com/office/drawing/2014/main" id="{0E1BAE77-2E62-635A-960E-D8CE45C93A4E}"/>
               </a:ext>
             </a:extLst>
           </p:cNvPr>
           <p:cNvCxnSpPr>
             <a:cxnSpLocks/>
-            <a:endCxn id="63" idx="2"/>
           </p:cNvCxnSpPr>
           <p:nvPr/>
         </p:nvCxnSpPr>
         <p:spPr>
-          <a:xfrm flipV="1">
-            <a:off x="5442860" y="2062226"/>
-            <a:ext cx="2942253" cy="2562646"/>
-          </a:xfrm>
-          <a:prstGeom prst="curvedConnector2">
+          <a:xfrm>
+            <a:off x="2418572" y="3743303"/>
+            <a:ext cx="4625771" cy="3789"/>
+          </a:xfrm>
+          <a:prstGeom prst="line">
             <a:avLst/>
           </a:prstGeom>
           <a:ln w="28575">
-            <a:tailEnd type="triangle"/>
+            <a:solidFill>
+              <a:srgbClr val="FF0000"/>
+            </a:solidFill>
           </a:ln>
         </p:spPr>
         <p:style>
-          <a:lnRef idx="1">
+          <a:lnRef idx="3">
             <a:schemeClr val="accent1"/>
           </a:lnRef>
           <a:fillRef idx="0">
             <a:schemeClr val="accent1"/>
           </a:fillRef>
-          <a:effectRef idx="0">
+          <a:effectRef idx="2">
             <a:schemeClr val="accent1"/>
           </a:effectRef>
           <a:fontRef idx="minor">
@@ -8414,10 +11409,10 @@
       </p:cxnSp>
       <p:sp>
         <p:nvSpPr>
-          <p:cNvPr id="81" name="Prostokąt: zaokrąglone rogi 80">
-            <a:extLst>
-              <a:ext uri="{FF2B5EF4-FFF2-40B4-BE49-F238E27FC236}">
-                <a16:creationId xmlns:a16="http://schemas.microsoft.com/office/drawing/2014/main" id="{247C19A0-D2AE-C068-79EF-8EFAF8DC93C6}"/>
+          <p:cNvPr id="32" name="Łuk 31">
+            <a:extLst>
+              <a:ext uri="{FF2B5EF4-FFF2-40B4-BE49-F238E27FC236}">
+                <a16:creationId xmlns:a16="http://schemas.microsoft.com/office/drawing/2014/main" id="{7E163559-6A1C-20D6-277D-4F74766241EA}"/>
               </a:ext>
             </a:extLst>
           </p:cNvPr>
@@ -8425,88 +11420,17 @@
           <p:nvPr/>
         </p:nvSpPr>
         <p:spPr>
-          <a:xfrm>
-            <a:off x="7551582" y="5074538"/>
-            <a:ext cx="4086802" cy="1058784"/>
-          </a:xfrm>
-          <a:prstGeom prst="roundRect">
-            <a:avLst/>
-          </a:prstGeom>
-        </p:spPr>
-        <p:style>
-          <a:lnRef idx="1">
-            <a:schemeClr val="accent1"/>
-          </a:lnRef>
-          <a:fillRef idx="2">
-            <a:schemeClr val="accent1"/>
-          </a:fillRef>
-          <a:effectRef idx="1">
-            <a:schemeClr val="accent1"/>
-          </a:effectRef>
-          <a:fontRef idx="minor">
-            <a:schemeClr val="dk1"/>
-          </a:fontRef>
-        </p:style>
-        <p:txBody>
-          <a:bodyPr rtlCol="0" anchor="ctr"/>
-          <a:lstStyle/>
-          <a:p>
-            <a:pPr algn="ctr"/>
-            <a:r>
-              <a:rPr lang="en-US" sz="1200" dirty="0" err="1"/>
-              <a:t>AssetHandle</a:t>
-            </a:r>
-            <a:r>
-              <a:rPr lang="en-US" sz="1200" dirty="0"/>
-              <a:t> is constructible on the fly.</a:t>
-            </a:r>
-          </a:p>
-          <a:p>
-            <a:pPr algn="ctr"/>
-            <a:endParaRPr lang="en-US" sz="1200" dirty="0"/>
-          </a:p>
-          <a:p>
-            <a:pPr algn="ctr"/>
-            <a:r>
-              <a:rPr lang="en-US" sz="1200" dirty="0" err="1"/>
-              <a:t>AssetHandles</a:t>
-            </a:r>
-            <a:r>
-              <a:rPr lang="en-US" sz="1200" dirty="0"/>
-              <a:t> with </a:t>
-            </a:r>
-            <a:r>
-              <a:rPr lang="en-US" sz="1200" dirty="0" err="1"/>
-              <a:t>AssetLoadingPriority</a:t>
-            </a:r>
-            <a:r>
-              <a:rPr lang="en-US" sz="1200" dirty="0"/>
-              <a:t>::None are not globally counted – no hidden cost.</a:t>
-            </a:r>
-          </a:p>
-        </p:txBody>
-      </p:sp>
-      <p:sp>
-        <p:nvSpPr>
-          <p:cNvPr id="94" name="Łuk 93">
-            <a:extLst>
-              <a:ext uri="{FF2B5EF4-FFF2-40B4-BE49-F238E27FC236}">
-                <a16:creationId xmlns:a16="http://schemas.microsoft.com/office/drawing/2014/main" id="{A4E96E68-DB85-581D-84BA-BFE55E13D1FC}"/>
-              </a:ext>
-            </a:extLst>
-          </p:cNvPr>
-          <p:cNvSpPr/>
-          <p:nvPr/>
-        </p:nvSpPr>
-        <p:spPr>
-          <a:xfrm>
-            <a:off x="7641775" y="3393065"/>
-            <a:ext cx="2158482" cy="3374733"/>
+          <a:xfrm flipH="1">
+            <a:off x="2127810" y="3738946"/>
+            <a:ext cx="603531" cy="1391854"/>
           </a:xfrm>
           <a:prstGeom prst="arc">
             <a:avLst/>
           </a:prstGeom>
           <a:ln w="28575">
+            <a:solidFill>
+              <a:srgbClr val="FF0000"/>
+            </a:solidFill>
             <a:headEnd type="none" w="med" len="med"/>
             <a:tailEnd type="triangle" w="med" len="med"/>
           </a:ln>
@@ -8547,7 +11471,7 @@
 </p:sld>
 </file>
 
-<file path=ppt/slides/slide5.xml><?xml version="1.0" encoding="utf-8"?>
+<file path=ppt/slides/slide7.xml><?xml version="1.0" encoding="utf-8"?>
 <p:sld xmlns:a="http://schemas.openxmlformats.org/drawingml/2006/main" xmlns:r="http://schemas.openxmlformats.org/officeDocument/2006/relationships" xmlns:p="http://schemas.openxmlformats.org/presentationml/2006/main">
   <p:cSld>
     <p:spTree>
@@ -8743,10 +11667,9 @@
           <a:p>
             <a:pPr algn="ctr"/>
             <a:r>
-              <a:rPr lang="en-US" dirty="0" err="1"/>
-              <a:t>MaterialInstance</a:t>
-            </a:r>
-            <a:endParaRPr lang="en-US" dirty="0"/>
+              <a:rPr lang="en-US" dirty="0"/>
+              <a:t>Material</a:t>
+            </a:r>
           </a:p>
         </p:txBody>
       </p:sp>
@@ -9201,9 +12124,10 @@
           <a:p>
             <a:pPr algn="ctr"/>
             <a:r>
-              <a:rPr lang="en-US" dirty="0"/>
-              <a:t>Material</a:t>
-            </a:r>
+              <a:rPr lang="en-US" dirty="0" err="1"/>
+              <a:t>ShadingModel</a:t>
+            </a:r>
+            <a:endParaRPr lang="en-US" dirty="0"/>
           </a:p>
         </p:txBody>
       </p:sp>
@@ -9629,10 +12553,9 @@
           <a:p>
             <a:pPr algn="ctr"/>
             <a:r>
-              <a:rPr lang="en-US" dirty="0" err="1"/>
-              <a:t>MaterialInstance</a:t>
-            </a:r>
-            <a:endParaRPr lang="en-US" dirty="0"/>
+              <a:rPr lang="en-US" dirty="0"/>
+              <a:t>Material</a:t>
+            </a:r>
           </a:p>
         </p:txBody>
       </p:sp>
@@ -9771,9 +12694,10 @@
           <a:p>
             <a:pPr algn="ctr"/>
             <a:r>
-              <a:rPr lang="en-US" dirty="0"/>
-              <a:t>Material</a:t>
-            </a:r>
+              <a:rPr lang="en-US" dirty="0" err="1"/>
+              <a:t>ShadingModel</a:t>
+            </a:r>
+            <a:endParaRPr lang="en-US" dirty="0"/>
           </a:p>
         </p:txBody>
       </p:sp>

</xml_diff>

<commit_message>
Scene components for geometry assets, oragnisation of scene components, continuation of conforming engine to new assets api
</commit_message>
<xml_diff>
--- a/Documentation/Asset Pipeline.pptx
+++ b/Documentation/Asset Pipeline.pptx
@@ -10,11 +10,11 @@
   <p:sldIdLst>
     <p:sldId id="256" r:id="rId2"/>
     <p:sldId id="261" r:id="rId3"/>
-    <p:sldId id="265" r:id="rId4"/>
-    <p:sldId id="260" r:id="rId5"/>
-    <p:sldId id="264" r:id="rId6"/>
-    <p:sldId id="262" r:id="rId7"/>
-    <p:sldId id="263" r:id="rId8"/>
+    <p:sldId id="263" r:id="rId4"/>
+    <p:sldId id="265" r:id="rId5"/>
+    <p:sldId id="260" r:id="rId6"/>
+    <p:sldId id="264" r:id="rId7"/>
+    <p:sldId id="262" r:id="rId8"/>
   </p:sldIdLst>
   <p:sldSz cx="12192000" cy="6858000"/>
   <p:notesSz cx="6858000" cy="9144000"/>
@@ -215,7 +215,7 @@
           <a:p>
             <a:fld id="{D0E2DD2C-27F7-4F93-96E8-CD28AD9267D9}" type="datetimeFigureOut">
               <a:rPr lang="en-US" smtClean="0"/>
-              <a:t>5/20/2025</a:t>
+              <a:t>5/22/2025</a:t>
             </a:fld>
             <a:endParaRPr lang="en-US"/>
           </a:p>
@@ -656,7 +656,7 @@
           <a:p>
             <a:fld id="{583D7F03-7197-42E4-9778-D52D335F305D}" type="slidenum">
               <a:rPr lang="en-US" smtClean="0"/>
-              <a:t>3</a:t>
+              <a:t>4</a:t>
             </a:fld>
             <a:endParaRPr lang="en-US"/>
           </a:p>
@@ -822,7 +822,7 @@
           <a:p>
             <a:fld id="{783DC7D5-4D76-4679-A391-31CBAFA90932}" type="datetimeFigureOut">
               <a:rPr lang="en-US" smtClean="0"/>
-              <a:t>5/20/2025</a:t>
+              <a:t>5/22/2025</a:t>
             </a:fld>
             <a:endParaRPr lang="en-US"/>
           </a:p>
@@ -1020,7 +1020,7 @@
           <a:p>
             <a:fld id="{783DC7D5-4D76-4679-A391-31CBAFA90932}" type="datetimeFigureOut">
               <a:rPr lang="en-US" smtClean="0"/>
-              <a:t>5/20/2025</a:t>
+              <a:t>5/22/2025</a:t>
             </a:fld>
             <a:endParaRPr lang="en-US"/>
           </a:p>
@@ -1228,7 +1228,7 @@
           <a:p>
             <a:fld id="{783DC7D5-4D76-4679-A391-31CBAFA90932}" type="datetimeFigureOut">
               <a:rPr lang="en-US" smtClean="0"/>
-              <a:t>5/20/2025</a:t>
+              <a:t>5/22/2025</a:t>
             </a:fld>
             <a:endParaRPr lang="en-US"/>
           </a:p>
@@ -1426,7 +1426,7 @@
           <a:p>
             <a:fld id="{783DC7D5-4D76-4679-A391-31CBAFA90932}" type="datetimeFigureOut">
               <a:rPr lang="en-US" smtClean="0"/>
-              <a:t>5/20/2025</a:t>
+              <a:t>5/22/2025</a:t>
             </a:fld>
             <a:endParaRPr lang="en-US"/>
           </a:p>
@@ -1701,7 +1701,7 @@
           <a:p>
             <a:fld id="{783DC7D5-4D76-4679-A391-31CBAFA90932}" type="datetimeFigureOut">
               <a:rPr lang="en-US" smtClean="0"/>
-              <a:t>5/20/2025</a:t>
+              <a:t>5/22/2025</a:t>
             </a:fld>
             <a:endParaRPr lang="en-US"/>
           </a:p>
@@ -1966,7 +1966,7 @@
           <a:p>
             <a:fld id="{783DC7D5-4D76-4679-A391-31CBAFA90932}" type="datetimeFigureOut">
               <a:rPr lang="en-US" smtClean="0"/>
-              <a:t>5/20/2025</a:t>
+              <a:t>5/22/2025</a:t>
             </a:fld>
             <a:endParaRPr lang="en-US"/>
           </a:p>
@@ -2378,7 +2378,7 @@
           <a:p>
             <a:fld id="{783DC7D5-4D76-4679-A391-31CBAFA90932}" type="datetimeFigureOut">
               <a:rPr lang="en-US" smtClean="0"/>
-              <a:t>5/20/2025</a:t>
+              <a:t>5/22/2025</a:t>
             </a:fld>
             <a:endParaRPr lang="en-US"/>
           </a:p>
@@ -2519,7 +2519,7 @@
           <a:p>
             <a:fld id="{783DC7D5-4D76-4679-A391-31CBAFA90932}" type="datetimeFigureOut">
               <a:rPr lang="en-US" smtClean="0"/>
-              <a:t>5/20/2025</a:t>
+              <a:t>5/22/2025</a:t>
             </a:fld>
             <a:endParaRPr lang="en-US"/>
           </a:p>
@@ -2632,7 +2632,7 @@
           <a:p>
             <a:fld id="{783DC7D5-4D76-4679-A391-31CBAFA90932}" type="datetimeFigureOut">
               <a:rPr lang="en-US" smtClean="0"/>
-              <a:t>5/20/2025</a:t>
+              <a:t>5/22/2025</a:t>
             </a:fld>
             <a:endParaRPr lang="en-US"/>
           </a:p>
@@ -2943,7 +2943,7 @@
           <a:p>
             <a:fld id="{783DC7D5-4D76-4679-A391-31CBAFA90932}" type="datetimeFigureOut">
               <a:rPr lang="en-US" smtClean="0"/>
-              <a:t>5/20/2025</a:t>
+              <a:t>5/22/2025</a:t>
             </a:fld>
             <a:endParaRPr lang="en-US"/>
           </a:p>
@@ -3231,7 +3231,7 @@
           <a:p>
             <a:fld id="{783DC7D5-4D76-4679-A391-31CBAFA90932}" type="datetimeFigureOut">
               <a:rPr lang="en-US" smtClean="0"/>
-              <a:t>5/20/2025</a:t>
+              <a:t>5/22/2025</a:t>
             </a:fld>
             <a:endParaRPr lang="en-US"/>
           </a:p>
@@ -3472,7 +3472,7 @@
           <a:p>
             <a:fld id="{783DC7D5-4D76-4679-A391-31CBAFA90932}" type="datetimeFigureOut">
               <a:rPr lang="en-US" smtClean="0"/>
-              <a:t>5/20/2025</a:t>
+              <a:t>5/22/2025</a:t>
             </a:fld>
             <a:endParaRPr lang="en-US"/>
           </a:p>
@@ -6280,6 +6280,1344 @@
   <p:cSld>
     <p:spTree>
       <p:nvGrpSpPr>
+        <p:cNvPr id="1" name=""/>
+        <p:cNvGrpSpPr/>
+        <p:nvPr/>
+      </p:nvGrpSpPr>
+      <p:grpSpPr>
+        <a:xfrm>
+          <a:off x="0" y="0"/>
+          <a:ext cx="0" cy="0"/>
+          <a:chOff x="0" y="0"/>
+          <a:chExt cx="0" cy="0"/>
+        </a:xfrm>
+      </p:grpSpPr>
+      <p:sp>
+        <p:nvSpPr>
+          <p:cNvPr id="16" name="Prostokąt: zaokrąglone rogi 15">
+            <a:extLst>
+              <a:ext uri="{FF2B5EF4-FFF2-40B4-BE49-F238E27FC236}">
+                <a16:creationId xmlns:a16="http://schemas.microsoft.com/office/drawing/2014/main" id="{2A0423BC-C930-8484-D2D7-D42A2484E299}"/>
+              </a:ext>
+            </a:extLst>
+          </p:cNvPr>
+          <p:cNvSpPr/>
+          <p:nvPr/>
+        </p:nvSpPr>
+        <p:spPr>
+          <a:xfrm>
+            <a:off x="3446108" y="3344138"/>
+            <a:ext cx="7352524" cy="582346"/>
+          </a:xfrm>
+          <a:prstGeom prst="roundRect">
+            <a:avLst/>
+          </a:prstGeom>
+        </p:spPr>
+        <p:style>
+          <a:lnRef idx="1">
+            <a:schemeClr val="accent3"/>
+          </a:lnRef>
+          <a:fillRef idx="2">
+            <a:schemeClr val="accent3"/>
+          </a:fillRef>
+          <a:effectRef idx="1">
+            <a:schemeClr val="accent3"/>
+          </a:effectRef>
+          <a:fontRef idx="minor">
+            <a:schemeClr val="dk1"/>
+          </a:fontRef>
+        </p:style>
+        <p:txBody>
+          <a:bodyPr rtlCol="0" anchor="ctr"/>
+          <a:lstStyle/>
+          <a:p>
+            <a:pPr algn="ctr"/>
+            <a:endParaRPr lang="en-US" sz="2000" b="1" dirty="0"/>
+          </a:p>
+        </p:txBody>
+      </p:sp>
+      <p:sp>
+        <p:nvSpPr>
+          <p:cNvPr id="2" name="Rectangle: Rounded Corners 3">
+            <a:extLst>
+              <a:ext uri="{FF2B5EF4-FFF2-40B4-BE49-F238E27FC236}">
+                <a16:creationId xmlns:a16="http://schemas.microsoft.com/office/drawing/2014/main" id="{404DC3D8-F878-872E-5898-6AFED02B9CDC}"/>
+              </a:ext>
+            </a:extLst>
+          </p:cNvPr>
+          <p:cNvSpPr/>
+          <p:nvPr/>
+        </p:nvSpPr>
+        <p:spPr>
+          <a:xfrm>
+            <a:off x="4057794" y="378414"/>
+            <a:ext cx="3566358" cy="582346"/>
+          </a:xfrm>
+          <a:prstGeom prst="roundRect">
+            <a:avLst/>
+          </a:prstGeom>
+        </p:spPr>
+        <p:style>
+          <a:lnRef idx="0">
+            <a:schemeClr val="accent1"/>
+          </a:lnRef>
+          <a:fillRef idx="3">
+            <a:schemeClr val="accent1"/>
+          </a:fillRef>
+          <a:effectRef idx="3">
+            <a:schemeClr val="accent1"/>
+          </a:effectRef>
+          <a:fontRef idx="minor">
+            <a:schemeClr val="lt1"/>
+          </a:fontRef>
+        </p:style>
+        <p:txBody>
+          <a:bodyPr rtlCol="0" anchor="ctr"/>
+          <a:lstStyle/>
+          <a:p>
+            <a:pPr algn="ctr"/>
+            <a:r>
+              <a:rPr lang="en-US" dirty="0"/>
+              <a:t>Geometry Assets</a:t>
+            </a:r>
+          </a:p>
+        </p:txBody>
+      </p:sp>
+      <p:sp>
+        <p:nvSpPr>
+          <p:cNvPr id="6" name="Prostokąt: zaokrąglone rogi 5">
+            <a:extLst>
+              <a:ext uri="{FF2B5EF4-FFF2-40B4-BE49-F238E27FC236}">
+                <a16:creationId xmlns:a16="http://schemas.microsoft.com/office/drawing/2014/main" id="{7DC1B869-0D55-DBE5-CB6D-B52A1D9AB747}"/>
+              </a:ext>
+            </a:extLst>
+          </p:cNvPr>
+          <p:cNvSpPr/>
+          <p:nvPr/>
+        </p:nvSpPr>
+        <p:spPr>
+          <a:xfrm>
+            <a:off x="5097624" y="3404013"/>
+            <a:ext cx="1996752" cy="454090"/>
+          </a:xfrm>
+          <a:prstGeom prst="roundRect">
+            <a:avLst/>
+          </a:prstGeom>
+        </p:spPr>
+        <p:style>
+          <a:lnRef idx="1">
+            <a:schemeClr val="accent1"/>
+          </a:lnRef>
+          <a:fillRef idx="2">
+            <a:schemeClr val="accent1"/>
+          </a:fillRef>
+          <a:effectRef idx="1">
+            <a:schemeClr val="accent1"/>
+          </a:effectRef>
+          <a:fontRef idx="minor">
+            <a:schemeClr val="dk1"/>
+          </a:fontRef>
+        </p:style>
+        <p:txBody>
+          <a:bodyPr rtlCol="0" anchor="ctr"/>
+          <a:lstStyle/>
+          <a:p>
+            <a:pPr algn="ctr"/>
+            <a:r>
+              <a:rPr lang="en-US" dirty="0"/>
+              <a:t>Mesh</a:t>
+            </a:r>
+          </a:p>
+        </p:txBody>
+      </p:sp>
+      <p:sp>
+        <p:nvSpPr>
+          <p:cNvPr id="7" name="Prostokąt: zaokrąglone rogi 6">
+            <a:extLst>
+              <a:ext uri="{FF2B5EF4-FFF2-40B4-BE49-F238E27FC236}">
+                <a16:creationId xmlns:a16="http://schemas.microsoft.com/office/drawing/2014/main" id="{BA477DC3-49B8-4D7A-AF02-F386BACC8A94}"/>
+              </a:ext>
+            </a:extLst>
+          </p:cNvPr>
+          <p:cNvSpPr/>
+          <p:nvPr/>
+        </p:nvSpPr>
+        <p:spPr>
+          <a:xfrm>
+            <a:off x="7181465" y="3404013"/>
+            <a:ext cx="1996752" cy="454090"/>
+          </a:xfrm>
+          <a:prstGeom prst="roundRect">
+            <a:avLst/>
+          </a:prstGeom>
+        </p:spPr>
+        <p:style>
+          <a:lnRef idx="1">
+            <a:schemeClr val="accent1"/>
+          </a:lnRef>
+          <a:fillRef idx="2">
+            <a:schemeClr val="accent1"/>
+          </a:fillRef>
+          <a:effectRef idx="1">
+            <a:schemeClr val="accent1"/>
+          </a:effectRef>
+          <a:fontRef idx="minor">
+            <a:schemeClr val="dk1"/>
+          </a:fontRef>
+        </p:style>
+        <p:txBody>
+          <a:bodyPr rtlCol="0" anchor="ctr"/>
+          <a:lstStyle/>
+          <a:p>
+            <a:pPr algn="ctr"/>
+            <a:r>
+              <a:rPr lang="en-US" dirty="0"/>
+              <a:t>Material</a:t>
+            </a:r>
+          </a:p>
+        </p:txBody>
+      </p:sp>
+      <p:sp>
+        <p:nvSpPr>
+          <p:cNvPr id="13" name="Prostokąt: zaokrąglone rogi 12">
+            <a:extLst>
+              <a:ext uri="{FF2B5EF4-FFF2-40B4-BE49-F238E27FC236}">
+                <a16:creationId xmlns:a16="http://schemas.microsoft.com/office/drawing/2014/main" id="{A0FD60EF-87B6-6B13-F32F-D0B4B552008D}"/>
+              </a:ext>
+            </a:extLst>
+          </p:cNvPr>
+          <p:cNvSpPr/>
+          <p:nvPr/>
+        </p:nvSpPr>
+        <p:spPr>
+          <a:xfrm>
+            <a:off x="3446108" y="1217291"/>
+            <a:ext cx="7352524" cy="582346"/>
+          </a:xfrm>
+          <a:prstGeom prst="roundRect">
+            <a:avLst/>
+          </a:prstGeom>
+        </p:spPr>
+        <p:style>
+          <a:lnRef idx="1">
+            <a:schemeClr val="accent3"/>
+          </a:lnRef>
+          <a:fillRef idx="2">
+            <a:schemeClr val="accent3"/>
+          </a:fillRef>
+          <a:effectRef idx="1">
+            <a:schemeClr val="accent3"/>
+          </a:effectRef>
+          <a:fontRef idx="minor">
+            <a:schemeClr val="dk1"/>
+          </a:fontRef>
+        </p:style>
+        <p:txBody>
+          <a:bodyPr rtlCol="0" anchor="ctr"/>
+          <a:lstStyle/>
+          <a:p>
+            <a:pPr algn="ctr"/>
+            <a:endParaRPr lang="en-US"/>
+          </a:p>
+        </p:txBody>
+      </p:sp>
+      <p:sp>
+        <p:nvSpPr>
+          <p:cNvPr id="14" name="Prostokąt: zaokrąglone rogi 13">
+            <a:extLst>
+              <a:ext uri="{FF2B5EF4-FFF2-40B4-BE49-F238E27FC236}">
+                <a16:creationId xmlns:a16="http://schemas.microsoft.com/office/drawing/2014/main" id="{897FECBC-4C47-1445-96DB-428BA58D01CB}"/>
+              </a:ext>
+            </a:extLst>
+          </p:cNvPr>
+          <p:cNvSpPr/>
+          <p:nvPr/>
+        </p:nvSpPr>
+        <p:spPr>
+          <a:xfrm>
+            <a:off x="3446108" y="1926240"/>
+            <a:ext cx="7352524" cy="582346"/>
+          </a:xfrm>
+          <a:prstGeom prst="roundRect">
+            <a:avLst/>
+          </a:prstGeom>
+        </p:spPr>
+        <p:style>
+          <a:lnRef idx="1">
+            <a:schemeClr val="accent3"/>
+          </a:lnRef>
+          <a:fillRef idx="2">
+            <a:schemeClr val="accent3"/>
+          </a:fillRef>
+          <a:effectRef idx="1">
+            <a:schemeClr val="accent3"/>
+          </a:effectRef>
+          <a:fontRef idx="minor">
+            <a:schemeClr val="dk1"/>
+          </a:fontRef>
+        </p:style>
+        <p:txBody>
+          <a:bodyPr rtlCol="0" anchor="ctr"/>
+          <a:lstStyle/>
+          <a:p>
+            <a:pPr algn="ctr"/>
+            <a:endParaRPr lang="en-US" sz="1800" b="1" dirty="0"/>
+          </a:p>
+        </p:txBody>
+      </p:sp>
+      <p:sp>
+        <p:nvSpPr>
+          <p:cNvPr id="15" name="Prostokąt: zaokrąglone rogi 14">
+            <a:extLst>
+              <a:ext uri="{FF2B5EF4-FFF2-40B4-BE49-F238E27FC236}">
+                <a16:creationId xmlns:a16="http://schemas.microsoft.com/office/drawing/2014/main" id="{B94F2211-64DC-A131-4117-28163CC5E325}"/>
+              </a:ext>
+            </a:extLst>
+          </p:cNvPr>
+          <p:cNvSpPr/>
+          <p:nvPr/>
+        </p:nvSpPr>
+        <p:spPr>
+          <a:xfrm>
+            <a:off x="3446108" y="2635189"/>
+            <a:ext cx="7352524" cy="582346"/>
+          </a:xfrm>
+          <a:prstGeom prst="roundRect">
+            <a:avLst/>
+          </a:prstGeom>
+        </p:spPr>
+        <p:style>
+          <a:lnRef idx="1">
+            <a:schemeClr val="accent3"/>
+          </a:lnRef>
+          <a:fillRef idx="2">
+            <a:schemeClr val="accent3"/>
+          </a:fillRef>
+          <a:effectRef idx="1">
+            <a:schemeClr val="accent3"/>
+          </a:effectRef>
+          <a:fontRef idx="minor">
+            <a:schemeClr val="dk1"/>
+          </a:fontRef>
+        </p:style>
+        <p:txBody>
+          <a:bodyPr rtlCol="0" anchor="ctr"/>
+          <a:lstStyle/>
+          <a:p>
+            <a:pPr algn="ctr"/>
+            <a:endParaRPr lang="en-US"/>
+          </a:p>
+        </p:txBody>
+      </p:sp>
+      <p:sp>
+        <p:nvSpPr>
+          <p:cNvPr id="17" name="Prostokąt: zaokrąglone rogi 16">
+            <a:extLst>
+              <a:ext uri="{FF2B5EF4-FFF2-40B4-BE49-F238E27FC236}">
+                <a16:creationId xmlns:a16="http://schemas.microsoft.com/office/drawing/2014/main" id="{29B3EDB4-AA20-7B1E-2E67-D0B4A67C0906}"/>
+              </a:ext>
+            </a:extLst>
+          </p:cNvPr>
+          <p:cNvSpPr/>
+          <p:nvPr/>
+        </p:nvSpPr>
+        <p:spPr>
+          <a:xfrm>
+            <a:off x="3446108" y="4053087"/>
+            <a:ext cx="7352524" cy="582346"/>
+          </a:xfrm>
+          <a:prstGeom prst="roundRect">
+            <a:avLst/>
+          </a:prstGeom>
+        </p:spPr>
+        <p:style>
+          <a:lnRef idx="1">
+            <a:schemeClr val="accent3"/>
+          </a:lnRef>
+          <a:fillRef idx="2">
+            <a:schemeClr val="accent3"/>
+          </a:fillRef>
+          <a:effectRef idx="1">
+            <a:schemeClr val="accent3"/>
+          </a:effectRef>
+          <a:fontRef idx="minor">
+            <a:schemeClr val="dk1"/>
+          </a:fontRef>
+        </p:style>
+        <p:txBody>
+          <a:bodyPr rtlCol="0" anchor="ctr"/>
+          <a:lstStyle/>
+          <a:p>
+            <a:pPr algn="ctr"/>
+            <a:endParaRPr lang="en-US" sz="2000" b="1" dirty="0"/>
+          </a:p>
+        </p:txBody>
+      </p:sp>
+      <p:sp>
+        <p:nvSpPr>
+          <p:cNvPr id="18" name="Prostokąt: zaokrąglone rogi 17">
+            <a:extLst>
+              <a:ext uri="{FF2B5EF4-FFF2-40B4-BE49-F238E27FC236}">
+                <a16:creationId xmlns:a16="http://schemas.microsoft.com/office/drawing/2014/main" id="{154721C8-F29E-2243-06B1-A602C584922D}"/>
+              </a:ext>
+            </a:extLst>
+          </p:cNvPr>
+          <p:cNvSpPr/>
+          <p:nvPr/>
+        </p:nvSpPr>
+        <p:spPr>
+          <a:xfrm>
+            <a:off x="3446108" y="4762035"/>
+            <a:ext cx="7352524" cy="582346"/>
+          </a:xfrm>
+          <a:prstGeom prst="roundRect">
+            <a:avLst/>
+          </a:prstGeom>
+        </p:spPr>
+        <p:style>
+          <a:lnRef idx="1">
+            <a:schemeClr val="accent3"/>
+          </a:lnRef>
+          <a:fillRef idx="2">
+            <a:schemeClr val="accent3"/>
+          </a:fillRef>
+          <a:effectRef idx="1">
+            <a:schemeClr val="accent3"/>
+          </a:effectRef>
+          <a:fontRef idx="minor">
+            <a:schemeClr val="dk1"/>
+          </a:fontRef>
+        </p:style>
+        <p:txBody>
+          <a:bodyPr rtlCol="0" anchor="ctr"/>
+          <a:lstStyle/>
+          <a:p>
+            <a:pPr algn="ctr"/>
+            <a:endParaRPr lang="en-US"/>
+          </a:p>
+        </p:txBody>
+      </p:sp>
+      <p:sp>
+        <p:nvSpPr>
+          <p:cNvPr id="19" name="Prostokąt: zaokrąglone rogi 18">
+            <a:extLst>
+              <a:ext uri="{FF2B5EF4-FFF2-40B4-BE49-F238E27FC236}">
+                <a16:creationId xmlns:a16="http://schemas.microsoft.com/office/drawing/2014/main" id="{AB90DAFD-234B-7A84-A8D3-4555CC31A120}"/>
+              </a:ext>
+            </a:extLst>
+          </p:cNvPr>
+          <p:cNvSpPr/>
+          <p:nvPr/>
+        </p:nvSpPr>
+        <p:spPr>
+          <a:xfrm>
+            <a:off x="6183089" y="4117212"/>
+            <a:ext cx="1996752" cy="454091"/>
+          </a:xfrm>
+          <a:prstGeom prst="roundRect">
+            <a:avLst/>
+          </a:prstGeom>
+        </p:spPr>
+        <p:style>
+          <a:lnRef idx="1">
+            <a:schemeClr val="accent1"/>
+          </a:lnRef>
+          <a:fillRef idx="2">
+            <a:schemeClr val="accent1"/>
+          </a:fillRef>
+          <a:effectRef idx="1">
+            <a:schemeClr val="accent1"/>
+          </a:effectRef>
+          <a:fontRef idx="minor">
+            <a:schemeClr val="dk1"/>
+          </a:fontRef>
+        </p:style>
+        <p:txBody>
+          <a:bodyPr rtlCol="0" anchor="t"/>
+          <a:lstStyle/>
+          <a:p>
+            <a:pPr algn="ctr"/>
+            <a:r>
+              <a:rPr lang="en-US" dirty="0"/>
+              <a:t>N × </a:t>
+            </a:r>
+            <a:r>
+              <a:rPr lang="en-US" dirty="0" err="1"/>
+              <a:t>RenderMesh</a:t>
+            </a:r>
+            <a:endParaRPr lang="en-US" dirty="0"/>
+          </a:p>
+        </p:txBody>
+      </p:sp>
+      <p:sp>
+        <p:nvSpPr>
+          <p:cNvPr id="21" name="Prostokąt: zaokrąglone rogi 20">
+            <a:extLst>
+              <a:ext uri="{FF2B5EF4-FFF2-40B4-BE49-F238E27FC236}">
+                <a16:creationId xmlns:a16="http://schemas.microsoft.com/office/drawing/2014/main" id="{D583FA01-2820-1FD4-E0D6-EFDA0DDBFAC3}"/>
+              </a:ext>
+            </a:extLst>
+          </p:cNvPr>
+          <p:cNvSpPr/>
+          <p:nvPr/>
+        </p:nvSpPr>
+        <p:spPr>
+          <a:xfrm>
+            <a:off x="3446108" y="5470983"/>
+            <a:ext cx="7352524" cy="582346"/>
+          </a:xfrm>
+          <a:prstGeom prst="roundRect">
+            <a:avLst/>
+          </a:prstGeom>
+        </p:spPr>
+        <p:style>
+          <a:lnRef idx="1">
+            <a:schemeClr val="accent3"/>
+          </a:lnRef>
+          <a:fillRef idx="2">
+            <a:schemeClr val="accent3"/>
+          </a:fillRef>
+          <a:effectRef idx="1">
+            <a:schemeClr val="accent3"/>
+          </a:effectRef>
+          <a:fontRef idx="minor">
+            <a:schemeClr val="dk1"/>
+          </a:fontRef>
+        </p:style>
+        <p:txBody>
+          <a:bodyPr rtlCol="0" anchor="ctr"/>
+          <a:lstStyle/>
+          <a:p>
+            <a:pPr algn="ctr"/>
+            <a:endParaRPr lang="en-US" sz="1800" b="1" dirty="0"/>
+          </a:p>
+        </p:txBody>
+      </p:sp>
+      <p:sp>
+        <p:nvSpPr>
+          <p:cNvPr id="22" name="Prostokąt: zaokrąglone rogi 21">
+            <a:extLst>
+              <a:ext uri="{FF2B5EF4-FFF2-40B4-BE49-F238E27FC236}">
+                <a16:creationId xmlns:a16="http://schemas.microsoft.com/office/drawing/2014/main" id="{BF595126-B4DB-766D-BB40-875AEB9834EA}"/>
+              </a:ext>
+            </a:extLst>
+          </p:cNvPr>
+          <p:cNvSpPr/>
+          <p:nvPr/>
+        </p:nvSpPr>
+        <p:spPr>
+          <a:xfrm>
+            <a:off x="4040153" y="5543383"/>
+            <a:ext cx="1996752" cy="454091"/>
+          </a:xfrm>
+          <a:prstGeom prst="roundRect">
+            <a:avLst/>
+          </a:prstGeom>
+        </p:spPr>
+        <p:style>
+          <a:lnRef idx="1">
+            <a:schemeClr val="accent1"/>
+          </a:lnRef>
+          <a:fillRef idx="2">
+            <a:schemeClr val="accent1"/>
+          </a:fillRef>
+          <a:effectRef idx="1">
+            <a:schemeClr val="accent1"/>
+          </a:effectRef>
+          <a:fontRef idx="minor">
+            <a:schemeClr val="dk1"/>
+          </a:fontRef>
+        </p:style>
+        <p:txBody>
+          <a:bodyPr rtlCol="0" anchor="t"/>
+          <a:lstStyle/>
+          <a:p>
+            <a:pPr algn="ctr"/>
+            <a:r>
+              <a:rPr lang="en-US" dirty="0"/>
+              <a:t>Skeleton</a:t>
+            </a:r>
+          </a:p>
+        </p:txBody>
+      </p:sp>
+      <p:sp>
+        <p:nvSpPr>
+          <p:cNvPr id="23" name="Prostokąt: zaokrąglone rogi 22">
+            <a:extLst>
+              <a:ext uri="{FF2B5EF4-FFF2-40B4-BE49-F238E27FC236}">
+                <a16:creationId xmlns:a16="http://schemas.microsoft.com/office/drawing/2014/main" id="{3E9B9E4D-B225-7EED-713C-596F474BCFDF}"/>
+              </a:ext>
+            </a:extLst>
+          </p:cNvPr>
+          <p:cNvSpPr/>
+          <p:nvPr/>
+        </p:nvSpPr>
+        <p:spPr>
+          <a:xfrm>
+            <a:off x="6123994" y="5543383"/>
+            <a:ext cx="1996752" cy="454091"/>
+          </a:xfrm>
+          <a:prstGeom prst="roundRect">
+            <a:avLst/>
+          </a:prstGeom>
+        </p:spPr>
+        <p:style>
+          <a:lnRef idx="1">
+            <a:schemeClr val="accent1"/>
+          </a:lnRef>
+          <a:fillRef idx="2">
+            <a:schemeClr val="accent1"/>
+          </a:fillRef>
+          <a:effectRef idx="1">
+            <a:schemeClr val="accent1"/>
+          </a:effectRef>
+          <a:fontRef idx="minor">
+            <a:schemeClr val="dk1"/>
+          </a:fontRef>
+        </p:style>
+        <p:txBody>
+          <a:bodyPr rtlCol="0" anchor="t"/>
+          <a:lstStyle/>
+          <a:p>
+            <a:pPr algn="ctr"/>
+            <a:r>
+              <a:rPr lang="en-US" dirty="0"/>
+              <a:t>Model</a:t>
+            </a:r>
+          </a:p>
+        </p:txBody>
+      </p:sp>
+      <p:sp>
+        <p:nvSpPr>
+          <p:cNvPr id="24" name="Prostokąt: zaokrąglone rogi 23">
+            <a:extLst>
+              <a:ext uri="{FF2B5EF4-FFF2-40B4-BE49-F238E27FC236}">
+                <a16:creationId xmlns:a16="http://schemas.microsoft.com/office/drawing/2014/main" id="{CA4F5D74-F9C0-33DB-A6C3-11AF9EF90C8F}"/>
+              </a:ext>
+            </a:extLst>
+          </p:cNvPr>
+          <p:cNvSpPr/>
+          <p:nvPr/>
+        </p:nvSpPr>
+        <p:spPr>
+          <a:xfrm>
+            <a:off x="4049486" y="1990365"/>
+            <a:ext cx="1996752" cy="454090"/>
+          </a:xfrm>
+          <a:prstGeom prst="roundRect">
+            <a:avLst/>
+          </a:prstGeom>
+        </p:spPr>
+        <p:style>
+          <a:lnRef idx="1">
+            <a:schemeClr val="accent1"/>
+          </a:lnRef>
+          <a:fillRef idx="2">
+            <a:schemeClr val="accent1"/>
+          </a:fillRef>
+          <a:effectRef idx="1">
+            <a:schemeClr val="accent1"/>
+          </a:effectRef>
+          <a:fontRef idx="minor">
+            <a:schemeClr val="dk1"/>
+          </a:fontRef>
+        </p:style>
+        <p:txBody>
+          <a:bodyPr rtlCol="0" anchor="ctr"/>
+          <a:lstStyle/>
+          <a:p>
+            <a:pPr algn="ctr"/>
+            <a:r>
+              <a:rPr lang="en-US" dirty="0" err="1"/>
+              <a:t>ShadingModel</a:t>
+            </a:r>
+            <a:endParaRPr lang="en-US" dirty="0"/>
+          </a:p>
+        </p:txBody>
+      </p:sp>
+      <p:sp>
+        <p:nvSpPr>
+          <p:cNvPr id="25" name="Prostokąt: zaokrąglone rogi 24">
+            <a:extLst>
+              <a:ext uri="{FF2B5EF4-FFF2-40B4-BE49-F238E27FC236}">
+                <a16:creationId xmlns:a16="http://schemas.microsoft.com/office/drawing/2014/main" id="{7B90A194-A5C2-66A5-F7C2-BEDE06203A33}"/>
+              </a:ext>
+            </a:extLst>
+          </p:cNvPr>
+          <p:cNvSpPr/>
+          <p:nvPr/>
+        </p:nvSpPr>
+        <p:spPr>
+          <a:xfrm>
+            <a:off x="6127101" y="1990171"/>
+            <a:ext cx="1996752" cy="454091"/>
+          </a:xfrm>
+          <a:prstGeom prst="roundRect">
+            <a:avLst/>
+          </a:prstGeom>
+        </p:spPr>
+        <p:style>
+          <a:lnRef idx="1">
+            <a:schemeClr val="accent1"/>
+          </a:lnRef>
+          <a:fillRef idx="2">
+            <a:schemeClr val="accent1"/>
+          </a:fillRef>
+          <a:effectRef idx="1">
+            <a:schemeClr val="accent1"/>
+          </a:effectRef>
+          <a:fontRef idx="minor">
+            <a:schemeClr val="dk1"/>
+          </a:fontRef>
+        </p:style>
+        <p:txBody>
+          <a:bodyPr rtlCol="0" anchor="t"/>
+          <a:lstStyle/>
+          <a:p>
+            <a:pPr algn="ctr"/>
+            <a:r>
+              <a:rPr lang="en-US" sz="1800" b="1" dirty="0"/>
+              <a:t>N × </a:t>
+            </a:r>
+            <a:r>
+              <a:rPr lang="en-US" dirty="0"/>
+              <a:t>Texture</a:t>
+            </a:r>
+          </a:p>
+        </p:txBody>
+      </p:sp>
+      <p:sp>
+        <p:nvSpPr>
+          <p:cNvPr id="26" name="Prostokąt: zaokrąglone rogi 25">
+            <a:extLst>
+              <a:ext uri="{FF2B5EF4-FFF2-40B4-BE49-F238E27FC236}">
+                <a16:creationId xmlns:a16="http://schemas.microsoft.com/office/drawing/2014/main" id="{F42F88EB-1A34-1A30-5484-700E344CD7B0}"/>
+              </a:ext>
+            </a:extLst>
+          </p:cNvPr>
+          <p:cNvSpPr/>
+          <p:nvPr/>
+        </p:nvSpPr>
+        <p:spPr>
+          <a:xfrm>
+            <a:off x="5097624" y="1281419"/>
+            <a:ext cx="1996752" cy="454090"/>
+          </a:xfrm>
+          <a:prstGeom prst="roundRect">
+            <a:avLst/>
+          </a:prstGeom>
+        </p:spPr>
+        <p:style>
+          <a:lnRef idx="1">
+            <a:schemeClr val="accent1"/>
+          </a:lnRef>
+          <a:fillRef idx="2">
+            <a:schemeClr val="accent1"/>
+          </a:fillRef>
+          <a:effectRef idx="1">
+            <a:schemeClr val="accent1"/>
+          </a:effectRef>
+          <a:fontRef idx="minor">
+            <a:schemeClr val="dk1"/>
+          </a:fontRef>
+        </p:style>
+        <p:txBody>
+          <a:bodyPr rtlCol="0" anchor="ctr"/>
+          <a:lstStyle/>
+          <a:p>
+            <a:pPr algn="ctr"/>
+            <a:r>
+              <a:rPr lang="en-US" dirty="0"/>
+              <a:t>Shader</a:t>
+            </a:r>
+          </a:p>
+        </p:txBody>
+      </p:sp>
+      <p:sp>
+        <p:nvSpPr>
+          <p:cNvPr id="27" name="Prostokąt: zaokrąglone rogi 26">
+            <a:extLst>
+              <a:ext uri="{FF2B5EF4-FFF2-40B4-BE49-F238E27FC236}">
+                <a16:creationId xmlns:a16="http://schemas.microsoft.com/office/drawing/2014/main" id="{569493F9-F3EC-0062-A180-C93A667ADF67}"/>
+              </a:ext>
+            </a:extLst>
+          </p:cNvPr>
+          <p:cNvSpPr/>
+          <p:nvPr/>
+        </p:nvSpPr>
+        <p:spPr>
+          <a:xfrm>
+            <a:off x="7181465" y="1281419"/>
+            <a:ext cx="1996752" cy="454090"/>
+          </a:xfrm>
+          <a:prstGeom prst="roundRect">
+            <a:avLst/>
+          </a:prstGeom>
+        </p:spPr>
+        <p:style>
+          <a:lnRef idx="1">
+            <a:schemeClr val="accent4"/>
+          </a:lnRef>
+          <a:fillRef idx="2">
+            <a:schemeClr val="accent4"/>
+          </a:fillRef>
+          <a:effectRef idx="1">
+            <a:schemeClr val="accent4"/>
+          </a:effectRef>
+          <a:fontRef idx="minor">
+            <a:schemeClr val="dk1"/>
+          </a:fontRef>
+        </p:style>
+        <p:txBody>
+          <a:bodyPr rtlCol="0" anchor="ctr"/>
+          <a:lstStyle/>
+          <a:p>
+            <a:pPr algn="ctr"/>
+            <a:r>
+              <a:rPr lang="en-US" sz="1400" dirty="0"/>
+              <a:t>Shader parameters (samplers, uniforms)</a:t>
+            </a:r>
+          </a:p>
+        </p:txBody>
+      </p:sp>
+      <p:sp>
+        <p:nvSpPr>
+          <p:cNvPr id="28" name="Prostokąt: zaokrąglone rogi 27">
+            <a:extLst>
+              <a:ext uri="{FF2B5EF4-FFF2-40B4-BE49-F238E27FC236}">
+                <a16:creationId xmlns:a16="http://schemas.microsoft.com/office/drawing/2014/main" id="{5C27AB83-49D2-7C3E-5AC5-6488022D575E}"/>
+              </a:ext>
+            </a:extLst>
+          </p:cNvPr>
+          <p:cNvSpPr/>
+          <p:nvPr/>
+        </p:nvSpPr>
+        <p:spPr>
+          <a:xfrm>
+            <a:off x="8204716" y="1990172"/>
+            <a:ext cx="1996752" cy="454090"/>
+          </a:xfrm>
+          <a:prstGeom prst="roundRect">
+            <a:avLst/>
+          </a:prstGeom>
+        </p:spPr>
+        <p:style>
+          <a:lnRef idx="1">
+            <a:schemeClr val="accent4"/>
+          </a:lnRef>
+          <a:fillRef idx="2">
+            <a:schemeClr val="accent4"/>
+          </a:fillRef>
+          <a:effectRef idx="1">
+            <a:schemeClr val="accent4"/>
+          </a:effectRef>
+          <a:fontRef idx="minor">
+            <a:schemeClr val="dk1"/>
+          </a:fontRef>
+        </p:style>
+        <p:txBody>
+          <a:bodyPr rtlCol="0" anchor="ctr"/>
+          <a:lstStyle/>
+          <a:p>
+            <a:pPr algn="ctr"/>
+            <a:r>
+              <a:rPr lang="en-US" sz="1400" dirty="0"/>
+              <a:t>Uniform Values</a:t>
+            </a:r>
+          </a:p>
+        </p:txBody>
+      </p:sp>
+      <p:sp>
+        <p:nvSpPr>
+          <p:cNvPr id="29" name="Prostokąt: zaokrąglone rogi 28">
+            <a:extLst>
+              <a:ext uri="{FF2B5EF4-FFF2-40B4-BE49-F238E27FC236}">
+                <a16:creationId xmlns:a16="http://schemas.microsoft.com/office/drawing/2014/main" id="{ABDC9015-5091-503D-A9A9-AB69ED341999}"/>
+              </a:ext>
+            </a:extLst>
+          </p:cNvPr>
+          <p:cNvSpPr/>
+          <p:nvPr/>
+        </p:nvSpPr>
+        <p:spPr>
+          <a:xfrm>
+            <a:off x="6123994" y="2699315"/>
+            <a:ext cx="1996752" cy="454090"/>
+          </a:xfrm>
+          <a:prstGeom prst="roundRect">
+            <a:avLst/>
+          </a:prstGeom>
+        </p:spPr>
+        <p:style>
+          <a:lnRef idx="1">
+            <a:schemeClr val="accent4"/>
+          </a:lnRef>
+          <a:fillRef idx="2">
+            <a:schemeClr val="accent4"/>
+          </a:fillRef>
+          <a:effectRef idx="1">
+            <a:schemeClr val="accent4"/>
+          </a:effectRef>
+          <a:fontRef idx="minor">
+            <a:schemeClr val="dk1"/>
+          </a:fontRef>
+        </p:style>
+        <p:txBody>
+          <a:bodyPr rtlCol="0" anchor="ctr"/>
+          <a:lstStyle/>
+          <a:p>
+            <a:pPr algn="ctr"/>
+            <a:r>
+              <a:rPr lang="en-US" sz="1400" dirty="0"/>
+              <a:t>Vertices and Indices</a:t>
+            </a:r>
+          </a:p>
+        </p:txBody>
+      </p:sp>
+      <p:sp>
+        <p:nvSpPr>
+          <p:cNvPr id="30" name="Prostokąt: zaokrąglone rogi 29">
+            <a:extLst>
+              <a:ext uri="{FF2B5EF4-FFF2-40B4-BE49-F238E27FC236}">
+                <a16:creationId xmlns:a16="http://schemas.microsoft.com/office/drawing/2014/main" id="{99303775-020C-8FCE-35FF-1F7E6C962DA7}"/>
+              </a:ext>
+            </a:extLst>
+          </p:cNvPr>
+          <p:cNvSpPr/>
+          <p:nvPr/>
+        </p:nvSpPr>
+        <p:spPr>
+          <a:xfrm>
+            <a:off x="6183089" y="4826163"/>
+            <a:ext cx="1996752" cy="454090"/>
+          </a:xfrm>
+          <a:prstGeom prst="roundRect">
+            <a:avLst/>
+          </a:prstGeom>
+        </p:spPr>
+        <p:style>
+          <a:lnRef idx="1">
+            <a:schemeClr val="accent4"/>
+          </a:lnRef>
+          <a:fillRef idx="2">
+            <a:schemeClr val="accent4"/>
+          </a:fillRef>
+          <a:effectRef idx="1">
+            <a:schemeClr val="accent4"/>
+          </a:effectRef>
+          <a:fontRef idx="minor">
+            <a:schemeClr val="dk1"/>
+          </a:fontRef>
+        </p:style>
+        <p:txBody>
+          <a:bodyPr rtlCol="0" anchor="ctr"/>
+          <a:lstStyle/>
+          <a:p>
+            <a:pPr algn="ctr"/>
+            <a:r>
+              <a:rPr lang="en-US" sz="1100" dirty="0"/>
+              <a:t>Hierarchy of transforms with default values (base pose)</a:t>
+            </a:r>
+          </a:p>
+        </p:txBody>
+      </p:sp>
+      <p:sp>
+        <p:nvSpPr>
+          <p:cNvPr id="5" name="Prostokąt: zaokrąglone rogi 4">
+            <a:extLst>
+              <a:ext uri="{FF2B5EF4-FFF2-40B4-BE49-F238E27FC236}">
+                <a16:creationId xmlns:a16="http://schemas.microsoft.com/office/drawing/2014/main" id="{557E3F4A-60E9-DCA0-D97F-434355F2C91D}"/>
+              </a:ext>
+            </a:extLst>
+          </p:cNvPr>
+          <p:cNvSpPr/>
+          <p:nvPr/>
+        </p:nvSpPr>
+        <p:spPr>
+          <a:xfrm>
+            <a:off x="1539550" y="3408263"/>
+            <a:ext cx="1996752" cy="454091"/>
+          </a:xfrm>
+          <a:prstGeom prst="roundRect">
+            <a:avLst/>
+          </a:prstGeom>
+        </p:spPr>
+        <p:style>
+          <a:lnRef idx="1">
+            <a:schemeClr val="accent1"/>
+          </a:lnRef>
+          <a:fillRef idx="2">
+            <a:schemeClr val="accent1"/>
+          </a:fillRef>
+          <a:effectRef idx="1">
+            <a:schemeClr val="accent1"/>
+          </a:effectRef>
+          <a:fontRef idx="minor">
+            <a:schemeClr val="dk1"/>
+          </a:fontRef>
+        </p:style>
+        <p:txBody>
+          <a:bodyPr rtlCol="0" anchor="t"/>
+          <a:lstStyle/>
+          <a:p>
+            <a:pPr algn="ctr"/>
+            <a:r>
+              <a:rPr lang="en-US" dirty="0" err="1"/>
+              <a:t>RenderMesh</a:t>
+            </a:r>
+            <a:endParaRPr lang="en-US" dirty="0"/>
+          </a:p>
+        </p:txBody>
+      </p:sp>
+      <p:sp>
+        <p:nvSpPr>
+          <p:cNvPr id="3" name="Prostokąt: zaokrąglone rogi 2">
+            <a:extLst>
+              <a:ext uri="{FF2B5EF4-FFF2-40B4-BE49-F238E27FC236}">
+                <a16:creationId xmlns:a16="http://schemas.microsoft.com/office/drawing/2014/main" id="{C4776758-F8EB-4357-8F25-C44477D42B3E}"/>
+              </a:ext>
+            </a:extLst>
+          </p:cNvPr>
+          <p:cNvSpPr/>
+          <p:nvPr/>
+        </p:nvSpPr>
+        <p:spPr>
+          <a:xfrm>
+            <a:off x="1539549" y="2699315"/>
+            <a:ext cx="1996752" cy="454090"/>
+          </a:xfrm>
+          <a:prstGeom prst="roundRect">
+            <a:avLst/>
+          </a:prstGeom>
+        </p:spPr>
+        <p:style>
+          <a:lnRef idx="1">
+            <a:schemeClr val="accent1"/>
+          </a:lnRef>
+          <a:fillRef idx="2">
+            <a:schemeClr val="accent1"/>
+          </a:fillRef>
+          <a:effectRef idx="1">
+            <a:schemeClr val="accent1"/>
+          </a:effectRef>
+          <a:fontRef idx="minor">
+            <a:schemeClr val="dk1"/>
+          </a:fontRef>
+        </p:style>
+        <p:txBody>
+          <a:bodyPr rtlCol="0" anchor="ctr"/>
+          <a:lstStyle/>
+          <a:p>
+            <a:pPr algn="ctr"/>
+            <a:r>
+              <a:rPr lang="en-US" dirty="0"/>
+              <a:t>Mesh</a:t>
+            </a:r>
+          </a:p>
+        </p:txBody>
+      </p:sp>
+      <p:sp>
+        <p:nvSpPr>
+          <p:cNvPr id="4" name="Prostokąt: zaokrąglone rogi 3">
+            <a:extLst>
+              <a:ext uri="{FF2B5EF4-FFF2-40B4-BE49-F238E27FC236}">
+                <a16:creationId xmlns:a16="http://schemas.microsoft.com/office/drawing/2014/main" id="{8052E21F-3AB5-BDE8-DC91-780EA97C6F68}"/>
+              </a:ext>
+            </a:extLst>
+          </p:cNvPr>
+          <p:cNvSpPr/>
+          <p:nvPr/>
+        </p:nvSpPr>
+        <p:spPr>
+          <a:xfrm>
+            <a:off x="1539549" y="1990367"/>
+            <a:ext cx="1996752" cy="454090"/>
+          </a:xfrm>
+          <a:prstGeom prst="roundRect">
+            <a:avLst/>
+          </a:prstGeom>
+        </p:spPr>
+        <p:style>
+          <a:lnRef idx="1">
+            <a:schemeClr val="accent1"/>
+          </a:lnRef>
+          <a:fillRef idx="2">
+            <a:schemeClr val="accent1"/>
+          </a:fillRef>
+          <a:effectRef idx="1">
+            <a:schemeClr val="accent1"/>
+          </a:effectRef>
+          <a:fontRef idx="minor">
+            <a:schemeClr val="dk1"/>
+          </a:fontRef>
+        </p:style>
+        <p:txBody>
+          <a:bodyPr rtlCol="0" anchor="ctr"/>
+          <a:lstStyle/>
+          <a:p>
+            <a:pPr algn="ctr"/>
+            <a:r>
+              <a:rPr lang="en-US" dirty="0"/>
+              <a:t>Material</a:t>
+            </a:r>
+          </a:p>
+        </p:txBody>
+      </p:sp>
+      <p:sp>
+        <p:nvSpPr>
+          <p:cNvPr id="8" name="Prostokąt: zaokrąglone rogi 7">
+            <a:extLst>
+              <a:ext uri="{FF2B5EF4-FFF2-40B4-BE49-F238E27FC236}">
+                <a16:creationId xmlns:a16="http://schemas.microsoft.com/office/drawing/2014/main" id="{09686041-2BBF-BF0F-1A49-FF7BCFEAFFEC}"/>
+              </a:ext>
+            </a:extLst>
+          </p:cNvPr>
+          <p:cNvSpPr/>
+          <p:nvPr/>
+        </p:nvSpPr>
+        <p:spPr>
+          <a:xfrm>
+            <a:off x="1539549" y="4117212"/>
+            <a:ext cx="1996752" cy="454091"/>
+          </a:xfrm>
+          <a:prstGeom prst="roundRect">
+            <a:avLst/>
+          </a:prstGeom>
+        </p:spPr>
+        <p:style>
+          <a:lnRef idx="1">
+            <a:schemeClr val="accent1"/>
+          </a:lnRef>
+          <a:fillRef idx="2">
+            <a:schemeClr val="accent1"/>
+          </a:fillRef>
+          <a:effectRef idx="1">
+            <a:schemeClr val="accent1"/>
+          </a:effectRef>
+          <a:fontRef idx="minor">
+            <a:schemeClr val="dk1"/>
+          </a:fontRef>
+        </p:style>
+        <p:txBody>
+          <a:bodyPr rtlCol="0" anchor="t"/>
+          <a:lstStyle/>
+          <a:p>
+            <a:pPr algn="ctr"/>
+            <a:r>
+              <a:rPr lang="en-US" dirty="0"/>
+              <a:t>Model</a:t>
+            </a:r>
+          </a:p>
+        </p:txBody>
+      </p:sp>
+      <p:sp>
+        <p:nvSpPr>
+          <p:cNvPr id="9" name="Prostokąt: zaokrąglone rogi 8">
+            <a:extLst>
+              <a:ext uri="{FF2B5EF4-FFF2-40B4-BE49-F238E27FC236}">
+                <a16:creationId xmlns:a16="http://schemas.microsoft.com/office/drawing/2014/main" id="{855B2F68-687D-EDD6-4E78-2D44B5FF46A4}"/>
+              </a:ext>
+            </a:extLst>
+          </p:cNvPr>
+          <p:cNvSpPr/>
+          <p:nvPr/>
+        </p:nvSpPr>
+        <p:spPr>
+          <a:xfrm>
+            <a:off x="1539549" y="4826163"/>
+            <a:ext cx="1996752" cy="454091"/>
+          </a:xfrm>
+          <a:prstGeom prst="roundRect">
+            <a:avLst/>
+          </a:prstGeom>
+        </p:spPr>
+        <p:style>
+          <a:lnRef idx="1">
+            <a:schemeClr val="accent1"/>
+          </a:lnRef>
+          <a:fillRef idx="2">
+            <a:schemeClr val="accent1"/>
+          </a:fillRef>
+          <a:effectRef idx="1">
+            <a:schemeClr val="accent1"/>
+          </a:effectRef>
+          <a:fontRef idx="minor">
+            <a:schemeClr val="dk1"/>
+          </a:fontRef>
+        </p:style>
+        <p:txBody>
+          <a:bodyPr rtlCol="0" anchor="t"/>
+          <a:lstStyle/>
+          <a:p>
+            <a:pPr algn="ctr"/>
+            <a:r>
+              <a:rPr lang="en-US" dirty="0"/>
+              <a:t>Skeleton</a:t>
+            </a:r>
+          </a:p>
+        </p:txBody>
+      </p:sp>
+      <p:sp>
+        <p:nvSpPr>
+          <p:cNvPr id="10" name="Prostokąt: zaokrąglone rogi 9">
+            <a:extLst>
+              <a:ext uri="{FF2B5EF4-FFF2-40B4-BE49-F238E27FC236}">
+                <a16:creationId xmlns:a16="http://schemas.microsoft.com/office/drawing/2014/main" id="{CF0201FE-182B-A715-5EFB-89E3DB288C39}"/>
+              </a:ext>
+            </a:extLst>
+          </p:cNvPr>
+          <p:cNvSpPr/>
+          <p:nvPr/>
+        </p:nvSpPr>
+        <p:spPr>
+          <a:xfrm>
+            <a:off x="1539549" y="1281419"/>
+            <a:ext cx="1996752" cy="454090"/>
+          </a:xfrm>
+          <a:prstGeom prst="roundRect">
+            <a:avLst/>
+          </a:prstGeom>
+        </p:spPr>
+        <p:style>
+          <a:lnRef idx="1">
+            <a:schemeClr val="accent1"/>
+          </a:lnRef>
+          <a:fillRef idx="2">
+            <a:schemeClr val="accent1"/>
+          </a:fillRef>
+          <a:effectRef idx="1">
+            <a:schemeClr val="accent1"/>
+          </a:effectRef>
+          <a:fontRef idx="minor">
+            <a:schemeClr val="dk1"/>
+          </a:fontRef>
+        </p:style>
+        <p:txBody>
+          <a:bodyPr rtlCol="0" anchor="ctr"/>
+          <a:lstStyle/>
+          <a:p>
+            <a:pPr algn="ctr"/>
+            <a:r>
+              <a:rPr lang="en-US" dirty="0" err="1"/>
+              <a:t>ShadingModel</a:t>
+            </a:r>
+            <a:endParaRPr lang="en-US" dirty="0"/>
+          </a:p>
+        </p:txBody>
+      </p:sp>
+      <p:sp>
+        <p:nvSpPr>
+          <p:cNvPr id="20" name="Prostokąt: zaokrąglone rogi 19">
+            <a:extLst>
+              <a:ext uri="{FF2B5EF4-FFF2-40B4-BE49-F238E27FC236}">
+                <a16:creationId xmlns:a16="http://schemas.microsoft.com/office/drawing/2014/main" id="{E974B9BC-FF5E-6BA1-5D41-9FA952D76AE8}"/>
+              </a:ext>
+            </a:extLst>
+          </p:cNvPr>
+          <p:cNvSpPr/>
+          <p:nvPr/>
+        </p:nvSpPr>
+        <p:spPr>
+          <a:xfrm>
+            <a:off x="1539549" y="5535108"/>
+            <a:ext cx="1996752" cy="454091"/>
+          </a:xfrm>
+          <a:prstGeom prst="roundRect">
+            <a:avLst/>
+          </a:prstGeom>
+        </p:spPr>
+        <p:style>
+          <a:lnRef idx="1">
+            <a:schemeClr val="accent1"/>
+          </a:lnRef>
+          <a:fillRef idx="2">
+            <a:schemeClr val="accent1"/>
+          </a:fillRef>
+          <a:effectRef idx="1">
+            <a:schemeClr val="accent1"/>
+          </a:effectRef>
+          <a:fontRef idx="minor">
+            <a:schemeClr val="dk1"/>
+          </a:fontRef>
+        </p:style>
+        <p:txBody>
+          <a:bodyPr rtlCol="0" anchor="t"/>
+          <a:lstStyle/>
+          <a:p>
+            <a:pPr algn="ctr"/>
+            <a:r>
+              <a:rPr lang="en-US" dirty="0" err="1"/>
+              <a:t>SkinnedModel</a:t>
+            </a:r>
+            <a:endParaRPr lang="en-US" dirty="0"/>
+          </a:p>
+        </p:txBody>
+      </p:sp>
+      <p:sp>
+        <p:nvSpPr>
+          <p:cNvPr id="32" name="Prostokąt: zaokrąglone rogi 31">
+            <a:extLst>
+              <a:ext uri="{FF2B5EF4-FFF2-40B4-BE49-F238E27FC236}">
+                <a16:creationId xmlns:a16="http://schemas.microsoft.com/office/drawing/2014/main" id="{EDDA5CDE-6FD3-ACBF-8E5B-F0BE562B71B9}"/>
+              </a:ext>
+            </a:extLst>
+          </p:cNvPr>
+          <p:cNvSpPr/>
+          <p:nvPr/>
+        </p:nvSpPr>
+        <p:spPr>
+          <a:xfrm>
+            <a:off x="8204716" y="5543384"/>
+            <a:ext cx="1996752" cy="454090"/>
+          </a:xfrm>
+          <a:prstGeom prst="roundRect">
+            <a:avLst/>
+          </a:prstGeom>
+        </p:spPr>
+        <p:style>
+          <a:lnRef idx="1">
+            <a:schemeClr val="accent4"/>
+          </a:lnRef>
+          <a:fillRef idx="2">
+            <a:schemeClr val="accent4"/>
+          </a:fillRef>
+          <a:effectRef idx="1">
+            <a:schemeClr val="accent4"/>
+          </a:effectRef>
+          <a:fontRef idx="minor">
+            <a:schemeClr val="dk1"/>
+          </a:fontRef>
+        </p:style>
+        <p:txBody>
+          <a:bodyPr rtlCol="0" anchor="ctr"/>
+          <a:lstStyle/>
+          <a:p>
+            <a:pPr algn="ctr"/>
+            <a:r>
+              <a:rPr lang="en-US" sz="1400" dirty="0"/>
+              <a:t>Skinning</a:t>
+            </a:r>
+          </a:p>
+        </p:txBody>
+      </p:sp>
+    </p:spTree>
+    <p:extLst>
+      <p:ext uri="{BB962C8B-B14F-4D97-AF65-F5344CB8AC3E}">
+        <p14:creationId xmlns:p14="http://schemas.microsoft.com/office/powerpoint/2010/main" val="3986972889"/>
+      </p:ext>
+    </p:extLst>
+  </p:cSld>
+  <p:clrMapOvr>
+    <a:masterClrMapping/>
+  </p:clrMapOvr>
+</p:sld>
+</file>
+
+<file path=ppt/slides/slide4.xml><?xml version="1.0" encoding="utf-8"?>
+<p:sld xmlns:a="http://schemas.openxmlformats.org/drawingml/2006/main" xmlns:r="http://schemas.openxmlformats.org/officeDocument/2006/relationships" xmlns:p="http://schemas.openxmlformats.org/presentationml/2006/main">
+  <p:cSld>
+    <p:spTree>
+      <p:nvGrpSpPr>
         <p:cNvPr id="1" name="">
           <a:extLst>
             <a:ext uri="{FF2B5EF4-FFF2-40B4-BE49-F238E27FC236}">
@@ -6541,7 +7879,7 @@
 </p:sld>
 </file>
 
-<file path=ppt/slides/slide4.xml><?xml version="1.0" encoding="utf-8"?>
+<file path=ppt/slides/slide5.xml><?xml version="1.0" encoding="utf-8"?>
 <p:sld xmlns:a="http://schemas.openxmlformats.org/drawingml/2006/main" xmlns:r="http://schemas.openxmlformats.org/officeDocument/2006/relationships" xmlns:p="http://schemas.openxmlformats.org/presentationml/2006/main">
   <p:cSld>
     <p:spTree>
@@ -8247,7 +9585,7 @@
 </p:sld>
 </file>
 
-<file path=ppt/slides/slide5.xml><?xml version="1.0" encoding="utf-8"?>
+<file path=ppt/slides/slide6.xml><?xml version="1.0" encoding="utf-8"?>
 <p:sld xmlns:a="http://schemas.openxmlformats.org/drawingml/2006/main" xmlns:r="http://schemas.openxmlformats.org/officeDocument/2006/relationships" xmlns:p="http://schemas.openxmlformats.org/presentationml/2006/main">
   <p:cSld>
     <p:spTree>
@@ -10641,7 +11979,7 @@
 </p:sld>
 </file>
 
-<file path=ppt/slides/slide6.xml><?xml version="1.0" encoding="utf-8"?>
+<file path=ppt/slides/slide7.xml><?xml version="1.0" encoding="utf-8"?>
 <p:sld xmlns:a="http://schemas.openxmlformats.org/drawingml/2006/main" xmlns:r="http://schemas.openxmlformats.org/officeDocument/2006/relationships" xmlns:p="http://schemas.openxmlformats.org/presentationml/2006/main">
   <p:cSld>
     <p:spTree>
@@ -11462,1344 +12800,6 @@
     <p:extLst>
       <p:ext uri="{BB962C8B-B14F-4D97-AF65-F5344CB8AC3E}">
         <p14:creationId xmlns:p14="http://schemas.microsoft.com/office/powerpoint/2010/main" val="786740795"/>
-      </p:ext>
-    </p:extLst>
-  </p:cSld>
-  <p:clrMapOvr>
-    <a:masterClrMapping/>
-  </p:clrMapOvr>
-</p:sld>
-</file>
-
-<file path=ppt/slides/slide7.xml><?xml version="1.0" encoding="utf-8"?>
-<p:sld xmlns:a="http://schemas.openxmlformats.org/drawingml/2006/main" xmlns:r="http://schemas.openxmlformats.org/officeDocument/2006/relationships" xmlns:p="http://schemas.openxmlformats.org/presentationml/2006/main">
-  <p:cSld>
-    <p:spTree>
-      <p:nvGrpSpPr>
-        <p:cNvPr id="1" name=""/>
-        <p:cNvGrpSpPr/>
-        <p:nvPr/>
-      </p:nvGrpSpPr>
-      <p:grpSpPr>
-        <a:xfrm>
-          <a:off x="0" y="0"/>
-          <a:ext cx="0" cy="0"/>
-          <a:chOff x="0" y="0"/>
-          <a:chExt cx="0" cy="0"/>
-        </a:xfrm>
-      </p:grpSpPr>
-      <p:sp>
-        <p:nvSpPr>
-          <p:cNvPr id="16" name="Prostokąt: zaokrąglone rogi 15">
-            <a:extLst>
-              <a:ext uri="{FF2B5EF4-FFF2-40B4-BE49-F238E27FC236}">
-                <a16:creationId xmlns:a16="http://schemas.microsoft.com/office/drawing/2014/main" id="{2A0423BC-C930-8484-D2D7-D42A2484E299}"/>
-              </a:ext>
-            </a:extLst>
-          </p:cNvPr>
-          <p:cNvSpPr/>
-          <p:nvPr/>
-        </p:nvSpPr>
-        <p:spPr>
-          <a:xfrm>
-            <a:off x="3446108" y="3344138"/>
-            <a:ext cx="7352524" cy="582346"/>
-          </a:xfrm>
-          <a:prstGeom prst="roundRect">
-            <a:avLst/>
-          </a:prstGeom>
-        </p:spPr>
-        <p:style>
-          <a:lnRef idx="1">
-            <a:schemeClr val="accent3"/>
-          </a:lnRef>
-          <a:fillRef idx="2">
-            <a:schemeClr val="accent3"/>
-          </a:fillRef>
-          <a:effectRef idx="1">
-            <a:schemeClr val="accent3"/>
-          </a:effectRef>
-          <a:fontRef idx="minor">
-            <a:schemeClr val="dk1"/>
-          </a:fontRef>
-        </p:style>
-        <p:txBody>
-          <a:bodyPr rtlCol="0" anchor="ctr"/>
-          <a:lstStyle/>
-          <a:p>
-            <a:pPr algn="ctr"/>
-            <a:endParaRPr lang="en-US" sz="2000" b="1" dirty="0"/>
-          </a:p>
-        </p:txBody>
-      </p:sp>
-      <p:sp>
-        <p:nvSpPr>
-          <p:cNvPr id="2" name="Rectangle: Rounded Corners 3">
-            <a:extLst>
-              <a:ext uri="{FF2B5EF4-FFF2-40B4-BE49-F238E27FC236}">
-                <a16:creationId xmlns:a16="http://schemas.microsoft.com/office/drawing/2014/main" id="{404DC3D8-F878-872E-5898-6AFED02B9CDC}"/>
-              </a:ext>
-            </a:extLst>
-          </p:cNvPr>
-          <p:cNvSpPr/>
-          <p:nvPr/>
-        </p:nvSpPr>
-        <p:spPr>
-          <a:xfrm>
-            <a:off x="4057794" y="378414"/>
-            <a:ext cx="3566358" cy="582346"/>
-          </a:xfrm>
-          <a:prstGeom prst="roundRect">
-            <a:avLst/>
-          </a:prstGeom>
-        </p:spPr>
-        <p:style>
-          <a:lnRef idx="0">
-            <a:schemeClr val="accent1"/>
-          </a:lnRef>
-          <a:fillRef idx="3">
-            <a:schemeClr val="accent1"/>
-          </a:fillRef>
-          <a:effectRef idx="3">
-            <a:schemeClr val="accent1"/>
-          </a:effectRef>
-          <a:fontRef idx="minor">
-            <a:schemeClr val="lt1"/>
-          </a:fontRef>
-        </p:style>
-        <p:txBody>
-          <a:bodyPr rtlCol="0" anchor="ctr"/>
-          <a:lstStyle/>
-          <a:p>
-            <a:pPr algn="ctr"/>
-            <a:r>
-              <a:rPr lang="en-US" dirty="0"/>
-              <a:t>Geometry Assets</a:t>
-            </a:r>
-          </a:p>
-        </p:txBody>
-      </p:sp>
-      <p:sp>
-        <p:nvSpPr>
-          <p:cNvPr id="6" name="Prostokąt: zaokrąglone rogi 5">
-            <a:extLst>
-              <a:ext uri="{FF2B5EF4-FFF2-40B4-BE49-F238E27FC236}">
-                <a16:creationId xmlns:a16="http://schemas.microsoft.com/office/drawing/2014/main" id="{7DC1B869-0D55-DBE5-CB6D-B52A1D9AB747}"/>
-              </a:ext>
-            </a:extLst>
-          </p:cNvPr>
-          <p:cNvSpPr/>
-          <p:nvPr/>
-        </p:nvSpPr>
-        <p:spPr>
-          <a:xfrm>
-            <a:off x="5097624" y="3404013"/>
-            <a:ext cx="1996752" cy="454090"/>
-          </a:xfrm>
-          <a:prstGeom prst="roundRect">
-            <a:avLst/>
-          </a:prstGeom>
-        </p:spPr>
-        <p:style>
-          <a:lnRef idx="1">
-            <a:schemeClr val="accent1"/>
-          </a:lnRef>
-          <a:fillRef idx="2">
-            <a:schemeClr val="accent1"/>
-          </a:fillRef>
-          <a:effectRef idx="1">
-            <a:schemeClr val="accent1"/>
-          </a:effectRef>
-          <a:fontRef idx="minor">
-            <a:schemeClr val="dk1"/>
-          </a:fontRef>
-        </p:style>
-        <p:txBody>
-          <a:bodyPr rtlCol="0" anchor="ctr"/>
-          <a:lstStyle/>
-          <a:p>
-            <a:pPr algn="ctr"/>
-            <a:r>
-              <a:rPr lang="en-US" dirty="0"/>
-              <a:t>Mesh</a:t>
-            </a:r>
-          </a:p>
-        </p:txBody>
-      </p:sp>
-      <p:sp>
-        <p:nvSpPr>
-          <p:cNvPr id="7" name="Prostokąt: zaokrąglone rogi 6">
-            <a:extLst>
-              <a:ext uri="{FF2B5EF4-FFF2-40B4-BE49-F238E27FC236}">
-                <a16:creationId xmlns:a16="http://schemas.microsoft.com/office/drawing/2014/main" id="{BA477DC3-49B8-4D7A-AF02-F386BACC8A94}"/>
-              </a:ext>
-            </a:extLst>
-          </p:cNvPr>
-          <p:cNvSpPr/>
-          <p:nvPr/>
-        </p:nvSpPr>
-        <p:spPr>
-          <a:xfrm>
-            <a:off x="7181465" y="3404013"/>
-            <a:ext cx="1996752" cy="454090"/>
-          </a:xfrm>
-          <a:prstGeom prst="roundRect">
-            <a:avLst/>
-          </a:prstGeom>
-        </p:spPr>
-        <p:style>
-          <a:lnRef idx="1">
-            <a:schemeClr val="accent1"/>
-          </a:lnRef>
-          <a:fillRef idx="2">
-            <a:schemeClr val="accent1"/>
-          </a:fillRef>
-          <a:effectRef idx="1">
-            <a:schemeClr val="accent1"/>
-          </a:effectRef>
-          <a:fontRef idx="minor">
-            <a:schemeClr val="dk1"/>
-          </a:fontRef>
-        </p:style>
-        <p:txBody>
-          <a:bodyPr rtlCol="0" anchor="ctr"/>
-          <a:lstStyle/>
-          <a:p>
-            <a:pPr algn="ctr"/>
-            <a:r>
-              <a:rPr lang="en-US" dirty="0"/>
-              <a:t>Material</a:t>
-            </a:r>
-          </a:p>
-        </p:txBody>
-      </p:sp>
-      <p:sp>
-        <p:nvSpPr>
-          <p:cNvPr id="13" name="Prostokąt: zaokrąglone rogi 12">
-            <a:extLst>
-              <a:ext uri="{FF2B5EF4-FFF2-40B4-BE49-F238E27FC236}">
-                <a16:creationId xmlns:a16="http://schemas.microsoft.com/office/drawing/2014/main" id="{A0FD60EF-87B6-6B13-F32F-D0B4B552008D}"/>
-              </a:ext>
-            </a:extLst>
-          </p:cNvPr>
-          <p:cNvSpPr/>
-          <p:nvPr/>
-        </p:nvSpPr>
-        <p:spPr>
-          <a:xfrm>
-            <a:off x="3446108" y="1217291"/>
-            <a:ext cx="7352524" cy="582346"/>
-          </a:xfrm>
-          <a:prstGeom prst="roundRect">
-            <a:avLst/>
-          </a:prstGeom>
-        </p:spPr>
-        <p:style>
-          <a:lnRef idx="1">
-            <a:schemeClr val="accent3"/>
-          </a:lnRef>
-          <a:fillRef idx="2">
-            <a:schemeClr val="accent3"/>
-          </a:fillRef>
-          <a:effectRef idx="1">
-            <a:schemeClr val="accent3"/>
-          </a:effectRef>
-          <a:fontRef idx="minor">
-            <a:schemeClr val="dk1"/>
-          </a:fontRef>
-        </p:style>
-        <p:txBody>
-          <a:bodyPr rtlCol="0" anchor="ctr"/>
-          <a:lstStyle/>
-          <a:p>
-            <a:pPr algn="ctr"/>
-            <a:endParaRPr lang="en-US"/>
-          </a:p>
-        </p:txBody>
-      </p:sp>
-      <p:sp>
-        <p:nvSpPr>
-          <p:cNvPr id="14" name="Prostokąt: zaokrąglone rogi 13">
-            <a:extLst>
-              <a:ext uri="{FF2B5EF4-FFF2-40B4-BE49-F238E27FC236}">
-                <a16:creationId xmlns:a16="http://schemas.microsoft.com/office/drawing/2014/main" id="{897FECBC-4C47-1445-96DB-428BA58D01CB}"/>
-              </a:ext>
-            </a:extLst>
-          </p:cNvPr>
-          <p:cNvSpPr/>
-          <p:nvPr/>
-        </p:nvSpPr>
-        <p:spPr>
-          <a:xfrm>
-            <a:off x="3446108" y="1926240"/>
-            <a:ext cx="7352524" cy="582346"/>
-          </a:xfrm>
-          <a:prstGeom prst="roundRect">
-            <a:avLst/>
-          </a:prstGeom>
-        </p:spPr>
-        <p:style>
-          <a:lnRef idx="1">
-            <a:schemeClr val="accent3"/>
-          </a:lnRef>
-          <a:fillRef idx="2">
-            <a:schemeClr val="accent3"/>
-          </a:fillRef>
-          <a:effectRef idx="1">
-            <a:schemeClr val="accent3"/>
-          </a:effectRef>
-          <a:fontRef idx="minor">
-            <a:schemeClr val="dk1"/>
-          </a:fontRef>
-        </p:style>
-        <p:txBody>
-          <a:bodyPr rtlCol="0" anchor="ctr"/>
-          <a:lstStyle/>
-          <a:p>
-            <a:pPr algn="ctr"/>
-            <a:endParaRPr lang="en-US" sz="1800" b="1" dirty="0"/>
-          </a:p>
-        </p:txBody>
-      </p:sp>
-      <p:sp>
-        <p:nvSpPr>
-          <p:cNvPr id="15" name="Prostokąt: zaokrąglone rogi 14">
-            <a:extLst>
-              <a:ext uri="{FF2B5EF4-FFF2-40B4-BE49-F238E27FC236}">
-                <a16:creationId xmlns:a16="http://schemas.microsoft.com/office/drawing/2014/main" id="{B94F2211-64DC-A131-4117-28163CC5E325}"/>
-              </a:ext>
-            </a:extLst>
-          </p:cNvPr>
-          <p:cNvSpPr/>
-          <p:nvPr/>
-        </p:nvSpPr>
-        <p:spPr>
-          <a:xfrm>
-            <a:off x="3446108" y="2635189"/>
-            <a:ext cx="7352524" cy="582346"/>
-          </a:xfrm>
-          <a:prstGeom prst="roundRect">
-            <a:avLst/>
-          </a:prstGeom>
-        </p:spPr>
-        <p:style>
-          <a:lnRef idx="1">
-            <a:schemeClr val="accent3"/>
-          </a:lnRef>
-          <a:fillRef idx="2">
-            <a:schemeClr val="accent3"/>
-          </a:fillRef>
-          <a:effectRef idx="1">
-            <a:schemeClr val="accent3"/>
-          </a:effectRef>
-          <a:fontRef idx="minor">
-            <a:schemeClr val="dk1"/>
-          </a:fontRef>
-        </p:style>
-        <p:txBody>
-          <a:bodyPr rtlCol="0" anchor="ctr"/>
-          <a:lstStyle/>
-          <a:p>
-            <a:pPr algn="ctr"/>
-            <a:endParaRPr lang="en-US"/>
-          </a:p>
-        </p:txBody>
-      </p:sp>
-      <p:sp>
-        <p:nvSpPr>
-          <p:cNvPr id="17" name="Prostokąt: zaokrąglone rogi 16">
-            <a:extLst>
-              <a:ext uri="{FF2B5EF4-FFF2-40B4-BE49-F238E27FC236}">
-                <a16:creationId xmlns:a16="http://schemas.microsoft.com/office/drawing/2014/main" id="{29B3EDB4-AA20-7B1E-2E67-D0B4A67C0906}"/>
-              </a:ext>
-            </a:extLst>
-          </p:cNvPr>
-          <p:cNvSpPr/>
-          <p:nvPr/>
-        </p:nvSpPr>
-        <p:spPr>
-          <a:xfrm>
-            <a:off x="3446108" y="4053087"/>
-            <a:ext cx="7352524" cy="582346"/>
-          </a:xfrm>
-          <a:prstGeom prst="roundRect">
-            <a:avLst/>
-          </a:prstGeom>
-        </p:spPr>
-        <p:style>
-          <a:lnRef idx="1">
-            <a:schemeClr val="accent3"/>
-          </a:lnRef>
-          <a:fillRef idx="2">
-            <a:schemeClr val="accent3"/>
-          </a:fillRef>
-          <a:effectRef idx="1">
-            <a:schemeClr val="accent3"/>
-          </a:effectRef>
-          <a:fontRef idx="minor">
-            <a:schemeClr val="dk1"/>
-          </a:fontRef>
-        </p:style>
-        <p:txBody>
-          <a:bodyPr rtlCol="0" anchor="ctr"/>
-          <a:lstStyle/>
-          <a:p>
-            <a:pPr algn="ctr"/>
-            <a:endParaRPr lang="en-US" sz="2000" b="1" dirty="0"/>
-          </a:p>
-        </p:txBody>
-      </p:sp>
-      <p:sp>
-        <p:nvSpPr>
-          <p:cNvPr id="18" name="Prostokąt: zaokrąglone rogi 17">
-            <a:extLst>
-              <a:ext uri="{FF2B5EF4-FFF2-40B4-BE49-F238E27FC236}">
-                <a16:creationId xmlns:a16="http://schemas.microsoft.com/office/drawing/2014/main" id="{154721C8-F29E-2243-06B1-A602C584922D}"/>
-              </a:ext>
-            </a:extLst>
-          </p:cNvPr>
-          <p:cNvSpPr/>
-          <p:nvPr/>
-        </p:nvSpPr>
-        <p:spPr>
-          <a:xfrm>
-            <a:off x="3446108" y="4762035"/>
-            <a:ext cx="7352524" cy="582346"/>
-          </a:xfrm>
-          <a:prstGeom prst="roundRect">
-            <a:avLst/>
-          </a:prstGeom>
-        </p:spPr>
-        <p:style>
-          <a:lnRef idx="1">
-            <a:schemeClr val="accent3"/>
-          </a:lnRef>
-          <a:fillRef idx="2">
-            <a:schemeClr val="accent3"/>
-          </a:fillRef>
-          <a:effectRef idx="1">
-            <a:schemeClr val="accent3"/>
-          </a:effectRef>
-          <a:fontRef idx="minor">
-            <a:schemeClr val="dk1"/>
-          </a:fontRef>
-        </p:style>
-        <p:txBody>
-          <a:bodyPr rtlCol="0" anchor="ctr"/>
-          <a:lstStyle/>
-          <a:p>
-            <a:pPr algn="ctr"/>
-            <a:endParaRPr lang="en-US"/>
-          </a:p>
-        </p:txBody>
-      </p:sp>
-      <p:sp>
-        <p:nvSpPr>
-          <p:cNvPr id="19" name="Prostokąt: zaokrąglone rogi 18">
-            <a:extLst>
-              <a:ext uri="{FF2B5EF4-FFF2-40B4-BE49-F238E27FC236}">
-                <a16:creationId xmlns:a16="http://schemas.microsoft.com/office/drawing/2014/main" id="{AB90DAFD-234B-7A84-A8D3-4555CC31A120}"/>
-              </a:ext>
-            </a:extLst>
-          </p:cNvPr>
-          <p:cNvSpPr/>
-          <p:nvPr/>
-        </p:nvSpPr>
-        <p:spPr>
-          <a:xfrm>
-            <a:off x="6183089" y="4117212"/>
-            <a:ext cx="1996752" cy="454091"/>
-          </a:xfrm>
-          <a:prstGeom prst="roundRect">
-            <a:avLst/>
-          </a:prstGeom>
-        </p:spPr>
-        <p:style>
-          <a:lnRef idx="1">
-            <a:schemeClr val="accent1"/>
-          </a:lnRef>
-          <a:fillRef idx="2">
-            <a:schemeClr val="accent1"/>
-          </a:fillRef>
-          <a:effectRef idx="1">
-            <a:schemeClr val="accent1"/>
-          </a:effectRef>
-          <a:fontRef idx="minor">
-            <a:schemeClr val="dk1"/>
-          </a:fontRef>
-        </p:style>
-        <p:txBody>
-          <a:bodyPr rtlCol="0" anchor="t"/>
-          <a:lstStyle/>
-          <a:p>
-            <a:pPr algn="ctr"/>
-            <a:r>
-              <a:rPr lang="en-US" dirty="0"/>
-              <a:t>N × </a:t>
-            </a:r>
-            <a:r>
-              <a:rPr lang="en-US" dirty="0" err="1"/>
-              <a:t>RenderMesh</a:t>
-            </a:r>
-            <a:endParaRPr lang="en-US" dirty="0"/>
-          </a:p>
-        </p:txBody>
-      </p:sp>
-      <p:sp>
-        <p:nvSpPr>
-          <p:cNvPr id="21" name="Prostokąt: zaokrąglone rogi 20">
-            <a:extLst>
-              <a:ext uri="{FF2B5EF4-FFF2-40B4-BE49-F238E27FC236}">
-                <a16:creationId xmlns:a16="http://schemas.microsoft.com/office/drawing/2014/main" id="{D583FA01-2820-1FD4-E0D6-EFDA0DDBFAC3}"/>
-              </a:ext>
-            </a:extLst>
-          </p:cNvPr>
-          <p:cNvSpPr/>
-          <p:nvPr/>
-        </p:nvSpPr>
-        <p:spPr>
-          <a:xfrm>
-            <a:off x="3446108" y="5470983"/>
-            <a:ext cx="7352524" cy="582346"/>
-          </a:xfrm>
-          <a:prstGeom prst="roundRect">
-            <a:avLst/>
-          </a:prstGeom>
-        </p:spPr>
-        <p:style>
-          <a:lnRef idx="1">
-            <a:schemeClr val="accent3"/>
-          </a:lnRef>
-          <a:fillRef idx="2">
-            <a:schemeClr val="accent3"/>
-          </a:fillRef>
-          <a:effectRef idx="1">
-            <a:schemeClr val="accent3"/>
-          </a:effectRef>
-          <a:fontRef idx="minor">
-            <a:schemeClr val="dk1"/>
-          </a:fontRef>
-        </p:style>
-        <p:txBody>
-          <a:bodyPr rtlCol="0" anchor="ctr"/>
-          <a:lstStyle/>
-          <a:p>
-            <a:pPr algn="ctr"/>
-            <a:endParaRPr lang="en-US" sz="1800" b="1" dirty="0"/>
-          </a:p>
-        </p:txBody>
-      </p:sp>
-      <p:sp>
-        <p:nvSpPr>
-          <p:cNvPr id="22" name="Prostokąt: zaokrąglone rogi 21">
-            <a:extLst>
-              <a:ext uri="{FF2B5EF4-FFF2-40B4-BE49-F238E27FC236}">
-                <a16:creationId xmlns:a16="http://schemas.microsoft.com/office/drawing/2014/main" id="{BF595126-B4DB-766D-BB40-875AEB9834EA}"/>
-              </a:ext>
-            </a:extLst>
-          </p:cNvPr>
-          <p:cNvSpPr/>
-          <p:nvPr/>
-        </p:nvSpPr>
-        <p:spPr>
-          <a:xfrm>
-            <a:off x="4040153" y="5543383"/>
-            <a:ext cx="1996752" cy="454091"/>
-          </a:xfrm>
-          <a:prstGeom prst="roundRect">
-            <a:avLst/>
-          </a:prstGeom>
-        </p:spPr>
-        <p:style>
-          <a:lnRef idx="1">
-            <a:schemeClr val="accent1"/>
-          </a:lnRef>
-          <a:fillRef idx="2">
-            <a:schemeClr val="accent1"/>
-          </a:fillRef>
-          <a:effectRef idx="1">
-            <a:schemeClr val="accent1"/>
-          </a:effectRef>
-          <a:fontRef idx="minor">
-            <a:schemeClr val="dk1"/>
-          </a:fontRef>
-        </p:style>
-        <p:txBody>
-          <a:bodyPr rtlCol="0" anchor="t"/>
-          <a:lstStyle/>
-          <a:p>
-            <a:pPr algn="ctr"/>
-            <a:r>
-              <a:rPr lang="en-US" dirty="0"/>
-              <a:t>Skeleton</a:t>
-            </a:r>
-          </a:p>
-        </p:txBody>
-      </p:sp>
-      <p:sp>
-        <p:nvSpPr>
-          <p:cNvPr id="23" name="Prostokąt: zaokrąglone rogi 22">
-            <a:extLst>
-              <a:ext uri="{FF2B5EF4-FFF2-40B4-BE49-F238E27FC236}">
-                <a16:creationId xmlns:a16="http://schemas.microsoft.com/office/drawing/2014/main" id="{3E9B9E4D-B225-7EED-713C-596F474BCFDF}"/>
-              </a:ext>
-            </a:extLst>
-          </p:cNvPr>
-          <p:cNvSpPr/>
-          <p:nvPr/>
-        </p:nvSpPr>
-        <p:spPr>
-          <a:xfrm>
-            <a:off x="6123994" y="5543383"/>
-            <a:ext cx="1996752" cy="454091"/>
-          </a:xfrm>
-          <a:prstGeom prst="roundRect">
-            <a:avLst/>
-          </a:prstGeom>
-        </p:spPr>
-        <p:style>
-          <a:lnRef idx="1">
-            <a:schemeClr val="accent1"/>
-          </a:lnRef>
-          <a:fillRef idx="2">
-            <a:schemeClr val="accent1"/>
-          </a:fillRef>
-          <a:effectRef idx="1">
-            <a:schemeClr val="accent1"/>
-          </a:effectRef>
-          <a:fontRef idx="minor">
-            <a:schemeClr val="dk1"/>
-          </a:fontRef>
-        </p:style>
-        <p:txBody>
-          <a:bodyPr rtlCol="0" anchor="t"/>
-          <a:lstStyle/>
-          <a:p>
-            <a:pPr algn="ctr"/>
-            <a:r>
-              <a:rPr lang="en-US" dirty="0"/>
-              <a:t>Model</a:t>
-            </a:r>
-          </a:p>
-        </p:txBody>
-      </p:sp>
-      <p:sp>
-        <p:nvSpPr>
-          <p:cNvPr id="24" name="Prostokąt: zaokrąglone rogi 23">
-            <a:extLst>
-              <a:ext uri="{FF2B5EF4-FFF2-40B4-BE49-F238E27FC236}">
-                <a16:creationId xmlns:a16="http://schemas.microsoft.com/office/drawing/2014/main" id="{CA4F5D74-F9C0-33DB-A6C3-11AF9EF90C8F}"/>
-              </a:ext>
-            </a:extLst>
-          </p:cNvPr>
-          <p:cNvSpPr/>
-          <p:nvPr/>
-        </p:nvSpPr>
-        <p:spPr>
-          <a:xfrm>
-            <a:off x="4049486" y="1990365"/>
-            <a:ext cx="1996752" cy="454090"/>
-          </a:xfrm>
-          <a:prstGeom prst="roundRect">
-            <a:avLst/>
-          </a:prstGeom>
-        </p:spPr>
-        <p:style>
-          <a:lnRef idx="1">
-            <a:schemeClr val="accent1"/>
-          </a:lnRef>
-          <a:fillRef idx="2">
-            <a:schemeClr val="accent1"/>
-          </a:fillRef>
-          <a:effectRef idx="1">
-            <a:schemeClr val="accent1"/>
-          </a:effectRef>
-          <a:fontRef idx="minor">
-            <a:schemeClr val="dk1"/>
-          </a:fontRef>
-        </p:style>
-        <p:txBody>
-          <a:bodyPr rtlCol="0" anchor="ctr"/>
-          <a:lstStyle/>
-          <a:p>
-            <a:pPr algn="ctr"/>
-            <a:r>
-              <a:rPr lang="en-US" dirty="0" err="1"/>
-              <a:t>ShadingModel</a:t>
-            </a:r>
-            <a:endParaRPr lang="en-US" dirty="0"/>
-          </a:p>
-        </p:txBody>
-      </p:sp>
-      <p:sp>
-        <p:nvSpPr>
-          <p:cNvPr id="25" name="Prostokąt: zaokrąglone rogi 24">
-            <a:extLst>
-              <a:ext uri="{FF2B5EF4-FFF2-40B4-BE49-F238E27FC236}">
-                <a16:creationId xmlns:a16="http://schemas.microsoft.com/office/drawing/2014/main" id="{7B90A194-A5C2-66A5-F7C2-BEDE06203A33}"/>
-              </a:ext>
-            </a:extLst>
-          </p:cNvPr>
-          <p:cNvSpPr/>
-          <p:nvPr/>
-        </p:nvSpPr>
-        <p:spPr>
-          <a:xfrm>
-            <a:off x="6127101" y="1990171"/>
-            <a:ext cx="1996752" cy="454091"/>
-          </a:xfrm>
-          <a:prstGeom prst="roundRect">
-            <a:avLst/>
-          </a:prstGeom>
-        </p:spPr>
-        <p:style>
-          <a:lnRef idx="1">
-            <a:schemeClr val="accent1"/>
-          </a:lnRef>
-          <a:fillRef idx="2">
-            <a:schemeClr val="accent1"/>
-          </a:fillRef>
-          <a:effectRef idx="1">
-            <a:schemeClr val="accent1"/>
-          </a:effectRef>
-          <a:fontRef idx="minor">
-            <a:schemeClr val="dk1"/>
-          </a:fontRef>
-        </p:style>
-        <p:txBody>
-          <a:bodyPr rtlCol="0" anchor="t"/>
-          <a:lstStyle/>
-          <a:p>
-            <a:pPr algn="ctr"/>
-            <a:r>
-              <a:rPr lang="en-US" sz="1800" b="1" dirty="0"/>
-              <a:t>N × </a:t>
-            </a:r>
-            <a:r>
-              <a:rPr lang="en-US" dirty="0"/>
-              <a:t>Texture</a:t>
-            </a:r>
-          </a:p>
-        </p:txBody>
-      </p:sp>
-      <p:sp>
-        <p:nvSpPr>
-          <p:cNvPr id="26" name="Prostokąt: zaokrąglone rogi 25">
-            <a:extLst>
-              <a:ext uri="{FF2B5EF4-FFF2-40B4-BE49-F238E27FC236}">
-                <a16:creationId xmlns:a16="http://schemas.microsoft.com/office/drawing/2014/main" id="{F42F88EB-1A34-1A30-5484-700E344CD7B0}"/>
-              </a:ext>
-            </a:extLst>
-          </p:cNvPr>
-          <p:cNvSpPr/>
-          <p:nvPr/>
-        </p:nvSpPr>
-        <p:spPr>
-          <a:xfrm>
-            <a:off x="5097624" y="1281419"/>
-            <a:ext cx="1996752" cy="454090"/>
-          </a:xfrm>
-          <a:prstGeom prst="roundRect">
-            <a:avLst/>
-          </a:prstGeom>
-        </p:spPr>
-        <p:style>
-          <a:lnRef idx="1">
-            <a:schemeClr val="accent1"/>
-          </a:lnRef>
-          <a:fillRef idx="2">
-            <a:schemeClr val="accent1"/>
-          </a:fillRef>
-          <a:effectRef idx="1">
-            <a:schemeClr val="accent1"/>
-          </a:effectRef>
-          <a:fontRef idx="minor">
-            <a:schemeClr val="dk1"/>
-          </a:fontRef>
-        </p:style>
-        <p:txBody>
-          <a:bodyPr rtlCol="0" anchor="ctr"/>
-          <a:lstStyle/>
-          <a:p>
-            <a:pPr algn="ctr"/>
-            <a:r>
-              <a:rPr lang="en-US" dirty="0"/>
-              <a:t>Shader</a:t>
-            </a:r>
-          </a:p>
-        </p:txBody>
-      </p:sp>
-      <p:sp>
-        <p:nvSpPr>
-          <p:cNvPr id="27" name="Prostokąt: zaokrąglone rogi 26">
-            <a:extLst>
-              <a:ext uri="{FF2B5EF4-FFF2-40B4-BE49-F238E27FC236}">
-                <a16:creationId xmlns:a16="http://schemas.microsoft.com/office/drawing/2014/main" id="{569493F9-F3EC-0062-A180-C93A667ADF67}"/>
-              </a:ext>
-            </a:extLst>
-          </p:cNvPr>
-          <p:cNvSpPr/>
-          <p:nvPr/>
-        </p:nvSpPr>
-        <p:spPr>
-          <a:xfrm>
-            <a:off x="7181465" y="1281419"/>
-            <a:ext cx="1996752" cy="454090"/>
-          </a:xfrm>
-          <a:prstGeom prst="roundRect">
-            <a:avLst/>
-          </a:prstGeom>
-        </p:spPr>
-        <p:style>
-          <a:lnRef idx="1">
-            <a:schemeClr val="accent4"/>
-          </a:lnRef>
-          <a:fillRef idx="2">
-            <a:schemeClr val="accent4"/>
-          </a:fillRef>
-          <a:effectRef idx="1">
-            <a:schemeClr val="accent4"/>
-          </a:effectRef>
-          <a:fontRef idx="minor">
-            <a:schemeClr val="dk1"/>
-          </a:fontRef>
-        </p:style>
-        <p:txBody>
-          <a:bodyPr rtlCol="0" anchor="ctr"/>
-          <a:lstStyle/>
-          <a:p>
-            <a:pPr algn="ctr"/>
-            <a:r>
-              <a:rPr lang="en-US" sz="1400" dirty="0"/>
-              <a:t>Shader parameters (samplers, uniforms)</a:t>
-            </a:r>
-          </a:p>
-        </p:txBody>
-      </p:sp>
-      <p:sp>
-        <p:nvSpPr>
-          <p:cNvPr id="28" name="Prostokąt: zaokrąglone rogi 27">
-            <a:extLst>
-              <a:ext uri="{FF2B5EF4-FFF2-40B4-BE49-F238E27FC236}">
-                <a16:creationId xmlns:a16="http://schemas.microsoft.com/office/drawing/2014/main" id="{5C27AB83-49D2-7C3E-5AC5-6488022D575E}"/>
-              </a:ext>
-            </a:extLst>
-          </p:cNvPr>
-          <p:cNvSpPr/>
-          <p:nvPr/>
-        </p:nvSpPr>
-        <p:spPr>
-          <a:xfrm>
-            <a:off x="8204716" y="1990172"/>
-            <a:ext cx="1996752" cy="454090"/>
-          </a:xfrm>
-          <a:prstGeom prst="roundRect">
-            <a:avLst/>
-          </a:prstGeom>
-        </p:spPr>
-        <p:style>
-          <a:lnRef idx="1">
-            <a:schemeClr val="accent4"/>
-          </a:lnRef>
-          <a:fillRef idx="2">
-            <a:schemeClr val="accent4"/>
-          </a:fillRef>
-          <a:effectRef idx="1">
-            <a:schemeClr val="accent4"/>
-          </a:effectRef>
-          <a:fontRef idx="minor">
-            <a:schemeClr val="dk1"/>
-          </a:fontRef>
-        </p:style>
-        <p:txBody>
-          <a:bodyPr rtlCol="0" anchor="ctr"/>
-          <a:lstStyle/>
-          <a:p>
-            <a:pPr algn="ctr"/>
-            <a:r>
-              <a:rPr lang="en-US" sz="1400" dirty="0"/>
-              <a:t>Uniform Values</a:t>
-            </a:r>
-          </a:p>
-        </p:txBody>
-      </p:sp>
-      <p:sp>
-        <p:nvSpPr>
-          <p:cNvPr id="29" name="Prostokąt: zaokrąglone rogi 28">
-            <a:extLst>
-              <a:ext uri="{FF2B5EF4-FFF2-40B4-BE49-F238E27FC236}">
-                <a16:creationId xmlns:a16="http://schemas.microsoft.com/office/drawing/2014/main" id="{ABDC9015-5091-503D-A9A9-AB69ED341999}"/>
-              </a:ext>
-            </a:extLst>
-          </p:cNvPr>
-          <p:cNvSpPr/>
-          <p:nvPr/>
-        </p:nvSpPr>
-        <p:spPr>
-          <a:xfrm>
-            <a:off x="6123994" y="2699315"/>
-            <a:ext cx="1996752" cy="454090"/>
-          </a:xfrm>
-          <a:prstGeom prst="roundRect">
-            <a:avLst/>
-          </a:prstGeom>
-        </p:spPr>
-        <p:style>
-          <a:lnRef idx="1">
-            <a:schemeClr val="accent4"/>
-          </a:lnRef>
-          <a:fillRef idx="2">
-            <a:schemeClr val="accent4"/>
-          </a:fillRef>
-          <a:effectRef idx="1">
-            <a:schemeClr val="accent4"/>
-          </a:effectRef>
-          <a:fontRef idx="minor">
-            <a:schemeClr val="dk1"/>
-          </a:fontRef>
-        </p:style>
-        <p:txBody>
-          <a:bodyPr rtlCol="0" anchor="ctr"/>
-          <a:lstStyle/>
-          <a:p>
-            <a:pPr algn="ctr"/>
-            <a:r>
-              <a:rPr lang="en-US" sz="1400" dirty="0"/>
-              <a:t>Vertices and Indices</a:t>
-            </a:r>
-          </a:p>
-        </p:txBody>
-      </p:sp>
-      <p:sp>
-        <p:nvSpPr>
-          <p:cNvPr id="30" name="Prostokąt: zaokrąglone rogi 29">
-            <a:extLst>
-              <a:ext uri="{FF2B5EF4-FFF2-40B4-BE49-F238E27FC236}">
-                <a16:creationId xmlns:a16="http://schemas.microsoft.com/office/drawing/2014/main" id="{99303775-020C-8FCE-35FF-1F7E6C962DA7}"/>
-              </a:ext>
-            </a:extLst>
-          </p:cNvPr>
-          <p:cNvSpPr/>
-          <p:nvPr/>
-        </p:nvSpPr>
-        <p:spPr>
-          <a:xfrm>
-            <a:off x="6183089" y="4826163"/>
-            <a:ext cx="1996752" cy="454090"/>
-          </a:xfrm>
-          <a:prstGeom prst="roundRect">
-            <a:avLst/>
-          </a:prstGeom>
-        </p:spPr>
-        <p:style>
-          <a:lnRef idx="1">
-            <a:schemeClr val="accent4"/>
-          </a:lnRef>
-          <a:fillRef idx="2">
-            <a:schemeClr val="accent4"/>
-          </a:fillRef>
-          <a:effectRef idx="1">
-            <a:schemeClr val="accent4"/>
-          </a:effectRef>
-          <a:fontRef idx="minor">
-            <a:schemeClr val="dk1"/>
-          </a:fontRef>
-        </p:style>
-        <p:txBody>
-          <a:bodyPr rtlCol="0" anchor="ctr"/>
-          <a:lstStyle/>
-          <a:p>
-            <a:pPr algn="ctr"/>
-            <a:r>
-              <a:rPr lang="en-US" sz="1100" dirty="0"/>
-              <a:t>Hierarchy of transforms with default values (base pose)</a:t>
-            </a:r>
-          </a:p>
-        </p:txBody>
-      </p:sp>
-      <p:sp>
-        <p:nvSpPr>
-          <p:cNvPr id="5" name="Prostokąt: zaokrąglone rogi 4">
-            <a:extLst>
-              <a:ext uri="{FF2B5EF4-FFF2-40B4-BE49-F238E27FC236}">
-                <a16:creationId xmlns:a16="http://schemas.microsoft.com/office/drawing/2014/main" id="{557E3F4A-60E9-DCA0-D97F-434355F2C91D}"/>
-              </a:ext>
-            </a:extLst>
-          </p:cNvPr>
-          <p:cNvSpPr/>
-          <p:nvPr/>
-        </p:nvSpPr>
-        <p:spPr>
-          <a:xfrm>
-            <a:off x="1539550" y="3408263"/>
-            <a:ext cx="1996752" cy="454091"/>
-          </a:xfrm>
-          <a:prstGeom prst="roundRect">
-            <a:avLst/>
-          </a:prstGeom>
-        </p:spPr>
-        <p:style>
-          <a:lnRef idx="1">
-            <a:schemeClr val="accent1"/>
-          </a:lnRef>
-          <a:fillRef idx="2">
-            <a:schemeClr val="accent1"/>
-          </a:fillRef>
-          <a:effectRef idx="1">
-            <a:schemeClr val="accent1"/>
-          </a:effectRef>
-          <a:fontRef idx="minor">
-            <a:schemeClr val="dk1"/>
-          </a:fontRef>
-        </p:style>
-        <p:txBody>
-          <a:bodyPr rtlCol="0" anchor="t"/>
-          <a:lstStyle/>
-          <a:p>
-            <a:pPr algn="ctr"/>
-            <a:r>
-              <a:rPr lang="en-US" dirty="0" err="1"/>
-              <a:t>RenderMesh</a:t>
-            </a:r>
-            <a:endParaRPr lang="en-US" dirty="0"/>
-          </a:p>
-        </p:txBody>
-      </p:sp>
-      <p:sp>
-        <p:nvSpPr>
-          <p:cNvPr id="3" name="Prostokąt: zaokrąglone rogi 2">
-            <a:extLst>
-              <a:ext uri="{FF2B5EF4-FFF2-40B4-BE49-F238E27FC236}">
-                <a16:creationId xmlns:a16="http://schemas.microsoft.com/office/drawing/2014/main" id="{C4776758-F8EB-4357-8F25-C44477D42B3E}"/>
-              </a:ext>
-            </a:extLst>
-          </p:cNvPr>
-          <p:cNvSpPr/>
-          <p:nvPr/>
-        </p:nvSpPr>
-        <p:spPr>
-          <a:xfrm>
-            <a:off x="1539549" y="2699315"/>
-            <a:ext cx="1996752" cy="454090"/>
-          </a:xfrm>
-          <a:prstGeom prst="roundRect">
-            <a:avLst/>
-          </a:prstGeom>
-        </p:spPr>
-        <p:style>
-          <a:lnRef idx="1">
-            <a:schemeClr val="accent1"/>
-          </a:lnRef>
-          <a:fillRef idx="2">
-            <a:schemeClr val="accent1"/>
-          </a:fillRef>
-          <a:effectRef idx="1">
-            <a:schemeClr val="accent1"/>
-          </a:effectRef>
-          <a:fontRef idx="minor">
-            <a:schemeClr val="dk1"/>
-          </a:fontRef>
-        </p:style>
-        <p:txBody>
-          <a:bodyPr rtlCol="0" anchor="ctr"/>
-          <a:lstStyle/>
-          <a:p>
-            <a:pPr algn="ctr"/>
-            <a:r>
-              <a:rPr lang="en-US" dirty="0"/>
-              <a:t>Mesh</a:t>
-            </a:r>
-          </a:p>
-        </p:txBody>
-      </p:sp>
-      <p:sp>
-        <p:nvSpPr>
-          <p:cNvPr id="4" name="Prostokąt: zaokrąglone rogi 3">
-            <a:extLst>
-              <a:ext uri="{FF2B5EF4-FFF2-40B4-BE49-F238E27FC236}">
-                <a16:creationId xmlns:a16="http://schemas.microsoft.com/office/drawing/2014/main" id="{8052E21F-3AB5-BDE8-DC91-780EA97C6F68}"/>
-              </a:ext>
-            </a:extLst>
-          </p:cNvPr>
-          <p:cNvSpPr/>
-          <p:nvPr/>
-        </p:nvSpPr>
-        <p:spPr>
-          <a:xfrm>
-            <a:off x="1539549" y="1990367"/>
-            <a:ext cx="1996752" cy="454090"/>
-          </a:xfrm>
-          <a:prstGeom prst="roundRect">
-            <a:avLst/>
-          </a:prstGeom>
-        </p:spPr>
-        <p:style>
-          <a:lnRef idx="1">
-            <a:schemeClr val="accent1"/>
-          </a:lnRef>
-          <a:fillRef idx="2">
-            <a:schemeClr val="accent1"/>
-          </a:fillRef>
-          <a:effectRef idx="1">
-            <a:schemeClr val="accent1"/>
-          </a:effectRef>
-          <a:fontRef idx="minor">
-            <a:schemeClr val="dk1"/>
-          </a:fontRef>
-        </p:style>
-        <p:txBody>
-          <a:bodyPr rtlCol="0" anchor="ctr"/>
-          <a:lstStyle/>
-          <a:p>
-            <a:pPr algn="ctr"/>
-            <a:r>
-              <a:rPr lang="en-US" dirty="0"/>
-              <a:t>Material</a:t>
-            </a:r>
-          </a:p>
-        </p:txBody>
-      </p:sp>
-      <p:sp>
-        <p:nvSpPr>
-          <p:cNvPr id="8" name="Prostokąt: zaokrąglone rogi 7">
-            <a:extLst>
-              <a:ext uri="{FF2B5EF4-FFF2-40B4-BE49-F238E27FC236}">
-                <a16:creationId xmlns:a16="http://schemas.microsoft.com/office/drawing/2014/main" id="{09686041-2BBF-BF0F-1A49-FF7BCFEAFFEC}"/>
-              </a:ext>
-            </a:extLst>
-          </p:cNvPr>
-          <p:cNvSpPr/>
-          <p:nvPr/>
-        </p:nvSpPr>
-        <p:spPr>
-          <a:xfrm>
-            <a:off x="1539549" y="4117212"/>
-            <a:ext cx="1996752" cy="454091"/>
-          </a:xfrm>
-          <a:prstGeom prst="roundRect">
-            <a:avLst/>
-          </a:prstGeom>
-        </p:spPr>
-        <p:style>
-          <a:lnRef idx="1">
-            <a:schemeClr val="accent1"/>
-          </a:lnRef>
-          <a:fillRef idx="2">
-            <a:schemeClr val="accent1"/>
-          </a:fillRef>
-          <a:effectRef idx="1">
-            <a:schemeClr val="accent1"/>
-          </a:effectRef>
-          <a:fontRef idx="minor">
-            <a:schemeClr val="dk1"/>
-          </a:fontRef>
-        </p:style>
-        <p:txBody>
-          <a:bodyPr rtlCol="0" anchor="t"/>
-          <a:lstStyle/>
-          <a:p>
-            <a:pPr algn="ctr"/>
-            <a:r>
-              <a:rPr lang="en-US" dirty="0"/>
-              <a:t>Model</a:t>
-            </a:r>
-          </a:p>
-        </p:txBody>
-      </p:sp>
-      <p:sp>
-        <p:nvSpPr>
-          <p:cNvPr id="9" name="Prostokąt: zaokrąglone rogi 8">
-            <a:extLst>
-              <a:ext uri="{FF2B5EF4-FFF2-40B4-BE49-F238E27FC236}">
-                <a16:creationId xmlns:a16="http://schemas.microsoft.com/office/drawing/2014/main" id="{855B2F68-687D-EDD6-4E78-2D44B5FF46A4}"/>
-              </a:ext>
-            </a:extLst>
-          </p:cNvPr>
-          <p:cNvSpPr/>
-          <p:nvPr/>
-        </p:nvSpPr>
-        <p:spPr>
-          <a:xfrm>
-            <a:off x="1539549" y="4826163"/>
-            <a:ext cx="1996752" cy="454091"/>
-          </a:xfrm>
-          <a:prstGeom prst="roundRect">
-            <a:avLst/>
-          </a:prstGeom>
-        </p:spPr>
-        <p:style>
-          <a:lnRef idx="1">
-            <a:schemeClr val="accent1"/>
-          </a:lnRef>
-          <a:fillRef idx="2">
-            <a:schemeClr val="accent1"/>
-          </a:fillRef>
-          <a:effectRef idx="1">
-            <a:schemeClr val="accent1"/>
-          </a:effectRef>
-          <a:fontRef idx="minor">
-            <a:schemeClr val="dk1"/>
-          </a:fontRef>
-        </p:style>
-        <p:txBody>
-          <a:bodyPr rtlCol="0" anchor="t"/>
-          <a:lstStyle/>
-          <a:p>
-            <a:pPr algn="ctr"/>
-            <a:r>
-              <a:rPr lang="en-US" dirty="0"/>
-              <a:t>Skeleton</a:t>
-            </a:r>
-          </a:p>
-        </p:txBody>
-      </p:sp>
-      <p:sp>
-        <p:nvSpPr>
-          <p:cNvPr id="10" name="Prostokąt: zaokrąglone rogi 9">
-            <a:extLst>
-              <a:ext uri="{FF2B5EF4-FFF2-40B4-BE49-F238E27FC236}">
-                <a16:creationId xmlns:a16="http://schemas.microsoft.com/office/drawing/2014/main" id="{CF0201FE-182B-A715-5EFB-89E3DB288C39}"/>
-              </a:ext>
-            </a:extLst>
-          </p:cNvPr>
-          <p:cNvSpPr/>
-          <p:nvPr/>
-        </p:nvSpPr>
-        <p:spPr>
-          <a:xfrm>
-            <a:off x="1539549" y="1281419"/>
-            <a:ext cx="1996752" cy="454090"/>
-          </a:xfrm>
-          <a:prstGeom prst="roundRect">
-            <a:avLst/>
-          </a:prstGeom>
-        </p:spPr>
-        <p:style>
-          <a:lnRef idx="1">
-            <a:schemeClr val="accent1"/>
-          </a:lnRef>
-          <a:fillRef idx="2">
-            <a:schemeClr val="accent1"/>
-          </a:fillRef>
-          <a:effectRef idx="1">
-            <a:schemeClr val="accent1"/>
-          </a:effectRef>
-          <a:fontRef idx="minor">
-            <a:schemeClr val="dk1"/>
-          </a:fontRef>
-        </p:style>
-        <p:txBody>
-          <a:bodyPr rtlCol="0" anchor="ctr"/>
-          <a:lstStyle/>
-          <a:p>
-            <a:pPr algn="ctr"/>
-            <a:r>
-              <a:rPr lang="en-US" dirty="0" err="1"/>
-              <a:t>ShadingModel</a:t>
-            </a:r>
-            <a:endParaRPr lang="en-US" dirty="0"/>
-          </a:p>
-        </p:txBody>
-      </p:sp>
-      <p:sp>
-        <p:nvSpPr>
-          <p:cNvPr id="20" name="Prostokąt: zaokrąglone rogi 19">
-            <a:extLst>
-              <a:ext uri="{FF2B5EF4-FFF2-40B4-BE49-F238E27FC236}">
-                <a16:creationId xmlns:a16="http://schemas.microsoft.com/office/drawing/2014/main" id="{E974B9BC-FF5E-6BA1-5D41-9FA952D76AE8}"/>
-              </a:ext>
-            </a:extLst>
-          </p:cNvPr>
-          <p:cNvSpPr/>
-          <p:nvPr/>
-        </p:nvSpPr>
-        <p:spPr>
-          <a:xfrm>
-            <a:off x="1539549" y="5535108"/>
-            <a:ext cx="1996752" cy="454091"/>
-          </a:xfrm>
-          <a:prstGeom prst="roundRect">
-            <a:avLst/>
-          </a:prstGeom>
-        </p:spPr>
-        <p:style>
-          <a:lnRef idx="1">
-            <a:schemeClr val="accent1"/>
-          </a:lnRef>
-          <a:fillRef idx="2">
-            <a:schemeClr val="accent1"/>
-          </a:fillRef>
-          <a:effectRef idx="1">
-            <a:schemeClr val="accent1"/>
-          </a:effectRef>
-          <a:fontRef idx="minor">
-            <a:schemeClr val="dk1"/>
-          </a:fontRef>
-        </p:style>
-        <p:txBody>
-          <a:bodyPr rtlCol="0" anchor="t"/>
-          <a:lstStyle/>
-          <a:p>
-            <a:pPr algn="ctr"/>
-            <a:r>
-              <a:rPr lang="en-US" dirty="0" err="1"/>
-              <a:t>SkinnedModel</a:t>
-            </a:r>
-            <a:endParaRPr lang="en-US" dirty="0"/>
-          </a:p>
-        </p:txBody>
-      </p:sp>
-      <p:sp>
-        <p:nvSpPr>
-          <p:cNvPr id="32" name="Prostokąt: zaokrąglone rogi 31">
-            <a:extLst>
-              <a:ext uri="{FF2B5EF4-FFF2-40B4-BE49-F238E27FC236}">
-                <a16:creationId xmlns:a16="http://schemas.microsoft.com/office/drawing/2014/main" id="{EDDA5CDE-6FD3-ACBF-8E5B-F0BE562B71B9}"/>
-              </a:ext>
-            </a:extLst>
-          </p:cNvPr>
-          <p:cNvSpPr/>
-          <p:nvPr/>
-        </p:nvSpPr>
-        <p:spPr>
-          <a:xfrm>
-            <a:off x="8204716" y="5543384"/>
-            <a:ext cx="1996752" cy="454090"/>
-          </a:xfrm>
-          <a:prstGeom prst="roundRect">
-            <a:avLst/>
-          </a:prstGeom>
-        </p:spPr>
-        <p:style>
-          <a:lnRef idx="1">
-            <a:schemeClr val="accent4"/>
-          </a:lnRef>
-          <a:fillRef idx="2">
-            <a:schemeClr val="accent4"/>
-          </a:fillRef>
-          <a:effectRef idx="1">
-            <a:schemeClr val="accent4"/>
-          </a:effectRef>
-          <a:fontRef idx="minor">
-            <a:schemeClr val="dk1"/>
-          </a:fontRef>
-        </p:style>
-        <p:txBody>
-          <a:bodyPr rtlCol="0" anchor="ctr"/>
-          <a:lstStyle/>
-          <a:p>
-            <a:pPr algn="ctr"/>
-            <a:r>
-              <a:rPr lang="en-US" sz="1400" dirty="0"/>
-              <a:t>Skinning</a:t>
-            </a:r>
-          </a:p>
-        </p:txBody>
-      </p:sp>
-    </p:spTree>
-    <p:extLst>
-      <p:ext uri="{BB962C8B-B14F-4D97-AF65-F5344CB8AC3E}">
-        <p14:creationId xmlns:p14="http://schemas.microsoft.com/office/powerpoint/2010/main" val="3986972889"/>
       </p:ext>
     </p:extLst>
   </p:cSld>

</xml_diff>

<commit_message>
Separation of AssetAccessors (Observer and User) into a dedicated file; some cleanup of engine code using assets
</commit_message>
<xml_diff>
--- a/Documentation/Asset Pipeline.pptx
+++ b/Documentation/Asset Pipeline.pptx
@@ -5,16 +5,17 @@
     <p:sldMasterId id="2147483648" r:id="rId1"/>
   </p:sldMasterIdLst>
   <p:notesMasterIdLst>
-    <p:notesMasterId r:id="rId9"/>
+    <p:notesMasterId r:id="rId10"/>
   </p:notesMasterIdLst>
   <p:sldIdLst>
     <p:sldId id="256" r:id="rId2"/>
     <p:sldId id="261" r:id="rId3"/>
     <p:sldId id="263" r:id="rId4"/>
-    <p:sldId id="265" r:id="rId5"/>
-    <p:sldId id="260" r:id="rId6"/>
-    <p:sldId id="264" r:id="rId7"/>
-    <p:sldId id="262" r:id="rId8"/>
+    <p:sldId id="266" r:id="rId5"/>
+    <p:sldId id="265" r:id="rId6"/>
+    <p:sldId id="260" r:id="rId7"/>
+    <p:sldId id="264" r:id="rId8"/>
+    <p:sldId id="262" r:id="rId9"/>
   </p:sldIdLst>
   <p:sldSz cx="12192000" cy="6858000"/>
   <p:notesSz cx="6858000" cy="9144000"/>
@@ -215,7 +216,7 @@
           <a:p>
             <a:fld id="{D0E2DD2C-27F7-4F93-96E8-CD28AD9267D9}" type="datetimeFigureOut">
               <a:rPr lang="en-US" smtClean="0"/>
-              <a:t>5/22/2025</a:t>
+              <a:t>5/26/2025</a:t>
             </a:fld>
             <a:endParaRPr lang="en-US"/>
           </a:p>
@@ -656,7 +657,7 @@
           <a:p>
             <a:fld id="{583D7F03-7197-42E4-9778-D52D335F305D}" type="slidenum">
               <a:rPr lang="en-US" smtClean="0"/>
-              <a:t>4</a:t>
+              <a:t>5</a:t>
             </a:fld>
             <a:endParaRPr lang="en-US"/>
           </a:p>
@@ -822,7 +823,7 @@
           <a:p>
             <a:fld id="{783DC7D5-4D76-4679-A391-31CBAFA90932}" type="datetimeFigureOut">
               <a:rPr lang="en-US" smtClean="0"/>
-              <a:t>5/22/2025</a:t>
+              <a:t>5/26/2025</a:t>
             </a:fld>
             <a:endParaRPr lang="en-US"/>
           </a:p>
@@ -1020,7 +1021,7 @@
           <a:p>
             <a:fld id="{783DC7D5-4D76-4679-A391-31CBAFA90932}" type="datetimeFigureOut">
               <a:rPr lang="en-US" smtClean="0"/>
-              <a:t>5/22/2025</a:t>
+              <a:t>5/26/2025</a:t>
             </a:fld>
             <a:endParaRPr lang="en-US"/>
           </a:p>
@@ -1228,7 +1229,7 @@
           <a:p>
             <a:fld id="{783DC7D5-4D76-4679-A391-31CBAFA90932}" type="datetimeFigureOut">
               <a:rPr lang="en-US" smtClean="0"/>
-              <a:t>5/22/2025</a:t>
+              <a:t>5/26/2025</a:t>
             </a:fld>
             <a:endParaRPr lang="en-US"/>
           </a:p>
@@ -1426,7 +1427,7 @@
           <a:p>
             <a:fld id="{783DC7D5-4D76-4679-A391-31CBAFA90932}" type="datetimeFigureOut">
               <a:rPr lang="en-US" smtClean="0"/>
-              <a:t>5/22/2025</a:t>
+              <a:t>5/26/2025</a:t>
             </a:fld>
             <a:endParaRPr lang="en-US"/>
           </a:p>
@@ -1701,7 +1702,7 @@
           <a:p>
             <a:fld id="{783DC7D5-4D76-4679-A391-31CBAFA90932}" type="datetimeFigureOut">
               <a:rPr lang="en-US" smtClean="0"/>
-              <a:t>5/22/2025</a:t>
+              <a:t>5/26/2025</a:t>
             </a:fld>
             <a:endParaRPr lang="en-US"/>
           </a:p>
@@ -1966,7 +1967,7 @@
           <a:p>
             <a:fld id="{783DC7D5-4D76-4679-A391-31CBAFA90932}" type="datetimeFigureOut">
               <a:rPr lang="en-US" smtClean="0"/>
-              <a:t>5/22/2025</a:t>
+              <a:t>5/26/2025</a:t>
             </a:fld>
             <a:endParaRPr lang="en-US"/>
           </a:p>
@@ -2378,7 +2379,7 @@
           <a:p>
             <a:fld id="{783DC7D5-4D76-4679-A391-31CBAFA90932}" type="datetimeFigureOut">
               <a:rPr lang="en-US" smtClean="0"/>
-              <a:t>5/22/2025</a:t>
+              <a:t>5/26/2025</a:t>
             </a:fld>
             <a:endParaRPr lang="en-US"/>
           </a:p>
@@ -2519,7 +2520,7 @@
           <a:p>
             <a:fld id="{783DC7D5-4D76-4679-A391-31CBAFA90932}" type="datetimeFigureOut">
               <a:rPr lang="en-US" smtClean="0"/>
-              <a:t>5/22/2025</a:t>
+              <a:t>5/26/2025</a:t>
             </a:fld>
             <a:endParaRPr lang="en-US"/>
           </a:p>
@@ -2632,7 +2633,7 @@
           <a:p>
             <a:fld id="{783DC7D5-4D76-4679-A391-31CBAFA90932}" type="datetimeFigureOut">
               <a:rPr lang="en-US" smtClean="0"/>
-              <a:t>5/22/2025</a:t>
+              <a:t>5/26/2025</a:t>
             </a:fld>
             <a:endParaRPr lang="en-US"/>
           </a:p>
@@ -2943,7 +2944,7 @@
           <a:p>
             <a:fld id="{783DC7D5-4D76-4679-A391-31CBAFA90932}" type="datetimeFigureOut">
               <a:rPr lang="en-US" smtClean="0"/>
-              <a:t>5/22/2025</a:t>
+              <a:t>5/26/2025</a:t>
             </a:fld>
             <a:endParaRPr lang="en-US"/>
           </a:p>
@@ -3231,7 +3232,7 @@
           <a:p>
             <a:fld id="{783DC7D5-4D76-4679-A391-31CBAFA90932}" type="datetimeFigureOut">
               <a:rPr lang="en-US" smtClean="0"/>
-              <a:t>5/22/2025</a:t>
+              <a:t>5/26/2025</a:t>
             </a:fld>
             <a:endParaRPr lang="en-US"/>
           </a:p>
@@ -3472,7 +3473,7 @@
           <a:p>
             <a:fld id="{783DC7D5-4D76-4679-A391-31CBAFA90932}" type="datetimeFigureOut">
               <a:rPr lang="en-US" smtClean="0"/>
-              <a:t>5/22/2025</a:t>
+              <a:t>5/26/2025</a:t>
             </a:fld>
             <a:endParaRPr lang="en-US"/>
           </a:p>
@@ -4054,7 +4055,7 @@
         </p:nvSpPr>
         <p:spPr>
           <a:xfrm>
-            <a:off x="7609411" y="3428682"/>
+            <a:off x="7733819" y="1655866"/>
             <a:ext cx="3813106" cy="2498052"/>
           </a:xfrm>
           <a:prstGeom prst="roundRect">
@@ -4157,7 +4158,7 @@
         </p:nvSpPr>
         <p:spPr>
           <a:xfrm>
-            <a:off x="8725969" y="3266249"/>
+            <a:off x="8850377" y="1493433"/>
             <a:ext cx="1698172" cy="291173"/>
           </a:xfrm>
           <a:prstGeom prst="roundRect">
@@ -4205,7 +4206,7 @@
         </p:nvSpPr>
         <p:spPr>
           <a:xfrm>
-            <a:off x="8174618" y="4184814"/>
+            <a:off x="8299026" y="2411998"/>
             <a:ext cx="2712098" cy="1380037"/>
           </a:xfrm>
           <a:prstGeom prst="roundRect">
@@ -4252,13 +4253,13 @@
           <p:nvPr>
             <p:extLst>
               <p:ext uri="{D42A27DB-BD31-4B8C-83A1-F6EECF244321}">
-                <p14:modId xmlns:p14="http://schemas.microsoft.com/office/powerpoint/2010/main" val="2668751953"/>
+                <p14:modId xmlns:p14="http://schemas.microsoft.com/office/powerpoint/2010/main" val="346019378"/>
               </p:ext>
             </p:extLst>
           </p:nvPr>
         </p:nvGraphicFramePr>
         <p:xfrm>
-          <a:off x="8335832" y="4430837"/>
+          <a:off x="8460240" y="2658021"/>
           <a:ext cx="2389670" cy="182292"/>
         </p:xfrm>
         <a:graphic>
@@ -4915,13 +4916,13 @@
           <p:nvPr>
             <p:extLst>
               <p:ext uri="{D42A27DB-BD31-4B8C-83A1-F6EECF244321}">
-                <p14:modId xmlns:p14="http://schemas.microsoft.com/office/powerpoint/2010/main" val="863077694"/>
+                <p14:modId xmlns:p14="http://schemas.microsoft.com/office/powerpoint/2010/main" val="3306356362"/>
               </p:ext>
             </p:extLst>
           </p:nvPr>
         </p:nvGraphicFramePr>
         <p:xfrm>
-          <a:off x="8335831" y="4684159"/>
+          <a:off x="8460239" y="2911343"/>
           <a:ext cx="1596054" cy="182292"/>
         </p:xfrm>
         <a:graphic>
@@ -5282,13 +5283,13 @@
           <p:nvPr>
             <p:extLst>
               <p:ext uri="{D42A27DB-BD31-4B8C-83A1-F6EECF244321}">
-                <p14:modId xmlns:p14="http://schemas.microsoft.com/office/powerpoint/2010/main" val="286022438"/>
+                <p14:modId xmlns:p14="http://schemas.microsoft.com/office/powerpoint/2010/main" val="376290221"/>
               </p:ext>
             </p:extLst>
           </p:nvPr>
         </p:nvGraphicFramePr>
         <p:xfrm>
-          <a:off x="8335830" y="4937481"/>
+          <a:off x="8460238" y="3164665"/>
           <a:ext cx="1782664" cy="182292"/>
         </p:xfrm>
         <a:graphic>
@@ -5541,13 +5542,13 @@
           <p:nvPr>
             <p:extLst>
               <p:ext uri="{D42A27DB-BD31-4B8C-83A1-F6EECF244321}">
-                <p14:modId xmlns:p14="http://schemas.microsoft.com/office/powerpoint/2010/main" val="3682411830"/>
+                <p14:modId xmlns:p14="http://schemas.microsoft.com/office/powerpoint/2010/main" val="1442030790"/>
               </p:ext>
             </p:extLst>
           </p:nvPr>
         </p:nvGraphicFramePr>
         <p:xfrm>
-          <a:off x="8335829" y="5190803"/>
+          <a:off x="8460237" y="3417987"/>
           <a:ext cx="1666240" cy="182292"/>
         </p:xfrm>
         <a:graphic>
@@ -6015,7 +6016,7 @@
         </p:nvSpPr>
         <p:spPr>
           <a:xfrm>
-            <a:off x="9255414" y="4030955"/>
+            <a:off x="9379822" y="2258139"/>
             <a:ext cx="550506" cy="291173"/>
           </a:xfrm>
           <a:prstGeom prst="roundRect">
@@ -6062,7 +6063,7 @@
         </p:nvSpPr>
         <p:spPr>
           <a:xfrm>
-            <a:off x="1335260" y="1436114"/>
+            <a:off x="566673" y="1311706"/>
             <a:ext cx="6686158" cy="4770537"/>
           </a:xfrm>
           <a:prstGeom prst="rect">
@@ -6377,8 +6378,12 @@
           <a:p>
             <a:pPr algn="ctr"/>
             <a:r>
+              <a:rPr lang="pl-PL" dirty="0"/>
+              <a:t>Rendering</a:t>
+            </a:r>
+            <a:r>
               <a:rPr lang="en-US" dirty="0"/>
-              <a:t>Geometry Assets</a:t>
+              <a:t> Assets</a:t>
             </a:r>
           </a:p>
         </p:txBody>
@@ -7614,6 +7619,1076 @@
 </file>
 
 <file path=ppt/slides/slide4.xml><?xml version="1.0" encoding="utf-8"?>
+<p:sld xmlns:a="http://schemas.openxmlformats.org/drawingml/2006/main" xmlns:r="http://schemas.openxmlformats.org/officeDocument/2006/relationships" xmlns:p="http://schemas.openxmlformats.org/presentationml/2006/main">
+  <p:cSld>
+    <p:spTree>
+      <p:nvGrpSpPr>
+        <p:cNvPr id="1" name="">
+          <a:extLst>
+            <a:ext uri="{FF2B5EF4-FFF2-40B4-BE49-F238E27FC236}">
+              <a16:creationId xmlns:a16="http://schemas.microsoft.com/office/drawing/2014/main" id="{BA447782-54D3-57FB-1D99-139F4A5AA9C8}"/>
+            </a:ext>
+          </a:extLst>
+        </p:cNvPr>
+        <p:cNvGrpSpPr/>
+        <p:nvPr/>
+      </p:nvGrpSpPr>
+      <p:grpSpPr>
+        <a:xfrm>
+          <a:off x="0" y="0"/>
+          <a:ext cx="0" cy="0"/>
+          <a:chOff x="0" y="0"/>
+          <a:chExt cx="0" cy="0"/>
+        </a:xfrm>
+      </p:grpSpPr>
+      <p:sp>
+        <p:nvSpPr>
+          <p:cNvPr id="16" name="Prostokąt: zaokrąglone rogi 15">
+            <a:extLst>
+              <a:ext uri="{FF2B5EF4-FFF2-40B4-BE49-F238E27FC236}">
+                <a16:creationId xmlns:a16="http://schemas.microsoft.com/office/drawing/2014/main" id="{DA2A30C4-CF41-4D3E-F602-3710EFD83B79}"/>
+              </a:ext>
+            </a:extLst>
+          </p:cNvPr>
+          <p:cNvSpPr/>
+          <p:nvPr/>
+        </p:nvSpPr>
+        <p:spPr>
+          <a:xfrm>
+            <a:off x="3103985" y="1683289"/>
+            <a:ext cx="7352524" cy="582346"/>
+          </a:xfrm>
+          <a:prstGeom prst="roundRect">
+            <a:avLst/>
+          </a:prstGeom>
+        </p:spPr>
+        <p:style>
+          <a:lnRef idx="1">
+            <a:schemeClr val="accent3"/>
+          </a:lnRef>
+          <a:fillRef idx="2">
+            <a:schemeClr val="accent3"/>
+          </a:fillRef>
+          <a:effectRef idx="1">
+            <a:schemeClr val="accent3"/>
+          </a:effectRef>
+          <a:fontRef idx="minor">
+            <a:schemeClr val="dk1"/>
+          </a:fontRef>
+        </p:style>
+        <p:txBody>
+          <a:bodyPr rtlCol="0" anchor="ctr"/>
+          <a:lstStyle/>
+          <a:p>
+            <a:pPr algn="ctr"/>
+            <a:endParaRPr lang="en-US" sz="2000" b="1" dirty="0"/>
+          </a:p>
+        </p:txBody>
+      </p:sp>
+      <p:sp>
+        <p:nvSpPr>
+          <p:cNvPr id="2" name="Rectangle: Rounded Corners 3">
+            <a:extLst>
+              <a:ext uri="{FF2B5EF4-FFF2-40B4-BE49-F238E27FC236}">
+                <a16:creationId xmlns:a16="http://schemas.microsoft.com/office/drawing/2014/main" id="{E445C594-D8AF-42C0-2BA6-654145F23E96}"/>
+              </a:ext>
+            </a:extLst>
+          </p:cNvPr>
+          <p:cNvSpPr/>
+          <p:nvPr/>
+        </p:nvSpPr>
+        <p:spPr>
+          <a:xfrm>
+            <a:off x="4057794" y="378414"/>
+            <a:ext cx="3566358" cy="582346"/>
+          </a:xfrm>
+          <a:prstGeom prst="roundRect">
+            <a:avLst/>
+          </a:prstGeom>
+        </p:spPr>
+        <p:style>
+          <a:lnRef idx="0">
+            <a:schemeClr val="accent1"/>
+          </a:lnRef>
+          <a:fillRef idx="3">
+            <a:schemeClr val="accent1"/>
+          </a:fillRef>
+          <a:effectRef idx="3">
+            <a:schemeClr val="accent1"/>
+          </a:effectRef>
+          <a:fontRef idx="minor">
+            <a:schemeClr val="lt1"/>
+          </a:fontRef>
+        </p:style>
+        <p:txBody>
+          <a:bodyPr rtlCol="0" anchor="ctr"/>
+          <a:lstStyle/>
+          <a:p>
+            <a:pPr algn="ctr"/>
+            <a:r>
+              <a:rPr lang="en-US" dirty="0"/>
+              <a:t>Scene Components for Mesh Assets</a:t>
+            </a:r>
+          </a:p>
+        </p:txBody>
+      </p:sp>
+      <p:sp>
+        <p:nvSpPr>
+          <p:cNvPr id="6" name="Prostokąt: zaokrąglone rogi 5">
+            <a:extLst>
+              <a:ext uri="{FF2B5EF4-FFF2-40B4-BE49-F238E27FC236}">
+                <a16:creationId xmlns:a16="http://schemas.microsoft.com/office/drawing/2014/main" id="{D4C783E7-E69F-0434-EC11-920C44E11072}"/>
+              </a:ext>
+            </a:extLst>
+          </p:cNvPr>
+          <p:cNvSpPr/>
+          <p:nvPr/>
+        </p:nvSpPr>
+        <p:spPr>
+          <a:xfrm>
+            <a:off x="4565780" y="1743164"/>
+            <a:ext cx="2093167" cy="454090"/>
+          </a:xfrm>
+          <a:prstGeom prst="roundRect">
+            <a:avLst/>
+          </a:prstGeom>
+        </p:spPr>
+        <p:style>
+          <a:lnRef idx="1">
+            <a:schemeClr val="accent1"/>
+          </a:lnRef>
+          <a:fillRef idx="2">
+            <a:schemeClr val="accent1"/>
+          </a:fillRef>
+          <a:effectRef idx="1">
+            <a:schemeClr val="accent1"/>
+          </a:effectRef>
+          <a:fontRef idx="minor">
+            <a:schemeClr val="dk1"/>
+          </a:fontRef>
+        </p:style>
+        <p:txBody>
+          <a:bodyPr rtlCol="0" anchor="ctr"/>
+          <a:lstStyle/>
+          <a:p>
+            <a:pPr algn="ctr"/>
+            <a:r>
+              <a:rPr lang="en-US" dirty="0"/>
+              <a:t>Mesh</a:t>
+            </a:r>
+          </a:p>
+        </p:txBody>
+      </p:sp>
+      <p:sp>
+        <p:nvSpPr>
+          <p:cNvPr id="7" name="Prostokąt: zaokrąglone rogi 6">
+            <a:extLst>
+              <a:ext uri="{FF2B5EF4-FFF2-40B4-BE49-F238E27FC236}">
+                <a16:creationId xmlns:a16="http://schemas.microsoft.com/office/drawing/2014/main" id="{CF2E88DC-EDD2-97C8-278D-6485FDBD6847}"/>
+              </a:ext>
+            </a:extLst>
+          </p:cNvPr>
+          <p:cNvSpPr/>
+          <p:nvPr/>
+        </p:nvSpPr>
+        <p:spPr>
+          <a:xfrm>
+            <a:off x="6780247" y="1743164"/>
+            <a:ext cx="2093167" cy="454090"/>
+          </a:xfrm>
+          <a:prstGeom prst="roundRect">
+            <a:avLst/>
+          </a:prstGeom>
+        </p:spPr>
+        <p:style>
+          <a:lnRef idx="1">
+            <a:schemeClr val="accent1"/>
+          </a:lnRef>
+          <a:fillRef idx="2">
+            <a:schemeClr val="accent1"/>
+          </a:fillRef>
+          <a:effectRef idx="1">
+            <a:schemeClr val="accent1"/>
+          </a:effectRef>
+          <a:fontRef idx="minor">
+            <a:schemeClr val="dk1"/>
+          </a:fontRef>
+        </p:style>
+        <p:txBody>
+          <a:bodyPr rtlCol="0" anchor="ctr"/>
+          <a:lstStyle/>
+          <a:p>
+            <a:pPr algn="ctr"/>
+            <a:r>
+              <a:rPr lang="en-US" dirty="0"/>
+              <a:t>Material</a:t>
+            </a:r>
+          </a:p>
+        </p:txBody>
+      </p:sp>
+      <p:sp>
+        <p:nvSpPr>
+          <p:cNvPr id="17" name="Prostokąt: zaokrąglone rogi 16">
+            <a:extLst>
+              <a:ext uri="{FF2B5EF4-FFF2-40B4-BE49-F238E27FC236}">
+                <a16:creationId xmlns:a16="http://schemas.microsoft.com/office/drawing/2014/main" id="{0E39B9AC-1098-46B1-00F5-47BB77B00CC4}"/>
+              </a:ext>
+            </a:extLst>
+          </p:cNvPr>
+          <p:cNvSpPr/>
+          <p:nvPr/>
+        </p:nvSpPr>
+        <p:spPr>
+          <a:xfrm>
+            <a:off x="3103985" y="3067860"/>
+            <a:ext cx="7352524" cy="582346"/>
+          </a:xfrm>
+          <a:prstGeom prst="roundRect">
+            <a:avLst/>
+          </a:prstGeom>
+        </p:spPr>
+        <p:style>
+          <a:lnRef idx="1">
+            <a:schemeClr val="accent3"/>
+          </a:lnRef>
+          <a:fillRef idx="2">
+            <a:schemeClr val="accent3"/>
+          </a:fillRef>
+          <a:effectRef idx="1">
+            <a:schemeClr val="accent3"/>
+          </a:effectRef>
+          <a:fontRef idx="minor">
+            <a:schemeClr val="dk1"/>
+          </a:fontRef>
+        </p:style>
+        <p:txBody>
+          <a:bodyPr rtlCol="0" anchor="ctr"/>
+          <a:lstStyle/>
+          <a:p>
+            <a:pPr algn="ctr"/>
+            <a:endParaRPr lang="en-US" sz="2000" b="1" dirty="0"/>
+          </a:p>
+        </p:txBody>
+      </p:sp>
+      <p:sp>
+        <p:nvSpPr>
+          <p:cNvPr id="19" name="Prostokąt: zaokrąglone rogi 18">
+            <a:extLst>
+              <a:ext uri="{FF2B5EF4-FFF2-40B4-BE49-F238E27FC236}">
+                <a16:creationId xmlns:a16="http://schemas.microsoft.com/office/drawing/2014/main" id="{699319EE-F153-1A51-A4E4-62DF1ACE8A03}"/>
+              </a:ext>
+            </a:extLst>
+          </p:cNvPr>
+          <p:cNvSpPr/>
+          <p:nvPr/>
+        </p:nvSpPr>
+        <p:spPr>
+          <a:xfrm>
+            <a:off x="5744551" y="3131985"/>
+            <a:ext cx="2093167" cy="454091"/>
+          </a:xfrm>
+          <a:prstGeom prst="roundRect">
+            <a:avLst/>
+          </a:prstGeom>
+        </p:spPr>
+        <p:style>
+          <a:lnRef idx="1">
+            <a:schemeClr val="accent1"/>
+          </a:lnRef>
+          <a:fillRef idx="2">
+            <a:schemeClr val="accent1"/>
+          </a:fillRef>
+          <a:effectRef idx="1">
+            <a:schemeClr val="accent1"/>
+          </a:effectRef>
+          <a:fontRef idx="minor">
+            <a:schemeClr val="dk1"/>
+          </a:fontRef>
+        </p:style>
+        <p:txBody>
+          <a:bodyPr rtlCol="0" anchor="ctr"/>
+          <a:lstStyle/>
+          <a:p>
+            <a:pPr algn="ctr"/>
+            <a:r>
+              <a:rPr lang="en-US" dirty="0"/>
+              <a:t>N × </a:t>
+            </a:r>
+            <a:r>
+              <a:rPr lang="en-US" dirty="0" err="1"/>
+              <a:t>RenderMesh</a:t>
+            </a:r>
+            <a:endParaRPr lang="en-US" dirty="0"/>
+          </a:p>
+        </p:txBody>
+      </p:sp>
+      <p:sp>
+        <p:nvSpPr>
+          <p:cNvPr id="21" name="Prostokąt: zaokrąglone rogi 20">
+            <a:extLst>
+              <a:ext uri="{FF2B5EF4-FFF2-40B4-BE49-F238E27FC236}">
+                <a16:creationId xmlns:a16="http://schemas.microsoft.com/office/drawing/2014/main" id="{E246BF17-4262-5110-6013-6EE613866E12}"/>
+              </a:ext>
+            </a:extLst>
+          </p:cNvPr>
+          <p:cNvSpPr/>
+          <p:nvPr/>
+        </p:nvSpPr>
+        <p:spPr>
+          <a:xfrm>
+            <a:off x="3103985" y="4491723"/>
+            <a:ext cx="7352524" cy="582346"/>
+          </a:xfrm>
+          <a:prstGeom prst="roundRect">
+            <a:avLst/>
+          </a:prstGeom>
+        </p:spPr>
+        <p:style>
+          <a:lnRef idx="1">
+            <a:schemeClr val="accent3"/>
+          </a:lnRef>
+          <a:fillRef idx="2">
+            <a:schemeClr val="accent3"/>
+          </a:fillRef>
+          <a:effectRef idx="1">
+            <a:schemeClr val="accent3"/>
+          </a:effectRef>
+          <a:fontRef idx="minor">
+            <a:schemeClr val="dk1"/>
+          </a:fontRef>
+        </p:style>
+        <p:txBody>
+          <a:bodyPr rtlCol="0" anchor="ctr"/>
+          <a:lstStyle/>
+          <a:p>
+            <a:pPr algn="ctr"/>
+            <a:endParaRPr lang="en-US" sz="1800" b="1" dirty="0"/>
+          </a:p>
+        </p:txBody>
+      </p:sp>
+      <p:sp>
+        <p:nvSpPr>
+          <p:cNvPr id="22" name="Prostokąt: zaokrąglone rogi 21">
+            <a:extLst>
+              <a:ext uri="{FF2B5EF4-FFF2-40B4-BE49-F238E27FC236}">
+                <a16:creationId xmlns:a16="http://schemas.microsoft.com/office/drawing/2014/main" id="{E9CCF0AF-7823-9C04-F3CF-2ABA38AA5E41}"/>
+              </a:ext>
+            </a:extLst>
+          </p:cNvPr>
+          <p:cNvSpPr/>
+          <p:nvPr/>
+        </p:nvSpPr>
+        <p:spPr>
+          <a:xfrm>
+            <a:off x="3592289" y="4555847"/>
+            <a:ext cx="2093167" cy="454091"/>
+          </a:xfrm>
+          <a:prstGeom prst="roundRect">
+            <a:avLst/>
+          </a:prstGeom>
+        </p:spPr>
+        <p:style>
+          <a:lnRef idx="1">
+            <a:schemeClr val="accent1"/>
+          </a:lnRef>
+          <a:fillRef idx="2">
+            <a:schemeClr val="accent1"/>
+          </a:fillRef>
+          <a:effectRef idx="1">
+            <a:schemeClr val="accent1"/>
+          </a:effectRef>
+          <a:fontRef idx="minor">
+            <a:schemeClr val="dk1"/>
+          </a:fontRef>
+        </p:style>
+        <p:txBody>
+          <a:bodyPr rtlCol="0" anchor="ctr"/>
+          <a:lstStyle/>
+          <a:p>
+            <a:pPr algn="ctr"/>
+            <a:r>
+              <a:rPr lang="en-US" dirty="0"/>
+              <a:t>Skeleton</a:t>
+            </a:r>
+          </a:p>
+        </p:txBody>
+      </p:sp>
+      <p:sp>
+        <p:nvSpPr>
+          <p:cNvPr id="5" name="Prostokąt: zaokrąglone rogi 4">
+            <a:extLst>
+              <a:ext uri="{FF2B5EF4-FFF2-40B4-BE49-F238E27FC236}">
+                <a16:creationId xmlns:a16="http://schemas.microsoft.com/office/drawing/2014/main" id="{68307D43-49F3-2EB0-546E-75FE4F7D9BB3}"/>
+              </a:ext>
+            </a:extLst>
+          </p:cNvPr>
+          <p:cNvSpPr/>
+          <p:nvPr/>
+        </p:nvSpPr>
+        <p:spPr>
+          <a:xfrm>
+            <a:off x="1101012" y="1747414"/>
+            <a:ext cx="2093167" cy="454091"/>
+          </a:xfrm>
+          <a:prstGeom prst="roundRect">
+            <a:avLst/>
+          </a:prstGeom>
+        </p:spPr>
+        <p:style>
+          <a:lnRef idx="1">
+            <a:schemeClr val="accent1"/>
+          </a:lnRef>
+          <a:fillRef idx="2">
+            <a:schemeClr val="accent1"/>
+          </a:fillRef>
+          <a:effectRef idx="1">
+            <a:schemeClr val="accent1"/>
+          </a:effectRef>
+          <a:fontRef idx="minor">
+            <a:schemeClr val="dk1"/>
+          </a:fontRef>
+        </p:style>
+        <p:txBody>
+          <a:bodyPr rtlCol="0" anchor="ctr"/>
+          <a:lstStyle/>
+          <a:p>
+            <a:pPr algn="ctr"/>
+            <a:r>
+              <a:rPr lang="en-US" dirty="0" err="1"/>
+              <a:t>CRenderMeshView</a:t>
+            </a:r>
+            <a:endParaRPr lang="en-US" dirty="0"/>
+          </a:p>
+        </p:txBody>
+      </p:sp>
+      <p:sp>
+        <p:nvSpPr>
+          <p:cNvPr id="8" name="Prostokąt: zaokrąglone rogi 7">
+            <a:extLst>
+              <a:ext uri="{FF2B5EF4-FFF2-40B4-BE49-F238E27FC236}">
+                <a16:creationId xmlns:a16="http://schemas.microsoft.com/office/drawing/2014/main" id="{D569CC9D-681D-23AE-891A-970A5D9D6966}"/>
+              </a:ext>
+            </a:extLst>
+          </p:cNvPr>
+          <p:cNvSpPr/>
+          <p:nvPr/>
+        </p:nvSpPr>
+        <p:spPr>
+          <a:xfrm>
+            <a:off x="1101011" y="3131985"/>
+            <a:ext cx="2093167" cy="454091"/>
+          </a:xfrm>
+          <a:prstGeom prst="roundRect">
+            <a:avLst/>
+          </a:prstGeom>
+        </p:spPr>
+        <p:style>
+          <a:lnRef idx="1">
+            <a:schemeClr val="accent1"/>
+          </a:lnRef>
+          <a:fillRef idx="2">
+            <a:schemeClr val="accent1"/>
+          </a:fillRef>
+          <a:effectRef idx="1">
+            <a:schemeClr val="accent1"/>
+          </a:effectRef>
+          <a:fontRef idx="minor">
+            <a:schemeClr val="dk1"/>
+          </a:fontRef>
+        </p:style>
+        <p:txBody>
+          <a:bodyPr rtlCol="0" anchor="ctr"/>
+          <a:lstStyle/>
+          <a:p>
+            <a:pPr algn="ctr"/>
+            <a:r>
+              <a:rPr lang="en-US" dirty="0" err="1"/>
+              <a:t>CModelView</a:t>
+            </a:r>
+            <a:endParaRPr lang="en-US" dirty="0"/>
+          </a:p>
+        </p:txBody>
+      </p:sp>
+      <p:sp>
+        <p:nvSpPr>
+          <p:cNvPr id="20" name="Prostokąt: zaokrąglone rogi 19">
+            <a:extLst>
+              <a:ext uri="{FF2B5EF4-FFF2-40B4-BE49-F238E27FC236}">
+                <a16:creationId xmlns:a16="http://schemas.microsoft.com/office/drawing/2014/main" id="{71AC8BE7-E0D7-4253-6153-96211E059EEA}"/>
+              </a:ext>
+            </a:extLst>
+          </p:cNvPr>
+          <p:cNvSpPr/>
+          <p:nvPr/>
+        </p:nvSpPr>
+        <p:spPr>
+          <a:xfrm>
+            <a:off x="1101011" y="4555848"/>
+            <a:ext cx="2093167" cy="454091"/>
+          </a:xfrm>
+          <a:prstGeom prst="roundRect">
+            <a:avLst/>
+          </a:prstGeom>
+        </p:spPr>
+        <p:style>
+          <a:lnRef idx="1">
+            <a:schemeClr val="accent1"/>
+          </a:lnRef>
+          <a:fillRef idx="2">
+            <a:schemeClr val="accent1"/>
+          </a:fillRef>
+          <a:effectRef idx="1">
+            <a:schemeClr val="accent1"/>
+          </a:effectRef>
+          <a:fontRef idx="minor">
+            <a:schemeClr val="dk1"/>
+          </a:fontRef>
+        </p:style>
+        <p:txBody>
+          <a:bodyPr rtlCol="0" anchor="ctr"/>
+          <a:lstStyle/>
+          <a:p>
+            <a:pPr algn="ctr"/>
+            <a:r>
+              <a:rPr lang="en-US" sz="1700" dirty="0" err="1"/>
+              <a:t>CSkinnedModelView</a:t>
+            </a:r>
+            <a:endParaRPr lang="en-US" sz="1700" dirty="0"/>
+          </a:p>
+        </p:txBody>
+      </p:sp>
+      <p:sp>
+        <p:nvSpPr>
+          <p:cNvPr id="32" name="Prostokąt: zaokrąglone rogi 31">
+            <a:extLst>
+              <a:ext uri="{FF2B5EF4-FFF2-40B4-BE49-F238E27FC236}">
+                <a16:creationId xmlns:a16="http://schemas.microsoft.com/office/drawing/2014/main" id="{79D43BD2-A3BB-D4FB-B644-CE15C38EC816}"/>
+              </a:ext>
+            </a:extLst>
+          </p:cNvPr>
+          <p:cNvSpPr/>
+          <p:nvPr/>
+        </p:nvSpPr>
+        <p:spPr>
+          <a:xfrm>
+            <a:off x="7940345" y="4547572"/>
+            <a:ext cx="2093167" cy="454090"/>
+          </a:xfrm>
+          <a:prstGeom prst="roundRect">
+            <a:avLst/>
+          </a:prstGeom>
+        </p:spPr>
+        <p:style>
+          <a:lnRef idx="1">
+            <a:schemeClr val="accent4"/>
+          </a:lnRef>
+          <a:fillRef idx="2">
+            <a:schemeClr val="accent4"/>
+          </a:fillRef>
+          <a:effectRef idx="1">
+            <a:schemeClr val="accent4"/>
+          </a:effectRef>
+          <a:fontRef idx="minor">
+            <a:schemeClr val="dk1"/>
+          </a:fontRef>
+        </p:style>
+        <p:txBody>
+          <a:bodyPr rtlCol="0" anchor="ctr"/>
+          <a:lstStyle/>
+          <a:p>
+            <a:pPr algn="ctr"/>
+            <a:r>
+              <a:rPr lang="en-US" sz="1400" dirty="0"/>
+              <a:t>Skinning</a:t>
+            </a:r>
+          </a:p>
+        </p:txBody>
+      </p:sp>
+      <p:sp>
+        <p:nvSpPr>
+          <p:cNvPr id="11" name="Prostokąt: zaokrąglone rogi 10">
+            <a:extLst>
+              <a:ext uri="{FF2B5EF4-FFF2-40B4-BE49-F238E27FC236}">
+                <a16:creationId xmlns:a16="http://schemas.microsoft.com/office/drawing/2014/main" id="{045BE31E-36D1-0DC0-9414-F6951E8F44CF}"/>
+              </a:ext>
+            </a:extLst>
+          </p:cNvPr>
+          <p:cNvSpPr/>
+          <p:nvPr/>
+        </p:nvSpPr>
+        <p:spPr>
+          <a:xfrm>
+            <a:off x="3103985" y="2355921"/>
+            <a:ext cx="7352524" cy="582346"/>
+          </a:xfrm>
+          <a:prstGeom prst="roundRect">
+            <a:avLst/>
+          </a:prstGeom>
+        </p:spPr>
+        <p:style>
+          <a:lnRef idx="1">
+            <a:schemeClr val="accent3"/>
+          </a:lnRef>
+          <a:fillRef idx="2">
+            <a:schemeClr val="accent3"/>
+          </a:fillRef>
+          <a:effectRef idx="1">
+            <a:schemeClr val="accent3"/>
+          </a:effectRef>
+          <a:fontRef idx="minor">
+            <a:schemeClr val="dk1"/>
+          </a:fontRef>
+        </p:style>
+        <p:txBody>
+          <a:bodyPr rtlCol="0" anchor="ctr"/>
+          <a:lstStyle/>
+          <a:p>
+            <a:pPr algn="ctr"/>
+            <a:endParaRPr lang="en-US" sz="2000" b="1" dirty="0"/>
+          </a:p>
+        </p:txBody>
+      </p:sp>
+      <p:sp>
+        <p:nvSpPr>
+          <p:cNvPr id="12" name="Prostokąt: zaokrąglone rogi 11">
+            <a:extLst>
+              <a:ext uri="{FF2B5EF4-FFF2-40B4-BE49-F238E27FC236}">
+                <a16:creationId xmlns:a16="http://schemas.microsoft.com/office/drawing/2014/main" id="{852F50F4-2EA9-04DB-76EC-53E0C9F42E51}"/>
+              </a:ext>
+            </a:extLst>
+          </p:cNvPr>
+          <p:cNvSpPr/>
+          <p:nvPr/>
+        </p:nvSpPr>
+        <p:spPr>
+          <a:xfrm>
+            <a:off x="5744551" y="2414650"/>
+            <a:ext cx="2093167" cy="454090"/>
+          </a:xfrm>
+          <a:prstGeom prst="roundRect">
+            <a:avLst/>
+          </a:prstGeom>
+        </p:spPr>
+        <p:style>
+          <a:lnRef idx="1">
+            <a:schemeClr val="accent1"/>
+          </a:lnRef>
+          <a:fillRef idx="2">
+            <a:schemeClr val="accent1"/>
+          </a:fillRef>
+          <a:effectRef idx="1">
+            <a:schemeClr val="accent1"/>
+          </a:effectRef>
+          <a:fontRef idx="minor">
+            <a:schemeClr val="dk1"/>
+          </a:fontRef>
+        </p:style>
+        <p:txBody>
+          <a:bodyPr rtlCol="0" anchor="ctr"/>
+          <a:lstStyle/>
+          <a:p>
+            <a:pPr algn="ctr"/>
+            <a:r>
+              <a:rPr lang="en-US" dirty="0" err="1"/>
+              <a:t>RenderMesh</a:t>
+            </a:r>
+            <a:endParaRPr lang="en-US" dirty="0"/>
+          </a:p>
+        </p:txBody>
+      </p:sp>
+      <p:sp>
+        <p:nvSpPr>
+          <p:cNvPr id="33" name="Prostokąt: zaokrąglone rogi 32">
+            <a:extLst>
+              <a:ext uri="{FF2B5EF4-FFF2-40B4-BE49-F238E27FC236}">
+                <a16:creationId xmlns:a16="http://schemas.microsoft.com/office/drawing/2014/main" id="{7EBF4F22-1A4D-EAB8-2A4D-A122E310FDD9}"/>
+              </a:ext>
+            </a:extLst>
+          </p:cNvPr>
+          <p:cNvSpPr/>
+          <p:nvPr/>
+        </p:nvSpPr>
+        <p:spPr>
+          <a:xfrm>
+            <a:off x="1101012" y="2420046"/>
+            <a:ext cx="2093167" cy="454091"/>
+          </a:xfrm>
+          <a:prstGeom prst="roundRect">
+            <a:avLst/>
+          </a:prstGeom>
+        </p:spPr>
+        <p:style>
+          <a:lnRef idx="1">
+            <a:schemeClr val="accent1"/>
+          </a:lnRef>
+          <a:fillRef idx="2">
+            <a:schemeClr val="accent1"/>
+          </a:fillRef>
+          <a:effectRef idx="1">
+            <a:schemeClr val="accent1"/>
+          </a:effectRef>
+          <a:fontRef idx="minor">
+            <a:schemeClr val="dk1"/>
+          </a:fontRef>
+        </p:style>
+        <p:txBody>
+          <a:bodyPr rtlCol="0" anchor="ctr"/>
+          <a:lstStyle/>
+          <a:p>
+            <a:pPr algn="ctr"/>
+            <a:r>
+              <a:rPr lang="en-US" dirty="0" err="1"/>
+              <a:t>CRenderMesh</a:t>
+            </a:r>
+            <a:endParaRPr lang="en-US" dirty="0"/>
+          </a:p>
+        </p:txBody>
+      </p:sp>
+      <p:sp>
+        <p:nvSpPr>
+          <p:cNvPr id="34" name="Prostokąt: zaokrąglone rogi 33">
+            <a:extLst>
+              <a:ext uri="{FF2B5EF4-FFF2-40B4-BE49-F238E27FC236}">
+                <a16:creationId xmlns:a16="http://schemas.microsoft.com/office/drawing/2014/main" id="{734254AC-514E-330C-B3FE-6341925DA2F1}"/>
+              </a:ext>
+            </a:extLst>
+          </p:cNvPr>
+          <p:cNvSpPr/>
+          <p:nvPr/>
+        </p:nvSpPr>
+        <p:spPr>
+          <a:xfrm>
+            <a:off x="3103985" y="3779794"/>
+            <a:ext cx="7352524" cy="582346"/>
+          </a:xfrm>
+          <a:prstGeom prst="roundRect">
+            <a:avLst/>
+          </a:prstGeom>
+        </p:spPr>
+        <p:style>
+          <a:lnRef idx="1">
+            <a:schemeClr val="accent3"/>
+          </a:lnRef>
+          <a:fillRef idx="2">
+            <a:schemeClr val="accent3"/>
+          </a:fillRef>
+          <a:effectRef idx="1">
+            <a:schemeClr val="accent3"/>
+          </a:effectRef>
+          <a:fontRef idx="minor">
+            <a:schemeClr val="dk1"/>
+          </a:fontRef>
+        </p:style>
+        <p:txBody>
+          <a:bodyPr rtlCol="0" anchor="ctr"/>
+          <a:lstStyle/>
+          <a:p>
+            <a:pPr algn="ctr"/>
+            <a:endParaRPr lang="en-US" sz="2000" b="1" dirty="0"/>
+          </a:p>
+        </p:txBody>
+      </p:sp>
+      <p:sp>
+        <p:nvSpPr>
+          <p:cNvPr id="35" name="Prostokąt: zaokrąglone rogi 34">
+            <a:extLst>
+              <a:ext uri="{FF2B5EF4-FFF2-40B4-BE49-F238E27FC236}">
+                <a16:creationId xmlns:a16="http://schemas.microsoft.com/office/drawing/2014/main" id="{27C4376F-0DDB-1940-75CF-C09C5110E43D}"/>
+              </a:ext>
+            </a:extLst>
+          </p:cNvPr>
+          <p:cNvSpPr/>
+          <p:nvPr/>
+        </p:nvSpPr>
+        <p:spPr>
+          <a:xfrm>
+            <a:off x="1101011" y="3843919"/>
+            <a:ext cx="2093167" cy="454091"/>
+          </a:xfrm>
+          <a:prstGeom prst="roundRect">
+            <a:avLst/>
+          </a:prstGeom>
+        </p:spPr>
+        <p:style>
+          <a:lnRef idx="1">
+            <a:schemeClr val="accent1"/>
+          </a:lnRef>
+          <a:fillRef idx="2">
+            <a:schemeClr val="accent1"/>
+          </a:fillRef>
+          <a:effectRef idx="1">
+            <a:schemeClr val="accent1"/>
+          </a:effectRef>
+          <a:fontRef idx="minor">
+            <a:schemeClr val="dk1"/>
+          </a:fontRef>
+        </p:style>
+        <p:txBody>
+          <a:bodyPr rtlCol="0" anchor="ctr"/>
+          <a:lstStyle/>
+          <a:p>
+            <a:pPr algn="ctr"/>
+            <a:r>
+              <a:rPr lang="en-US" dirty="0" err="1"/>
+              <a:t>CModel</a:t>
+            </a:r>
+            <a:endParaRPr lang="en-US" dirty="0"/>
+          </a:p>
+        </p:txBody>
+      </p:sp>
+      <p:sp>
+        <p:nvSpPr>
+          <p:cNvPr id="36" name="Prostokąt: zaokrąglone rogi 35">
+            <a:extLst>
+              <a:ext uri="{FF2B5EF4-FFF2-40B4-BE49-F238E27FC236}">
+                <a16:creationId xmlns:a16="http://schemas.microsoft.com/office/drawing/2014/main" id="{30CEE5F5-3D2F-2C49-7677-E1148E3B3F82}"/>
+              </a:ext>
+            </a:extLst>
+          </p:cNvPr>
+          <p:cNvSpPr/>
+          <p:nvPr/>
+        </p:nvSpPr>
+        <p:spPr>
+          <a:xfrm>
+            <a:off x="5744550" y="3843919"/>
+            <a:ext cx="2093167" cy="454091"/>
+          </a:xfrm>
+          <a:prstGeom prst="roundRect">
+            <a:avLst/>
+          </a:prstGeom>
+        </p:spPr>
+        <p:style>
+          <a:lnRef idx="1">
+            <a:schemeClr val="accent1"/>
+          </a:lnRef>
+          <a:fillRef idx="2">
+            <a:schemeClr val="accent1"/>
+          </a:fillRef>
+          <a:effectRef idx="1">
+            <a:schemeClr val="accent1"/>
+          </a:effectRef>
+          <a:fontRef idx="minor">
+            <a:schemeClr val="dk1"/>
+          </a:fontRef>
+        </p:style>
+        <p:txBody>
+          <a:bodyPr rtlCol="0" anchor="ctr"/>
+          <a:lstStyle/>
+          <a:p>
+            <a:pPr algn="ctr"/>
+            <a:r>
+              <a:rPr lang="en-US" dirty="0"/>
+              <a:t>Model</a:t>
+            </a:r>
+          </a:p>
+        </p:txBody>
+      </p:sp>
+      <p:sp>
+        <p:nvSpPr>
+          <p:cNvPr id="37" name="Prostokąt: zaokrąglone rogi 36">
+            <a:extLst>
+              <a:ext uri="{FF2B5EF4-FFF2-40B4-BE49-F238E27FC236}">
+                <a16:creationId xmlns:a16="http://schemas.microsoft.com/office/drawing/2014/main" id="{6BA2E05B-8796-2A38-9671-820E4A57BFAF}"/>
+              </a:ext>
+            </a:extLst>
+          </p:cNvPr>
+          <p:cNvSpPr/>
+          <p:nvPr/>
+        </p:nvSpPr>
+        <p:spPr>
+          <a:xfrm>
+            <a:off x="3103985" y="5174711"/>
+            <a:ext cx="7352524" cy="582346"/>
+          </a:xfrm>
+          <a:prstGeom prst="roundRect">
+            <a:avLst/>
+          </a:prstGeom>
+        </p:spPr>
+        <p:style>
+          <a:lnRef idx="1">
+            <a:schemeClr val="accent3"/>
+          </a:lnRef>
+          <a:fillRef idx="2">
+            <a:schemeClr val="accent3"/>
+          </a:fillRef>
+          <a:effectRef idx="1">
+            <a:schemeClr val="accent3"/>
+          </a:effectRef>
+          <a:fontRef idx="minor">
+            <a:schemeClr val="dk1"/>
+          </a:fontRef>
+        </p:style>
+        <p:txBody>
+          <a:bodyPr rtlCol="0" anchor="ctr"/>
+          <a:lstStyle/>
+          <a:p>
+            <a:pPr algn="ctr"/>
+            <a:endParaRPr lang="en-US" sz="1800" b="1" dirty="0"/>
+          </a:p>
+        </p:txBody>
+      </p:sp>
+      <p:sp>
+        <p:nvSpPr>
+          <p:cNvPr id="39" name="Prostokąt: zaokrąglone rogi 38">
+            <a:extLst>
+              <a:ext uri="{FF2B5EF4-FFF2-40B4-BE49-F238E27FC236}">
+                <a16:creationId xmlns:a16="http://schemas.microsoft.com/office/drawing/2014/main" id="{116889B7-C9B1-7923-BDE9-6B1337451F90}"/>
+              </a:ext>
+            </a:extLst>
+          </p:cNvPr>
+          <p:cNvSpPr/>
+          <p:nvPr/>
+        </p:nvSpPr>
+        <p:spPr>
+          <a:xfrm>
+            <a:off x="5685456" y="5247111"/>
+            <a:ext cx="2093167" cy="454091"/>
+          </a:xfrm>
+          <a:prstGeom prst="roundRect">
+            <a:avLst/>
+          </a:prstGeom>
+        </p:spPr>
+        <p:style>
+          <a:lnRef idx="1">
+            <a:schemeClr val="accent1"/>
+          </a:lnRef>
+          <a:fillRef idx="2">
+            <a:schemeClr val="accent1"/>
+          </a:fillRef>
+          <a:effectRef idx="1">
+            <a:schemeClr val="accent1"/>
+          </a:effectRef>
+          <a:fontRef idx="minor">
+            <a:schemeClr val="dk1"/>
+          </a:fontRef>
+        </p:style>
+        <p:txBody>
+          <a:bodyPr rtlCol="0" anchor="ctr"/>
+          <a:lstStyle/>
+          <a:p>
+            <a:pPr algn="ctr"/>
+            <a:r>
+              <a:rPr lang="en-US" dirty="0" err="1"/>
+              <a:t>SkinnedModel</a:t>
+            </a:r>
+            <a:endParaRPr lang="en-US" dirty="0"/>
+          </a:p>
+        </p:txBody>
+      </p:sp>
+      <p:sp>
+        <p:nvSpPr>
+          <p:cNvPr id="40" name="Prostokąt: zaokrąglone rogi 39">
+            <a:extLst>
+              <a:ext uri="{FF2B5EF4-FFF2-40B4-BE49-F238E27FC236}">
+                <a16:creationId xmlns:a16="http://schemas.microsoft.com/office/drawing/2014/main" id="{A0BF6C05-E35A-8CBB-FD45-C607C8B17039}"/>
+              </a:ext>
+            </a:extLst>
+          </p:cNvPr>
+          <p:cNvSpPr/>
+          <p:nvPr/>
+        </p:nvSpPr>
+        <p:spPr>
+          <a:xfrm>
+            <a:off x="1101011" y="5238836"/>
+            <a:ext cx="2093167" cy="454091"/>
+          </a:xfrm>
+          <a:prstGeom prst="roundRect">
+            <a:avLst/>
+          </a:prstGeom>
+        </p:spPr>
+        <p:style>
+          <a:lnRef idx="1">
+            <a:schemeClr val="accent1"/>
+          </a:lnRef>
+          <a:fillRef idx="2">
+            <a:schemeClr val="accent1"/>
+          </a:fillRef>
+          <a:effectRef idx="1">
+            <a:schemeClr val="accent1"/>
+          </a:effectRef>
+          <a:fontRef idx="minor">
+            <a:schemeClr val="dk1"/>
+          </a:fontRef>
+        </p:style>
+        <p:txBody>
+          <a:bodyPr rtlCol="0" anchor="ctr"/>
+          <a:lstStyle/>
+          <a:p>
+            <a:pPr algn="ctr"/>
+            <a:r>
+              <a:rPr lang="en-US" dirty="0" err="1"/>
+              <a:t>CSkinnedModel</a:t>
+            </a:r>
+            <a:endParaRPr lang="en-US" dirty="0"/>
+          </a:p>
+        </p:txBody>
+      </p:sp>
+      <p:sp>
+        <p:nvSpPr>
+          <p:cNvPr id="42" name="Prostokąt: zaokrąglone rogi 41">
+            <a:extLst>
+              <a:ext uri="{FF2B5EF4-FFF2-40B4-BE49-F238E27FC236}">
+                <a16:creationId xmlns:a16="http://schemas.microsoft.com/office/drawing/2014/main" id="{C895747E-6E04-68FD-75D3-4A19EAFCDF22}"/>
+              </a:ext>
+            </a:extLst>
+          </p:cNvPr>
+          <p:cNvSpPr/>
+          <p:nvPr/>
+        </p:nvSpPr>
+        <p:spPr>
+          <a:xfrm>
+            <a:off x="5766316" y="4555847"/>
+            <a:ext cx="2093167" cy="454091"/>
+          </a:xfrm>
+          <a:prstGeom prst="roundRect">
+            <a:avLst/>
+          </a:prstGeom>
+        </p:spPr>
+        <p:style>
+          <a:lnRef idx="1">
+            <a:schemeClr val="accent1"/>
+          </a:lnRef>
+          <a:fillRef idx="2">
+            <a:schemeClr val="accent1"/>
+          </a:fillRef>
+          <a:effectRef idx="1">
+            <a:schemeClr val="accent1"/>
+          </a:effectRef>
+          <a:fontRef idx="minor">
+            <a:schemeClr val="dk1"/>
+          </a:fontRef>
+        </p:style>
+        <p:txBody>
+          <a:bodyPr rtlCol="0" anchor="ctr"/>
+          <a:lstStyle/>
+          <a:p>
+            <a:pPr algn="ctr"/>
+            <a:r>
+              <a:rPr lang="en-US" dirty="0"/>
+              <a:t>N × </a:t>
+            </a:r>
+            <a:r>
+              <a:rPr lang="en-US" dirty="0" err="1"/>
+              <a:t>RenderMesh</a:t>
+            </a:r>
+            <a:endParaRPr lang="en-US" dirty="0"/>
+          </a:p>
+        </p:txBody>
+      </p:sp>
+    </p:spTree>
+    <p:extLst>
+      <p:ext uri="{BB962C8B-B14F-4D97-AF65-F5344CB8AC3E}">
+        <p14:creationId xmlns:p14="http://schemas.microsoft.com/office/powerpoint/2010/main" val="687407255"/>
+      </p:ext>
+    </p:extLst>
+  </p:cSld>
+  <p:clrMapOvr>
+    <a:masterClrMapping/>
+  </p:clrMapOvr>
+</p:sld>
+</file>
+
+<file path=ppt/slides/slide5.xml><?xml version="1.0" encoding="utf-8"?>
 <p:sld xmlns:a="http://schemas.openxmlformats.org/drawingml/2006/main" xmlns:r="http://schemas.openxmlformats.org/officeDocument/2006/relationships" xmlns:p="http://schemas.openxmlformats.org/presentationml/2006/main">
   <p:cSld>
     <p:spTree>
@@ -7822,7 +8897,7 @@
         <p:spPr>
           <a:xfrm>
             <a:off x="369804" y="3043024"/>
-            <a:ext cx="6441821" cy="1077218"/>
+            <a:ext cx="7729167" cy="1077218"/>
           </a:xfrm>
           <a:prstGeom prst="rect">
             <a:avLst/>
@@ -7851,7 +8926,15 @@
             </a:pPr>
             <a:r>
               <a:rPr lang="en-US" sz="1600" dirty="0"/>
-              <a:t>Sorts assets based on theirs scores:</a:t>
+              <a:t>Sorts assets based on their</a:t>
+            </a:r>
+            <a:r>
+              <a:rPr lang="pl-PL" sz="1600" dirty="0"/>
+              <a:t>’</a:t>
+            </a:r>
+            <a:r>
+              <a:rPr lang="en-US" sz="1600" dirty="0"/>
+              <a:t>s scores:</a:t>
             </a:r>
           </a:p>
           <a:p>
@@ -7861,7 +8944,7 @@
             </a:pPr>
             <a:r>
               <a:rPr lang="en-US" sz="1600" dirty="0"/>
-              <a:t>Load as many assets as much memory is available going from highest score down (and unloading going from lowest score up).</a:t>
+              <a:t>Load as many assets as much memory is available going from the highest score down (and unloading going from lowest score up).</a:t>
             </a:r>
           </a:p>
         </p:txBody>
@@ -7879,7 +8962,7 @@
 </p:sld>
 </file>
 
-<file path=ppt/slides/slide5.xml><?xml version="1.0" encoding="utf-8"?>
+<file path=ppt/slides/slide6.xml><?xml version="1.0" encoding="utf-8"?>
 <p:sld xmlns:a="http://schemas.openxmlformats.org/drawingml/2006/main" xmlns:r="http://schemas.openxmlformats.org/officeDocument/2006/relationships" xmlns:p="http://schemas.openxmlformats.org/presentationml/2006/main">
   <p:cSld>
     <p:spTree>
@@ -9585,7 +10668,7 @@
 </p:sld>
 </file>
 
-<file path=ppt/slides/slide6.xml><?xml version="1.0" encoding="utf-8"?>
+<file path=ppt/slides/slide7.xml><?xml version="1.0" encoding="utf-8"?>
 <p:sld xmlns:a="http://schemas.openxmlformats.org/drawingml/2006/main" xmlns:r="http://schemas.openxmlformats.org/officeDocument/2006/relationships" xmlns:p="http://schemas.openxmlformats.org/presentationml/2006/main">
   <p:cSld>
     <p:spTree>
@@ -11979,7 +13062,7 @@
 </p:sld>
 </file>
 
-<file path=ppt/slides/slide7.xml><?xml version="1.0" encoding="utf-8"?>
+<file path=ppt/slides/slide8.xml><?xml version="1.0" encoding="utf-8"?>
 <p:sld xmlns:a="http://schemas.openxmlformats.org/drawingml/2006/main" xmlns:r="http://schemas.openxmlformats.org/officeDocument/2006/relationships" xmlns:p="http://schemas.openxmlformats.org/presentationml/2006/main">
   <p:cSld>
     <p:spTree>
@@ -12004,10 +13087,10 @@
       </p:grpSpPr>
       <p:pic>
         <p:nvPicPr>
-          <p:cNvPr id="5" name="Obraz 4">
-            <a:extLst>
-              <a:ext uri="{FF2B5EF4-FFF2-40B4-BE49-F238E27FC236}">
-                <a16:creationId xmlns:a16="http://schemas.microsoft.com/office/drawing/2014/main" id="{2D34841B-C04C-FFF1-87C8-72881EFBEEFE}"/>
+          <p:cNvPr id="7" name="Obraz 6">
+            <a:extLst>
+              <a:ext uri="{FF2B5EF4-FFF2-40B4-BE49-F238E27FC236}">
+                <a16:creationId xmlns:a16="http://schemas.microsoft.com/office/drawing/2014/main" id="{4ABE271D-3EB0-8847-23AF-B19809082E5F}"/>
               </a:ext>
             </a:extLst>
           </p:cNvPr>
@@ -12024,8 +13107,8 @@
         </p:blipFill>
         <p:spPr>
           <a:xfrm>
-            <a:off x="2270799" y="1255893"/>
-            <a:ext cx="8371801" cy="2603914"/>
+            <a:off x="5124577" y="996984"/>
+            <a:ext cx="6868239" cy="1887292"/>
           </a:xfrm>
           <a:prstGeom prst="rect">
             <a:avLst/>
@@ -12087,715 +13170,36 @@
           </a:p>
         </p:txBody>
       </p:sp>
-      <p:sp>
-        <p:nvSpPr>
-          <p:cNvPr id="2" name="Prostokąt: zaokrąglone rogi 1">
-            <a:extLst>
-              <a:ext uri="{FF2B5EF4-FFF2-40B4-BE49-F238E27FC236}">
-                <a16:creationId xmlns:a16="http://schemas.microsoft.com/office/drawing/2014/main" id="{BA87AED6-D731-709A-98FC-6434E9FF1E83}"/>
-              </a:ext>
-            </a:extLst>
-          </p:cNvPr>
-          <p:cNvSpPr/>
-          <p:nvPr/>
-        </p:nvSpPr>
-        <p:spPr>
-          <a:xfrm>
-            <a:off x="479842" y="2101330"/>
-            <a:ext cx="1435749" cy="1219199"/>
-          </a:xfrm>
-          <a:prstGeom prst="roundRect">
-            <a:avLst/>
-          </a:prstGeom>
-        </p:spPr>
-        <p:style>
-          <a:lnRef idx="1">
-            <a:schemeClr val="accent6"/>
-          </a:lnRef>
-          <a:fillRef idx="2">
-            <a:schemeClr val="accent6"/>
-          </a:fillRef>
-          <a:effectRef idx="1">
-            <a:schemeClr val="accent6"/>
-          </a:effectRef>
-          <a:fontRef idx="minor">
-            <a:schemeClr val="dk1"/>
-          </a:fontRef>
-        </p:style>
-        <p:txBody>
-          <a:bodyPr rtlCol="0" anchor="ctr"/>
-          <a:lstStyle/>
-          <a:p>
-            <a:pPr algn="ctr"/>
-            <a:r>
-              <a:rPr lang="en-US" sz="1200" dirty="0"/>
-              <a:t>Dedicated scope to destroy </a:t>
-            </a:r>
-            <a:r>
-              <a:rPr lang="en-US" sz="1200" dirty="0" err="1"/>
-              <a:t>shader_observer</a:t>
-            </a:r>
-            <a:r>
-              <a:rPr lang="en-US" sz="1200" dirty="0"/>
-              <a:t> and release locks when its no longer needed</a:t>
-            </a:r>
-          </a:p>
-        </p:txBody>
-      </p:sp>
-      <p:sp>
-        <p:nvSpPr>
-          <p:cNvPr id="6" name="Nawias klamrowy otwierający 5">
-            <a:extLst>
-              <a:ext uri="{FF2B5EF4-FFF2-40B4-BE49-F238E27FC236}">
-                <a16:creationId xmlns:a16="http://schemas.microsoft.com/office/drawing/2014/main" id="{0AFAEBB2-30B9-7ACD-4FC9-03F35C22FCF5}"/>
-              </a:ext>
-            </a:extLst>
-          </p:cNvPr>
-          <p:cNvSpPr/>
-          <p:nvPr/>
-        </p:nvSpPr>
-        <p:spPr>
-          <a:xfrm>
-            <a:off x="1970184" y="2133080"/>
-            <a:ext cx="367004" cy="1219200"/>
-          </a:xfrm>
-          <a:prstGeom prst="leftBrace">
-            <a:avLst>
-              <a:gd name="adj1" fmla="val 55149"/>
-              <a:gd name="adj2" fmla="val 50000"/>
-            </a:avLst>
-          </a:prstGeom>
-          <a:ln w="38100">
-            <a:solidFill>
-              <a:schemeClr val="accent6"/>
-            </a:solidFill>
-          </a:ln>
-        </p:spPr>
-        <p:style>
-          <a:lnRef idx="3">
-            <a:schemeClr val="dk1"/>
-          </a:lnRef>
-          <a:fillRef idx="0">
-            <a:schemeClr val="dk1"/>
-          </a:fillRef>
-          <a:effectRef idx="2">
-            <a:schemeClr val="dk1"/>
-          </a:effectRef>
-          <a:fontRef idx="minor">
-            <a:schemeClr val="tx1"/>
-          </a:fontRef>
-        </p:style>
-        <p:txBody>
-          <a:bodyPr rtlCol="0" anchor="ctr"/>
-          <a:lstStyle/>
-          <a:p>
-            <a:pPr algn="ctr"/>
-            <a:endParaRPr lang="en-US" dirty="0"/>
-          </a:p>
-        </p:txBody>
-      </p:sp>
-      <p:cxnSp>
-        <p:nvCxnSpPr>
-          <p:cNvPr id="10" name="Łącznik prosty 9">
-            <a:extLst>
-              <a:ext uri="{FF2B5EF4-FFF2-40B4-BE49-F238E27FC236}">
-                <a16:creationId xmlns:a16="http://schemas.microsoft.com/office/drawing/2014/main" id="{ED9AAB46-268A-BE8A-E15E-AD0AD03C9FB9}"/>
-              </a:ext>
-            </a:extLst>
-          </p:cNvPr>
-          <p:cNvCxnSpPr/>
-          <p:nvPr/>
-        </p:nvCxnSpPr>
-        <p:spPr>
-          <a:xfrm>
-            <a:off x="6131773" y="2101330"/>
-            <a:ext cx="734009" cy="0"/>
-          </a:xfrm>
-          <a:prstGeom prst="line">
-            <a:avLst/>
-          </a:prstGeom>
-          <a:ln w="28575">
-            <a:solidFill>
-              <a:srgbClr val="FFFF00"/>
-            </a:solidFill>
-          </a:ln>
-        </p:spPr>
-        <p:style>
-          <a:lnRef idx="3">
-            <a:schemeClr val="accent1"/>
-          </a:lnRef>
-          <a:fillRef idx="0">
-            <a:schemeClr val="accent1"/>
-          </a:fillRef>
-          <a:effectRef idx="2">
-            <a:schemeClr val="accent1"/>
-          </a:effectRef>
-          <a:fontRef idx="minor">
-            <a:schemeClr val="tx1"/>
-          </a:fontRef>
-        </p:style>
-      </p:cxnSp>
-      <p:cxnSp>
-        <p:nvCxnSpPr>
-          <p:cNvPr id="11" name="Łącznik prosty 10">
-            <a:extLst>
-              <a:ext uri="{FF2B5EF4-FFF2-40B4-BE49-F238E27FC236}">
-                <a16:creationId xmlns:a16="http://schemas.microsoft.com/office/drawing/2014/main" id="{E406229B-3FAC-D5D7-D50B-4D416FD22920}"/>
-              </a:ext>
-            </a:extLst>
-          </p:cNvPr>
-          <p:cNvCxnSpPr>
-            <a:cxnSpLocks/>
-          </p:cNvCxnSpPr>
-          <p:nvPr/>
-        </p:nvCxnSpPr>
-        <p:spPr>
-          <a:xfrm flipV="1">
-            <a:off x="7112000" y="3747092"/>
-            <a:ext cx="650655" cy="1480"/>
-          </a:xfrm>
-          <a:prstGeom prst="line">
-            <a:avLst/>
-          </a:prstGeom>
-          <a:ln w="38100">
-            <a:solidFill>
-              <a:srgbClr val="FFFF00"/>
-            </a:solidFill>
-          </a:ln>
-        </p:spPr>
-        <p:style>
-          <a:lnRef idx="3">
-            <a:schemeClr val="accent1"/>
-          </a:lnRef>
-          <a:fillRef idx="0">
-            <a:schemeClr val="accent1"/>
-          </a:fillRef>
-          <a:effectRef idx="2">
-            <a:schemeClr val="accent1"/>
-          </a:effectRef>
-          <a:fontRef idx="minor">
-            <a:schemeClr val="tx1"/>
-          </a:fontRef>
-        </p:style>
-      </p:cxnSp>
-      <p:sp>
-        <p:nvSpPr>
-          <p:cNvPr id="63" name="Prostokąt: zaokrąglone rogi 62">
-            <a:extLst>
-              <a:ext uri="{FF2B5EF4-FFF2-40B4-BE49-F238E27FC236}">
-                <a16:creationId xmlns:a16="http://schemas.microsoft.com/office/drawing/2014/main" id="{C7B617CD-A88D-6BD5-612E-D345F53B601E}"/>
-              </a:ext>
-            </a:extLst>
-          </p:cNvPr>
-          <p:cNvSpPr/>
-          <p:nvPr/>
-        </p:nvSpPr>
-        <p:spPr>
-          <a:xfrm>
-            <a:off x="7803372" y="4297645"/>
-            <a:ext cx="3645156" cy="666621"/>
-          </a:xfrm>
-          <a:prstGeom prst="roundRect">
-            <a:avLst/>
-          </a:prstGeom>
-        </p:spPr>
-        <p:style>
-          <a:lnRef idx="1">
-            <a:schemeClr val="accent4"/>
-          </a:lnRef>
-          <a:fillRef idx="2">
-            <a:schemeClr val="accent4"/>
-          </a:fillRef>
-          <a:effectRef idx="1">
-            <a:schemeClr val="accent4"/>
-          </a:effectRef>
-          <a:fontRef idx="minor">
-            <a:schemeClr val="dk1"/>
-          </a:fontRef>
-        </p:style>
-        <p:txBody>
-          <a:bodyPr rtlCol="0" anchor="ctr"/>
-          <a:lstStyle/>
-          <a:p>
-            <a:pPr algn="ctr"/>
-            <a:r>
-              <a:rPr lang="en-US" sz="1200" dirty="0"/>
-              <a:t>Use() and Observe() are chainable for convenience.</a:t>
-            </a:r>
-          </a:p>
-          <a:p>
-            <a:pPr algn="ctr"/>
-            <a:r>
-              <a:rPr lang="en-US" sz="1200" dirty="0"/>
-              <a:t>Synchronization is inline (beware of the cost!).</a:t>
-            </a:r>
-          </a:p>
-        </p:txBody>
-      </p:sp>
-      <p:cxnSp>
-        <p:nvCxnSpPr>
-          <p:cNvPr id="71" name="Łącznik prosty 70">
-            <a:extLst>
-              <a:ext uri="{FF2B5EF4-FFF2-40B4-BE49-F238E27FC236}">
-                <a16:creationId xmlns:a16="http://schemas.microsoft.com/office/drawing/2014/main" id="{1E441B41-D2FE-82B9-A6A5-74E3B2B9FBC7}"/>
-              </a:ext>
-            </a:extLst>
-          </p:cNvPr>
-          <p:cNvCxnSpPr>
-            <a:cxnSpLocks/>
-          </p:cNvCxnSpPr>
-          <p:nvPr/>
-        </p:nvCxnSpPr>
-        <p:spPr>
-          <a:xfrm flipV="1">
-            <a:off x="4358824" y="2443024"/>
-            <a:ext cx="3779030" cy="10241"/>
-          </a:xfrm>
-          <a:prstGeom prst="line">
-            <a:avLst/>
-          </a:prstGeom>
-          <a:ln w="28575">
-            <a:solidFill>
-              <a:srgbClr val="FF0000"/>
-            </a:solidFill>
-          </a:ln>
-        </p:spPr>
-        <p:style>
-          <a:lnRef idx="3">
-            <a:schemeClr val="accent1"/>
-          </a:lnRef>
-          <a:fillRef idx="0">
-            <a:schemeClr val="accent1"/>
-          </a:fillRef>
-          <a:effectRef idx="2">
-            <a:schemeClr val="accent1"/>
-          </a:effectRef>
-          <a:fontRef idx="minor">
-            <a:schemeClr val="tx1"/>
-          </a:fontRef>
-        </p:style>
-      </p:cxnSp>
-      <p:sp>
-        <p:nvSpPr>
-          <p:cNvPr id="81" name="Prostokąt: zaokrąglone rogi 80">
-            <a:extLst>
-              <a:ext uri="{FF2B5EF4-FFF2-40B4-BE49-F238E27FC236}">
-                <a16:creationId xmlns:a16="http://schemas.microsoft.com/office/drawing/2014/main" id="{247C19A0-D2AE-C068-79EF-8EFAF8DC93C6}"/>
-              </a:ext>
-            </a:extLst>
-          </p:cNvPr>
-          <p:cNvSpPr/>
-          <p:nvPr/>
-        </p:nvSpPr>
-        <p:spPr>
-          <a:xfrm>
-            <a:off x="1238085" y="4434874"/>
-            <a:ext cx="4086802" cy="1058784"/>
-          </a:xfrm>
-          <a:prstGeom prst="roundRect">
-            <a:avLst/>
-          </a:prstGeom>
-        </p:spPr>
-        <p:style>
-          <a:lnRef idx="1">
-            <a:schemeClr val="accent2"/>
-          </a:lnRef>
-          <a:fillRef idx="2">
-            <a:schemeClr val="accent2"/>
-          </a:fillRef>
-          <a:effectRef idx="1">
-            <a:schemeClr val="accent2"/>
-          </a:effectRef>
-          <a:fontRef idx="minor">
-            <a:schemeClr val="dk1"/>
-          </a:fontRef>
-        </p:style>
-        <p:txBody>
-          <a:bodyPr rtlCol="0" anchor="ctr"/>
-          <a:lstStyle/>
-          <a:p>
-            <a:pPr algn="ctr"/>
-            <a:r>
-              <a:rPr lang="en-US" sz="1200" dirty="0" err="1"/>
-              <a:t>AssetHandle</a:t>
-            </a:r>
-            <a:r>
-              <a:rPr lang="en-US" sz="1200" dirty="0"/>
-              <a:t> is constructible on the fly.</a:t>
-            </a:r>
-          </a:p>
-          <a:p>
-            <a:pPr algn="ctr"/>
-            <a:endParaRPr lang="en-US" sz="1200" dirty="0"/>
-          </a:p>
-          <a:p>
-            <a:pPr algn="ctr"/>
-            <a:r>
-              <a:rPr lang="en-US" sz="1200" dirty="0" err="1"/>
-              <a:t>AssetHandles</a:t>
-            </a:r>
-            <a:r>
-              <a:rPr lang="en-US" sz="1200" dirty="0"/>
-              <a:t> with </a:t>
-            </a:r>
-            <a:r>
-              <a:rPr lang="en-US" sz="1200" dirty="0" err="1"/>
-              <a:t>AssetLoadingPriority</a:t>
-            </a:r>
-            <a:r>
-              <a:rPr lang="en-US" sz="1200" dirty="0"/>
-              <a:t>::None are not globally counted – no hidden cost.</a:t>
-            </a:r>
-          </a:p>
-        </p:txBody>
-      </p:sp>
-      <p:sp>
-        <p:nvSpPr>
-          <p:cNvPr id="94" name="Łuk 93">
-            <a:extLst>
-              <a:ext uri="{FF2B5EF4-FFF2-40B4-BE49-F238E27FC236}">
-                <a16:creationId xmlns:a16="http://schemas.microsoft.com/office/drawing/2014/main" id="{A4E96E68-DB85-581D-84BA-BFE55E13D1FC}"/>
-              </a:ext>
-            </a:extLst>
-          </p:cNvPr>
-          <p:cNvSpPr/>
-          <p:nvPr/>
-        </p:nvSpPr>
-        <p:spPr>
-          <a:xfrm flipH="1">
-            <a:off x="2133267" y="2448144"/>
-            <a:ext cx="4451114" cy="3957526"/>
-          </a:xfrm>
-          <a:prstGeom prst="arc">
-            <a:avLst/>
-          </a:prstGeom>
-          <a:ln w="28575">
-            <a:solidFill>
-              <a:srgbClr val="FF0000"/>
-            </a:solidFill>
-            <a:headEnd type="none" w="med" len="med"/>
-            <a:tailEnd type="triangle" w="med" len="med"/>
-          </a:ln>
-        </p:spPr>
-        <p:style>
-          <a:lnRef idx="1">
-            <a:schemeClr val="accent1"/>
-          </a:lnRef>
-          <a:fillRef idx="0">
-            <a:schemeClr val="accent1"/>
-          </a:fillRef>
-          <a:effectRef idx="0">
-            <a:schemeClr val="accent1"/>
-          </a:effectRef>
-          <a:fontRef idx="minor">
-            <a:schemeClr val="tx1"/>
-          </a:fontRef>
-        </p:style>
-        <p:txBody>
-          <a:bodyPr rtlCol="0" anchor="ctr"/>
-          <a:lstStyle/>
-          <a:p>
-            <a:pPr algn="ctr"/>
-            <a:endParaRPr lang="en-US"/>
-          </a:p>
-        </p:txBody>
-      </p:sp>
-      <p:cxnSp>
-        <p:nvCxnSpPr>
-          <p:cNvPr id="14" name="Łącznik prosty 13">
-            <a:extLst>
-              <a:ext uri="{FF2B5EF4-FFF2-40B4-BE49-F238E27FC236}">
-                <a16:creationId xmlns:a16="http://schemas.microsoft.com/office/drawing/2014/main" id="{650A180E-92C1-8DFE-E570-0D3884EF6749}"/>
-              </a:ext>
-            </a:extLst>
-          </p:cNvPr>
-          <p:cNvCxnSpPr>
-            <a:cxnSpLocks/>
-          </p:cNvCxnSpPr>
-          <p:nvPr/>
-        </p:nvCxnSpPr>
-        <p:spPr>
-          <a:xfrm>
-            <a:off x="4214548" y="1946173"/>
-            <a:ext cx="5272352" cy="0"/>
-          </a:xfrm>
-          <a:prstGeom prst="line">
-            <a:avLst/>
-          </a:prstGeom>
-          <a:ln w="28575">
-            <a:solidFill>
-              <a:srgbClr val="FF0000"/>
-            </a:solidFill>
-          </a:ln>
-        </p:spPr>
-        <p:style>
-          <a:lnRef idx="3">
-            <a:schemeClr val="accent1"/>
-          </a:lnRef>
-          <a:fillRef idx="0">
-            <a:schemeClr val="accent1"/>
-          </a:fillRef>
-          <a:effectRef idx="2">
-            <a:schemeClr val="accent1"/>
-          </a:effectRef>
-          <a:fontRef idx="minor">
-            <a:schemeClr val="tx1"/>
-          </a:fontRef>
-        </p:style>
-      </p:cxnSp>
-      <p:sp>
-        <p:nvSpPr>
-          <p:cNvPr id="22" name="Łuk 21">
-            <a:extLst>
-              <a:ext uri="{FF2B5EF4-FFF2-40B4-BE49-F238E27FC236}">
-                <a16:creationId xmlns:a16="http://schemas.microsoft.com/office/drawing/2014/main" id="{AD27090E-36E8-26A3-3128-8420F7C6807A}"/>
-              </a:ext>
-            </a:extLst>
-          </p:cNvPr>
-          <p:cNvSpPr/>
-          <p:nvPr/>
-        </p:nvSpPr>
-        <p:spPr>
-          <a:xfrm rot="5400000" flipH="1" flipV="1">
-            <a:off x="4590577" y="1466807"/>
-            <a:ext cx="4412787" cy="5681834"/>
-          </a:xfrm>
-          <a:prstGeom prst="arc">
-            <a:avLst>
-              <a:gd name="adj1" fmla="val 87858"/>
-              <a:gd name="adj2" fmla="val 5365406"/>
-            </a:avLst>
-          </a:prstGeom>
-          <a:ln w="28575">
-            <a:solidFill>
-              <a:srgbClr val="FFFF00"/>
-            </a:solidFill>
-            <a:headEnd type="none" w="med" len="med"/>
-            <a:tailEnd type="triangle" w="med" len="med"/>
-          </a:ln>
-        </p:spPr>
-        <p:style>
-          <a:lnRef idx="1">
-            <a:schemeClr val="accent1"/>
-          </a:lnRef>
-          <a:fillRef idx="0">
-            <a:schemeClr val="accent1"/>
-          </a:fillRef>
-          <a:effectRef idx="0">
-            <a:schemeClr val="accent1"/>
-          </a:effectRef>
-          <a:fontRef idx="minor">
-            <a:schemeClr val="tx1"/>
-          </a:fontRef>
-        </p:style>
-        <p:txBody>
-          <a:bodyPr rtlCol="0" anchor="ctr"/>
-          <a:lstStyle/>
-          <a:p>
-            <a:pPr algn="ctr"/>
-            <a:endParaRPr lang="en-US"/>
-          </a:p>
-        </p:txBody>
-      </p:sp>
-      <p:sp>
-        <p:nvSpPr>
-          <p:cNvPr id="26" name="Łuk 25">
-            <a:extLst>
-              <a:ext uri="{FF2B5EF4-FFF2-40B4-BE49-F238E27FC236}">
-                <a16:creationId xmlns:a16="http://schemas.microsoft.com/office/drawing/2014/main" id="{FB6D6F38-CC39-19D6-79BD-D8E177A58D93}"/>
-              </a:ext>
-            </a:extLst>
-          </p:cNvPr>
-          <p:cNvSpPr/>
-          <p:nvPr/>
-        </p:nvSpPr>
-        <p:spPr>
-          <a:xfrm flipH="1">
-            <a:off x="2130534" y="1946173"/>
-            <a:ext cx="4155966" cy="4960461"/>
-          </a:xfrm>
-          <a:prstGeom prst="arc">
-            <a:avLst/>
-          </a:prstGeom>
-          <a:ln w="28575">
-            <a:solidFill>
-              <a:srgbClr val="FF0000"/>
-            </a:solidFill>
-            <a:headEnd type="none" w="med" len="med"/>
-            <a:tailEnd type="triangle" w="med" len="med"/>
-          </a:ln>
-        </p:spPr>
-        <p:style>
-          <a:lnRef idx="1">
-            <a:schemeClr val="accent1"/>
-          </a:lnRef>
-          <a:fillRef idx="0">
-            <a:schemeClr val="accent1"/>
-          </a:fillRef>
-          <a:effectRef idx="0">
-            <a:schemeClr val="accent1"/>
-          </a:effectRef>
-          <a:fontRef idx="minor">
-            <a:schemeClr val="tx1"/>
-          </a:fontRef>
-        </p:style>
-        <p:txBody>
-          <a:bodyPr rtlCol="0" anchor="ctr"/>
-          <a:lstStyle/>
-          <a:p>
-            <a:pPr algn="ctr"/>
-            <a:endParaRPr lang="en-US"/>
-          </a:p>
-        </p:txBody>
-      </p:sp>
-      <p:sp>
-        <p:nvSpPr>
-          <p:cNvPr id="28" name="Łuk 27">
-            <a:extLst>
-              <a:ext uri="{FF2B5EF4-FFF2-40B4-BE49-F238E27FC236}">
-                <a16:creationId xmlns:a16="http://schemas.microsoft.com/office/drawing/2014/main" id="{7AE2D700-25D6-7916-5ED2-1ABDBBBDD08E}"/>
-              </a:ext>
-            </a:extLst>
-          </p:cNvPr>
-          <p:cNvSpPr/>
-          <p:nvPr/>
-        </p:nvSpPr>
-        <p:spPr>
-          <a:xfrm rot="5400000" flipH="1" flipV="1">
-            <a:off x="7150852" y="2374740"/>
-            <a:ext cx="1115577" cy="3847582"/>
-          </a:xfrm>
-          <a:prstGeom prst="arc">
-            <a:avLst>
-              <a:gd name="adj1" fmla="val 87858"/>
-              <a:gd name="adj2" fmla="val 5365406"/>
-            </a:avLst>
-          </a:prstGeom>
-          <a:ln w="28575">
-            <a:solidFill>
-              <a:srgbClr val="FFFF00"/>
-            </a:solidFill>
-            <a:headEnd type="none" w="med" len="med"/>
-            <a:tailEnd type="triangle" w="med" len="med"/>
-          </a:ln>
-        </p:spPr>
-        <p:style>
-          <a:lnRef idx="1">
-            <a:schemeClr val="accent1"/>
-          </a:lnRef>
-          <a:fillRef idx="0">
-            <a:schemeClr val="accent1"/>
-          </a:fillRef>
-          <a:effectRef idx="0">
-            <a:schemeClr val="accent1"/>
-          </a:effectRef>
-          <a:fontRef idx="minor">
-            <a:schemeClr val="tx1"/>
-          </a:fontRef>
-        </p:style>
-        <p:txBody>
-          <a:bodyPr rtlCol="0" anchor="ctr"/>
-          <a:lstStyle/>
-          <a:p>
-            <a:pPr algn="ctr"/>
-            <a:endParaRPr lang="en-US"/>
-          </a:p>
-        </p:txBody>
-      </p:sp>
-      <p:cxnSp>
-        <p:nvCxnSpPr>
-          <p:cNvPr id="29" name="Łącznik prosty 28">
-            <a:extLst>
-              <a:ext uri="{FF2B5EF4-FFF2-40B4-BE49-F238E27FC236}">
-                <a16:creationId xmlns:a16="http://schemas.microsoft.com/office/drawing/2014/main" id="{0E1BAE77-2E62-635A-960E-D8CE45C93A4E}"/>
-              </a:ext>
-            </a:extLst>
-          </p:cNvPr>
-          <p:cNvCxnSpPr>
-            <a:cxnSpLocks/>
-          </p:cNvCxnSpPr>
-          <p:nvPr/>
-        </p:nvCxnSpPr>
-        <p:spPr>
-          <a:xfrm>
-            <a:off x="2418572" y="3743303"/>
-            <a:ext cx="4625771" cy="3789"/>
-          </a:xfrm>
-          <a:prstGeom prst="line">
-            <a:avLst/>
-          </a:prstGeom>
-          <a:ln w="28575">
-            <a:solidFill>
-              <a:srgbClr val="FF0000"/>
-            </a:solidFill>
-          </a:ln>
-        </p:spPr>
-        <p:style>
-          <a:lnRef idx="3">
-            <a:schemeClr val="accent1"/>
-          </a:lnRef>
-          <a:fillRef idx="0">
-            <a:schemeClr val="accent1"/>
-          </a:fillRef>
-          <a:effectRef idx="2">
-            <a:schemeClr val="accent1"/>
-          </a:effectRef>
-          <a:fontRef idx="minor">
-            <a:schemeClr val="tx1"/>
-          </a:fontRef>
-        </p:style>
-      </p:cxnSp>
-      <p:sp>
-        <p:nvSpPr>
-          <p:cNvPr id="32" name="Łuk 31">
-            <a:extLst>
-              <a:ext uri="{FF2B5EF4-FFF2-40B4-BE49-F238E27FC236}">
-                <a16:creationId xmlns:a16="http://schemas.microsoft.com/office/drawing/2014/main" id="{7E163559-6A1C-20D6-277D-4F74766241EA}"/>
-              </a:ext>
-            </a:extLst>
-          </p:cNvPr>
-          <p:cNvSpPr/>
-          <p:nvPr/>
-        </p:nvSpPr>
-        <p:spPr>
-          <a:xfrm flipH="1">
-            <a:off x="2127810" y="3738946"/>
-            <a:ext cx="603531" cy="1391854"/>
-          </a:xfrm>
-          <a:prstGeom prst="arc">
-            <a:avLst/>
-          </a:prstGeom>
-          <a:ln w="28575">
-            <a:solidFill>
-              <a:srgbClr val="FF0000"/>
-            </a:solidFill>
-            <a:headEnd type="none" w="med" len="med"/>
-            <a:tailEnd type="triangle" w="med" len="med"/>
-          </a:ln>
-        </p:spPr>
-        <p:style>
-          <a:lnRef idx="1">
-            <a:schemeClr val="accent1"/>
-          </a:lnRef>
-          <a:fillRef idx="0">
-            <a:schemeClr val="accent1"/>
-          </a:fillRef>
-          <a:effectRef idx="0">
-            <a:schemeClr val="accent1"/>
-          </a:effectRef>
-          <a:fontRef idx="minor">
-            <a:schemeClr val="tx1"/>
-          </a:fontRef>
-        </p:style>
-        <p:txBody>
-          <a:bodyPr rtlCol="0" anchor="ctr"/>
-          <a:lstStyle/>
-          <a:p>
-            <a:pPr algn="ctr"/>
-            <a:endParaRPr lang="en-US"/>
-          </a:p>
-        </p:txBody>
-      </p:sp>
+      <p:pic>
+        <p:nvPicPr>
+          <p:cNvPr id="9" name="Obraz 8">
+            <a:extLst>
+              <a:ext uri="{FF2B5EF4-FFF2-40B4-BE49-F238E27FC236}">
+                <a16:creationId xmlns:a16="http://schemas.microsoft.com/office/drawing/2014/main" id="{FB88DCAA-9953-7025-1033-F2A6890943F1}"/>
+              </a:ext>
+            </a:extLst>
+          </p:cNvPr>
+          <p:cNvPicPr>
+            <a:picLocks noChangeAspect="1"/>
+          </p:cNvPicPr>
+          <p:nvPr/>
+        </p:nvPicPr>
+        <p:blipFill>
+          <a:blip r:embed="rId3"/>
+          <a:stretch>
+            <a:fillRect/>
+          </a:stretch>
+        </p:blipFill>
+        <p:spPr>
+          <a:xfrm>
+            <a:off x="199184" y="996984"/>
+            <a:ext cx="4746041" cy="3763008"/>
+          </a:xfrm>
+          <a:prstGeom prst="rect">
+            <a:avLst/>
+          </a:prstGeom>
+        </p:spPr>
+      </p:pic>
     </p:spTree>
     <p:extLst>
       <p:ext uri="{BB962C8B-B14F-4D97-AF65-F5344CB8AC3E}">

</xml_diff>